<commit_message>
Add more slides for my presentation of my thesis
</commit_message>
<xml_diff>
--- a/doc/diapositivas_sustentacion_tesis.pptx
+++ b/doc/diapositivas_sustentacion_tesis.pptx
@@ -5,7 +5,7 @@
     <p:sldMasterId id="2147483672" r:id="rId1"/>
   </p:sldMasterIdLst>
   <p:notesMasterIdLst>
-    <p:notesMasterId r:id="rId50"/>
+    <p:notesMasterId r:id="rId68"/>
   </p:notesMasterIdLst>
   <p:sldIdLst>
     <p:sldId id="256" r:id="rId2"/>
@@ -21,41 +21,59 @@
     <p:sldId id="291" r:id="rId12"/>
     <p:sldId id="273" r:id="rId13"/>
     <p:sldId id="261" r:id="rId14"/>
-    <p:sldId id="279" r:id="rId15"/>
-    <p:sldId id="292" r:id="rId16"/>
-    <p:sldId id="275" r:id="rId17"/>
-    <p:sldId id="280" r:id="rId18"/>
-    <p:sldId id="293" r:id="rId19"/>
-    <p:sldId id="294" r:id="rId20"/>
-    <p:sldId id="276" r:id="rId21"/>
-    <p:sldId id="295" r:id="rId22"/>
-    <p:sldId id="296" r:id="rId23"/>
-    <p:sldId id="297" r:id="rId24"/>
-    <p:sldId id="298" r:id="rId25"/>
-    <p:sldId id="299" r:id="rId26"/>
-    <p:sldId id="300" r:id="rId27"/>
-    <p:sldId id="301" r:id="rId28"/>
-    <p:sldId id="277" r:id="rId29"/>
-    <p:sldId id="282" r:id="rId30"/>
-    <p:sldId id="302" r:id="rId31"/>
-    <p:sldId id="303" r:id="rId32"/>
-    <p:sldId id="304" r:id="rId33"/>
-    <p:sldId id="305" r:id="rId34"/>
-    <p:sldId id="278" r:id="rId35"/>
-    <p:sldId id="283" r:id="rId36"/>
-    <p:sldId id="306" r:id="rId37"/>
-    <p:sldId id="307" r:id="rId38"/>
-    <p:sldId id="308" r:id="rId39"/>
-    <p:sldId id="262" r:id="rId40"/>
-    <p:sldId id="284" r:id="rId41"/>
-    <p:sldId id="285" r:id="rId42"/>
-    <p:sldId id="286" r:id="rId43"/>
-    <p:sldId id="287" r:id="rId44"/>
-    <p:sldId id="288" r:id="rId45"/>
-    <p:sldId id="263" r:id="rId46"/>
-    <p:sldId id="289" r:id="rId47"/>
-    <p:sldId id="264" r:id="rId48"/>
-    <p:sldId id="290" r:id="rId49"/>
+    <p:sldId id="309" r:id="rId15"/>
+    <p:sldId id="279" r:id="rId16"/>
+    <p:sldId id="292" r:id="rId17"/>
+    <p:sldId id="275" r:id="rId18"/>
+    <p:sldId id="280" r:id="rId19"/>
+    <p:sldId id="293" r:id="rId20"/>
+    <p:sldId id="310" r:id="rId21"/>
+    <p:sldId id="311" r:id="rId22"/>
+    <p:sldId id="294" r:id="rId23"/>
+    <p:sldId id="312" r:id="rId24"/>
+    <p:sldId id="276" r:id="rId25"/>
+    <p:sldId id="313" r:id="rId26"/>
+    <p:sldId id="295" r:id="rId27"/>
+    <p:sldId id="296" r:id="rId28"/>
+    <p:sldId id="314" r:id="rId29"/>
+    <p:sldId id="297" r:id="rId30"/>
+    <p:sldId id="298" r:id="rId31"/>
+    <p:sldId id="299" r:id="rId32"/>
+    <p:sldId id="315" r:id="rId33"/>
+    <p:sldId id="300" r:id="rId34"/>
+    <p:sldId id="301" r:id="rId35"/>
+    <p:sldId id="316" r:id="rId36"/>
+    <p:sldId id="277" r:id="rId37"/>
+    <p:sldId id="317" r:id="rId38"/>
+    <p:sldId id="282" r:id="rId39"/>
+    <p:sldId id="302" r:id="rId40"/>
+    <p:sldId id="303" r:id="rId41"/>
+    <p:sldId id="318" r:id="rId42"/>
+    <p:sldId id="305" r:id="rId43"/>
+    <p:sldId id="319" r:id="rId44"/>
+    <p:sldId id="320" r:id="rId45"/>
+    <p:sldId id="323" r:id="rId46"/>
+    <p:sldId id="321" r:id="rId47"/>
+    <p:sldId id="304" r:id="rId48"/>
+    <p:sldId id="322" r:id="rId49"/>
+    <p:sldId id="278" r:id="rId50"/>
+    <p:sldId id="283" r:id="rId51"/>
+    <p:sldId id="306" r:id="rId52"/>
+    <p:sldId id="307" r:id="rId53"/>
+    <p:sldId id="324" r:id="rId54"/>
+    <p:sldId id="325" r:id="rId55"/>
+    <p:sldId id="308" r:id="rId56"/>
+    <p:sldId id="326" r:id="rId57"/>
+    <p:sldId id="262" r:id="rId58"/>
+    <p:sldId id="284" r:id="rId59"/>
+    <p:sldId id="285" r:id="rId60"/>
+    <p:sldId id="286" r:id="rId61"/>
+    <p:sldId id="287" r:id="rId62"/>
+    <p:sldId id="288" r:id="rId63"/>
+    <p:sldId id="263" r:id="rId64"/>
+    <p:sldId id="289" r:id="rId65"/>
+    <p:sldId id="264" r:id="rId66"/>
+    <p:sldId id="290" r:id="rId67"/>
   </p:sldIdLst>
   <p:sldSz cx="12192000" cy="6858000"/>
   <p:notesSz cx="6858000" cy="9144000"/>
@@ -184,31 +202,49 @@
         <p14:section name="Resultados" id="{701451A7-F4BC-4778-9070-1BEF8573188C}">
           <p14:sldIdLst>
             <p14:sldId id="261"/>
+            <p14:sldId id="309"/>
             <p14:sldId id="279"/>
             <p14:sldId id="292"/>
             <p14:sldId id="275"/>
             <p14:sldId id="280"/>
             <p14:sldId id="293"/>
+            <p14:sldId id="310"/>
+            <p14:sldId id="311"/>
             <p14:sldId id="294"/>
+            <p14:sldId id="312"/>
             <p14:sldId id="276"/>
+            <p14:sldId id="313"/>
             <p14:sldId id="295"/>
             <p14:sldId id="296"/>
+            <p14:sldId id="314"/>
             <p14:sldId id="297"/>
             <p14:sldId id="298"/>
             <p14:sldId id="299"/>
+            <p14:sldId id="315"/>
             <p14:sldId id="300"/>
             <p14:sldId id="301"/>
+            <p14:sldId id="316"/>
             <p14:sldId id="277"/>
+            <p14:sldId id="317"/>
             <p14:sldId id="282"/>
             <p14:sldId id="302"/>
             <p14:sldId id="303"/>
+            <p14:sldId id="318"/>
+            <p14:sldId id="305"/>
+            <p14:sldId id="319"/>
+            <p14:sldId id="320"/>
+            <p14:sldId id="323"/>
+            <p14:sldId id="321"/>
             <p14:sldId id="304"/>
-            <p14:sldId id="305"/>
+            <p14:sldId id="322"/>
             <p14:sldId id="278"/>
             <p14:sldId id="283"/>
             <p14:sldId id="306"/>
             <p14:sldId id="307"/>
+            <p14:sldId id="324"/>
+            <p14:sldId id="325"/>
             <p14:sldId id="308"/>
+            <p14:sldId id="326"/>
           </p14:sldIdLst>
         </p14:section>
         <p14:section name="Discusión" id="{A10A5C0C-7D13-47EC-B27F-9FFD115A05EB}">
@@ -320,7 +356,7 @@
           <a:p>
             <a:fld id="{234B5AB6-08EC-47B1-B66D-262C33DD7BFF}" type="datetimeFigureOut">
               <a:rPr lang="es-PE" smtClean="0"/>
-              <a:t>29/02/2024</a:t>
+              <a:t>1/03/2024</a:t>
             </a:fld>
             <a:endParaRPr lang="es-PE"/>
           </a:p>
@@ -710,7 +746,7 @@
           <a:p>
             <a:fld id="{C8C7E893-61C0-4E51-AB68-6EE02BB86A4E}" type="slidenum">
               <a:rPr lang="es-PE" smtClean="0"/>
-              <a:t>14</a:t>
+              <a:t>15</a:t>
             </a:fld>
             <a:endParaRPr lang="es-PE"/>
           </a:p>
@@ -867,7 +903,7 @@
           <a:p>
             <a:fld id="{C8C7E893-61C0-4E51-AB68-6EE02BB86A4E}" type="slidenum">
               <a:rPr lang="es-PE" smtClean="0"/>
-              <a:t>25</a:t>
+              <a:t>31</a:t>
             </a:fld>
             <a:endParaRPr lang="es-PE"/>
           </a:p>
@@ -1036,7 +1072,7 @@
           <a:p>
             <a:fld id="{C8C7E893-61C0-4E51-AB68-6EE02BB86A4E}" type="slidenum">
               <a:rPr lang="es-PE" smtClean="0"/>
-              <a:t>26</a:t>
+              <a:t>33</a:t>
             </a:fld>
             <a:endParaRPr lang="es-PE"/>
           </a:p>
@@ -1169,7 +1205,7 @@
           <a:p>
             <a:fld id="{C8C7E893-61C0-4E51-AB68-6EE02BB86A4E}" type="slidenum">
               <a:rPr lang="es-PE" smtClean="0"/>
-              <a:t>27</a:t>
+              <a:t>34</a:t>
             </a:fld>
             <a:endParaRPr lang="es-PE"/>
           </a:p>
@@ -1312,7 +1348,7 @@
           <a:p>
             <a:fld id="{C8C7E893-61C0-4E51-AB68-6EE02BB86A4E}" type="slidenum">
               <a:rPr lang="es-PE" smtClean="0"/>
-              <a:t>29</a:t>
+              <a:t>38</a:t>
             </a:fld>
             <a:endParaRPr lang="es-PE"/>
           </a:p>
@@ -1455,7 +1491,7 @@
           <a:p>
             <a:fld id="{C8C7E893-61C0-4E51-AB68-6EE02BB86A4E}" type="slidenum">
               <a:rPr lang="es-PE" smtClean="0"/>
-              <a:t>30</a:t>
+              <a:t>39</a:t>
             </a:fld>
             <a:endParaRPr lang="es-PE"/>
           </a:p>
@@ -1598,7 +1634,7 @@
           <a:p>
             <a:fld id="{C8C7E893-61C0-4E51-AB68-6EE02BB86A4E}" type="slidenum">
               <a:rPr lang="es-PE" smtClean="0"/>
-              <a:t>31</a:t>
+              <a:t>40</a:t>
             </a:fld>
             <a:endParaRPr lang="es-PE"/>
           </a:p>
@@ -1679,7 +1715,7 @@
                 <a:ea typeface="Calibri" panose="020F0502020204030204" pitchFamily="34" charset="0"/>
                 <a:cs typeface="Times New Roman" panose="02020603050405020304" pitchFamily="18" charset="0"/>
               </a:rPr>
-              <a:t>En la figura se representa la proporción global de mujeres ingresantes al programa de </a:t>
+              <a:t>En la tabla se realiza una comparación en el número y porcentaje de ingresantes y no ingresantes al </a:t>
             </a:r>
             <a:r>
               <a:rPr lang="es-PE" sz="1800" dirty="0" err="1">
@@ -1697,10 +1733,21 @@
                 <a:ea typeface="Calibri" panose="020F0502020204030204" pitchFamily="34" charset="0"/>
                 <a:cs typeface="Times New Roman" panose="02020603050405020304" pitchFamily="18" charset="0"/>
               </a:rPr>
-              <a:t> médico del Perú y separada por especialidades clínicas y quirúrgicas entre los años 2016 y 2023.</a:t>
-            </a:r>
-          </a:p>
-          <a:p>
+              <a:t> médico del Perú entre mujeres y varones entre los años 2016 y 2023.</a:t>
+            </a:r>
+          </a:p>
+          <a:p>
+            <a:pPr algn="just">
+              <a:lnSpc>
+                <a:spcPct val="150000"/>
+              </a:lnSpc>
+              <a:spcBef>
+                <a:spcPts val="600"/>
+              </a:spcBef>
+              <a:spcAft>
+                <a:spcPts val="1400"/>
+              </a:spcAft>
+            </a:pPr>
             <a:r>
               <a:rPr lang="es-PE" sz="1800" dirty="0">
                 <a:effectLst/>
@@ -1708,9 +1755,52 @@
                 <a:ea typeface="Calibri" panose="020F0502020204030204" pitchFamily="34" charset="0"/>
                 <a:cs typeface="Times New Roman" panose="02020603050405020304" pitchFamily="18" charset="0"/>
               </a:rPr>
-              <a:t>Al igual que lo encontrado en los postulantes, se observa una diferencia en la proporción de mujeres ingresantes a especialidades clínicas y quirúrgicas. También se observa una tendencia hacia el aumento de la proporción de mujeres, que es más notoria en los ingresantes a especialidades quirúrgicas.</a:t>
-            </a:r>
-            <a:endParaRPr lang="es-PE" dirty="0"/>
+              <a:t>Entre los postulantes de género femenino se encontró que el porcentaje más alto de ingresantes fue en el año 2021, llegando a 51.5%, mientras que el porcentaje más bajo fue el último año, 2023, llegando a 33.2%.</a:t>
+            </a:r>
+          </a:p>
+          <a:p>
+            <a:pPr algn="just">
+              <a:lnSpc>
+                <a:spcPct val="150000"/>
+              </a:lnSpc>
+              <a:spcBef>
+                <a:spcPts val="600"/>
+              </a:spcBef>
+              <a:spcAft>
+                <a:spcPts val="1400"/>
+              </a:spcAft>
+            </a:pPr>
+            <a:r>
+              <a:rPr lang="es-PE" sz="1800" dirty="0">
+                <a:effectLst/>
+                <a:latin typeface="Calibri" panose="020F0502020204030204" pitchFamily="34" charset="0"/>
+                <a:ea typeface="Calibri" panose="020F0502020204030204" pitchFamily="34" charset="0"/>
+                <a:cs typeface="Times New Roman" panose="02020603050405020304" pitchFamily="18" charset="0"/>
+              </a:rPr>
+              <a:t>Entre los postulantes de género masculino, se tuvo hallazgos similares. El porcentaje más alto fue en el año 2021, llegando a 49.6%, mientras que el porcentaje más bajo fue el último año, 2023, con 39.4%.</a:t>
+            </a:r>
+          </a:p>
+          <a:p>
+            <a:pPr algn="just">
+              <a:lnSpc>
+                <a:spcPct val="150000"/>
+              </a:lnSpc>
+              <a:spcBef>
+                <a:spcPts val="600"/>
+              </a:spcBef>
+              <a:spcAft>
+                <a:spcPts val="1400"/>
+              </a:spcAft>
+            </a:pPr>
+            <a:r>
+              <a:rPr lang="es-PE" sz="1800" dirty="0">
+                <a:effectLst/>
+                <a:latin typeface="Calibri" panose="020F0502020204030204" pitchFamily="34" charset="0"/>
+                <a:ea typeface="Calibri" panose="020F0502020204030204" pitchFamily="34" charset="0"/>
+                <a:cs typeface="Times New Roman" panose="02020603050405020304" pitchFamily="18" charset="0"/>
+              </a:rPr>
+              <a:t>En la comparación global (incluyendo todos los años) entre ambos géneros se encontró que los postulantes de género masculino lograron ingresar en un 39.4%, mientras que en el género femenino lograron ingresar en un 38.7%.</a:t>
+            </a:r>
           </a:p>
         </p:txBody>
       </p:sp>
@@ -1731,7 +1821,7 @@
           <a:p>
             <a:fld id="{C8C7E893-61C0-4E51-AB68-6EE02BB86A4E}" type="slidenum">
               <a:rPr lang="es-PE" smtClean="0"/>
-              <a:t>32</a:t>
+              <a:t>42</a:t>
             </a:fld>
             <a:endParaRPr lang="es-PE"/>
           </a:p>
@@ -1740,7 +1830,7 @@
     </p:spTree>
     <p:extLst>
       <p:ext uri="{BB962C8B-B14F-4D97-AF65-F5344CB8AC3E}">
-        <p14:creationId xmlns:p14="http://schemas.microsoft.com/office/powerpoint/2010/main" val="2076420541"/>
+        <p14:creationId xmlns:p14="http://schemas.microsoft.com/office/powerpoint/2010/main" val="2995226731"/>
       </p:ext>
     </p:extLst>
   </p:cSld>
@@ -1812,7 +1902,7 @@
                 <a:ea typeface="Calibri" panose="020F0502020204030204" pitchFamily="34" charset="0"/>
                 <a:cs typeface="Times New Roman" panose="02020603050405020304" pitchFamily="18" charset="0"/>
               </a:rPr>
-              <a:t>En la tabla se realiza una comparación en el número y porcentaje de ingresantes y no ingresantes al </a:t>
+              <a:t>En la figura se representa la proporción global de mujeres ingresantes al programa de </a:t>
             </a:r>
             <a:r>
               <a:rPr lang="es-PE" sz="1800" dirty="0" err="1">
@@ -1830,21 +1920,10 @@
                 <a:ea typeface="Calibri" panose="020F0502020204030204" pitchFamily="34" charset="0"/>
                 <a:cs typeface="Times New Roman" panose="02020603050405020304" pitchFamily="18" charset="0"/>
               </a:rPr>
-              <a:t> médico del Perú entre mujeres y varones entre los años 2016 y 2023.</a:t>
-            </a:r>
-          </a:p>
-          <a:p>
-            <a:pPr algn="just">
-              <a:lnSpc>
-                <a:spcPct val="150000"/>
-              </a:lnSpc>
-              <a:spcBef>
-                <a:spcPts val="600"/>
-              </a:spcBef>
-              <a:spcAft>
-                <a:spcPts val="1400"/>
-              </a:spcAft>
-            </a:pPr>
+              <a:t> médico del Perú y separada por especialidades clínicas y quirúrgicas entre los años 2016 y 2023.</a:t>
+            </a:r>
+          </a:p>
+          <a:p>
             <a:r>
               <a:rPr lang="es-PE" sz="1800" dirty="0">
                 <a:effectLst/>
@@ -1852,52 +1931,9 @@
                 <a:ea typeface="Calibri" panose="020F0502020204030204" pitchFamily="34" charset="0"/>
                 <a:cs typeface="Times New Roman" panose="02020603050405020304" pitchFamily="18" charset="0"/>
               </a:rPr>
-              <a:t>Entre los postulantes de género femenino se encontró que el porcentaje más alto de ingresantes fue en el año 2021, llegando a 51.5%, mientras que el porcentaje más bajo fue el último año, 2023, llegando a 33.2%.</a:t>
-            </a:r>
-          </a:p>
-          <a:p>
-            <a:pPr algn="just">
-              <a:lnSpc>
-                <a:spcPct val="150000"/>
-              </a:lnSpc>
-              <a:spcBef>
-                <a:spcPts val="600"/>
-              </a:spcBef>
-              <a:spcAft>
-                <a:spcPts val="1400"/>
-              </a:spcAft>
-            </a:pPr>
-            <a:r>
-              <a:rPr lang="es-PE" sz="1800" dirty="0">
-                <a:effectLst/>
-                <a:latin typeface="Calibri" panose="020F0502020204030204" pitchFamily="34" charset="0"/>
-                <a:ea typeface="Calibri" panose="020F0502020204030204" pitchFamily="34" charset="0"/>
-                <a:cs typeface="Times New Roman" panose="02020603050405020304" pitchFamily="18" charset="0"/>
-              </a:rPr>
-              <a:t>Entre los postulantes de género masculino, se tuvo hallazgos similares. El porcentaje más alto fue en el año 2021, llegando a 49.6%, mientras que el porcentaje más bajo fue el último año, 2023, con 39.4%.</a:t>
-            </a:r>
-          </a:p>
-          <a:p>
-            <a:pPr algn="just">
-              <a:lnSpc>
-                <a:spcPct val="150000"/>
-              </a:lnSpc>
-              <a:spcBef>
-                <a:spcPts val="600"/>
-              </a:spcBef>
-              <a:spcAft>
-                <a:spcPts val="1400"/>
-              </a:spcAft>
-            </a:pPr>
-            <a:r>
-              <a:rPr lang="es-PE" sz="1800" dirty="0">
-                <a:effectLst/>
-                <a:latin typeface="Calibri" panose="020F0502020204030204" pitchFamily="34" charset="0"/>
-                <a:ea typeface="Calibri" panose="020F0502020204030204" pitchFamily="34" charset="0"/>
-                <a:cs typeface="Times New Roman" panose="02020603050405020304" pitchFamily="18" charset="0"/>
-              </a:rPr>
-              <a:t>En la comparación global (incluyendo todos los años) entre ambos géneros se encontró que los postulantes de género masculino lograron ingresar en un 39.4%, mientras que en el género femenino lograron ingresar en un 38.7%.</a:t>
-            </a:r>
+              <a:t>Al igual que lo encontrado en los postulantes, se observa una diferencia en la proporción de mujeres ingresantes a especialidades clínicas y quirúrgicas. También se observa una tendencia hacia el aumento de la proporción de mujeres, que es más notoria en los ingresantes a especialidades quirúrgicas.</a:t>
+            </a:r>
+            <a:endParaRPr lang="es-PE" dirty="0"/>
           </a:p>
         </p:txBody>
       </p:sp>
@@ -1918,7 +1954,7 @@
           <a:p>
             <a:fld id="{C8C7E893-61C0-4E51-AB68-6EE02BB86A4E}" type="slidenum">
               <a:rPr lang="es-PE" smtClean="0"/>
-              <a:t>33</a:t>
+              <a:t>47</a:t>
             </a:fld>
             <a:endParaRPr lang="es-PE"/>
           </a:p>
@@ -1927,7 +1963,7 @@
     </p:spTree>
     <p:extLst>
       <p:ext uri="{BB962C8B-B14F-4D97-AF65-F5344CB8AC3E}">
-        <p14:creationId xmlns:p14="http://schemas.microsoft.com/office/powerpoint/2010/main" val="2995226731"/>
+        <p14:creationId xmlns:p14="http://schemas.microsoft.com/office/powerpoint/2010/main" val="2076420541"/>
       </p:ext>
     </p:extLst>
   </p:cSld>
@@ -2061,7 +2097,7 @@
           <a:p>
             <a:fld id="{C8C7E893-61C0-4E51-AB68-6EE02BB86A4E}" type="slidenum">
               <a:rPr lang="es-PE" smtClean="0"/>
-              <a:t>35</a:t>
+              <a:t>50</a:t>
             </a:fld>
             <a:endParaRPr lang="es-PE"/>
           </a:p>
@@ -2216,7 +2252,7 @@
           <a:p>
             <a:fld id="{C8C7E893-61C0-4E51-AB68-6EE02BB86A4E}" type="slidenum">
               <a:rPr lang="es-PE" smtClean="0"/>
-              <a:t>36</a:t>
+              <a:t>51</a:t>
             </a:fld>
             <a:endParaRPr lang="es-PE"/>
           </a:p>
@@ -2312,7 +2348,7 @@
           <a:p>
             <a:fld id="{C8C7E893-61C0-4E51-AB68-6EE02BB86A4E}" type="slidenum">
               <a:rPr lang="es-PE" smtClean="0"/>
-              <a:t>15</a:t>
+              <a:t>16</a:t>
             </a:fld>
             <a:endParaRPr lang="es-PE"/>
           </a:p>
@@ -2423,7 +2459,7 @@
           <a:p>
             <a:fld id="{C8C7E893-61C0-4E51-AB68-6EE02BB86A4E}" type="slidenum">
               <a:rPr lang="es-PE" smtClean="0"/>
-              <a:t>37</a:t>
+              <a:t>52</a:t>
             </a:fld>
             <a:endParaRPr lang="es-PE"/>
           </a:p>
@@ -2566,7 +2602,7 @@
           <a:p>
             <a:fld id="{C8C7E893-61C0-4E51-AB68-6EE02BB86A4E}" type="slidenum">
               <a:rPr lang="es-PE" smtClean="0"/>
-              <a:t>38</a:t>
+              <a:t>55</a:t>
             </a:fld>
             <a:endParaRPr lang="es-PE"/>
           </a:p>
@@ -2631,6 +2667,15 @@
           <a:p>
             <a:r>
               <a:rPr lang="es-MX" dirty="0"/>
+              <a:t>Se identificaron 81 especialidades médicas</a:t>
+            </a:r>
+          </a:p>
+          <a:p>
+            <a:endParaRPr lang="es-MX" dirty="0"/>
+          </a:p>
+          <a:p>
+            <a:r>
+              <a:rPr lang="es-MX" dirty="0"/>
               <a:t>En la tabla se representan el número y la distribución de género entre las 14 especialidades médicas con mayor porcentaje de género femenino de postulantes al </a:t>
             </a:r>
             <a:r>
@@ -2667,7 +2712,7 @@
           <a:p>
             <a:fld id="{C8C7E893-61C0-4E51-AB68-6EE02BB86A4E}" type="slidenum">
               <a:rPr lang="es-PE" smtClean="0"/>
-              <a:t>17</a:t>
+              <a:t>18</a:t>
             </a:fld>
             <a:endParaRPr lang="es-PE"/>
           </a:p>
@@ -2832,7 +2877,7 @@
           <a:p>
             <a:fld id="{C8C7E893-61C0-4E51-AB68-6EE02BB86A4E}" type="slidenum">
               <a:rPr lang="es-PE" smtClean="0"/>
-              <a:t>18</a:t>
+              <a:t>19</a:t>
             </a:fld>
             <a:endParaRPr lang="es-PE"/>
           </a:p>
@@ -3087,7 +3132,7 @@
           <a:p>
             <a:fld id="{C8C7E893-61C0-4E51-AB68-6EE02BB86A4E}" type="slidenum">
               <a:rPr lang="es-PE" smtClean="0"/>
-              <a:t>19</a:t>
+              <a:t>22</a:t>
             </a:fld>
             <a:endParaRPr lang="es-PE"/>
           </a:p>
@@ -3272,7 +3317,7 @@
           <a:p>
             <a:fld id="{C8C7E893-61C0-4E51-AB68-6EE02BB86A4E}" type="slidenum">
               <a:rPr lang="es-PE" smtClean="0"/>
-              <a:t>21</a:t>
+              <a:t>26</a:t>
             </a:fld>
             <a:endParaRPr lang="es-PE"/>
           </a:p>
@@ -3457,7 +3502,7 @@
           <a:p>
             <a:fld id="{C8C7E893-61C0-4E51-AB68-6EE02BB86A4E}" type="slidenum">
               <a:rPr lang="es-PE" smtClean="0"/>
-              <a:t>22</a:t>
+              <a:t>27</a:t>
             </a:fld>
             <a:endParaRPr lang="es-PE"/>
           </a:p>
@@ -3606,7 +3651,7 @@
           <a:p>
             <a:fld id="{C8C7E893-61C0-4E51-AB68-6EE02BB86A4E}" type="slidenum">
               <a:rPr lang="es-PE" smtClean="0"/>
-              <a:t>23</a:t>
+              <a:t>29</a:t>
             </a:fld>
             <a:endParaRPr lang="es-PE"/>
           </a:p>
@@ -3711,6 +3756,59 @@
                 <a:ea typeface="Calibri" panose="020F0502020204030204" pitchFamily="34" charset="0"/>
                 <a:cs typeface="Times New Roman" panose="02020603050405020304" pitchFamily="18" charset="0"/>
               </a:rPr>
+              <a:t>también podemos notar que hay una diferencia entre las especialidades clínicas y quirúrgicas respecto al género de los postulantes. Para esto podemos agrupar las especialidades y comparar a las especialidades clínicas y las quirúrgicas.</a:t>
+            </a:r>
+          </a:p>
+          <a:p>
+            <a:pPr marL="0" marR="0" lvl="0" indent="0" algn="l" defTabSz="914400" rtl="0" eaLnBrk="1" fontAlgn="auto" latinLnBrk="0" hangingPunct="1">
+              <a:lnSpc>
+                <a:spcPct val="100000"/>
+              </a:lnSpc>
+              <a:spcBef>
+                <a:spcPts val="0"/>
+              </a:spcBef>
+              <a:spcAft>
+                <a:spcPts val="0"/>
+              </a:spcAft>
+              <a:buClrTx/>
+              <a:buSzTx/>
+              <a:buFontTx/>
+              <a:buNone/>
+              <a:tabLst/>
+              <a:defRPr/>
+            </a:pPr>
+            <a:endParaRPr lang="es-PE" sz="1800" dirty="0">
+              <a:effectLst/>
+              <a:latin typeface="Calibri" panose="020F0502020204030204" pitchFamily="34" charset="0"/>
+              <a:ea typeface="Calibri" panose="020F0502020204030204" pitchFamily="34" charset="0"/>
+              <a:cs typeface="Times New Roman" panose="02020603050405020304" pitchFamily="18" charset="0"/>
+            </a:endParaRPr>
+          </a:p>
+          <a:p>
+            <a:pPr marL="0" marR="0" lvl="0" indent="0" algn="l" defTabSz="914400" rtl="0" eaLnBrk="1" fontAlgn="auto" latinLnBrk="0" hangingPunct="1">
+              <a:lnSpc>
+                <a:spcPct val="100000"/>
+              </a:lnSpc>
+              <a:spcBef>
+                <a:spcPts val="0"/>
+              </a:spcBef>
+              <a:spcAft>
+                <a:spcPts val="0"/>
+              </a:spcAft>
+              <a:buClrTx/>
+              <a:buSzTx/>
+              <a:buFontTx/>
+              <a:buNone/>
+              <a:tabLst/>
+              <a:defRPr/>
+            </a:pPr>
+            <a:r>
+              <a:rPr lang="es-PE" sz="1800" dirty="0">
+                <a:effectLst/>
+                <a:latin typeface="Calibri" panose="020F0502020204030204" pitchFamily="34" charset="0"/>
+                <a:ea typeface="Calibri" panose="020F0502020204030204" pitchFamily="34" charset="0"/>
+                <a:cs typeface="Times New Roman" panose="02020603050405020304" pitchFamily="18" charset="0"/>
+              </a:rPr>
               <a:t>En la figura se observa el número de postulantes al programa de </a:t>
             </a:r>
             <a:r>
@@ -3757,7 +3855,7 @@
           <a:p>
             <a:fld id="{C8C7E893-61C0-4E51-AB68-6EE02BB86A4E}" type="slidenum">
               <a:rPr lang="es-PE" smtClean="0"/>
-              <a:t>24</a:t>
+              <a:t>30</a:t>
             </a:fld>
             <a:endParaRPr lang="es-PE"/>
           </a:p>
@@ -4002,7 +4100,7 @@
           <a:p>
             <a:fld id="{7B14AA15-6390-4B76-91AD-6461C139DACF}" type="datetimeFigureOut">
               <a:rPr lang="es-PE" smtClean="0"/>
-              <a:t>29/02/2024</a:t>
+              <a:t>1/03/2024</a:t>
             </a:fld>
             <a:endParaRPr lang="es-PE"/>
           </a:p>
@@ -4210,7 +4308,7 @@
           <a:p>
             <a:fld id="{7B14AA15-6390-4B76-91AD-6461C139DACF}" type="datetimeFigureOut">
               <a:rPr lang="es-PE" smtClean="0"/>
-              <a:t>29/02/2024</a:t>
+              <a:t>1/03/2024</a:t>
             </a:fld>
             <a:endParaRPr lang="es-PE"/>
           </a:p>
@@ -4466,7 +4564,7 @@
           <a:p>
             <a:fld id="{7B14AA15-6390-4B76-91AD-6461C139DACF}" type="datetimeFigureOut">
               <a:rPr lang="es-PE" smtClean="0"/>
-              <a:t>29/02/2024</a:t>
+              <a:t>1/03/2024</a:t>
             </a:fld>
             <a:endParaRPr lang="es-PE"/>
           </a:p>
@@ -4636,7 +4734,7 @@
           <a:p>
             <a:fld id="{7B14AA15-6390-4B76-91AD-6461C139DACF}" type="datetimeFigureOut">
               <a:rPr lang="es-PE" smtClean="0"/>
-              <a:t>29/02/2024</a:t>
+              <a:t>1/03/2024</a:t>
             </a:fld>
             <a:endParaRPr lang="es-PE"/>
           </a:p>
@@ -4979,7 +5077,7 @@
           <a:p>
             <a:fld id="{7B14AA15-6390-4B76-91AD-6461C139DACF}" type="datetimeFigureOut">
               <a:rPr lang="es-PE" smtClean="0"/>
-              <a:t>29/02/2024</a:t>
+              <a:t>1/03/2024</a:t>
             </a:fld>
             <a:endParaRPr lang="es-PE"/>
           </a:p>
@@ -5254,7 +5352,7 @@
           <a:p>
             <a:fld id="{7B14AA15-6390-4B76-91AD-6461C139DACF}" type="datetimeFigureOut">
               <a:rPr lang="es-PE" smtClean="0"/>
-              <a:t>29/02/2024</a:t>
+              <a:t>1/03/2024</a:t>
             </a:fld>
             <a:endParaRPr lang="es-PE"/>
           </a:p>
@@ -5633,7 +5731,7 @@
           <a:p>
             <a:fld id="{7B14AA15-6390-4B76-91AD-6461C139DACF}" type="datetimeFigureOut">
               <a:rPr lang="es-PE" smtClean="0"/>
-              <a:t>29/02/2024</a:t>
+              <a:t>1/03/2024</a:t>
             </a:fld>
             <a:endParaRPr lang="es-PE"/>
           </a:p>
@@ -5751,7 +5849,7 @@
           <a:p>
             <a:fld id="{7B14AA15-6390-4B76-91AD-6461C139DACF}" type="datetimeFigureOut">
               <a:rPr lang="es-PE" smtClean="0"/>
-              <a:t>29/02/2024</a:t>
+              <a:t>1/03/2024</a:t>
             </a:fld>
             <a:endParaRPr lang="es-PE"/>
           </a:p>
@@ -5922,7 +6020,7 @@
           <a:p>
             <a:fld id="{7B14AA15-6390-4B76-91AD-6461C139DACF}" type="datetimeFigureOut">
               <a:rPr lang="es-PE" smtClean="0"/>
-              <a:t>29/02/2024</a:t>
+              <a:t>1/03/2024</a:t>
             </a:fld>
             <a:endParaRPr lang="es-PE"/>
           </a:p>
@@ -6276,7 +6374,7 @@
           <a:p>
             <a:fld id="{7B14AA15-6390-4B76-91AD-6461C139DACF}" type="datetimeFigureOut">
               <a:rPr lang="es-PE" smtClean="0"/>
-              <a:t>29/02/2024</a:t>
+              <a:t>1/03/2024</a:t>
             </a:fld>
             <a:endParaRPr lang="es-PE"/>
           </a:p>
@@ -6653,7 +6751,7 @@
           <a:p>
             <a:fld id="{7B14AA15-6390-4B76-91AD-6461C139DACF}" type="datetimeFigureOut">
               <a:rPr lang="es-PE" smtClean="0"/>
-              <a:t>29/02/2024</a:t>
+              <a:t>1/03/2024</a:t>
             </a:fld>
             <a:endParaRPr lang="es-PE"/>
           </a:p>
@@ -6940,7 +7038,7 @@
           <a:p>
             <a:fld id="{7B14AA15-6390-4B76-91AD-6461C139DACF}" type="datetimeFigureOut">
               <a:rPr lang="es-PE" smtClean="0"/>
-              <a:t>29/02/2024</a:t>
+              <a:t>1/03/2024</a:t>
             </a:fld>
             <a:endParaRPr lang="es-PE"/>
           </a:p>
@@ -8006,6 +8104,106 @@
           <p:cNvPr id="2" name="Título 1">
             <a:extLst>
               <a:ext uri="{FF2B5EF4-FFF2-40B4-BE49-F238E27FC236}">
+                <a16:creationId xmlns:a16="http://schemas.microsoft.com/office/drawing/2014/main" id="{44198FBE-4829-1EE5-F40F-F4283F89B7A5}"/>
+              </a:ext>
+            </a:extLst>
+          </p:cNvPr>
+          <p:cNvSpPr>
+            <a:spLocks noGrp="1"/>
+          </p:cNvSpPr>
+          <p:nvPr>
+            <p:ph type="title"/>
+          </p:nvPr>
+        </p:nvSpPr>
+        <p:spPr/>
+        <p:txBody>
+          <a:bodyPr/>
+          <a:lstStyle/>
+          <a:p>
+            <a:r>
+              <a:rPr lang="es-MX" dirty="0"/>
+              <a:t>Resultados descriptivos generales</a:t>
+            </a:r>
+            <a:endParaRPr lang="es-PE" dirty="0"/>
+          </a:p>
+        </p:txBody>
+      </p:sp>
+      <p:sp>
+        <p:nvSpPr>
+          <p:cNvPr id="3" name="Marcador de contenido 2">
+            <a:extLst>
+              <a:ext uri="{FF2B5EF4-FFF2-40B4-BE49-F238E27FC236}">
+                <a16:creationId xmlns:a16="http://schemas.microsoft.com/office/drawing/2014/main" id="{A17F594D-F45B-EEC3-9612-86AB14B82061}"/>
+              </a:ext>
+            </a:extLst>
+          </p:cNvPr>
+          <p:cNvSpPr>
+            <a:spLocks noGrp="1"/>
+          </p:cNvSpPr>
+          <p:nvPr>
+            <p:ph idx="1"/>
+          </p:nvPr>
+        </p:nvSpPr>
+        <p:spPr/>
+        <p:txBody>
+          <a:bodyPr/>
+          <a:lstStyle/>
+          <a:p>
+            <a:r>
+              <a:rPr lang="es-MX" dirty="0"/>
+              <a:t>Entre los años 2013 y 2023 hubo 67007 postulantes.</a:t>
+            </a:r>
+          </a:p>
+          <a:p>
+            <a:r>
+              <a:rPr lang="es-MX" dirty="0"/>
+              <a:t>Se asignó el género al 62093 (92.7%)</a:t>
+            </a:r>
+          </a:p>
+          <a:p>
+            <a:r>
+              <a:rPr lang="es-MX" dirty="0"/>
+              <a:t>28778 postulantes de género femenino (46.35%), 33315 de género masculino (53.65%).</a:t>
+            </a:r>
+            <a:endParaRPr lang="es-PE" dirty="0"/>
+          </a:p>
+        </p:txBody>
+      </p:sp>
+    </p:spTree>
+    <p:extLst>
+      <p:ext uri="{BB962C8B-B14F-4D97-AF65-F5344CB8AC3E}">
+        <p14:creationId xmlns:p14="http://schemas.microsoft.com/office/powerpoint/2010/main" val="211293480"/>
+      </p:ext>
+    </p:extLst>
+  </p:cSld>
+  <p:clrMapOvr>
+    <a:masterClrMapping/>
+  </p:clrMapOvr>
+</p:sld>
+</file>
+
+<file path=ppt/slides/slide15.xml><?xml version="1.0" encoding="utf-8"?>
+<p:sld xmlns:a="http://schemas.openxmlformats.org/drawingml/2006/main" xmlns:r="http://schemas.openxmlformats.org/officeDocument/2006/relationships" xmlns:p="http://schemas.openxmlformats.org/presentationml/2006/main">
+  <p:cSld>
+    <p:spTree>
+      <p:nvGrpSpPr>
+        <p:cNvPr id="1" name=""/>
+        <p:cNvGrpSpPr/>
+        <p:nvPr/>
+      </p:nvGrpSpPr>
+      <p:grpSpPr>
+        <a:xfrm>
+          <a:off x="0" y="0"/>
+          <a:ext cx="0" cy="0"/>
+          <a:chOff x="0" y="0"/>
+          <a:chExt cx="0" cy="0"/>
+        </a:xfrm>
+      </p:grpSpPr>
+      <p:sp>
+        <p:nvSpPr>
+          <p:cNvPr id="2" name="Título 1">
+            <a:extLst>
+              <a:ext uri="{FF2B5EF4-FFF2-40B4-BE49-F238E27FC236}">
                 <a16:creationId xmlns:a16="http://schemas.microsoft.com/office/drawing/2014/main" id="{D8BD374C-F795-35AA-3CF8-99B45D2CC062}"/>
               </a:ext>
             </a:extLst>
@@ -9730,7 +9928,7 @@
 </p:sld>
 </file>
 
-<file path=ppt/slides/slide15.xml><?xml version="1.0" encoding="utf-8"?>
+<file path=ppt/slides/slide16.xml><?xml version="1.0" encoding="utf-8"?>
 <p:sld xmlns:a="http://schemas.openxmlformats.org/drawingml/2006/main" xmlns:r="http://schemas.openxmlformats.org/officeDocument/2006/relationships" xmlns:p="http://schemas.openxmlformats.org/presentationml/2006/main">
   <p:cSld>
     <p:spTree>
@@ -9832,7 +10030,7 @@
 </p:sld>
 </file>
 
-<file path=ppt/slides/slide16.xml><?xml version="1.0" encoding="utf-8"?>
+<file path=ppt/slides/slide17.xml><?xml version="1.0" encoding="utf-8"?>
 <p:sld xmlns:a="http://schemas.openxmlformats.org/drawingml/2006/main" xmlns:r="http://schemas.openxmlformats.org/officeDocument/2006/relationships" xmlns:p="http://schemas.openxmlformats.org/presentationml/2006/main">
   <p:cSld>
     <p:spTree>
@@ -9916,7 +10114,7 @@
 </p:sld>
 </file>
 
-<file path=ppt/slides/slide17.xml><?xml version="1.0" encoding="utf-8"?>
+<file path=ppt/slides/slide18.xml><?xml version="1.0" encoding="utf-8"?>
 <p:sld xmlns:a="http://schemas.openxmlformats.org/drawingml/2006/main" xmlns:r="http://schemas.openxmlformats.org/officeDocument/2006/relationships" xmlns:p="http://schemas.openxmlformats.org/presentationml/2006/main">
   <p:cSld>
     <p:spTree>
@@ -12465,7 +12663,7 @@
 </p:sld>
 </file>
 
-<file path=ppt/slides/slide18.xml><?xml version="1.0" encoding="utf-8"?>
+<file path=ppt/slides/slide19.xml><?xml version="1.0" encoding="utf-8"?>
 <p:sld xmlns:a="http://schemas.openxmlformats.org/drawingml/2006/main" xmlns:r="http://schemas.openxmlformats.org/officeDocument/2006/relationships" xmlns:p="http://schemas.openxmlformats.org/presentationml/2006/main">
   <p:cSld>
     <p:spTree>
@@ -15008,7 +15206,336 @@
 </p:sld>
 </file>
 
-<file path=ppt/slides/slide19.xml><?xml version="1.0" encoding="utf-8"?>
+<file path=ppt/slides/slide2.xml><?xml version="1.0" encoding="utf-8"?>
+<p:sld xmlns:a="http://schemas.openxmlformats.org/drawingml/2006/main" xmlns:r="http://schemas.openxmlformats.org/officeDocument/2006/relationships" xmlns:p="http://schemas.openxmlformats.org/presentationml/2006/main">
+  <p:cSld>
+    <p:spTree>
+      <p:nvGrpSpPr>
+        <p:cNvPr id="1" name=""/>
+        <p:cNvGrpSpPr/>
+        <p:nvPr/>
+      </p:nvGrpSpPr>
+      <p:grpSpPr>
+        <a:xfrm>
+          <a:off x="0" y="0"/>
+          <a:ext cx="0" cy="0"/>
+          <a:chOff x="0" y="0"/>
+          <a:chExt cx="0" cy="0"/>
+        </a:xfrm>
+      </p:grpSpPr>
+      <p:sp>
+        <p:nvSpPr>
+          <p:cNvPr id="2" name="Título 1">
+            <a:extLst>
+              <a:ext uri="{FF2B5EF4-FFF2-40B4-BE49-F238E27FC236}">
+                <a16:creationId xmlns:a16="http://schemas.microsoft.com/office/drawing/2014/main" id="{064C1A2E-4D77-2744-E49C-B60F6C2C57C7}"/>
+              </a:ext>
+            </a:extLst>
+          </p:cNvPr>
+          <p:cNvSpPr>
+            <a:spLocks noGrp="1"/>
+          </p:cNvSpPr>
+          <p:nvPr>
+            <p:ph type="title"/>
+          </p:nvPr>
+        </p:nvSpPr>
+        <p:spPr/>
+        <p:txBody>
+          <a:bodyPr/>
+          <a:lstStyle/>
+          <a:p>
+            <a:r>
+              <a:rPr lang="es-MX" dirty="0"/>
+              <a:t>Puntos a tratar</a:t>
+            </a:r>
+            <a:endParaRPr lang="es-PE" dirty="0"/>
+          </a:p>
+        </p:txBody>
+      </p:sp>
+      <p:sp>
+        <p:nvSpPr>
+          <p:cNvPr id="3" name="Marcador de contenido 2">
+            <a:extLst>
+              <a:ext uri="{FF2B5EF4-FFF2-40B4-BE49-F238E27FC236}">
+                <a16:creationId xmlns:a16="http://schemas.microsoft.com/office/drawing/2014/main" id="{19A94768-A3AF-214B-9C00-EDEA644CE768}"/>
+              </a:ext>
+            </a:extLst>
+          </p:cNvPr>
+          <p:cNvSpPr>
+            <a:spLocks noGrp="1"/>
+          </p:cNvSpPr>
+          <p:nvPr>
+            <p:ph idx="1"/>
+          </p:nvPr>
+        </p:nvSpPr>
+        <p:spPr/>
+        <p:txBody>
+          <a:bodyPr/>
+          <a:lstStyle/>
+          <a:p>
+            <a:pPr>
+              <a:buFont typeface="Wingdings" panose="05000000000000000000" pitchFamily="2" charset="2"/>
+              <a:buChar char="Ø"/>
+            </a:pPr>
+            <a:r>
+              <a:rPr lang="es-MX" dirty="0"/>
+              <a:t>Introducción y marco teórico</a:t>
+            </a:r>
+          </a:p>
+          <a:p>
+            <a:pPr>
+              <a:buFont typeface="Wingdings" panose="05000000000000000000" pitchFamily="2" charset="2"/>
+              <a:buChar char="Ø"/>
+            </a:pPr>
+            <a:r>
+              <a:rPr lang="es-MX" dirty="0"/>
+              <a:t>Objetivos</a:t>
+            </a:r>
+          </a:p>
+          <a:p>
+            <a:pPr>
+              <a:buFont typeface="Wingdings" panose="05000000000000000000" pitchFamily="2" charset="2"/>
+              <a:buChar char="Ø"/>
+            </a:pPr>
+            <a:r>
+              <a:rPr lang="es-MX" dirty="0"/>
+              <a:t>Materiales y métodos</a:t>
+            </a:r>
+          </a:p>
+          <a:p>
+            <a:pPr>
+              <a:buFont typeface="Wingdings" panose="05000000000000000000" pitchFamily="2" charset="2"/>
+              <a:buChar char="Ø"/>
+            </a:pPr>
+            <a:r>
+              <a:rPr lang="es-MX" dirty="0"/>
+              <a:t>Resultados</a:t>
+            </a:r>
+          </a:p>
+          <a:p>
+            <a:pPr>
+              <a:buFont typeface="Wingdings" panose="05000000000000000000" pitchFamily="2" charset="2"/>
+              <a:buChar char="Ø"/>
+            </a:pPr>
+            <a:r>
+              <a:rPr lang="es-MX" dirty="0"/>
+              <a:t>Discusión</a:t>
+            </a:r>
+          </a:p>
+          <a:p>
+            <a:pPr>
+              <a:buFont typeface="Wingdings" panose="05000000000000000000" pitchFamily="2" charset="2"/>
+              <a:buChar char="Ø"/>
+            </a:pPr>
+            <a:r>
+              <a:rPr lang="es-MX" dirty="0"/>
+              <a:t>Conclusiones y recomendaciones</a:t>
+            </a:r>
+          </a:p>
+        </p:txBody>
+      </p:sp>
+    </p:spTree>
+    <p:extLst>
+      <p:ext uri="{BB962C8B-B14F-4D97-AF65-F5344CB8AC3E}">
+        <p14:creationId xmlns:p14="http://schemas.microsoft.com/office/powerpoint/2010/main" val="3282833789"/>
+      </p:ext>
+    </p:extLst>
+  </p:cSld>
+  <p:clrMapOvr>
+    <a:masterClrMapping/>
+  </p:clrMapOvr>
+</p:sld>
+</file>
+
+<file path=ppt/slides/slide20.xml><?xml version="1.0" encoding="utf-8"?>
+<p:sld xmlns:a="http://schemas.openxmlformats.org/drawingml/2006/main" xmlns:r="http://schemas.openxmlformats.org/officeDocument/2006/relationships" xmlns:p="http://schemas.openxmlformats.org/presentationml/2006/main">
+  <p:cSld>
+    <p:spTree>
+      <p:nvGrpSpPr>
+        <p:cNvPr id="1" name=""/>
+        <p:cNvGrpSpPr/>
+        <p:nvPr/>
+      </p:nvGrpSpPr>
+      <p:grpSpPr>
+        <a:xfrm>
+          <a:off x="0" y="0"/>
+          <a:ext cx="0" cy="0"/>
+          <a:chOff x="0" y="0"/>
+          <a:chExt cx="0" cy="0"/>
+        </a:xfrm>
+      </p:grpSpPr>
+      <p:sp>
+        <p:nvSpPr>
+          <p:cNvPr id="2" name="Título 1">
+            <a:extLst>
+              <a:ext uri="{FF2B5EF4-FFF2-40B4-BE49-F238E27FC236}">
+                <a16:creationId xmlns:a16="http://schemas.microsoft.com/office/drawing/2014/main" id="{55BD6D15-2E8E-1E9A-78B9-A770D495A212}"/>
+              </a:ext>
+            </a:extLst>
+          </p:cNvPr>
+          <p:cNvSpPr>
+            <a:spLocks noGrp="1"/>
+          </p:cNvSpPr>
+          <p:nvPr>
+            <p:ph type="title"/>
+          </p:nvPr>
+        </p:nvSpPr>
+        <p:spPr/>
+        <p:txBody>
+          <a:bodyPr/>
+          <a:lstStyle/>
+          <a:p>
+            <a:endParaRPr lang="es-PE" dirty="0"/>
+          </a:p>
+        </p:txBody>
+      </p:sp>
+      <p:sp>
+        <p:nvSpPr>
+          <p:cNvPr id="3" name="Marcador de contenido 2">
+            <a:extLst>
+              <a:ext uri="{FF2B5EF4-FFF2-40B4-BE49-F238E27FC236}">
+                <a16:creationId xmlns:a16="http://schemas.microsoft.com/office/drawing/2014/main" id="{44A11A3C-E44B-5776-D11F-685530A53054}"/>
+              </a:ext>
+            </a:extLst>
+          </p:cNvPr>
+          <p:cNvSpPr>
+            <a:spLocks noGrp="1"/>
+          </p:cNvSpPr>
+          <p:nvPr>
+            <p:ph idx="1"/>
+          </p:nvPr>
+        </p:nvSpPr>
+        <p:spPr/>
+        <p:txBody>
+          <a:bodyPr>
+            <a:normAutofit lnSpcReduction="10000"/>
+          </a:bodyPr>
+          <a:lstStyle/>
+          <a:p>
+            <a:r>
+              <a:rPr lang="es-MX" dirty="0"/>
+              <a:t>En la tabla 2 se muestran las especialidades de mayor significancia con mayor porcentaje de género femenino. Llama la atención que entre las primeras 14 especialidades solo hay una especialidad quirúrgica, cirugía pediátrica, siendo las demás especialidades clínicas: medicina física y de rehabilitación, anatomía patológica, dermatología, geriatría, hematología, medicina legal, patología clínica, pediatría, endocrinología, inmunología y alergia, anestesiología, medicina familiar y comunitaria. Esta predilección por la postulación hacia especialidades clínicas es algo que se ha encontrado en el presente estudio, como puede representarse también en las figuras 7 y 8 y la tabla 6. Esto contrasta con lo encontrado para los postulantes del género masculino. En la tabla 3 se muestran especialidades con un elevado porcentaje de postulantes de género masculino. A diferencia de la tabla 2, mencionada anteriormente, en esta tabla predominaron para el género masculino las especialidades quirúrgicas. Estando a la cabeza ortopedia y traumatología (88.7% de postulantes de género masculino), seguida de urología (81.5%), neurocirugía (78.3%), cirugía de tórax y cardiovascular (76.7%), cirugía general (73.2%), cirugía oncológica (72.9%). Cardiología fue la especialidad clínica con mayor porcentaje de postulantes de género masculino (excluyendo subespecialidades), con un 69.8%.</a:t>
+            </a:r>
+            <a:endParaRPr lang="es-PE" dirty="0"/>
+          </a:p>
+        </p:txBody>
+      </p:sp>
+    </p:spTree>
+    <p:extLst>
+      <p:ext uri="{BB962C8B-B14F-4D97-AF65-F5344CB8AC3E}">
+        <p14:creationId xmlns:p14="http://schemas.microsoft.com/office/powerpoint/2010/main" val="569318348"/>
+      </p:ext>
+    </p:extLst>
+  </p:cSld>
+  <p:clrMapOvr>
+    <a:masterClrMapping/>
+  </p:clrMapOvr>
+</p:sld>
+</file>
+
+<file path=ppt/slides/slide21.xml><?xml version="1.0" encoding="utf-8"?>
+<p:sld xmlns:a="http://schemas.openxmlformats.org/drawingml/2006/main" xmlns:r="http://schemas.openxmlformats.org/officeDocument/2006/relationships" xmlns:p="http://schemas.openxmlformats.org/presentationml/2006/main">
+  <p:cSld>
+    <p:spTree>
+      <p:nvGrpSpPr>
+        <p:cNvPr id="1" name=""/>
+        <p:cNvGrpSpPr/>
+        <p:nvPr/>
+      </p:nvGrpSpPr>
+      <p:grpSpPr>
+        <a:xfrm>
+          <a:off x="0" y="0"/>
+          <a:ext cx="0" cy="0"/>
+          <a:chOff x="0" y="0"/>
+          <a:chExt cx="0" cy="0"/>
+        </a:xfrm>
+      </p:grpSpPr>
+      <p:sp>
+        <p:nvSpPr>
+          <p:cNvPr id="2" name="Título 1">
+            <a:extLst>
+              <a:ext uri="{FF2B5EF4-FFF2-40B4-BE49-F238E27FC236}">
+                <a16:creationId xmlns:a16="http://schemas.microsoft.com/office/drawing/2014/main" id="{F63F83D3-CD13-CE5E-549C-213CC26CD989}"/>
+              </a:ext>
+            </a:extLst>
+          </p:cNvPr>
+          <p:cNvSpPr>
+            <a:spLocks noGrp="1"/>
+          </p:cNvSpPr>
+          <p:nvPr>
+            <p:ph type="title"/>
+          </p:nvPr>
+        </p:nvSpPr>
+        <p:spPr/>
+        <p:txBody>
+          <a:bodyPr/>
+          <a:lstStyle/>
+          <a:p>
+            <a:endParaRPr lang="es-PE"/>
+          </a:p>
+        </p:txBody>
+      </p:sp>
+      <p:sp>
+        <p:nvSpPr>
+          <p:cNvPr id="3" name="Marcador de contenido 2">
+            <a:extLst>
+              <a:ext uri="{FF2B5EF4-FFF2-40B4-BE49-F238E27FC236}">
+                <a16:creationId xmlns:a16="http://schemas.microsoft.com/office/drawing/2014/main" id="{4E21E348-392D-078C-1FD1-A7DB29C55141}"/>
+              </a:ext>
+            </a:extLst>
+          </p:cNvPr>
+          <p:cNvSpPr>
+            <a:spLocks noGrp="1"/>
+          </p:cNvSpPr>
+          <p:nvPr>
+            <p:ph idx="1"/>
+          </p:nvPr>
+        </p:nvSpPr>
+        <p:spPr/>
+        <p:txBody>
+          <a:bodyPr>
+            <a:normAutofit fontScale="92500" lnSpcReduction="10000"/>
+          </a:bodyPr>
+          <a:lstStyle/>
+          <a:p>
+            <a:r>
+              <a:rPr lang="es-MX" dirty="0"/>
+              <a:t>Debido al gran número de especialidades médicas (81 especialidades) se optó por realizar un filtro mediante una prueba estadística para determinar cuáles diferencias en la distribución de género entre las distintas especialidades eran estadísticamente significativas. Para esto se utilizaron modelos de regresión logística. Se creó un modelo de regresión logística para cada una de las especialidades médicas. La variable dependiente del modelo (resultado) fue el género, mientras que las variables dependientes (predictoras) fueron la especialidad médica y el año de postulación. De este modelo estadístico se obtuvieron valores de p del coeficiente de la especialidad médica para determinar la significancia estadística. Debido a que se realizaron estas pruebas estadísticas múltiples veces (81 veces) se realizó un ajuste del valor de p mediante corrección de Bonferroni (valor de p usado como punto de corte para la significancia estadística: 0.000617284). Con esto se seleccionaron 39 especialidades que llegaron a pasar el filtro, entre estas especialidades hubo dos grupos, aquellas en las que hubo una distribución de género con una inclinación hacia el género femenino, y aquellas con inclinación de la distribución de género hacia el género masculino. Para separarlas se calcularon </a:t>
+            </a:r>
+            <a:r>
+              <a:rPr lang="es-MX" dirty="0" err="1"/>
+              <a:t>odds</a:t>
+            </a:r>
+            <a:r>
+              <a:rPr lang="es-MX" dirty="0"/>
+              <a:t> ratios a partir de los coeficientes de la especialidad (como predictora del género y ajustados al año de postulación). Se separaron aquellas especialidades con </a:t>
+            </a:r>
+            <a:r>
+              <a:rPr lang="es-MX" dirty="0" err="1"/>
+              <a:t>odds</a:t>
+            </a:r>
+            <a:r>
+              <a:rPr lang="es-MX" dirty="0"/>
+              <a:t> ratios estadísticamente significativos superiores a uno (más género femenino) y aquellos inferiores a uno (más género masculino)</a:t>
+            </a:r>
+            <a:endParaRPr lang="es-PE" dirty="0"/>
+          </a:p>
+        </p:txBody>
+      </p:sp>
+    </p:spTree>
+    <p:extLst>
+      <p:ext uri="{BB962C8B-B14F-4D97-AF65-F5344CB8AC3E}">
+        <p14:creationId xmlns:p14="http://schemas.microsoft.com/office/powerpoint/2010/main" val="2807644473"/>
+      </p:ext>
+    </p:extLst>
+  </p:cSld>
+  <p:clrMapOvr>
+    <a:masterClrMapping/>
+  </p:clrMapOvr>
+</p:sld>
+</file>
+
+<file path=ppt/slides/slide22.xml><?xml version="1.0" encoding="utf-8"?>
 <p:sld xmlns:a="http://schemas.openxmlformats.org/drawingml/2006/main" xmlns:r="http://schemas.openxmlformats.org/officeDocument/2006/relationships" xmlns:p="http://schemas.openxmlformats.org/presentationml/2006/main">
   <p:cSld>
     <p:spTree>
@@ -17162,7 +17689,7 @@
 </p:sld>
 </file>
 
-<file path=ppt/slides/slide2.xml><?xml version="1.0" encoding="utf-8"?>
+<file path=ppt/slides/slide23.xml><?xml version="1.0" encoding="utf-8"?>
 <p:sld xmlns:a="http://schemas.openxmlformats.org/drawingml/2006/main" xmlns:r="http://schemas.openxmlformats.org/officeDocument/2006/relationships" xmlns:p="http://schemas.openxmlformats.org/presentationml/2006/main">
   <p:cSld>
     <p:spTree>
@@ -17184,7 +17711,7 @@
           <p:cNvPr id="2" name="Título 1">
             <a:extLst>
               <a:ext uri="{FF2B5EF4-FFF2-40B4-BE49-F238E27FC236}">
-                <a16:creationId xmlns:a16="http://schemas.microsoft.com/office/drawing/2014/main" id="{064C1A2E-4D77-2744-E49C-B60F6C2C57C7}"/>
+                <a16:creationId xmlns:a16="http://schemas.microsoft.com/office/drawing/2014/main" id="{64E995C2-D742-9098-BE07-F0724C2C67DC}"/>
               </a:ext>
             </a:extLst>
           </p:cNvPr>
@@ -17200,11 +17727,7 @@
           <a:bodyPr/>
           <a:lstStyle/>
           <a:p>
-            <a:r>
-              <a:rPr lang="es-MX" dirty="0"/>
-              <a:t>Puntos a tratar</a:t>
-            </a:r>
-            <a:endParaRPr lang="es-PE" dirty="0"/>
+            <a:endParaRPr lang="es-PE"/>
           </a:p>
         </p:txBody>
       </p:sp>
@@ -17213,7 +17736,7 @@
           <p:cNvPr id="3" name="Marcador de contenido 2">
             <a:extLst>
               <a:ext uri="{FF2B5EF4-FFF2-40B4-BE49-F238E27FC236}">
-                <a16:creationId xmlns:a16="http://schemas.microsoft.com/office/drawing/2014/main" id="{19A94768-A3AF-214B-9C00-EDEA644CE768}"/>
+                <a16:creationId xmlns:a16="http://schemas.microsoft.com/office/drawing/2014/main" id="{44DE4746-FFD3-114F-3C45-B69324D6FFFA}"/>
               </a:ext>
             </a:extLst>
           </p:cNvPr>
@@ -17229,71 +17752,34 @@
           <a:bodyPr/>
           <a:lstStyle/>
           <a:p>
-            <a:pPr>
-              <a:buFont typeface="Wingdings" panose="05000000000000000000" pitchFamily="2" charset="2"/>
-              <a:buChar char="Ø"/>
-            </a:pPr>
             <a:r>
               <a:rPr lang="es-MX" dirty="0"/>
-              <a:t>Introducción y marco teórico</a:t>
-            </a:r>
-          </a:p>
-          <a:p>
-            <a:pPr>
-              <a:buFont typeface="Wingdings" panose="05000000000000000000" pitchFamily="2" charset="2"/>
-              <a:buChar char="Ø"/>
-            </a:pPr>
+              <a:t>Entre estas especialidades encontradas se encuentra un patrón similar al encontrado anteriormente analizando solamente las proporciones de género. Entre las 10 especialidades con mayor </a:t>
+            </a:r>
+            <a:r>
+              <a:rPr lang="es-MX" dirty="0" err="1"/>
+              <a:t>odds</a:t>
+            </a:r>
             <a:r>
               <a:rPr lang="es-MX" dirty="0"/>
-              <a:t>Objetivos</a:t>
-            </a:r>
-          </a:p>
-          <a:p>
-            <a:pPr>
-              <a:buFont typeface="Wingdings" panose="05000000000000000000" pitchFamily="2" charset="2"/>
-              <a:buChar char="Ø"/>
-            </a:pPr>
+              <a:t> ratio (estadísticamente significativo) se encuentra solamente una especialidad quirúrgica, que es cirugía pediátrica). Por otro lado, entre las 10 especialidades con menor </a:t>
+            </a:r>
+            <a:r>
+              <a:rPr lang="es-MX" dirty="0" err="1"/>
+              <a:t>odds</a:t>
+            </a:r>
             <a:r>
               <a:rPr lang="es-MX" dirty="0"/>
-              <a:t>Materiales y métodos</a:t>
-            </a:r>
-          </a:p>
-          <a:p>
-            <a:pPr>
-              <a:buFont typeface="Wingdings" panose="05000000000000000000" pitchFamily="2" charset="2"/>
-              <a:buChar char="Ø"/>
-            </a:pPr>
-            <a:r>
-              <a:rPr lang="es-MX" dirty="0"/>
-              <a:t>Resultados</a:t>
-            </a:r>
-          </a:p>
-          <a:p>
-            <a:pPr>
-              <a:buFont typeface="Wingdings" panose="05000000000000000000" pitchFamily="2" charset="2"/>
-              <a:buChar char="Ø"/>
-            </a:pPr>
-            <a:r>
-              <a:rPr lang="es-MX" dirty="0"/>
-              <a:t>Discusión</a:t>
-            </a:r>
-          </a:p>
-          <a:p>
-            <a:pPr>
-              <a:buFont typeface="Wingdings" panose="05000000000000000000" pitchFamily="2" charset="2"/>
-              <a:buChar char="Ø"/>
-            </a:pPr>
-            <a:r>
-              <a:rPr lang="es-MX" dirty="0"/>
-              <a:t>Conclusiones y recomendaciones</a:t>
-            </a:r>
+              <a:t> ratio (estadísticamente significativo) se encontraron 7 especialidades quirúrgicas, estando nuevamente a la cabeza ortopedia y traumatología, seguida de urología, neurocirugía, cirugía de tórax y cardiovascular, cirugía general, cirugía oncológica.</a:t>
+            </a:r>
+            <a:endParaRPr lang="es-PE" dirty="0"/>
           </a:p>
         </p:txBody>
       </p:sp>
     </p:spTree>
     <p:extLst>
       <p:ext uri="{BB962C8B-B14F-4D97-AF65-F5344CB8AC3E}">
-        <p14:creationId xmlns:p14="http://schemas.microsoft.com/office/powerpoint/2010/main" val="3282833789"/>
+        <p14:creationId xmlns:p14="http://schemas.microsoft.com/office/powerpoint/2010/main" val="3523990644"/>
       </p:ext>
     </p:extLst>
   </p:cSld>
@@ -17303,7 +17789,7 @@
 </p:sld>
 </file>
 
-<file path=ppt/slides/slide20.xml><?xml version="1.0" encoding="utf-8"?>
+<file path=ppt/slides/slide24.xml><?xml version="1.0" encoding="utf-8"?>
 <p:sld xmlns:a="http://schemas.openxmlformats.org/drawingml/2006/main" xmlns:r="http://schemas.openxmlformats.org/officeDocument/2006/relationships" xmlns:p="http://schemas.openxmlformats.org/presentationml/2006/main">
   <p:cSld>
     <p:spTree>
@@ -17387,7 +17873,107 @@
 </p:sld>
 </file>
 
-<file path=ppt/slides/slide21.xml><?xml version="1.0" encoding="utf-8"?>
+<file path=ppt/slides/slide25.xml><?xml version="1.0" encoding="utf-8"?>
+<p:sld xmlns:a="http://schemas.openxmlformats.org/drawingml/2006/main" xmlns:r="http://schemas.openxmlformats.org/officeDocument/2006/relationships" xmlns:p="http://schemas.openxmlformats.org/presentationml/2006/main">
+  <p:cSld>
+    <p:spTree>
+      <p:nvGrpSpPr>
+        <p:cNvPr id="1" name=""/>
+        <p:cNvGrpSpPr/>
+        <p:nvPr/>
+      </p:nvGrpSpPr>
+      <p:grpSpPr>
+        <a:xfrm>
+          <a:off x="0" y="0"/>
+          <a:ext cx="0" cy="0"/>
+          <a:chOff x="0" y="0"/>
+          <a:chExt cx="0" cy="0"/>
+        </a:xfrm>
+      </p:grpSpPr>
+      <p:sp>
+        <p:nvSpPr>
+          <p:cNvPr id="2" name="Título 1">
+            <a:extLst>
+              <a:ext uri="{FF2B5EF4-FFF2-40B4-BE49-F238E27FC236}">
+                <a16:creationId xmlns:a16="http://schemas.microsoft.com/office/drawing/2014/main" id="{3BE39D83-2037-3242-E2E4-FC86225E46C3}"/>
+              </a:ext>
+            </a:extLst>
+          </p:cNvPr>
+          <p:cNvSpPr>
+            <a:spLocks noGrp="1"/>
+          </p:cNvSpPr>
+          <p:nvPr>
+            <p:ph type="title"/>
+          </p:nvPr>
+        </p:nvSpPr>
+        <p:spPr/>
+        <p:txBody>
+          <a:bodyPr/>
+          <a:lstStyle/>
+          <a:p>
+            <a:endParaRPr lang="es-PE"/>
+          </a:p>
+        </p:txBody>
+      </p:sp>
+      <p:sp>
+        <p:nvSpPr>
+          <p:cNvPr id="3" name="Marcador de contenido 2">
+            <a:extLst>
+              <a:ext uri="{FF2B5EF4-FFF2-40B4-BE49-F238E27FC236}">
+                <a16:creationId xmlns:a16="http://schemas.microsoft.com/office/drawing/2014/main" id="{9D1F5F57-1E18-BA21-1900-5AB5740B74E0}"/>
+              </a:ext>
+            </a:extLst>
+          </p:cNvPr>
+          <p:cNvSpPr>
+            <a:spLocks noGrp="1"/>
+          </p:cNvSpPr>
+          <p:nvPr>
+            <p:ph idx="1"/>
+          </p:nvPr>
+        </p:nvSpPr>
+        <p:spPr/>
+        <p:txBody>
+          <a:bodyPr/>
+          <a:lstStyle/>
+          <a:p>
+            <a:r>
+              <a:rPr lang="es-MX" dirty="0"/>
+              <a:t>Si bien sabemos que la distribución es heterogénea en las distintas especialidades y llegamos a identificar aquellas especialidades con mayor número de mujeres y aquellas con mayor número de hombres, falta aún determinar la dirección de la tendencia (con el pasar de los años). Para esto se realizó un modelo estadístico (regresión logística) en el que se tenía al género como variable dependiente (de resultado) y al año de postulación y especialidad como variables independientes (predictoras), se encontró que el coeficiente del año de postulación era estadísticamente significativo y con un </a:t>
+            </a:r>
+            <a:r>
+              <a:rPr lang="es-MX" dirty="0" err="1"/>
+              <a:t>odds</a:t>
+            </a:r>
+            <a:r>
+              <a:rPr lang="es-MX" dirty="0"/>
+              <a:t> ratio ajustado de 1.048 [intervalo de confianza (IC) 95%: 1.043-1.054]. Entonces, podemos decir que hay una tendencia hacia un mayor número de mujeres con el paso de los años entre los postulantes al programa de </a:t>
+            </a:r>
+            <a:r>
+              <a:rPr lang="es-MX" dirty="0" err="1"/>
+              <a:t>residentado</a:t>
+            </a:r>
+            <a:r>
+              <a:rPr lang="es-MX" dirty="0"/>
+              <a:t> médico en el Perú</a:t>
+            </a:r>
+            <a:endParaRPr lang="es-PE" dirty="0"/>
+          </a:p>
+        </p:txBody>
+      </p:sp>
+    </p:spTree>
+    <p:extLst>
+      <p:ext uri="{BB962C8B-B14F-4D97-AF65-F5344CB8AC3E}">
+        <p14:creationId xmlns:p14="http://schemas.microsoft.com/office/powerpoint/2010/main" val="2485922193"/>
+      </p:ext>
+    </p:extLst>
+  </p:cSld>
+  <p:clrMapOvr>
+    <a:masterClrMapping/>
+  </p:clrMapOvr>
+</p:sld>
+</file>
+
+<file path=ppt/slides/slide26.xml><?xml version="1.0" encoding="utf-8"?>
 <p:sld xmlns:a="http://schemas.openxmlformats.org/drawingml/2006/main" xmlns:r="http://schemas.openxmlformats.org/officeDocument/2006/relationships" xmlns:p="http://schemas.openxmlformats.org/presentationml/2006/main">
   <p:cSld>
     <p:spTree>
@@ -17505,7 +18091,7 @@
 </p:sld>
 </file>
 
-<file path=ppt/slides/slide22.xml><?xml version="1.0" encoding="utf-8"?>
+<file path=ppt/slides/slide27.xml><?xml version="1.0" encoding="utf-8"?>
 <p:sld xmlns:a="http://schemas.openxmlformats.org/drawingml/2006/main" xmlns:r="http://schemas.openxmlformats.org/officeDocument/2006/relationships" xmlns:p="http://schemas.openxmlformats.org/presentationml/2006/main">
   <p:cSld>
     <p:spTree>
@@ -17623,7 +18209,99 @@
 </p:sld>
 </file>
 
-<file path=ppt/slides/slide23.xml><?xml version="1.0" encoding="utf-8"?>
+<file path=ppt/slides/slide28.xml><?xml version="1.0" encoding="utf-8"?>
+<p:sld xmlns:a="http://schemas.openxmlformats.org/drawingml/2006/main" xmlns:r="http://schemas.openxmlformats.org/officeDocument/2006/relationships" xmlns:p="http://schemas.openxmlformats.org/presentationml/2006/main">
+  <p:cSld>
+    <p:spTree>
+      <p:nvGrpSpPr>
+        <p:cNvPr id="1" name=""/>
+        <p:cNvGrpSpPr/>
+        <p:nvPr/>
+      </p:nvGrpSpPr>
+      <p:grpSpPr>
+        <a:xfrm>
+          <a:off x="0" y="0"/>
+          <a:ext cx="0" cy="0"/>
+          <a:chOff x="0" y="0"/>
+          <a:chExt cx="0" cy="0"/>
+        </a:xfrm>
+      </p:grpSpPr>
+      <p:sp>
+        <p:nvSpPr>
+          <p:cNvPr id="2" name="Título 1">
+            <a:extLst>
+              <a:ext uri="{FF2B5EF4-FFF2-40B4-BE49-F238E27FC236}">
+                <a16:creationId xmlns:a16="http://schemas.microsoft.com/office/drawing/2014/main" id="{7BBDB6CA-92D0-198B-E06E-547009CD267C}"/>
+              </a:ext>
+            </a:extLst>
+          </p:cNvPr>
+          <p:cNvSpPr>
+            <a:spLocks noGrp="1"/>
+          </p:cNvSpPr>
+          <p:nvPr>
+            <p:ph type="title"/>
+          </p:nvPr>
+        </p:nvSpPr>
+        <p:spPr/>
+        <p:txBody>
+          <a:bodyPr/>
+          <a:lstStyle/>
+          <a:p>
+            <a:endParaRPr lang="es-PE"/>
+          </a:p>
+        </p:txBody>
+      </p:sp>
+      <p:sp>
+        <p:nvSpPr>
+          <p:cNvPr id="3" name="Marcador de contenido 2">
+            <a:extLst>
+              <a:ext uri="{FF2B5EF4-FFF2-40B4-BE49-F238E27FC236}">
+                <a16:creationId xmlns:a16="http://schemas.microsoft.com/office/drawing/2014/main" id="{4B3E546E-4009-E458-8125-8943918499A2}"/>
+              </a:ext>
+            </a:extLst>
+          </p:cNvPr>
+          <p:cNvSpPr>
+            <a:spLocks noGrp="1"/>
+          </p:cNvSpPr>
+          <p:nvPr>
+            <p:ph idx="1"/>
+          </p:nvPr>
+        </p:nvSpPr>
+        <p:spPr/>
+        <p:txBody>
+          <a:bodyPr/>
+          <a:lstStyle/>
+          <a:p>
+            <a:r>
+              <a:rPr lang="es-MX" dirty="0"/>
+              <a:t>Ahora, para determinar si esta tendencia es la misma en todas las especialidades o es una tendencia heterogénea se optó por realizar también una regresión logística en la cual se agregaba a la posible modificación del efecto del tiempo sobre el género por las distintas especialidades. Para esto se agregó la interacción en el modelo estadístico y también se realizó un análisis mediante la prueba de razón de verosimilitud (“</a:t>
+            </a:r>
+            <a:r>
+              <a:rPr lang="es-MX" dirty="0" err="1"/>
+              <a:t>likelihood</a:t>
+            </a:r>
+            <a:r>
+              <a:rPr lang="es-MX" dirty="0"/>
+              <a:t> ratio test”) para cada uno de los modelos generados. Para determinar la significancia estadística se hizo el ajuste del valor de p mediante la corrección de Bonferroni. Se encontró que solo había significancia estadística de la interacción para tres especialidades: cirugía general, cirugía plástica y ginecología y obstetricia. Dos de ellas (cirugía general y ginecología y obstetricia) con una tendencia incluso superior a la tendencia global (más mujeres), mientras que una especialidad (cirugía plástica) tuvo una tendencia en dirección opuesta: menos mujeres. Estos hallazgos se representan en la figura 4. El encontrar solamente estas 3 especialidades mediante el método descrito indica que en líneas generales las distintas especialidades médicas aparentemente están siguiendo una tendencia similar a la tendencia global.</a:t>
+            </a:r>
+            <a:endParaRPr lang="es-PE" dirty="0"/>
+          </a:p>
+        </p:txBody>
+      </p:sp>
+    </p:spTree>
+    <p:extLst>
+      <p:ext uri="{BB962C8B-B14F-4D97-AF65-F5344CB8AC3E}">
+        <p14:creationId xmlns:p14="http://schemas.microsoft.com/office/powerpoint/2010/main" val="1293225629"/>
+      </p:ext>
+    </p:extLst>
+  </p:cSld>
+  <p:clrMapOvr>
+    <a:masterClrMapping/>
+  </p:clrMapOvr>
+</p:sld>
+</file>
+
+<file path=ppt/slides/slide29.xml><?xml version="1.0" encoding="utf-8"?>
 <p:sld xmlns:a="http://schemas.openxmlformats.org/drawingml/2006/main" xmlns:r="http://schemas.openxmlformats.org/officeDocument/2006/relationships" xmlns:p="http://schemas.openxmlformats.org/presentationml/2006/main">
   <p:cSld>
     <p:spTree>
@@ -17733,7 +18411,91 @@
 </p:sld>
 </file>
 
-<file path=ppt/slides/slide24.xml><?xml version="1.0" encoding="utf-8"?>
+<file path=ppt/slides/slide3.xml><?xml version="1.0" encoding="utf-8"?>
+<p:sld xmlns:a="http://schemas.openxmlformats.org/drawingml/2006/main" xmlns:r="http://schemas.openxmlformats.org/officeDocument/2006/relationships" xmlns:p="http://schemas.openxmlformats.org/presentationml/2006/main">
+  <p:cSld>
+    <p:spTree>
+      <p:nvGrpSpPr>
+        <p:cNvPr id="1" name=""/>
+        <p:cNvGrpSpPr/>
+        <p:nvPr/>
+      </p:nvGrpSpPr>
+      <p:grpSpPr>
+        <a:xfrm>
+          <a:off x="0" y="0"/>
+          <a:ext cx="0" cy="0"/>
+          <a:chOff x="0" y="0"/>
+          <a:chExt cx="0" cy="0"/>
+        </a:xfrm>
+      </p:grpSpPr>
+      <p:sp>
+        <p:nvSpPr>
+          <p:cNvPr id="4" name="Título 3">
+            <a:extLst>
+              <a:ext uri="{FF2B5EF4-FFF2-40B4-BE49-F238E27FC236}">
+                <a16:creationId xmlns:a16="http://schemas.microsoft.com/office/drawing/2014/main" id="{F9F995DB-5B73-D0D8-4616-5EF9B2B84A0A}"/>
+              </a:ext>
+            </a:extLst>
+          </p:cNvPr>
+          <p:cNvSpPr>
+            <a:spLocks noGrp="1"/>
+          </p:cNvSpPr>
+          <p:nvPr>
+            <p:ph type="title"/>
+          </p:nvPr>
+        </p:nvSpPr>
+        <p:spPr/>
+        <p:txBody>
+          <a:bodyPr/>
+          <a:lstStyle/>
+          <a:p>
+            <a:r>
+              <a:rPr lang="es-MX" dirty="0"/>
+              <a:t>Introducción y marco teórico</a:t>
+            </a:r>
+            <a:endParaRPr lang="es-PE" dirty="0"/>
+          </a:p>
+        </p:txBody>
+      </p:sp>
+      <p:sp>
+        <p:nvSpPr>
+          <p:cNvPr id="5" name="Marcador de texto 4">
+            <a:extLst>
+              <a:ext uri="{FF2B5EF4-FFF2-40B4-BE49-F238E27FC236}">
+                <a16:creationId xmlns:a16="http://schemas.microsoft.com/office/drawing/2014/main" id="{EEE1B087-4536-92A2-9D16-540E34F96D3E}"/>
+              </a:ext>
+            </a:extLst>
+          </p:cNvPr>
+          <p:cNvSpPr>
+            <a:spLocks noGrp="1"/>
+          </p:cNvSpPr>
+          <p:nvPr>
+            <p:ph type="body" idx="1"/>
+          </p:nvPr>
+        </p:nvSpPr>
+        <p:spPr/>
+        <p:txBody>
+          <a:bodyPr/>
+          <a:lstStyle/>
+          <a:p>
+            <a:endParaRPr lang="es-PE"/>
+          </a:p>
+        </p:txBody>
+      </p:sp>
+    </p:spTree>
+    <p:extLst>
+      <p:ext uri="{BB962C8B-B14F-4D97-AF65-F5344CB8AC3E}">
+        <p14:creationId xmlns:p14="http://schemas.microsoft.com/office/powerpoint/2010/main" val="3605842633"/>
+      </p:ext>
+    </p:extLst>
+  </p:cSld>
+  <p:clrMapOvr>
+    <a:masterClrMapping/>
+  </p:clrMapOvr>
+</p:sld>
+</file>
+
+<file path=ppt/slides/slide30.xml><?xml version="1.0" encoding="utf-8"?>
 <p:sld xmlns:a="http://schemas.openxmlformats.org/drawingml/2006/main" xmlns:r="http://schemas.openxmlformats.org/officeDocument/2006/relationships" xmlns:p="http://schemas.openxmlformats.org/presentationml/2006/main">
   <p:cSld>
     <p:spTree>
@@ -17842,7 +18604,7 @@
 </p:sld>
 </file>
 
-<file path=ppt/slides/slide25.xml><?xml version="1.0" encoding="utf-8"?>
+<file path=ppt/slides/slide31.xml><?xml version="1.0" encoding="utf-8"?>
 <p:sld xmlns:a="http://schemas.openxmlformats.org/drawingml/2006/main" xmlns:r="http://schemas.openxmlformats.org/officeDocument/2006/relationships" xmlns:p="http://schemas.openxmlformats.org/presentationml/2006/main">
   <p:cSld>
     <p:spTree>
@@ -17951,7 +18713,99 @@
 </p:sld>
 </file>
 
-<file path=ppt/slides/slide26.xml><?xml version="1.0" encoding="utf-8"?>
+<file path=ppt/slides/slide32.xml><?xml version="1.0" encoding="utf-8"?>
+<p:sld xmlns:a="http://schemas.openxmlformats.org/drawingml/2006/main" xmlns:r="http://schemas.openxmlformats.org/officeDocument/2006/relationships" xmlns:p="http://schemas.openxmlformats.org/presentationml/2006/main">
+  <p:cSld>
+    <p:spTree>
+      <p:nvGrpSpPr>
+        <p:cNvPr id="1" name=""/>
+        <p:cNvGrpSpPr/>
+        <p:nvPr/>
+      </p:nvGrpSpPr>
+      <p:grpSpPr>
+        <a:xfrm>
+          <a:off x="0" y="0"/>
+          <a:ext cx="0" cy="0"/>
+          <a:chOff x="0" y="0"/>
+          <a:chExt cx="0" cy="0"/>
+        </a:xfrm>
+      </p:grpSpPr>
+      <p:sp>
+        <p:nvSpPr>
+          <p:cNvPr id="2" name="Título 1">
+            <a:extLst>
+              <a:ext uri="{FF2B5EF4-FFF2-40B4-BE49-F238E27FC236}">
+                <a16:creationId xmlns:a16="http://schemas.microsoft.com/office/drawing/2014/main" id="{B6AA687D-C707-288B-A833-4D403A56AB07}"/>
+              </a:ext>
+            </a:extLst>
+          </p:cNvPr>
+          <p:cNvSpPr>
+            <a:spLocks noGrp="1"/>
+          </p:cNvSpPr>
+          <p:nvPr>
+            <p:ph type="title"/>
+          </p:nvPr>
+        </p:nvSpPr>
+        <p:spPr/>
+        <p:txBody>
+          <a:bodyPr/>
+          <a:lstStyle/>
+          <a:p>
+            <a:endParaRPr lang="es-PE"/>
+          </a:p>
+        </p:txBody>
+      </p:sp>
+      <p:sp>
+        <p:nvSpPr>
+          <p:cNvPr id="3" name="Marcador de contenido 2">
+            <a:extLst>
+              <a:ext uri="{FF2B5EF4-FFF2-40B4-BE49-F238E27FC236}">
+                <a16:creationId xmlns:a16="http://schemas.microsoft.com/office/drawing/2014/main" id="{909672BA-6D5D-8573-990A-B68AFAB13C59}"/>
+              </a:ext>
+            </a:extLst>
+          </p:cNvPr>
+          <p:cNvSpPr>
+            <a:spLocks noGrp="1"/>
+          </p:cNvSpPr>
+          <p:nvPr>
+            <p:ph idx="1"/>
+          </p:nvPr>
+        </p:nvSpPr>
+        <p:spPr/>
+        <p:txBody>
+          <a:bodyPr/>
+          <a:lstStyle/>
+          <a:p>
+            <a:r>
+              <a:rPr lang="es-MX" dirty="0"/>
+              <a:t>Se realizó un modelo de regresión logística en el que se tenía al género como variable dependiente (de resultado) y al tipo de especialidad (clínica vs. quirúrgica) y al año de postulación como variables independientes (predictoras). El resultado fue que para el coeficiente del tipo de especialidad había diferencias estadísticamente significativas (valor de p de &lt;2.23-308, se promedia a 0), con un </a:t>
+            </a:r>
+            <a:r>
+              <a:rPr lang="es-MX" dirty="0" err="1"/>
+              <a:t>odds</a:t>
+            </a:r>
+            <a:r>
+              <a:rPr lang="es-MX" dirty="0"/>
+              <a:t> ratio ajustado de 0.39 [IC 95%: 0.37-0.40], con lo que se corrobora estadísticamente la evidente diferencia observada. También se realizó un modelo en el que se incorporaba la posible modificación de efecto del tipo de especialidad sobre el efecto del año de postulación en el género. Sin embargo, no se obtuvo una significancia estadística (valor de p de la interacción: 0.054). Esto indica que, a pesar de las grandes diferencias en la distribución de género, la tendencia de las especialidades clínicas y las especialidades quirúrgicas es similar. Esto también puede observarse en la figura 6, donde se observa que las líneas hasta parecen paralelas entre sí.</a:t>
+            </a:r>
+            <a:endParaRPr lang="es-PE" dirty="0"/>
+          </a:p>
+        </p:txBody>
+      </p:sp>
+    </p:spTree>
+    <p:extLst>
+      <p:ext uri="{BB962C8B-B14F-4D97-AF65-F5344CB8AC3E}">
+        <p14:creationId xmlns:p14="http://schemas.microsoft.com/office/powerpoint/2010/main" val="716505547"/>
+      </p:ext>
+    </p:extLst>
+  </p:cSld>
+  <p:clrMapOvr>
+    <a:masterClrMapping/>
+  </p:clrMapOvr>
+</p:sld>
+</file>
+
+<file path=ppt/slides/slide33.xml><?xml version="1.0" encoding="utf-8"?>
 <p:sld xmlns:a="http://schemas.openxmlformats.org/drawingml/2006/main" xmlns:r="http://schemas.openxmlformats.org/officeDocument/2006/relationships" xmlns:p="http://schemas.openxmlformats.org/presentationml/2006/main">
   <p:cSld>
     <p:spTree>
@@ -18060,7 +18914,7 @@
 </p:sld>
 </file>
 
-<file path=ppt/slides/slide27.xml><?xml version="1.0" encoding="utf-8"?>
+<file path=ppt/slides/slide34.xml><?xml version="1.0" encoding="utf-8"?>
 <p:sld xmlns:a="http://schemas.openxmlformats.org/drawingml/2006/main" xmlns:r="http://schemas.openxmlformats.org/officeDocument/2006/relationships" xmlns:p="http://schemas.openxmlformats.org/presentationml/2006/main">
   <p:cSld>
     <p:spTree>
@@ -18169,7 +19023,91 @@
 </p:sld>
 </file>
 
-<file path=ppt/slides/slide28.xml><?xml version="1.0" encoding="utf-8"?>
+<file path=ppt/slides/slide35.xml><?xml version="1.0" encoding="utf-8"?>
+<p:sld xmlns:a="http://schemas.openxmlformats.org/drawingml/2006/main" xmlns:r="http://schemas.openxmlformats.org/officeDocument/2006/relationships" xmlns:p="http://schemas.openxmlformats.org/presentationml/2006/main">
+  <p:cSld>
+    <p:spTree>
+      <p:nvGrpSpPr>
+        <p:cNvPr id="1" name=""/>
+        <p:cNvGrpSpPr/>
+        <p:nvPr/>
+      </p:nvGrpSpPr>
+      <p:grpSpPr>
+        <a:xfrm>
+          <a:off x="0" y="0"/>
+          <a:ext cx="0" cy="0"/>
+          <a:chOff x="0" y="0"/>
+          <a:chExt cx="0" cy="0"/>
+        </a:xfrm>
+      </p:grpSpPr>
+      <p:sp>
+        <p:nvSpPr>
+          <p:cNvPr id="2" name="Título 1">
+            <a:extLst>
+              <a:ext uri="{FF2B5EF4-FFF2-40B4-BE49-F238E27FC236}">
+                <a16:creationId xmlns:a16="http://schemas.microsoft.com/office/drawing/2014/main" id="{FA36F1C1-7FD8-91FF-0A31-B278125608F7}"/>
+              </a:ext>
+            </a:extLst>
+          </p:cNvPr>
+          <p:cNvSpPr>
+            <a:spLocks noGrp="1"/>
+          </p:cNvSpPr>
+          <p:nvPr>
+            <p:ph type="title"/>
+          </p:nvPr>
+        </p:nvSpPr>
+        <p:spPr/>
+        <p:txBody>
+          <a:bodyPr/>
+          <a:lstStyle/>
+          <a:p>
+            <a:endParaRPr lang="es-PE"/>
+          </a:p>
+        </p:txBody>
+      </p:sp>
+      <p:sp>
+        <p:nvSpPr>
+          <p:cNvPr id="3" name="Marcador de contenido 2">
+            <a:extLst>
+              <a:ext uri="{FF2B5EF4-FFF2-40B4-BE49-F238E27FC236}">
+                <a16:creationId xmlns:a16="http://schemas.microsoft.com/office/drawing/2014/main" id="{27F34349-C23B-9C5C-481D-3A223F94C46F}"/>
+              </a:ext>
+            </a:extLst>
+          </p:cNvPr>
+          <p:cNvSpPr>
+            <a:spLocks noGrp="1"/>
+          </p:cNvSpPr>
+          <p:nvPr>
+            <p:ph idx="1"/>
+          </p:nvPr>
+        </p:nvSpPr>
+        <p:spPr/>
+        <p:txBody>
+          <a:bodyPr/>
+          <a:lstStyle/>
+          <a:p>
+            <a:r>
+              <a:rPr lang="es-MX" dirty="0"/>
+              <a:t>Ahora, si comparamos la predilección por la postulación a especialidades clínicas o quirúrgicas entre los postulantes de género femenino y masculino, encontramos que consistentemente los postulantes de género femenino tienen porcentajes más bajos de postulación a especialidades quirúrgicas. El porcentaje más alto de postulación a especialidades quirúrgicas entre los postulantes de género femenino fue alcanzado el año 2023, con 35.7%, mientras que el de los postulantes de género masculino fue el año 2022, con 56.8%. Incluso, el año con menor porcentaje de postulación a especialidades quirúrgicas de los postulantes de género masculino fue el año 2013, con 45.8%, porcentaje superior al mayor porcentaje en el género femenino. Esto indica la amplia diferencia en cuanto a la predilección por las especialidades quirúrgicas del género masculino.</a:t>
+            </a:r>
+            <a:endParaRPr lang="es-PE" dirty="0"/>
+          </a:p>
+        </p:txBody>
+      </p:sp>
+    </p:spTree>
+    <p:extLst>
+      <p:ext uri="{BB962C8B-B14F-4D97-AF65-F5344CB8AC3E}">
+        <p14:creationId xmlns:p14="http://schemas.microsoft.com/office/powerpoint/2010/main" val="3817328959"/>
+      </p:ext>
+    </p:extLst>
+  </p:cSld>
+  <p:clrMapOvr>
+    <a:masterClrMapping/>
+  </p:clrMapOvr>
+</p:sld>
+</file>
+
+<file path=ppt/slides/slide36.xml><?xml version="1.0" encoding="utf-8"?>
 <p:sld xmlns:a="http://schemas.openxmlformats.org/drawingml/2006/main" xmlns:r="http://schemas.openxmlformats.org/officeDocument/2006/relationships" xmlns:p="http://schemas.openxmlformats.org/presentationml/2006/main">
   <p:cSld>
     <p:spTree>
@@ -18253,7 +19191,91 @@
 </p:sld>
 </file>
 
-<file path=ppt/slides/slide29.xml><?xml version="1.0" encoding="utf-8"?>
+<file path=ppt/slides/slide37.xml><?xml version="1.0" encoding="utf-8"?>
+<p:sld xmlns:a="http://schemas.openxmlformats.org/drawingml/2006/main" xmlns:r="http://schemas.openxmlformats.org/officeDocument/2006/relationships" xmlns:p="http://schemas.openxmlformats.org/presentationml/2006/main">
+  <p:cSld>
+    <p:spTree>
+      <p:nvGrpSpPr>
+        <p:cNvPr id="1" name=""/>
+        <p:cNvGrpSpPr/>
+        <p:nvPr/>
+      </p:nvGrpSpPr>
+      <p:grpSpPr>
+        <a:xfrm>
+          <a:off x="0" y="0"/>
+          <a:ext cx="0" cy="0"/>
+          <a:chOff x="0" y="0"/>
+          <a:chExt cx="0" cy="0"/>
+        </a:xfrm>
+      </p:grpSpPr>
+      <p:sp>
+        <p:nvSpPr>
+          <p:cNvPr id="4" name="Título 3">
+            <a:extLst>
+              <a:ext uri="{FF2B5EF4-FFF2-40B4-BE49-F238E27FC236}">
+                <a16:creationId xmlns:a16="http://schemas.microsoft.com/office/drawing/2014/main" id="{E700D761-4072-4D35-3B9C-32049D05890C}"/>
+              </a:ext>
+            </a:extLst>
+          </p:cNvPr>
+          <p:cNvSpPr>
+            <a:spLocks noGrp="1"/>
+          </p:cNvSpPr>
+          <p:nvPr>
+            <p:ph type="title"/>
+          </p:nvPr>
+        </p:nvSpPr>
+        <p:spPr/>
+        <p:txBody>
+          <a:bodyPr/>
+          <a:lstStyle/>
+          <a:p>
+            <a:endParaRPr lang="es-PE"/>
+          </a:p>
+        </p:txBody>
+      </p:sp>
+      <p:sp>
+        <p:nvSpPr>
+          <p:cNvPr id="5" name="Marcador de contenido 4">
+            <a:extLst>
+              <a:ext uri="{FF2B5EF4-FFF2-40B4-BE49-F238E27FC236}">
+                <a16:creationId xmlns:a16="http://schemas.microsoft.com/office/drawing/2014/main" id="{B5D9DBF3-E7BC-C13E-A733-5E56CB5DE408}"/>
+              </a:ext>
+            </a:extLst>
+          </p:cNvPr>
+          <p:cNvSpPr>
+            <a:spLocks noGrp="1"/>
+          </p:cNvSpPr>
+          <p:nvPr>
+            <p:ph idx="1"/>
+          </p:nvPr>
+        </p:nvSpPr>
+        <p:spPr/>
+        <p:txBody>
+          <a:bodyPr/>
+          <a:lstStyle/>
+          <a:p>
+            <a:r>
+              <a:rPr lang="es-MX" dirty="0"/>
+              <a:t>Hasta este punto se abordó el tema de los postulantes, pero queda la duda si lo mismo puede extrapolarse para los ingresantes, para esto se realizaron análisis similares a los realizados en los postulantes, pero solo en los ingresantes. Cabe mencionar que para los ingresantes solo se contaron con datos desde el año 2016, debido a que estos datos no se registraban en años anteriores (a diferencia de los postulantes, de quienes se contaban con datos desde el año 2013). </a:t>
+            </a:r>
+            <a:endParaRPr lang="es-PE" dirty="0"/>
+          </a:p>
+        </p:txBody>
+      </p:sp>
+    </p:spTree>
+    <p:extLst>
+      <p:ext uri="{BB962C8B-B14F-4D97-AF65-F5344CB8AC3E}">
+        <p14:creationId xmlns:p14="http://schemas.microsoft.com/office/powerpoint/2010/main" val="2591177265"/>
+      </p:ext>
+    </p:extLst>
+  </p:cSld>
+  <p:clrMapOvr>
+    <a:masterClrMapping/>
+  </p:clrMapOvr>
+</p:sld>
+</file>
+
+<file path=ppt/slides/slide38.xml><?xml version="1.0" encoding="utf-8"?>
 <p:sld xmlns:a="http://schemas.openxmlformats.org/drawingml/2006/main" xmlns:r="http://schemas.openxmlformats.org/officeDocument/2006/relationships" xmlns:p="http://schemas.openxmlformats.org/presentationml/2006/main">
   <p:cSld>
     <p:spTree>
@@ -18363,91 +19385,7 @@
 </p:sld>
 </file>
 
-<file path=ppt/slides/slide3.xml><?xml version="1.0" encoding="utf-8"?>
-<p:sld xmlns:a="http://schemas.openxmlformats.org/drawingml/2006/main" xmlns:r="http://schemas.openxmlformats.org/officeDocument/2006/relationships" xmlns:p="http://schemas.openxmlformats.org/presentationml/2006/main">
-  <p:cSld>
-    <p:spTree>
-      <p:nvGrpSpPr>
-        <p:cNvPr id="1" name=""/>
-        <p:cNvGrpSpPr/>
-        <p:nvPr/>
-      </p:nvGrpSpPr>
-      <p:grpSpPr>
-        <a:xfrm>
-          <a:off x="0" y="0"/>
-          <a:ext cx="0" cy="0"/>
-          <a:chOff x="0" y="0"/>
-          <a:chExt cx="0" cy="0"/>
-        </a:xfrm>
-      </p:grpSpPr>
-      <p:sp>
-        <p:nvSpPr>
-          <p:cNvPr id="4" name="Título 3">
-            <a:extLst>
-              <a:ext uri="{FF2B5EF4-FFF2-40B4-BE49-F238E27FC236}">
-                <a16:creationId xmlns:a16="http://schemas.microsoft.com/office/drawing/2014/main" id="{F9F995DB-5B73-D0D8-4616-5EF9B2B84A0A}"/>
-              </a:ext>
-            </a:extLst>
-          </p:cNvPr>
-          <p:cNvSpPr>
-            <a:spLocks noGrp="1"/>
-          </p:cNvSpPr>
-          <p:nvPr>
-            <p:ph type="title"/>
-          </p:nvPr>
-        </p:nvSpPr>
-        <p:spPr/>
-        <p:txBody>
-          <a:bodyPr/>
-          <a:lstStyle/>
-          <a:p>
-            <a:r>
-              <a:rPr lang="es-MX" dirty="0"/>
-              <a:t>Introducción y marco teórico</a:t>
-            </a:r>
-            <a:endParaRPr lang="es-PE" dirty="0"/>
-          </a:p>
-        </p:txBody>
-      </p:sp>
-      <p:sp>
-        <p:nvSpPr>
-          <p:cNvPr id="5" name="Marcador de texto 4">
-            <a:extLst>
-              <a:ext uri="{FF2B5EF4-FFF2-40B4-BE49-F238E27FC236}">
-                <a16:creationId xmlns:a16="http://schemas.microsoft.com/office/drawing/2014/main" id="{EEE1B087-4536-92A2-9D16-540E34F96D3E}"/>
-              </a:ext>
-            </a:extLst>
-          </p:cNvPr>
-          <p:cNvSpPr>
-            <a:spLocks noGrp="1"/>
-          </p:cNvSpPr>
-          <p:nvPr>
-            <p:ph type="body" idx="1"/>
-          </p:nvPr>
-        </p:nvSpPr>
-        <p:spPr/>
-        <p:txBody>
-          <a:bodyPr/>
-          <a:lstStyle/>
-          <a:p>
-            <a:endParaRPr lang="es-PE"/>
-          </a:p>
-        </p:txBody>
-      </p:sp>
-    </p:spTree>
-    <p:extLst>
-      <p:ext uri="{BB962C8B-B14F-4D97-AF65-F5344CB8AC3E}">
-        <p14:creationId xmlns:p14="http://schemas.microsoft.com/office/powerpoint/2010/main" val="3605842633"/>
-      </p:ext>
-    </p:extLst>
-  </p:cSld>
-  <p:clrMapOvr>
-    <a:masterClrMapping/>
-  </p:clrMapOvr>
-</p:sld>
-</file>
-
-<file path=ppt/slides/slide30.xml><?xml version="1.0" encoding="utf-8"?>
+<file path=ppt/slides/slide39.xml><?xml version="1.0" encoding="utf-8"?>
 <p:sld xmlns:a="http://schemas.openxmlformats.org/drawingml/2006/main" xmlns:r="http://schemas.openxmlformats.org/officeDocument/2006/relationships" xmlns:p="http://schemas.openxmlformats.org/presentationml/2006/main">
   <p:cSld>
     <p:spTree>
@@ -18551,7 +19489,137 @@
 </p:sld>
 </file>
 
-<file path=ppt/slides/slide31.xml><?xml version="1.0" encoding="utf-8"?>
+<file path=ppt/slides/slide4.xml><?xml version="1.0" encoding="utf-8"?>
+<p:sld xmlns:a="http://schemas.openxmlformats.org/drawingml/2006/main" xmlns:r="http://schemas.openxmlformats.org/officeDocument/2006/relationships" xmlns:p="http://schemas.openxmlformats.org/presentationml/2006/main">
+  <p:cSld>
+    <p:spTree>
+      <p:nvGrpSpPr>
+        <p:cNvPr id="1" name=""/>
+        <p:cNvGrpSpPr/>
+        <p:nvPr/>
+      </p:nvGrpSpPr>
+      <p:grpSpPr>
+        <a:xfrm>
+          <a:off x="0" y="0"/>
+          <a:ext cx="0" cy="0"/>
+          <a:chOff x="0" y="0"/>
+          <a:chExt cx="0" cy="0"/>
+        </a:xfrm>
+      </p:grpSpPr>
+      <p:sp>
+        <p:nvSpPr>
+          <p:cNvPr id="4" name="Título 3">
+            <a:extLst>
+              <a:ext uri="{FF2B5EF4-FFF2-40B4-BE49-F238E27FC236}">
+                <a16:creationId xmlns:a16="http://schemas.microsoft.com/office/drawing/2014/main" id="{A12A0201-3825-1432-5849-1ABE3D3C3EF4}"/>
+              </a:ext>
+            </a:extLst>
+          </p:cNvPr>
+          <p:cNvSpPr>
+            <a:spLocks noGrp="1"/>
+          </p:cNvSpPr>
+          <p:nvPr>
+            <p:ph type="title"/>
+          </p:nvPr>
+        </p:nvSpPr>
+        <p:spPr/>
+        <p:txBody>
+          <a:bodyPr/>
+          <a:lstStyle/>
+          <a:p>
+            <a:r>
+              <a:rPr lang="es-MX" dirty="0"/>
+              <a:t>Introducción y datos generales</a:t>
+            </a:r>
+            <a:endParaRPr lang="es-PE" dirty="0"/>
+          </a:p>
+        </p:txBody>
+      </p:sp>
+      <p:sp>
+        <p:nvSpPr>
+          <p:cNvPr id="5" name="Marcador de contenido 4">
+            <a:extLst>
+              <a:ext uri="{FF2B5EF4-FFF2-40B4-BE49-F238E27FC236}">
+                <a16:creationId xmlns:a16="http://schemas.microsoft.com/office/drawing/2014/main" id="{9573FAE0-C63F-4B12-904B-17395943868A}"/>
+              </a:ext>
+            </a:extLst>
+          </p:cNvPr>
+          <p:cNvSpPr>
+            <a:spLocks noGrp="1"/>
+          </p:cNvSpPr>
+          <p:nvPr>
+            <p:ph idx="1"/>
+          </p:nvPr>
+        </p:nvSpPr>
+        <p:spPr/>
+        <p:txBody>
+          <a:bodyPr>
+            <a:normAutofit/>
+          </a:bodyPr>
+          <a:lstStyle/>
+          <a:p>
+            <a:r>
+              <a:rPr lang="es-MX" dirty="0"/>
+              <a:t>En la actualidad, la especialidad médica representa un hito significativo en la formación de muchos médicos.</a:t>
+            </a:r>
+            <a:endParaRPr lang="es-PE" dirty="0"/>
+          </a:p>
+          <a:p>
+            <a:r>
+              <a:rPr lang="es-PE" dirty="0"/>
+              <a:t>Tener una especialidad repercute en el desarrollo profesional y en la situación económica individual de un médico.</a:t>
+            </a:r>
+            <a:endParaRPr lang="es-MX" dirty="0"/>
+          </a:p>
+          <a:p>
+            <a:r>
+              <a:rPr lang="es-PE" dirty="0"/>
+              <a:t>Antiguamente existía una predominancia masculina en los profesionales médicos.</a:t>
+            </a:r>
+          </a:p>
+          <a:p>
+            <a:r>
+              <a:rPr lang="es-MX" dirty="0"/>
+              <a:t>En 1971 solo el 11.5% de los médicos registrados en el Colegio Médico del Perú eran mujeres, en el año 2011 esta cifra aumentó al 48.9%.</a:t>
+            </a:r>
+            <a:endParaRPr lang="es-PE" dirty="0"/>
+          </a:p>
+          <a:p>
+            <a:r>
+              <a:rPr lang="es-PE" dirty="0"/>
+              <a:t>Cada vez hay más mujeres que son profesionales médicos y, consecuentemente, cada vez hay más mujeres realizando especialidades médicas.</a:t>
+            </a:r>
+          </a:p>
+          <a:p>
+            <a:r>
+              <a:rPr lang="es-PE" dirty="0"/>
+              <a:t>No existe a la fecha un estudio sobre el género de los postulantes a los programas de </a:t>
+            </a:r>
+            <a:r>
+              <a:rPr lang="es-PE" dirty="0" err="1"/>
+              <a:t>residentado</a:t>
+            </a:r>
+            <a:r>
+              <a:rPr lang="es-PE" dirty="0"/>
+              <a:t> médico en el Perú.</a:t>
+            </a:r>
+          </a:p>
+        </p:txBody>
+      </p:sp>
+    </p:spTree>
+    <p:extLst>
+      <p:ext uri="{BB962C8B-B14F-4D97-AF65-F5344CB8AC3E}">
+        <p14:creationId xmlns:p14="http://schemas.microsoft.com/office/powerpoint/2010/main" val="3185660407"/>
+      </p:ext>
+    </p:extLst>
+  </p:cSld>
+  <p:clrMapOvr>
+    <a:masterClrMapping/>
+  </p:clrMapOvr>
+</p:sld>
+</file>
+
+<file path=ppt/slides/slide40.xml><?xml version="1.0" encoding="utf-8"?>
 <p:sld xmlns:a="http://schemas.openxmlformats.org/drawingml/2006/main" xmlns:r="http://schemas.openxmlformats.org/officeDocument/2006/relationships" xmlns:p="http://schemas.openxmlformats.org/presentationml/2006/main">
   <p:cSld>
     <p:spTree>
@@ -18654,7 +19722,7 @@
 </p:sld>
 </file>
 
-<file path=ppt/slides/slide32.xml><?xml version="1.0" encoding="utf-8"?>
+<file path=ppt/slides/slide41.xml><?xml version="1.0" encoding="utf-8"?>
 <p:sld xmlns:a="http://schemas.openxmlformats.org/drawingml/2006/main" xmlns:r="http://schemas.openxmlformats.org/officeDocument/2006/relationships" xmlns:p="http://schemas.openxmlformats.org/presentationml/2006/main">
   <p:cSld>
     <p:spTree>
@@ -18676,7 +19744,7 @@
           <p:cNvPr id="2" name="Título 1">
             <a:extLst>
               <a:ext uri="{FF2B5EF4-FFF2-40B4-BE49-F238E27FC236}">
-                <a16:creationId xmlns:a16="http://schemas.microsoft.com/office/drawing/2014/main" id="{CEC9B3CA-FEDF-422D-24FA-3E27A6FD1F35}"/>
+                <a16:creationId xmlns:a16="http://schemas.microsoft.com/office/drawing/2014/main" id="{9932295A-D5BB-53E3-BB69-E278D07C0263}"/>
               </a:ext>
             </a:extLst>
           </p:cNvPr>
@@ -18689,66 +19757,46 @@
         </p:nvSpPr>
         <p:spPr/>
         <p:txBody>
-          <a:bodyPr>
-            <a:noAutofit/>
-          </a:bodyPr>
+          <a:bodyPr/>
           <a:lstStyle/>
           <a:p>
-            <a:r>
-              <a:rPr lang="es-MX" sz="3600" dirty="0"/>
-              <a:t>Proporción de ingresantes de género femenino separada por especialidades clínicas y quirúrgicas en los distintos años</a:t>
-            </a:r>
-            <a:endParaRPr lang="es-PE" sz="3600" dirty="0"/>
+            <a:endParaRPr lang="es-PE"/>
           </a:p>
         </p:txBody>
       </p:sp>
-      <p:pic>
-        <p:nvPicPr>
-          <p:cNvPr id="4" name="Marcador de contenido 3">
+      <p:sp>
+        <p:nvSpPr>
+          <p:cNvPr id="3" name="Marcador de contenido 2">
             <a:extLst>
               <a:ext uri="{FF2B5EF4-FFF2-40B4-BE49-F238E27FC236}">
-                <a16:creationId xmlns:a16="http://schemas.microsoft.com/office/drawing/2014/main" id="{48F8E5B3-1D30-A433-9FC1-B9F9CB3781E1}"/>
+                <a16:creationId xmlns:a16="http://schemas.microsoft.com/office/drawing/2014/main" id="{BBA90884-523C-9505-D1DF-9A9964FA3DF3}"/>
               </a:ext>
             </a:extLst>
           </p:cNvPr>
-          <p:cNvPicPr>
-            <a:picLocks noGrp="1" noChangeAspect="1"/>
-          </p:cNvPicPr>
+          <p:cNvSpPr>
+            <a:spLocks noGrp="1"/>
+          </p:cNvSpPr>
           <p:nvPr>
             <p:ph idx="1"/>
           </p:nvPr>
-        </p:nvPicPr>
-        <p:blipFill>
-          <a:blip r:embed="rId3" cstate="print">
-            <a:extLst>
-              <a:ext uri="{28A0092B-C50C-407E-A947-70E740481C1C}">
-                <a14:useLocalDpi xmlns:a14="http://schemas.microsoft.com/office/drawing/2010/main" val="0"/>
-              </a:ext>
-            </a:extLst>
-          </a:blip>
-          <a:srcRect/>
-          <a:stretch>
-            <a:fillRect/>
-          </a:stretch>
-        </p:blipFill>
-        <p:spPr bwMode="auto">
-          <a:xfrm>
-            <a:off x="2804999" y="2042540"/>
-            <a:ext cx="6582001" cy="4065651"/>
-          </a:xfrm>
-          <a:prstGeom prst="rect">
-            <a:avLst/>
-          </a:prstGeom>
-          <a:noFill/>
-          <a:ln>
-            <a:noFill/>
-          </a:ln>
-        </p:spPr>
-      </p:pic>
+        </p:nvSpPr>
+        <p:spPr/>
+        <p:txBody>
+          <a:bodyPr/>
+          <a:lstStyle/>
+          <a:p>
+            <a:r>
+              <a:rPr lang="es-MX" dirty="0"/>
+              <a:t>En cuanto al número de ingresantes, este es inferior al número de postulantes, siendo inferior al 50% de postulantes en todos los años, como se representa en la figura 9. El número de ingresantes en los diferentes años fue similar al de los postulantes, con la excepción del año 2021, año en el que hubo más ingresantes en relación al número de postulantes. </a:t>
+            </a:r>
+            <a:endParaRPr lang="es-PE" dirty="0"/>
+          </a:p>
+        </p:txBody>
+      </p:sp>
     </p:spTree>
     <p:extLst>
       <p:ext uri="{BB962C8B-B14F-4D97-AF65-F5344CB8AC3E}">
-        <p14:creationId xmlns:p14="http://schemas.microsoft.com/office/powerpoint/2010/main" val="227963802"/>
+        <p14:creationId xmlns:p14="http://schemas.microsoft.com/office/powerpoint/2010/main" val="3938094395"/>
       </p:ext>
     </p:extLst>
   </p:cSld>
@@ -18758,7 +19806,7 @@
 </p:sld>
 </file>
 
-<file path=ppt/slides/slide33.xml><?xml version="1.0" encoding="utf-8"?>
+<file path=ppt/slides/slide42.xml><?xml version="1.0" encoding="utf-8"?>
 <p:sld xmlns:a="http://schemas.openxmlformats.org/drawingml/2006/main" xmlns:r="http://schemas.openxmlformats.org/officeDocument/2006/relationships" xmlns:p="http://schemas.openxmlformats.org/presentationml/2006/main">
   <p:cSld>
     <p:spTree>
@@ -22509,7 +23557,559 @@
 </p:sld>
 </file>
 
-<file path=ppt/slides/slide34.xml><?xml version="1.0" encoding="utf-8"?>
+<file path=ppt/slides/slide43.xml><?xml version="1.0" encoding="utf-8"?>
+<p:sld xmlns:a="http://schemas.openxmlformats.org/drawingml/2006/main" xmlns:r="http://schemas.openxmlformats.org/officeDocument/2006/relationships" xmlns:p="http://schemas.openxmlformats.org/presentationml/2006/main">
+  <p:cSld>
+    <p:spTree>
+      <p:nvGrpSpPr>
+        <p:cNvPr id="1" name=""/>
+        <p:cNvGrpSpPr/>
+        <p:nvPr/>
+      </p:nvGrpSpPr>
+      <p:grpSpPr>
+        <a:xfrm>
+          <a:off x="0" y="0"/>
+          <a:ext cx="0" cy="0"/>
+          <a:chOff x="0" y="0"/>
+          <a:chExt cx="0" cy="0"/>
+        </a:xfrm>
+      </p:grpSpPr>
+      <p:sp>
+        <p:nvSpPr>
+          <p:cNvPr id="2" name="Título 1">
+            <a:extLst>
+              <a:ext uri="{FF2B5EF4-FFF2-40B4-BE49-F238E27FC236}">
+                <a16:creationId xmlns:a16="http://schemas.microsoft.com/office/drawing/2014/main" id="{84F734E1-DD7B-A146-0B00-F7B586852B9B}"/>
+              </a:ext>
+            </a:extLst>
+          </p:cNvPr>
+          <p:cNvSpPr>
+            <a:spLocks noGrp="1"/>
+          </p:cNvSpPr>
+          <p:nvPr>
+            <p:ph type="title"/>
+          </p:nvPr>
+        </p:nvSpPr>
+        <p:spPr/>
+        <p:txBody>
+          <a:bodyPr/>
+          <a:lstStyle/>
+          <a:p>
+            <a:endParaRPr lang="es-PE"/>
+          </a:p>
+        </p:txBody>
+      </p:sp>
+      <p:sp>
+        <p:nvSpPr>
+          <p:cNvPr id="3" name="Marcador de contenido 2">
+            <a:extLst>
+              <a:ext uri="{FF2B5EF4-FFF2-40B4-BE49-F238E27FC236}">
+                <a16:creationId xmlns:a16="http://schemas.microsoft.com/office/drawing/2014/main" id="{3A597E63-9EC3-0F0E-4074-E5E4E69A201A}"/>
+              </a:ext>
+            </a:extLst>
+          </p:cNvPr>
+          <p:cNvSpPr>
+            <a:spLocks noGrp="1"/>
+          </p:cNvSpPr>
+          <p:nvPr>
+            <p:ph idx="1"/>
+          </p:nvPr>
+        </p:nvSpPr>
+        <p:spPr/>
+        <p:txBody>
+          <a:bodyPr/>
+          <a:lstStyle/>
+          <a:p>
+            <a:r>
+              <a:rPr lang="es-MX" dirty="0"/>
+              <a:t>En relación al porcentaje de ingresantes de género femenino o masculino se encontró que hubo más porcentaje de ingresantes de género masculino en todos los años, con excepción del año 2020, año en el que se encontró que hubo la misma cantidad de ingresantes de género femenino y masculino. Se aprecia que desde el año 2019 la diferencia se reduce en comparación a años anteriores. </a:t>
+            </a:r>
+            <a:endParaRPr lang="es-PE" dirty="0"/>
+          </a:p>
+        </p:txBody>
+      </p:sp>
+    </p:spTree>
+    <p:extLst>
+      <p:ext uri="{BB962C8B-B14F-4D97-AF65-F5344CB8AC3E}">
+        <p14:creationId xmlns:p14="http://schemas.microsoft.com/office/powerpoint/2010/main" val="2629095766"/>
+      </p:ext>
+    </p:extLst>
+  </p:cSld>
+  <p:clrMapOvr>
+    <a:masterClrMapping/>
+  </p:clrMapOvr>
+</p:sld>
+</file>
+
+<file path=ppt/slides/slide44.xml><?xml version="1.0" encoding="utf-8"?>
+<p:sld xmlns:a="http://schemas.openxmlformats.org/drawingml/2006/main" xmlns:r="http://schemas.openxmlformats.org/officeDocument/2006/relationships" xmlns:p="http://schemas.openxmlformats.org/presentationml/2006/main">
+  <p:cSld>
+    <p:spTree>
+      <p:nvGrpSpPr>
+        <p:cNvPr id="1" name=""/>
+        <p:cNvGrpSpPr/>
+        <p:nvPr/>
+      </p:nvGrpSpPr>
+      <p:grpSpPr>
+        <a:xfrm>
+          <a:off x="0" y="0"/>
+          <a:ext cx="0" cy="0"/>
+          <a:chOff x="0" y="0"/>
+          <a:chExt cx="0" cy="0"/>
+        </a:xfrm>
+      </p:grpSpPr>
+      <p:sp>
+        <p:nvSpPr>
+          <p:cNvPr id="2" name="Título 1">
+            <a:extLst>
+              <a:ext uri="{FF2B5EF4-FFF2-40B4-BE49-F238E27FC236}">
+                <a16:creationId xmlns:a16="http://schemas.microsoft.com/office/drawing/2014/main" id="{D623629A-B847-36D7-F4E4-4F4C8AEC1A0D}"/>
+              </a:ext>
+            </a:extLst>
+          </p:cNvPr>
+          <p:cNvSpPr>
+            <a:spLocks noGrp="1"/>
+          </p:cNvSpPr>
+          <p:nvPr>
+            <p:ph type="title"/>
+          </p:nvPr>
+        </p:nvSpPr>
+        <p:spPr/>
+        <p:txBody>
+          <a:bodyPr/>
+          <a:lstStyle/>
+          <a:p>
+            <a:endParaRPr lang="es-PE"/>
+          </a:p>
+        </p:txBody>
+      </p:sp>
+      <p:sp>
+        <p:nvSpPr>
+          <p:cNvPr id="3" name="Marcador de contenido 2">
+            <a:extLst>
+              <a:ext uri="{FF2B5EF4-FFF2-40B4-BE49-F238E27FC236}">
+                <a16:creationId xmlns:a16="http://schemas.microsoft.com/office/drawing/2014/main" id="{C1D5B867-0C4E-BF9B-F83C-8F03A2148381}"/>
+              </a:ext>
+            </a:extLst>
+          </p:cNvPr>
+          <p:cNvSpPr>
+            <a:spLocks noGrp="1"/>
+          </p:cNvSpPr>
+          <p:nvPr>
+            <p:ph idx="1"/>
+          </p:nvPr>
+        </p:nvSpPr>
+        <p:spPr/>
+        <p:txBody>
+          <a:bodyPr/>
+          <a:lstStyle/>
+          <a:p>
+            <a:r>
+              <a:rPr lang="es-MX" dirty="0"/>
+              <a:t>Para determinar si para los ingresantes el año de postulación es también estadísticamente significativo como predictor del género de los ingresantes se realizó un modelo de regresión logística con el género como variable dependiente (resultado) y el año de postulación y la especialidad como variables independientes (predictoras). Se obtuvo también significancia estadística (valor de p del coeficiente del año de postulación: 2.146297-08, con un </a:t>
+            </a:r>
+            <a:r>
+              <a:rPr lang="es-MX" dirty="0" err="1"/>
+              <a:t>odds</a:t>
+            </a:r>
+            <a:r>
+              <a:rPr lang="es-MX" dirty="0"/>
+              <a:t> ratio de 1.038 [IC 95%: 1.024-1.051]). Al agregar al modelo la especialidad como variable independiente (predictora) se conservó esta significancia estadística (valor de p ajustado: 1.210564-10, </a:t>
+            </a:r>
+            <a:r>
+              <a:rPr lang="es-MX" dirty="0" err="1"/>
+              <a:t>odds</a:t>
+            </a:r>
+            <a:r>
+              <a:rPr lang="es-MX" dirty="0"/>
+              <a:t> ratio ajustado: 1.047 [IC 95%: 1.032-1.061]). Estos resultados son similares a los que se obtuvieron con los postulantes, lo cual era de esperarse.</a:t>
+            </a:r>
+            <a:endParaRPr lang="es-PE" dirty="0"/>
+          </a:p>
+        </p:txBody>
+      </p:sp>
+    </p:spTree>
+    <p:extLst>
+      <p:ext uri="{BB962C8B-B14F-4D97-AF65-F5344CB8AC3E}">
+        <p14:creationId xmlns:p14="http://schemas.microsoft.com/office/powerpoint/2010/main" val="1442823573"/>
+      </p:ext>
+    </p:extLst>
+  </p:cSld>
+  <p:clrMapOvr>
+    <a:masterClrMapping/>
+  </p:clrMapOvr>
+</p:sld>
+</file>
+
+<file path=ppt/slides/slide45.xml><?xml version="1.0" encoding="utf-8"?>
+<p:sld xmlns:a="http://schemas.openxmlformats.org/drawingml/2006/main" xmlns:r="http://schemas.openxmlformats.org/officeDocument/2006/relationships" xmlns:p="http://schemas.openxmlformats.org/presentationml/2006/main">
+  <p:cSld>
+    <p:spTree>
+      <p:nvGrpSpPr>
+        <p:cNvPr id="1" name=""/>
+        <p:cNvGrpSpPr/>
+        <p:nvPr/>
+      </p:nvGrpSpPr>
+      <p:grpSpPr>
+        <a:xfrm>
+          <a:off x="0" y="0"/>
+          <a:ext cx="0" cy="0"/>
+          <a:chOff x="0" y="0"/>
+          <a:chExt cx="0" cy="0"/>
+        </a:xfrm>
+      </p:grpSpPr>
+      <p:sp>
+        <p:nvSpPr>
+          <p:cNvPr id="2" name="Título 1">
+            <a:extLst>
+              <a:ext uri="{FF2B5EF4-FFF2-40B4-BE49-F238E27FC236}">
+                <a16:creationId xmlns:a16="http://schemas.microsoft.com/office/drawing/2014/main" id="{C1115D8A-0BFF-C73D-9333-6FB3A463B87A}"/>
+              </a:ext>
+            </a:extLst>
+          </p:cNvPr>
+          <p:cNvSpPr>
+            <a:spLocks noGrp="1"/>
+          </p:cNvSpPr>
+          <p:nvPr>
+            <p:ph type="title"/>
+          </p:nvPr>
+        </p:nvSpPr>
+        <p:spPr/>
+        <p:txBody>
+          <a:bodyPr/>
+          <a:lstStyle/>
+          <a:p>
+            <a:endParaRPr lang="es-PE"/>
+          </a:p>
+        </p:txBody>
+      </p:sp>
+      <p:sp>
+        <p:nvSpPr>
+          <p:cNvPr id="3" name="Marcador de contenido 2">
+            <a:extLst>
+              <a:ext uri="{FF2B5EF4-FFF2-40B4-BE49-F238E27FC236}">
+                <a16:creationId xmlns:a16="http://schemas.microsoft.com/office/drawing/2014/main" id="{F4D8BFBC-FAAF-E85C-4D72-B745A67E5549}"/>
+              </a:ext>
+            </a:extLst>
+          </p:cNvPr>
+          <p:cNvSpPr>
+            <a:spLocks noGrp="1"/>
+          </p:cNvSpPr>
+          <p:nvPr>
+            <p:ph idx="1"/>
+          </p:nvPr>
+        </p:nvSpPr>
+        <p:spPr/>
+        <p:txBody>
+          <a:bodyPr>
+            <a:normAutofit lnSpcReduction="10000"/>
+          </a:bodyPr>
+          <a:lstStyle/>
+          <a:p>
+            <a:r>
+              <a:rPr lang="es-MX" dirty="0"/>
+              <a:t>Ahora, queda una duda sobre la relación entre los postulantes y los ingresantes. La duda es si existe alguna diferencia en el resultado de postulación entre el género femenino y masculino. Es decir, ¿hay alguna diferencia en el éxito de la postulación entre postulantes de género femenino y masculino? Para esto se analizaron las diferencias en el porcentaje de ingresantes (entre los postulantes) en el género femenino y masculino y se compararon estos resultados (tabla 10). Se pueden observar resultados similares entre los géneros en los diferentes años y también en el porcentaje total de ingreso. Para determinar si las diferencias fueron estadísticamente significativas se realizó una prueba estadística (regresión logística) en la que se tuvo al resultado de la postulación (ingreso vs. no ingreso) como variable dependiente (de resultado), y se tuvo al género y al año de postulación como variables independientes (predictoras). Se obtuvo que el coeficiente del género (ajustado al año de postulación) no fue estadísticamente significativo como predictor del resultado de la postulación (su valor de p fue 0.155083). Tampoco fue estadísticamente significativo al agregar al modelo el año de postulación como otra variable independiente (valor de p ajustado: 0.1416485). Esto no es sugerente de que existan diferencias importantes en el resultado de la postulación de acuerdo al género.</a:t>
+            </a:r>
+            <a:endParaRPr lang="es-PE" dirty="0"/>
+          </a:p>
+        </p:txBody>
+      </p:sp>
+    </p:spTree>
+    <p:extLst>
+      <p:ext uri="{BB962C8B-B14F-4D97-AF65-F5344CB8AC3E}">
+        <p14:creationId xmlns:p14="http://schemas.microsoft.com/office/powerpoint/2010/main" val="1926985678"/>
+      </p:ext>
+    </p:extLst>
+  </p:cSld>
+  <p:clrMapOvr>
+    <a:masterClrMapping/>
+  </p:clrMapOvr>
+</p:sld>
+</file>
+
+<file path=ppt/slides/slide46.xml><?xml version="1.0" encoding="utf-8"?>
+<p:sld xmlns:a="http://schemas.openxmlformats.org/drawingml/2006/main" xmlns:r="http://schemas.openxmlformats.org/officeDocument/2006/relationships" xmlns:p="http://schemas.openxmlformats.org/presentationml/2006/main">
+  <p:cSld>
+    <p:spTree>
+      <p:nvGrpSpPr>
+        <p:cNvPr id="1" name=""/>
+        <p:cNvGrpSpPr/>
+        <p:nvPr/>
+      </p:nvGrpSpPr>
+      <p:grpSpPr>
+        <a:xfrm>
+          <a:off x="0" y="0"/>
+          <a:ext cx="0" cy="0"/>
+          <a:chOff x="0" y="0"/>
+          <a:chExt cx="0" cy="0"/>
+        </a:xfrm>
+      </p:grpSpPr>
+      <p:sp>
+        <p:nvSpPr>
+          <p:cNvPr id="2" name="Título 1">
+            <a:extLst>
+              <a:ext uri="{FF2B5EF4-FFF2-40B4-BE49-F238E27FC236}">
+                <a16:creationId xmlns:a16="http://schemas.microsoft.com/office/drawing/2014/main" id="{D2794BA4-8936-AFBC-2314-71B35083B5A9}"/>
+              </a:ext>
+            </a:extLst>
+          </p:cNvPr>
+          <p:cNvSpPr>
+            <a:spLocks noGrp="1"/>
+          </p:cNvSpPr>
+          <p:nvPr>
+            <p:ph type="title"/>
+          </p:nvPr>
+        </p:nvSpPr>
+        <p:spPr/>
+        <p:txBody>
+          <a:bodyPr/>
+          <a:lstStyle/>
+          <a:p>
+            <a:endParaRPr lang="es-PE"/>
+          </a:p>
+        </p:txBody>
+      </p:sp>
+      <p:sp>
+        <p:nvSpPr>
+          <p:cNvPr id="3" name="Marcador de contenido 2">
+            <a:extLst>
+              <a:ext uri="{FF2B5EF4-FFF2-40B4-BE49-F238E27FC236}">
+                <a16:creationId xmlns:a16="http://schemas.microsoft.com/office/drawing/2014/main" id="{6C5DDF9C-1FBE-CC2E-0EE4-5D7F3A95B01C}"/>
+              </a:ext>
+            </a:extLst>
+          </p:cNvPr>
+          <p:cNvSpPr>
+            <a:spLocks noGrp="1"/>
+          </p:cNvSpPr>
+          <p:nvPr>
+            <p:ph idx="1"/>
+          </p:nvPr>
+        </p:nvSpPr>
+        <p:spPr/>
+        <p:txBody>
+          <a:bodyPr/>
+          <a:lstStyle/>
+          <a:p>
+            <a:r>
+              <a:rPr lang="es-MX" dirty="0"/>
+              <a:t>Para los ingresantes, podemos analizar también cuáles son las especialidades con mayor porcentaje de ingresantes de género femenino o masculino. En las tablas 8 y 9 se representan las especialidades médicas más relevantes con mayor porcentaje de ingresantes de género femenino o masculino. Entre estas especialidades que tienen un mayor porcentaje de ingresantes de género femenino destaca también la especialidad de cirugía pediátrica, que es la única especialidad quirúrgica que llega a estar entre las que más proporción de ingresantes de género femenino tiene, con 62.4% (esto coincide con los hallazgos para los postulantes). En cuanto a las especialidades con predominancia de género masculino se encuentran también las mismas especialidades quirúrgicas que para los postulantes: ortopedia y traumatología (90.2% de postulantes de género masculino), seguida de urología (82.3%), neurocirugía (81.5%), cirugía de tórax y cardiovascular (80.2%). Cardiología fue también la especialidad clínica con mayor predominancia masculina (73.9%), de las incluidas en la tabla 9.</a:t>
+            </a:r>
+            <a:endParaRPr lang="es-PE" dirty="0"/>
+          </a:p>
+        </p:txBody>
+      </p:sp>
+    </p:spTree>
+    <p:extLst>
+      <p:ext uri="{BB962C8B-B14F-4D97-AF65-F5344CB8AC3E}">
+        <p14:creationId xmlns:p14="http://schemas.microsoft.com/office/powerpoint/2010/main" val="1900709084"/>
+      </p:ext>
+    </p:extLst>
+  </p:cSld>
+  <p:clrMapOvr>
+    <a:masterClrMapping/>
+  </p:clrMapOvr>
+</p:sld>
+</file>
+
+<file path=ppt/slides/slide47.xml><?xml version="1.0" encoding="utf-8"?>
+<p:sld xmlns:a="http://schemas.openxmlformats.org/drawingml/2006/main" xmlns:r="http://schemas.openxmlformats.org/officeDocument/2006/relationships" xmlns:p="http://schemas.openxmlformats.org/presentationml/2006/main">
+  <p:cSld>
+    <p:spTree>
+      <p:nvGrpSpPr>
+        <p:cNvPr id="1" name=""/>
+        <p:cNvGrpSpPr/>
+        <p:nvPr/>
+      </p:nvGrpSpPr>
+      <p:grpSpPr>
+        <a:xfrm>
+          <a:off x="0" y="0"/>
+          <a:ext cx="0" cy="0"/>
+          <a:chOff x="0" y="0"/>
+          <a:chExt cx="0" cy="0"/>
+        </a:xfrm>
+      </p:grpSpPr>
+      <p:sp>
+        <p:nvSpPr>
+          <p:cNvPr id="2" name="Título 1">
+            <a:extLst>
+              <a:ext uri="{FF2B5EF4-FFF2-40B4-BE49-F238E27FC236}">
+                <a16:creationId xmlns:a16="http://schemas.microsoft.com/office/drawing/2014/main" id="{CEC9B3CA-FEDF-422D-24FA-3E27A6FD1F35}"/>
+              </a:ext>
+            </a:extLst>
+          </p:cNvPr>
+          <p:cNvSpPr>
+            <a:spLocks noGrp="1"/>
+          </p:cNvSpPr>
+          <p:nvPr>
+            <p:ph type="title"/>
+          </p:nvPr>
+        </p:nvSpPr>
+        <p:spPr/>
+        <p:txBody>
+          <a:bodyPr>
+            <a:noAutofit/>
+          </a:bodyPr>
+          <a:lstStyle/>
+          <a:p>
+            <a:r>
+              <a:rPr lang="es-MX" sz="3600" dirty="0"/>
+              <a:t>Proporción de ingresantes de género femenino separada por especialidades clínicas y quirúrgicas en los distintos años</a:t>
+            </a:r>
+            <a:endParaRPr lang="es-PE" sz="3600" dirty="0"/>
+          </a:p>
+        </p:txBody>
+      </p:sp>
+      <p:pic>
+        <p:nvPicPr>
+          <p:cNvPr id="4" name="Marcador de contenido 3">
+            <a:extLst>
+              <a:ext uri="{FF2B5EF4-FFF2-40B4-BE49-F238E27FC236}">
+                <a16:creationId xmlns:a16="http://schemas.microsoft.com/office/drawing/2014/main" id="{48F8E5B3-1D30-A433-9FC1-B9F9CB3781E1}"/>
+              </a:ext>
+            </a:extLst>
+          </p:cNvPr>
+          <p:cNvPicPr>
+            <a:picLocks noGrp="1" noChangeAspect="1"/>
+          </p:cNvPicPr>
+          <p:nvPr>
+            <p:ph idx="1"/>
+          </p:nvPr>
+        </p:nvPicPr>
+        <p:blipFill>
+          <a:blip r:embed="rId3" cstate="print">
+            <a:extLst>
+              <a:ext uri="{28A0092B-C50C-407E-A947-70E740481C1C}">
+                <a14:useLocalDpi xmlns:a14="http://schemas.microsoft.com/office/drawing/2010/main" val="0"/>
+              </a:ext>
+            </a:extLst>
+          </a:blip>
+          <a:srcRect/>
+          <a:stretch>
+            <a:fillRect/>
+          </a:stretch>
+        </p:blipFill>
+        <p:spPr bwMode="auto">
+          <a:xfrm>
+            <a:off x="2804999" y="2042540"/>
+            <a:ext cx="6582001" cy="4065651"/>
+          </a:xfrm>
+          <a:prstGeom prst="rect">
+            <a:avLst/>
+          </a:prstGeom>
+          <a:noFill/>
+          <a:ln>
+            <a:noFill/>
+          </a:ln>
+        </p:spPr>
+      </p:pic>
+    </p:spTree>
+    <p:extLst>
+      <p:ext uri="{BB962C8B-B14F-4D97-AF65-F5344CB8AC3E}">
+        <p14:creationId xmlns:p14="http://schemas.microsoft.com/office/powerpoint/2010/main" val="227963802"/>
+      </p:ext>
+    </p:extLst>
+  </p:cSld>
+  <p:clrMapOvr>
+    <a:masterClrMapping/>
+  </p:clrMapOvr>
+</p:sld>
+</file>
+
+<file path=ppt/slides/slide48.xml><?xml version="1.0" encoding="utf-8"?>
+<p:sld xmlns:a="http://schemas.openxmlformats.org/drawingml/2006/main" xmlns:r="http://schemas.openxmlformats.org/officeDocument/2006/relationships" xmlns:p="http://schemas.openxmlformats.org/presentationml/2006/main">
+  <p:cSld>
+    <p:spTree>
+      <p:nvGrpSpPr>
+        <p:cNvPr id="1" name=""/>
+        <p:cNvGrpSpPr/>
+        <p:nvPr/>
+      </p:nvGrpSpPr>
+      <p:grpSpPr>
+        <a:xfrm>
+          <a:off x="0" y="0"/>
+          <a:ext cx="0" cy="0"/>
+          <a:chOff x="0" y="0"/>
+          <a:chExt cx="0" cy="0"/>
+        </a:xfrm>
+      </p:grpSpPr>
+      <p:sp>
+        <p:nvSpPr>
+          <p:cNvPr id="2" name="Título 1">
+            <a:extLst>
+              <a:ext uri="{FF2B5EF4-FFF2-40B4-BE49-F238E27FC236}">
+                <a16:creationId xmlns:a16="http://schemas.microsoft.com/office/drawing/2014/main" id="{76FCA751-0BC4-630D-9C77-C35AD1334984}"/>
+              </a:ext>
+            </a:extLst>
+          </p:cNvPr>
+          <p:cNvSpPr>
+            <a:spLocks noGrp="1"/>
+          </p:cNvSpPr>
+          <p:nvPr>
+            <p:ph type="title"/>
+          </p:nvPr>
+        </p:nvSpPr>
+        <p:spPr/>
+        <p:txBody>
+          <a:bodyPr/>
+          <a:lstStyle/>
+          <a:p>
+            <a:endParaRPr lang="es-PE"/>
+          </a:p>
+        </p:txBody>
+      </p:sp>
+      <p:sp>
+        <p:nvSpPr>
+          <p:cNvPr id="3" name="Marcador de contenido 2">
+            <a:extLst>
+              <a:ext uri="{FF2B5EF4-FFF2-40B4-BE49-F238E27FC236}">
+                <a16:creationId xmlns:a16="http://schemas.microsoft.com/office/drawing/2014/main" id="{2B32A383-8417-8608-22E1-6AEA6B584C7D}"/>
+              </a:ext>
+            </a:extLst>
+          </p:cNvPr>
+          <p:cNvSpPr>
+            <a:spLocks noGrp="1"/>
+          </p:cNvSpPr>
+          <p:nvPr>
+            <p:ph idx="1"/>
+          </p:nvPr>
+        </p:nvSpPr>
+        <p:spPr/>
+        <p:txBody>
+          <a:bodyPr>
+            <a:normAutofit lnSpcReduction="10000"/>
+          </a:bodyPr>
+          <a:lstStyle/>
+          <a:p>
+            <a:r>
+              <a:rPr lang="es-MX" dirty="0"/>
+              <a:t>Para los ingresantes también se agruparon las especialidades en clínicas y quirúrgicas para realizar la comparación. Al igual que en los postulantes se obtuvo una diferencia notable en la distribución de género, teniendo las especialidades quirúrgicas mayor número relativo de ingresantes de género masculino. Esto puede observarse en la figura 12. Del mismo modo se realizó un modelo estadístico para determinar si esta diferencia observada es estadísticamente significativa. Este modelo tuvo al género como variable dependiente (resultado), mientras que el tipo de especialidad (clínica vs. quirúrgica) y el año de postulación fueron usadas como variables independientes (predictoras). Se encontró la diferencia sí fue estadísticamente significativa (valor de p del coeficiente para el tipo de especialidad: 3.459630-156, con un </a:t>
+            </a:r>
+            <a:r>
+              <a:rPr lang="es-MX" dirty="0" err="1"/>
+              <a:t>odds</a:t>
+            </a:r>
+            <a:r>
+              <a:rPr lang="es-MX" dirty="0"/>
+              <a:t> ratio de 0.41 [IC 95%: 0.39-0.44]), así como para los postulantes. Además, se agregó también al modelo la posible modificación de efecto del tipo de especialidad (clínica vs. quirúrgica) sobre el efecto del año de postulación en el género. En el modelo se obtuvo significancia estadística de esta interacción (valor de p de la interacción: 0.00137); sin embargo, valorando la magnitud de la misma y observando las tendencias de las especialidades clínicas y quirúrgicas en la figura 12, no parece tratarse de algo relevante.</a:t>
+            </a:r>
+            <a:endParaRPr lang="es-PE" dirty="0"/>
+          </a:p>
+        </p:txBody>
+      </p:sp>
+    </p:spTree>
+    <p:extLst>
+      <p:ext uri="{BB962C8B-B14F-4D97-AF65-F5344CB8AC3E}">
+        <p14:creationId xmlns:p14="http://schemas.microsoft.com/office/powerpoint/2010/main" val="2169410913"/>
+      </p:ext>
+    </p:extLst>
+  </p:cSld>
+  <p:clrMapOvr>
+    <a:masterClrMapping/>
+  </p:clrMapOvr>
+</p:sld>
+</file>
+
+<file path=ppt/slides/slide49.xml><?xml version="1.0" encoding="utf-8"?>
 <p:sld xmlns:a="http://schemas.openxmlformats.org/drawingml/2006/main" xmlns:r="http://schemas.openxmlformats.org/officeDocument/2006/relationships" xmlns:p="http://schemas.openxmlformats.org/presentationml/2006/main">
   <p:cSld>
     <p:spTree>
@@ -22593,7 +24193,120 @@
 </p:sld>
 </file>
 
-<file path=ppt/slides/slide35.xml><?xml version="1.0" encoding="utf-8"?>
+<file path=ppt/slides/slide5.xml><?xml version="1.0" encoding="utf-8"?>
+<p:sld xmlns:a="http://schemas.openxmlformats.org/drawingml/2006/main" xmlns:r="http://schemas.openxmlformats.org/officeDocument/2006/relationships" xmlns:p="http://schemas.openxmlformats.org/presentationml/2006/main">
+  <p:cSld>
+    <p:spTree>
+      <p:nvGrpSpPr>
+        <p:cNvPr id="1" name=""/>
+        <p:cNvGrpSpPr/>
+        <p:nvPr/>
+      </p:nvGrpSpPr>
+      <p:grpSpPr>
+        <a:xfrm>
+          <a:off x="0" y="0"/>
+          <a:ext cx="0" cy="0"/>
+          <a:chOff x="0" y="0"/>
+          <a:chExt cx="0" cy="0"/>
+        </a:xfrm>
+      </p:grpSpPr>
+      <p:sp>
+        <p:nvSpPr>
+          <p:cNvPr id="2" name="Título 1">
+            <a:extLst>
+              <a:ext uri="{FF2B5EF4-FFF2-40B4-BE49-F238E27FC236}">
+                <a16:creationId xmlns:a16="http://schemas.microsoft.com/office/drawing/2014/main" id="{30BD1730-B728-1D5A-D824-39833DA8D53D}"/>
+              </a:ext>
+            </a:extLst>
+          </p:cNvPr>
+          <p:cNvSpPr>
+            <a:spLocks noGrp="1"/>
+          </p:cNvSpPr>
+          <p:nvPr>
+            <p:ph type="title"/>
+          </p:nvPr>
+        </p:nvSpPr>
+        <p:spPr/>
+        <p:txBody>
+          <a:bodyPr/>
+          <a:lstStyle/>
+          <a:p>
+            <a:r>
+              <a:rPr lang="es-MX" dirty="0"/>
+              <a:t>Problema de investigación</a:t>
+            </a:r>
+            <a:endParaRPr lang="es-PE" dirty="0"/>
+          </a:p>
+        </p:txBody>
+      </p:sp>
+      <p:sp>
+        <p:nvSpPr>
+          <p:cNvPr id="3" name="Marcador de contenido 2">
+            <a:extLst>
+              <a:ext uri="{FF2B5EF4-FFF2-40B4-BE49-F238E27FC236}">
+                <a16:creationId xmlns:a16="http://schemas.microsoft.com/office/drawing/2014/main" id="{98D2C2C6-67EC-D04E-ED34-A8C54CD02173}"/>
+              </a:ext>
+            </a:extLst>
+          </p:cNvPr>
+          <p:cNvSpPr>
+            <a:spLocks noGrp="1"/>
+          </p:cNvSpPr>
+          <p:nvPr>
+            <p:ph idx="1"/>
+          </p:nvPr>
+        </p:nvSpPr>
+        <p:spPr/>
+        <p:txBody>
+          <a:bodyPr/>
+          <a:lstStyle/>
+          <a:p>
+            <a:r>
+              <a:rPr lang="es-MX" dirty="0"/>
+              <a:t>Información sobre cómo se están incorporando las mujeres a las especialidades médicas es insuficiente.</a:t>
+            </a:r>
+          </a:p>
+          <a:p>
+            <a:r>
+              <a:rPr lang="es-PE" dirty="0"/>
+              <a:t>Detectar diferencias de género es el primer paso para determinar las causas de estas diferencias que pueden ser problemáticas.</a:t>
+            </a:r>
+          </a:p>
+          <a:p>
+            <a:r>
+              <a:rPr lang="es-PE" dirty="0"/>
+              <a:t>Diferencias de género en algunas especialidades (ej. quirúrgicas), son descritas por la literatura. Se describen discriminación por género, acoso sexual, entre otras como posibles causas de estas diferencias.</a:t>
+            </a:r>
+          </a:p>
+          <a:p>
+            <a:r>
+              <a:rPr lang="es-PE" dirty="0"/>
+              <a:t>El presente estudio busca caracterizar la incorporación del género femenino en el programa de </a:t>
+            </a:r>
+            <a:r>
+              <a:rPr lang="es-PE" dirty="0" err="1"/>
+              <a:t>residentado</a:t>
+            </a:r>
+            <a:r>
+              <a:rPr lang="es-PE" dirty="0"/>
+              <a:t> médico del Perú entre los años 2013 y 2023 para tener un panorama de la situación actual respecto a este tema.</a:t>
+            </a:r>
+          </a:p>
+        </p:txBody>
+      </p:sp>
+    </p:spTree>
+    <p:extLst>
+      <p:ext uri="{BB962C8B-B14F-4D97-AF65-F5344CB8AC3E}">
+        <p14:creationId xmlns:p14="http://schemas.microsoft.com/office/powerpoint/2010/main" val="650012995"/>
+      </p:ext>
+    </p:extLst>
+  </p:cSld>
+  <p:clrMapOvr>
+    <a:masterClrMapping/>
+  </p:clrMapOvr>
+</p:sld>
+</file>
+
+<file path=ppt/slides/slide50.xml><?xml version="1.0" encoding="utf-8"?>
 <p:sld xmlns:a="http://schemas.openxmlformats.org/drawingml/2006/main" xmlns:r="http://schemas.openxmlformats.org/officeDocument/2006/relationships" xmlns:p="http://schemas.openxmlformats.org/presentationml/2006/main">
   <p:cSld>
     <p:spTree>
@@ -22703,7 +24416,7 @@
 </p:sld>
 </file>
 
-<file path=ppt/slides/slide36.xml><?xml version="1.0" encoding="utf-8"?>
+<file path=ppt/slides/slide51.xml><?xml version="1.0" encoding="utf-8"?>
 <p:sld xmlns:a="http://schemas.openxmlformats.org/drawingml/2006/main" xmlns:r="http://schemas.openxmlformats.org/officeDocument/2006/relationships" xmlns:p="http://schemas.openxmlformats.org/presentationml/2006/main">
   <p:cSld>
     <p:spTree>
@@ -22806,7 +24519,7 @@
 </p:sld>
 </file>
 
-<file path=ppt/slides/slide37.xml><?xml version="1.0" encoding="utf-8"?>
+<file path=ppt/slides/slide52.xml><?xml version="1.0" encoding="utf-8"?>
 <p:sld xmlns:a="http://schemas.openxmlformats.org/drawingml/2006/main" xmlns:r="http://schemas.openxmlformats.org/officeDocument/2006/relationships" xmlns:p="http://schemas.openxmlformats.org/presentationml/2006/main">
   <p:cSld>
     <p:spTree>
@@ -22910,7 +24623,191 @@
 </p:sld>
 </file>
 
-<file path=ppt/slides/slide38.xml><?xml version="1.0" encoding="utf-8"?>
+<file path=ppt/slides/slide53.xml><?xml version="1.0" encoding="utf-8"?>
+<p:sld xmlns:a="http://schemas.openxmlformats.org/drawingml/2006/main" xmlns:r="http://schemas.openxmlformats.org/officeDocument/2006/relationships" xmlns:p="http://schemas.openxmlformats.org/presentationml/2006/main">
+  <p:cSld>
+    <p:spTree>
+      <p:nvGrpSpPr>
+        <p:cNvPr id="1" name=""/>
+        <p:cNvGrpSpPr/>
+        <p:nvPr/>
+      </p:nvGrpSpPr>
+      <p:grpSpPr>
+        <a:xfrm>
+          <a:off x="0" y="0"/>
+          <a:ext cx="0" cy="0"/>
+          <a:chOff x="0" y="0"/>
+          <a:chExt cx="0" cy="0"/>
+        </a:xfrm>
+      </p:grpSpPr>
+      <p:sp>
+        <p:nvSpPr>
+          <p:cNvPr id="2" name="Título 1">
+            <a:extLst>
+              <a:ext uri="{FF2B5EF4-FFF2-40B4-BE49-F238E27FC236}">
+                <a16:creationId xmlns:a16="http://schemas.microsoft.com/office/drawing/2014/main" id="{8C23824F-A3CC-74BE-0F70-2D7E56FC581F}"/>
+              </a:ext>
+            </a:extLst>
+          </p:cNvPr>
+          <p:cNvSpPr>
+            <a:spLocks noGrp="1"/>
+          </p:cNvSpPr>
+          <p:nvPr>
+            <p:ph type="title"/>
+          </p:nvPr>
+        </p:nvSpPr>
+        <p:spPr/>
+        <p:txBody>
+          <a:bodyPr/>
+          <a:lstStyle/>
+          <a:p>
+            <a:endParaRPr lang="es-PE"/>
+          </a:p>
+        </p:txBody>
+      </p:sp>
+      <p:sp>
+        <p:nvSpPr>
+          <p:cNvPr id="3" name="Marcador de contenido 2">
+            <a:extLst>
+              <a:ext uri="{FF2B5EF4-FFF2-40B4-BE49-F238E27FC236}">
+                <a16:creationId xmlns:a16="http://schemas.microsoft.com/office/drawing/2014/main" id="{DC474205-866C-975E-E3C4-2BFB9E10981B}"/>
+              </a:ext>
+            </a:extLst>
+          </p:cNvPr>
+          <p:cNvSpPr>
+            <a:spLocks noGrp="1"/>
+          </p:cNvSpPr>
+          <p:nvPr>
+            <p:ph idx="1"/>
+          </p:nvPr>
+        </p:nvSpPr>
+        <p:spPr/>
+        <p:txBody>
+          <a:bodyPr/>
+          <a:lstStyle/>
+          <a:p>
+            <a:r>
+              <a:rPr lang="es-MX" dirty="0"/>
+              <a:t>En cuanto a la distribución de género llama especial atención la distribución de género y la tendencia de la región Oriente, representada en la tabla 15 y la figura 15. Esta región tiene un número muy inferior de postulantes de género femenino en comparación a otras regiones (comparar con tablas 11, 12, 13 y 14, así como figura 15). Para el estudio comparativo de las distribuciones de género en las diferentes regiones y las tendencias de las mismas se realizaron modelos de regresión logística comparando cada región con las demás. </a:t>
+            </a:r>
+            <a:endParaRPr lang="es-PE" dirty="0"/>
+          </a:p>
+        </p:txBody>
+      </p:sp>
+    </p:spTree>
+    <p:extLst>
+      <p:ext uri="{BB962C8B-B14F-4D97-AF65-F5344CB8AC3E}">
+        <p14:creationId xmlns:p14="http://schemas.microsoft.com/office/powerpoint/2010/main" val="61066386"/>
+      </p:ext>
+    </p:extLst>
+  </p:cSld>
+  <p:clrMapOvr>
+    <a:masterClrMapping/>
+  </p:clrMapOvr>
+</p:sld>
+</file>
+
+<file path=ppt/slides/slide54.xml><?xml version="1.0" encoding="utf-8"?>
+<p:sld xmlns:a="http://schemas.openxmlformats.org/drawingml/2006/main" xmlns:r="http://schemas.openxmlformats.org/officeDocument/2006/relationships" xmlns:p="http://schemas.openxmlformats.org/presentationml/2006/main">
+  <p:cSld>
+    <p:spTree>
+      <p:nvGrpSpPr>
+        <p:cNvPr id="1" name=""/>
+        <p:cNvGrpSpPr/>
+        <p:nvPr/>
+      </p:nvGrpSpPr>
+      <p:grpSpPr>
+        <a:xfrm>
+          <a:off x="0" y="0"/>
+          <a:ext cx="0" cy="0"/>
+          <a:chOff x="0" y="0"/>
+          <a:chExt cx="0" cy="0"/>
+        </a:xfrm>
+      </p:grpSpPr>
+      <p:sp>
+        <p:nvSpPr>
+          <p:cNvPr id="2" name="Título 1">
+            <a:extLst>
+              <a:ext uri="{FF2B5EF4-FFF2-40B4-BE49-F238E27FC236}">
+                <a16:creationId xmlns:a16="http://schemas.microsoft.com/office/drawing/2014/main" id="{541FB8DA-954F-7473-3E5C-65FAC97527CA}"/>
+              </a:ext>
+            </a:extLst>
+          </p:cNvPr>
+          <p:cNvSpPr>
+            <a:spLocks noGrp="1"/>
+          </p:cNvSpPr>
+          <p:nvPr>
+            <p:ph type="title"/>
+          </p:nvPr>
+        </p:nvSpPr>
+        <p:spPr/>
+        <p:txBody>
+          <a:bodyPr/>
+          <a:lstStyle/>
+          <a:p>
+            <a:endParaRPr lang="es-PE"/>
+          </a:p>
+        </p:txBody>
+      </p:sp>
+      <p:sp>
+        <p:nvSpPr>
+          <p:cNvPr id="3" name="Marcador de contenido 2">
+            <a:extLst>
+              <a:ext uri="{FF2B5EF4-FFF2-40B4-BE49-F238E27FC236}">
+                <a16:creationId xmlns:a16="http://schemas.microsoft.com/office/drawing/2014/main" id="{28EC423D-CFE4-CC8F-E853-C85F48FCAAD4}"/>
+              </a:ext>
+            </a:extLst>
+          </p:cNvPr>
+          <p:cNvSpPr>
+            <a:spLocks noGrp="1"/>
+          </p:cNvSpPr>
+          <p:nvPr>
+            <p:ph idx="1"/>
+          </p:nvPr>
+        </p:nvSpPr>
+        <p:spPr/>
+        <p:txBody>
+          <a:bodyPr/>
+          <a:lstStyle/>
+          <a:p>
+            <a:r>
+              <a:rPr lang="es-MX" dirty="0"/>
+              <a:t>Para el estudio comparativo de las distribuciones de género en las diferentes regiones y las tendencias de las mismas se realizaron modelos de regresión logística comparando cada región con las demás. Se obtuvo como resultado que las regiones tenían diferencias estadísticamente significativas en comparación con el resto como variables predictoras del género (ajustadas al año de postulación), como se muestra en la tabla 16. También se obtuvieron los </a:t>
+            </a:r>
+            <a:r>
+              <a:rPr lang="es-MX" dirty="0" err="1"/>
+              <a:t>odds</a:t>
+            </a:r>
+            <a:r>
+              <a:rPr lang="es-MX" dirty="0"/>
+              <a:t> ratios a partir de los coeficientes de estas regiones, estos están representados en la tabla 16 también. Llama la atención el </a:t>
+            </a:r>
+            <a:r>
+              <a:rPr lang="es-MX" dirty="0" err="1"/>
+              <a:t>odds</a:t>
+            </a:r>
+            <a:r>
+              <a:rPr lang="es-MX" dirty="0"/>
+              <a:t> ratio de la región oriente: 0.75 [IC 95%: 0.69-0.81], el cual es notablemente inferior a los demás. También se agregó a los modelos de regresión logística la modificación del efecto del año de postulación en el género ocasionada por las regiones. Sin embargo, no se obtuvo significancia estadística de esta interacción en ninguna de las regiones, lo cual indica que no hay diferencias estadísticamente significativas en las tendencias de género entre las distintas regiones.</a:t>
+            </a:r>
+            <a:endParaRPr lang="es-PE" dirty="0"/>
+          </a:p>
+        </p:txBody>
+      </p:sp>
+    </p:spTree>
+    <p:extLst>
+      <p:ext uri="{BB962C8B-B14F-4D97-AF65-F5344CB8AC3E}">
+        <p14:creationId xmlns:p14="http://schemas.microsoft.com/office/powerpoint/2010/main" val="3727669880"/>
+      </p:ext>
+    </p:extLst>
+  </p:cSld>
+  <p:clrMapOvr>
+    <a:masterClrMapping/>
+  </p:clrMapOvr>
+</p:sld>
+</file>
+
+<file path=ppt/slides/slide55.xml><?xml version="1.0" encoding="utf-8"?>
 <p:sld xmlns:a="http://schemas.openxmlformats.org/drawingml/2006/main" xmlns:r="http://schemas.openxmlformats.org/officeDocument/2006/relationships" xmlns:p="http://schemas.openxmlformats.org/presentationml/2006/main">
   <p:cSld>
     <p:spTree>
@@ -24219,7 +26116,99 @@
 </p:sld>
 </file>
 
-<file path=ppt/slides/slide39.xml><?xml version="1.0" encoding="utf-8"?>
+<file path=ppt/slides/slide56.xml><?xml version="1.0" encoding="utf-8"?>
+<p:sld xmlns:a="http://schemas.openxmlformats.org/drawingml/2006/main" xmlns:r="http://schemas.openxmlformats.org/officeDocument/2006/relationships" xmlns:p="http://schemas.openxmlformats.org/presentationml/2006/main">
+  <p:cSld>
+    <p:spTree>
+      <p:nvGrpSpPr>
+        <p:cNvPr id="1" name=""/>
+        <p:cNvGrpSpPr/>
+        <p:nvPr/>
+      </p:nvGrpSpPr>
+      <p:grpSpPr>
+        <a:xfrm>
+          <a:off x="0" y="0"/>
+          <a:ext cx="0" cy="0"/>
+          <a:chOff x="0" y="0"/>
+          <a:chExt cx="0" cy="0"/>
+        </a:xfrm>
+      </p:grpSpPr>
+      <p:sp>
+        <p:nvSpPr>
+          <p:cNvPr id="2" name="Título 1">
+            <a:extLst>
+              <a:ext uri="{FF2B5EF4-FFF2-40B4-BE49-F238E27FC236}">
+                <a16:creationId xmlns:a16="http://schemas.microsoft.com/office/drawing/2014/main" id="{55D5FD4D-5868-65DF-2C46-52859145B42B}"/>
+              </a:ext>
+            </a:extLst>
+          </p:cNvPr>
+          <p:cNvSpPr>
+            <a:spLocks noGrp="1"/>
+          </p:cNvSpPr>
+          <p:nvPr>
+            <p:ph type="title"/>
+          </p:nvPr>
+        </p:nvSpPr>
+        <p:spPr/>
+        <p:txBody>
+          <a:bodyPr/>
+          <a:lstStyle/>
+          <a:p>
+            <a:endParaRPr lang="es-PE"/>
+          </a:p>
+        </p:txBody>
+      </p:sp>
+      <p:sp>
+        <p:nvSpPr>
+          <p:cNvPr id="3" name="Marcador de contenido 2">
+            <a:extLst>
+              <a:ext uri="{FF2B5EF4-FFF2-40B4-BE49-F238E27FC236}">
+                <a16:creationId xmlns:a16="http://schemas.microsoft.com/office/drawing/2014/main" id="{FB696612-C911-4A5D-283B-2D4A095D5FA1}"/>
+              </a:ext>
+            </a:extLst>
+          </p:cNvPr>
+          <p:cNvSpPr>
+            <a:spLocks noGrp="1"/>
+          </p:cNvSpPr>
+          <p:nvPr>
+            <p:ph idx="1"/>
+          </p:nvPr>
+        </p:nvSpPr>
+        <p:spPr/>
+        <p:txBody>
+          <a:bodyPr/>
+          <a:lstStyle/>
+          <a:p>
+            <a:r>
+              <a:rPr lang="es-MX" dirty="0"/>
+              <a:t>Para concluir y comprobar que la significancia estadística del año de postulación como predictor del género se preserva luego de ajustar este coeficiente a la especialidad y a la región se realizó un modelo de regresión logística incluyendo todas estas variables. Se realizó entonces un modelo de regresión logística con la variable género como variable dependiente (de resultado), y las variables tiempo (año de postulación), región y especialidad como variables independientes (predictoras). Se obtuvo que para el coeficiente de tiempo hubo también significancia estadística (valor de p: 2.296120-60) y tuvo un </a:t>
+            </a:r>
+            <a:r>
+              <a:rPr lang="es-MX" dirty="0" err="1"/>
+              <a:t>odds</a:t>
+            </a:r>
+            <a:r>
+              <a:rPr lang="es-MX" dirty="0"/>
+              <a:t> ratio de 1.048 [IC 95%: 1.042-1.054]. </a:t>
+            </a:r>
+            <a:endParaRPr lang="es-PE" dirty="0"/>
+          </a:p>
+        </p:txBody>
+      </p:sp>
+    </p:spTree>
+    <p:extLst>
+      <p:ext uri="{BB962C8B-B14F-4D97-AF65-F5344CB8AC3E}">
+        <p14:creationId xmlns:p14="http://schemas.microsoft.com/office/powerpoint/2010/main" val="945578074"/>
+      </p:ext>
+    </p:extLst>
+  </p:cSld>
+  <p:clrMapOvr>
+    <a:masterClrMapping/>
+  </p:clrMapOvr>
+</p:sld>
+</file>
+
+<file path=ppt/slides/slide57.xml><?xml version="1.0" encoding="utf-8"?>
 <p:sld xmlns:a="http://schemas.openxmlformats.org/drawingml/2006/main" xmlns:r="http://schemas.openxmlformats.org/officeDocument/2006/relationships" xmlns:p="http://schemas.openxmlformats.org/presentationml/2006/main">
   <p:cSld>
     <p:spTree>
@@ -24303,137 +26292,7 @@
 </p:sld>
 </file>
 
-<file path=ppt/slides/slide4.xml><?xml version="1.0" encoding="utf-8"?>
-<p:sld xmlns:a="http://schemas.openxmlformats.org/drawingml/2006/main" xmlns:r="http://schemas.openxmlformats.org/officeDocument/2006/relationships" xmlns:p="http://schemas.openxmlformats.org/presentationml/2006/main">
-  <p:cSld>
-    <p:spTree>
-      <p:nvGrpSpPr>
-        <p:cNvPr id="1" name=""/>
-        <p:cNvGrpSpPr/>
-        <p:nvPr/>
-      </p:nvGrpSpPr>
-      <p:grpSpPr>
-        <a:xfrm>
-          <a:off x="0" y="0"/>
-          <a:ext cx="0" cy="0"/>
-          <a:chOff x="0" y="0"/>
-          <a:chExt cx="0" cy="0"/>
-        </a:xfrm>
-      </p:grpSpPr>
-      <p:sp>
-        <p:nvSpPr>
-          <p:cNvPr id="4" name="Título 3">
-            <a:extLst>
-              <a:ext uri="{FF2B5EF4-FFF2-40B4-BE49-F238E27FC236}">
-                <a16:creationId xmlns:a16="http://schemas.microsoft.com/office/drawing/2014/main" id="{A12A0201-3825-1432-5849-1ABE3D3C3EF4}"/>
-              </a:ext>
-            </a:extLst>
-          </p:cNvPr>
-          <p:cNvSpPr>
-            <a:spLocks noGrp="1"/>
-          </p:cNvSpPr>
-          <p:nvPr>
-            <p:ph type="title"/>
-          </p:nvPr>
-        </p:nvSpPr>
-        <p:spPr/>
-        <p:txBody>
-          <a:bodyPr/>
-          <a:lstStyle/>
-          <a:p>
-            <a:r>
-              <a:rPr lang="es-MX" dirty="0"/>
-              <a:t>Introducción y datos generales</a:t>
-            </a:r>
-            <a:endParaRPr lang="es-PE" dirty="0"/>
-          </a:p>
-        </p:txBody>
-      </p:sp>
-      <p:sp>
-        <p:nvSpPr>
-          <p:cNvPr id="5" name="Marcador de contenido 4">
-            <a:extLst>
-              <a:ext uri="{FF2B5EF4-FFF2-40B4-BE49-F238E27FC236}">
-                <a16:creationId xmlns:a16="http://schemas.microsoft.com/office/drawing/2014/main" id="{9573FAE0-C63F-4B12-904B-17395943868A}"/>
-              </a:ext>
-            </a:extLst>
-          </p:cNvPr>
-          <p:cNvSpPr>
-            <a:spLocks noGrp="1"/>
-          </p:cNvSpPr>
-          <p:nvPr>
-            <p:ph idx="1"/>
-          </p:nvPr>
-        </p:nvSpPr>
-        <p:spPr/>
-        <p:txBody>
-          <a:bodyPr>
-            <a:normAutofit/>
-          </a:bodyPr>
-          <a:lstStyle/>
-          <a:p>
-            <a:r>
-              <a:rPr lang="es-MX" dirty="0"/>
-              <a:t>En la actualidad, la especialidad médica representa un hito significativo en la formación de muchos médicos.</a:t>
-            </a:r>
-            <a:endParaRPr lang="es-PE" dirty="0"/>
-          </a:p>
-          <a:p>
-            <a:r>
-              <a:rPr lang="es-PE" dirty="0"/>
-              <a:t>Tener una especialidad repercute en el desarrollo profesional y en la situación económica individual de un médico.</a:t>
-            </a:r>
-            <a:endParaRPr lang="es-MX" dirty="0"/>
-          </a:p>
-          <a:p>
-            <a:r>
-              <a:rPr lang="es-PE" dirty="0"/>
-              <a:t>Antiguamente existía una predominancia masculina en los profesionales médicos.</a:t>
-            </a:r>
-          </a:p>
-          <a:p>
-            <a:r>
-              <a:rPr lang="es-MX" dirty="0"/>
-              <a:t>En 1971 solo el 11.5% de los médicos registrados en el Colegio Médico del Perú eran mujeres, en el año 2011 esta cifra aumentó al 48.9%.</a:t>
-            </a:r>
-            <a:endParaRPr lang="es-PE" dirty="0"/>
-          </a:p>
-          <a:p>
-            <a:r>
-              <a:rPr lang="es-PE" dirty="0"/>
-              <a:t>Cada vez hay más mujeres que son profesionales médicos y, consecuentemente, cada vez hay más mujeres realizando especialidades médicas.</a:t>
-            </a:r>
-          </a:p>
-          <a:p>
-            <a:r>
-              <a:rPr lang="es-PE" dirty="0"/>
-              <a:t>No existe a la fecha un estudio sobre el género de los postulantes a los programas de </a:t>
-            </a:r>
-            <a:r>
-              <a:rPr lang="es-PE" dirty="0" err="1"/>
-              <a:t>residentado</a:t>
-            </a:r>
-            <a:r>
-              <a:rPr lang="es-PE" dirty="0"/>
-              <a:t> médico en el Perú.</a:t>
-            </a:r>
-          </a:p>
-        </p:txBody>
-      </p:sp>
-    </p:spTree>
-    <p:extLst>
-      <p:ext uri="{BB962C8B-B14F-4D97-AF65-F5344CB8AC3E}">
-        <p14:creationId xmlns:p14="http://schemas.microsoft.com/office/powerpoint/2010/main" val="3185660407"/>
-      </p:ext>
-    </p:extLst>
-  </p:cSld>
-  <p:clrMapOvr>
-    <a:masterClrMapping/>
-  </p:clrMapOvr>
-</p:sld>
-</file>
-
-<file path=ppt/slides/slide40.xml><?xml version="1.0" encoding="utf-8"?>
+<file path=ppt/slides/slide58.xml><?xml version="1.0" encoding="utf-8"?>
 <p:sld xmlns:a="http://schemas.openxmlformats.org/drawingml/2006/main" xmlns:r="http://schemas.openxmlformats.org/officeDocument/2006/relationships" xmlns:p="http://schemas.openxmlformats.org/presentationml/2006/main">
   <p:cSld>
     <p:spTree>
@@ -24521,7 +26380,7 @@
 </p:sld>
 </file>
 
-<file path=ppt/slides/slide41.xml><?xml version="1.0" encoding="utf-8"?>
+<file path=ppt/slides/slide59.xml><?xml version="1.0" encoding="utf-8"?>
 <p:sld xmlns:a="http://schemas.openxmlformats.org/drawingml/2006/main" xmlns:r="http://schemas.openxmlformats.org/officeDocument/2006/relationships" xmlns:p="http://schemas.openxmlformats.org/presentationml/2006/main">
   <p:cSld>
     <p:spTree>
@@ -24596,707 +26455,6 @@
     <p:extLst>
       <p:ext uri="{BB962C8B-B14F-4D97-AF65-F5344CB8AC3E}">
         <p14:creationId xmlns:p14="http://schemas.microsoft.com/office/powerpoint/2010/main" val="4086840107"/>
-      </p:ext>
-    </p:extLst>
-  </p:cSld>
-  <p:clrMapOvr>
-    <a:masterClrMapping/>
-  </p:clrMapOvr>
-</p:sld>
-</file>
-
-<file path=ppt/slides/slide42.xml><?xml version="1.0" encoding="utf-8"?>
-<p:sld xmlns:a="http://schemas.openxmlformats.org/drawingml/2006/main" xmlns:r="http://schemas.openxmlformats.org/officeDocument/2006/relationships" xmlns:p="http://schemas.openxmlformats.org/presentationml/2006/main">
-  <p:cSld>
-    <p:spTree>
-      <p:nvGrpSpPr>
-        <p:cNvPr id="1" name=""/>
-        <p:cNvGrpSpPr/>
-        <p:nvPr/>
-      </p:nvGrpSpPr>
-      <p:grpSpPr>
-        <a:xfrm>
-          <a:off x="0" y="0"/>
-          <a:ext cx="0" cy="0"/>
-          <a:chOff x="0" y="0"/>
-          <a:chExt cx="0" cy="0"/>
-        </a:xfrm>
-      </p:grpSpPr>
-      <p:sp>
-        <p:nvSpPr>
-          <p:cNvPr id="2" name="Título 1">
-            <a:extLst>
-              <a:ext uri="{FF2B5EF4-FFF2-40B4-BE49-F238E27FC236}">
-                <a16:creationId xmlns:a16="http://schemas.microsoft.com/office/drawing/2014/main" id="{BF0F4476-32BB-29C2-168D-C2D752FD43B7}"/>
-              </a:ext>
-            </a:extLst>
-          </p:cNvPr>
-          <p:cNvSpPr>
-            <a:spLocks noGrp="1"/>
-          </p:cNvSpPr>
-          <p:nvPr>
-            <p:ph type="title"/>
-          </p:nvPr>
-        </p:nvSpPr>
-        <p:spPr/>
-        <p:txBody>
-          <a:bodyPr/>
-          <a:lstStyle/>
-          <a:p>
-            <a:r>
-              <a:rPr lang="es-MX" dirty="0"/>
-              <a:t>Limitaciones</a:t>
-            </a:r>
-            <a:endParaRPr lang="es-PE" dirty="0"/>
-          </a:p>
-        </p:txBody>
-      </p:sp>
-      <p:sp>
-        <p:nvSpPr>
-          <p:cNvPr id="3" name="Marcador de contenido 2">
-            <a:extLst>
-              <a:ext uri="{FF2B5EF4-FFF2-40B4-BE49-F238E27FC236}">
-                <a16:creationId xmlns:a16="http://schemas.microsoft.com/office/drawing/2014/main" id="{9814A80F-1BC3-CEF0-0A68-8A57A5E3F2C3}"/>
-              </a:ext>
-            </a:extLst>
-          </p:cNvPr>
-          <p:cNvSpPr>
-            <a:spLocks noGrp="1"/>
-          </p:cNvSpPr>
-          <p:nvPr>
-            <p:ph idx="1"/>
-          </p:nvPr>
-        </p:nvSpPr>
-        <p:spPr/>
-        <p:txBody>
-          <a:bodyPr/>
-          <a:lstStyle/>
-          <a:p>
-            <a:endParaRPr lang="es-PE"/>
-          </a:p>
-        </p:txBody>
-      </p:sp>
-    </p:spTree>
-    <p:extLst>
-      <p:ext uri="{BB962C8B-B14F-4D97-AF65-F5344CB8AC3E}">
-        <p14:creationId xmlns:p14="http://schemas.microsoft.com/office/powerpoint/2010/main" val="1065821840"/>
-      </p:ext>
-    </p:extLst>
-  </p:cSld>
-  <p:clrMapOvr>
-    <a:masterClrMapping/>
-  </p:clrMapOvr>
-</p:sld>
-</file>
-
-<file path=ppt/slides/slide43.xml><?xml version="1.0" encoding="utf-8"?>
-<p:sld xmlns:a="http://schemas.openxmlformats.org/drawingml/2006/main" xmlns:r="http://schemas.openxmlformats.org/officeDocument/2006/relationships" xmlns:p="http://schemas.openxmlformats.org/presentationml/2006/main">
-  <p:cSld>
-    <p:spTree>
-      <p:nvGrpSpPr>
-        <p:cNvPr id="1" name=""/>
-        <p:cNvGrpSpPr/>
-        <p:nvPr/>
-      </p:nvGrpSpPr>
-      <p:grpSpPr>
-        <a:xfrm>
-          <a:off x="0" y="0"/>
-          <a:ext cx="0" cy="0"/>
-          <a:chOff x="0" y="0"/>
-          <a:chExt cx="0" cy="0"/>
-        </a:xfrm>
-      </p:grpSpPr>
-      <p:sp>
-        <p:nvSpPr>
-          <p:cNvPr id="2" name="Título 1">
-            <a:extLst>
-              <a:ext uri="{FF2B5EF4-FFF2-40B4-BE49-F238E27FC236}">
-                <a16:creationId xmlns:a16="http://schemas.microsoft.com/office/drawing/2014/main" id="{33D59C49-650A-15EF-F2C6-F3454F2D2000}"/>
-              </a:ext>
-            </a:extLst>
-          </p:cNvPr>
-          <p:cNvSpPr>
-            <a:spLocks noGrp="1"/>
-          </p:cNvSpPr>
-          <p:nvPr>
-            <p:ph type="title"/>
-          </p:nvPr>
-        </p:nvSpPr>
-        <p:spPr/>
-        <p:txBody>
-          <a:bodyPr/>
-          <a:lstStyle/>
-          <a:p>
-            <a:r>
-              <a:rPr lang="es-MX" dirty="0"/>
-              <a:t>Implicancias y significancia del estudio</a:t>
-            </a:r>
-            <a:endParaRPr lang="es-PE" dirty="0"/>
-          </a:p>
-        </p:txBody>
-      </p:sp>
-      <p:sp>
-        <p:nvSpPr>
-          <p:cNvPr id="3" name="Marcador de contenido 2">
-            <a:extLst>
-              <a:ext uri="{FF2B5EF4-FFF2-40B4-BE49-F238E27FC236}">
-                <a16:creationId xmlns:a16="http://schemas.microsoft.com/office/drawing/2014/main" id="{E8EB1420-7868-ECB8-D57E-80B6122B8151}"/>
-              </a:ext>
-            </a:extLst>
-          </p:cNvPr>
-          <p:cNvSpPr>
-            <a:spLocks noGrp="1"/>
-          </p:cNvSpPr>
-          <p:nvPr>
-            <p:ph idx="1"/>
-          </p:nvPr>
-        </p:nvSpPr>
-        <p:spPr/>
-        <p:txBody>
-          <a:bodyPr/>
-          <a:lstStyle/>
-          <a:p>
-            <a:endParaRPr lang="es-PE"/>
-          </a:p>
-        </p:txBody>
-      </p:sp>
-    </p:spTree>
-    <p:extLst>
-      <p:ext uri="{BB962C8B-B14F-4D97-AF65-F5344CB8AC3E}">
-        <p14:creationId xmlns:p14="http://schemas.microsoft.com/office/powerpoint/2010/main" val="1065016520"/>
-      </p:ext>
-    </p:extLst>
-  </p:cSld>
-  <p:clrMapOvr>
-    <a:masterClrMapping/>
-  </p:clrMapOvr>
-</p:sld>
-</file>
-
-<file path=ppt/slides/slide44.xml><?xml version="1.0" encoding="utf-8"?>
-<p:sld xmlns:a="http://schemas.openxmlformats.org/drawingml/2006/main" xmlns:r="http://schemas.openxmlformats.org/officeDocument/2006/relationships" xmlns:p="http://schemas.openxmlformats.org/presentationml/2006/main">
-  <p:cSld>
-    <p:spTree>
-      <p:nvGrpSpPr>
-        <p:cNvPr id="1" name=""/>
-        <p:cNvGrpSpPr/>
-        <p:nvPr/>
-      </p:nvGrpSpPr>
-      <p:grpSpPr>
-        <a:xfrm>
-          <a:off x="0" y="0"/>
-          <a:ext cx="0" cy="0"/>
-          <a:chOff x="0" y="0"/>
-          <a:chExt cx="0" cy="0"/>
-        </a:xfrm>
-      </p:grpSpPr>
-      <p:sp>
-        <p:nvSpPr>
-          <p:cNvPr id="2" name="Título 1">
-            <a:extLst>
-              <a:ext uri="{FF2B5EF4-FFF2-40B4-BE49-F238E27FC236}">
-                <a16:creationId xmlns:a16="http://schemas.microsoft.com/office/drawing/2014/main" id="{CA83AE3D-B4AE-1B15-7940-4C52FD12AA85}"/>
-              </a:ext>
-            </a:extLst>
-          </p:cNvPr>
-          <p:cNvSpPr>
-            <a:spLocks noGrp="1"/>
-          </p:cNvSpPr>
-          <p:nvPr>
-            <p:ph type="title"/>
-          </p:nvPr>
-        </p:nvSpPr>
-        <p:spPr/>
-        <p:txBody>
-          <a:bodyPr/>
-          <a:lstStyle/>
-          <a:p>
-            <a:r>
-              <a:rPr lang="es-MX" dirty="0"/>
-              <a:t>Direcciones de investigación futuras</a:t>
-            </a:r>
-            <a:endParaRPr lang="es-PE" dirty="0"/>
-          </a:p>
-        </p:txBody>
-      </p:sp>
-      <p:sp>
-        <p:nvSpPr>
-          <p:cNvPr id="3" name="Marcador de contenido 2">
-            <a:extLst>
-              <a:ext uri="{FF2B5EF4-FFF2-40B4-BE49-F238E27FC236}">
-                <a16:creationId xmlns:a16="http://schemas.microsoft.com/office/drawing/2014/main" id="{D87CE05F-BC72-7D88-E536-C0377A21F856}"/>
-              </a:ext>
-            </a:extLst>
-          </p:cNvPr>
-          <p:cNvSpPr>
-            <a:spLocks noGrp="1"/>
-          </p:cNvSpPr>
-          <p:nvPr>
-            <p:ph idx="1"/>
-          </p:nvPr>
-        </p:nvSpPr>
-        <p:spPr/>
-        <p:txBody>
-          <a:bodyPr/>
-          <a:lstStyle/>
-          <a:p>
-            <a:endParaRPr lang="es-PE"/>
-          </a:p>
-        </p:txBody>
-      </p:sp>
-    </p:spTree>
-    <p:extLst>
-      <p:ext uri="{BB962C8B-B14F-4D97-AF65-F5344CB8AC3E}">
-        <p14:creationId xmlns:p14="http://schemas.microsoft.com/office/powerpoint/2010/main" val="1220307406"/>
-      </p:ext>
-    </p:extLst>
-  </p:cSld>
-  <p:clrMapOvr>
-    <a:masterClrMapping/>
-  </p:clrMapOvr>
-</p:sld>
-</file>
-
-<file path=ppt/slides/slide45.xml><?xml version="1.0" encoding="utf-8"?>
-<p:sld xmlns:a="http://schemas.openxmlformats.org/drawingml/2006/main" xmlns:r="http://schemas.openxmlformats.org/officeDocument/2006/relationships" xmlns:p="http://schemas.openxmlformats.org/presentationml/2006/main">
-  <p:cSld>
-    <p:spTree>
-      <p:nvGrpSpPr>
-        <p:cNvPr id="1" name=""/>
-        <p:cNvGrpSpPr/>
-        <p:nvPr/>
-      </p:nvGrpSpPr>
-      <p:grpSpPr>
-        <a:xfrm>
-          <a:off x="0" y="0"/>
-          <a:ext cx="0" cy="0"/>
-          <a:chOff x="0" y="0"/>
-          <a:chExt cx="0" cy="0"/>
-        </a:xfrm>
-      </p:grpSpPr>
-      <p:sp>
-        <p:nvSpPr>
-          <p:cNvPr id="2" name="Título 1">
-            <a:extLst>
-              <a:ext uri="{FF2B5EF4-FFF2-40B4-BE49-F238E27FC236}">
-                <a16:creationId xmlns:a16="http://schemas.microsoft.com/office/drawing/2014/main" id="{4683FAC4-0A42-0FD8-03FD-73E01A59C19D}"/>
-              </a:ext>
-            </a:extLst>
-          </p:cNvPr>
-          <p:cNvSpPr>
-            <a:spLocks noGrp="1"/>
-          </p:cNvSpPr>
-          <p:nvPr>
-            <p:ph type="title"/>
-          </p:nvPr>
-        </p:nvSpPr>
-        <p:spPr/>
-        <p:txBody>
-          <a:bodyPr/>
-          <a:lstStyle/>
-          <a:p>
-            <a:r>
-              <a:rPr lang="es-MX" dirty="0"/>
-              <a:t>Conclusiones</a:t>
-            </a:r>
-            <a:endParaRPr lang="es-PE" dirty="0"/>
-          </a:p>
-        </p:txBody>
-      </p:sp>
-      <p:sp>
-        <p:nvSpPr>
-          <p:cNvPr id="3" name="Marcador de texto 2">
-            <a:extLst>
-              <a:ext uri="{FF2B5EF4-FFF2-40B4-BE49-F238E27FC236}">
-                <a16:creationId xmlns:a16="http://schemas.microsoft.com/office/drawing/2014/main" id="{A5F78B56-51D5-9455-9F2C-E759D0C31C17}"/>
-              </a:ext>
-            </a:extLst>
-          </p:cNvPr>
-          <p:cNvSpPr>
-            <a:spLocks noGrp="1"/>
-          </p:cNvSpPr>
-          <p:nvPr>
-            <p:ph type="body" idx="1"/>
-          </p:nvPr>
-        </p:nvSpPr>
-        <p:spPr/>
-        <p:txBody>
-          <a:bodyPr/>
-          <a:lstStyle/>
-          <a:p>
-            <a:endParaRPr lang="es-PE"/>
-          </a:p>
-        </p:txBody>
-      </p:sp>
-    </p:spTree>
-    <p:extLst>
-      <p:ext uri="{BB962C8B-B14F-4D97-AF65-F5344CB8AC3E}">
-        <p14:creationId xmlns:p14="http://schemas.microsoft.com/office/powerpoint/2010/main" val="2465460233"/>
-      </p:ext>
-    </p:extLst>
-  </p:cSld>
-  <p:clrMapOvr>
-    <a:masterClrMapping/>
-  </p:clrMapOvr>
-</p:sld>
-</file>
-
-<file path=ppt/slides/slide46.xml><?xml version="1.0" encoding="utf-8"?>
-<p:sld xmlns:a="http://schemas.openxmlformats.org/drawingml/2006/main" xmlns:r="http://schemas.openxmlformats.org/officeDocument/2006/relationships" xmlns:p="http://schemas.openxmlformats.org/presentationml/2006/main">
-  <p:cSld>
-    <p:spTree>
-      <p:nvGrpSpPr>
-        <p:cNvPr id="1" name=""/>
-        <p:cNvGrpSpPr/>
-        <p:nvPr/>
-      </p:nvGrpSpPr>
-      <p:grpSpPr>
-        <a:xfrm>
-          <a:off x="0" y="0"/>
-          <a:ext cx="0" cy="0"/>
-          <a:chOff x="0" y="0"/>
-          <a:chExt cx="0" cy="0"/>
-        </a:xfrm>
-      </p:grpSpPr>
-      <p:sp>
-        <p:nvSpPr>
-          <p:cNvPr id="2" name="Título 1">
-            <a:extLst>
-              <a:ext uri="{FF2B5EF4-FFF2-40B4-BE49-F238E27FC236}">
-                <a16:creationId xmlns:a16="http://schemas.microsoft.com/office/drawing/2014/main" id="{EC0E22F8-7BE2-55CD-80B4-FF7C65F21588}"/>
-              </a:ext>
-            </a:extLst>
-          </p:cNvPr>
-          <p:cNvSpPr>
-            <a:spLocks noGrp="1"/>
-          </p:cNvSpPr>
-          <p:nvPr>
-            <p:ph type="title"/>
-          </p:nvPr>
-        </p:nvSpPr>
-        <p:spPr/>
-        <p:txBody>
-          <a:bodyPr/>
-          <a:lstStyle/>
-          <a:p>
-            <a:r>
-              <a:rPr lang="es-MX" dirty="0"/>
-              <a:t>Conclusiones</a:t>
-            </a:r>
-            <a:endParaRPr lang="es-PE" dirty="0"/>
-          </a:p>
-        </p:txBody>
-      </p:sp>
-      <p:sp>
-        <p:nvSpPr>
-          <p:cNvPr id="3" name="Marcador de contenido 2">
-            <a:extLst>
-              <a:ext uri="{FF2B5EF4-FFF2-40B4-BE49-F238E27FC236}">
-                <a16:creationId xmlns:a16="http://schemas.microsoft.com/office/drawing/2014/main" id="{F555039C-2FB1-9C0A-C941-0BBA39CB99D0}"/>
-              </a:ext>
-            </a:extLst>
-          </p:cNvPr>
-          <p:cNvSpPr>
-            <a:spLocks noGrp="1"/>
-          </p:cNvSpPr>
-          <p:nvPr>
-            <p:ph idx="1"/>
-          </p:nvPr>
-        </p:nvSpPr>
-        <p:spPr/>
-        <p:txBody>
-          <a:bodyPr/>
-          <a:lstStyle/>
-          <a:p>
-            <a:endParaRPr lang="es-PE"/>
-          </a:p>
-        </p:txBody>
-      </p:sp>
-    </p:spTree>
-    <p:extLst>
-      <p:ext uri="{BB962C8B-B14F-4D97-AF65-F5344CB8AC3E}">
-        <p14:creationId xmlns:p14="http://schemas.microsoft.com/office/powerpoint/2010/main" val="3201697237"/>
-      </p:ext>
-    </p:extLst>
-  </p:cSld>
-  <p:clrMapOvr>
-    <a:masterClrMapping/>
-  </p:clrMapOvr>
-</p:sld>
-</file>
-
-<file path=ppt/slides/slide47.xml><?xml version="1.0" encoding="utf-8"?>
-<p:sld xmlns:a="http://schemas.openxmlformats.org/drawingml/2006/main" xmlns:r="http://schemas.openxmlformats.org/officeDocument/2006/relationships" xmlns:p="http://schemas.openxmlformats.org/presentationml/2006/main">
-  <p:cSld>
-    <p:spTree>
-      <p:nvGrpSpPr>
-        <p:cNvPr id="1" name=""/>
-        <p:cNvGrpSpPr/>
-        <p:nvPr/>
-      </p:nvGrpSpPr>
-      <p:grpSpPr>
-        <a:xfrm>
-          <a:off x="0" y="0"/>
-          <a:ext cx="0" cy="0"/>
-          <a:chOff x="0" y="0"/>
-          <a:chExt cx="0" cy="0"/>
-        </a:xfrm>
-      </p:grpSpPr>
-      <p:sp>
-        <p:nvSpPr>
-          <p:cNvPr id="2" name="Título 1">
-            <a:extLst>
-              <a:ext uri="{FF2B5EF4-FFF2-40B4-BE49-F238E27FC236}">
-                <a16:creationId xmlns:a16="http://schemas.microsoft.com/office/drawing/2014/main" id="{6C6A166D-28F4-C01B-7CB6-E6373C45DADD}"/>
-              </a:ext>
-            </a:extLst>
-          </p:cNvPr>
-          <p:cNvSpPr>
-            <a:spLocks noGrp="1"/>
-          </p:cNvSpPr>
-          <p:nvPr>
-            <p:ph type="title"/>
-          </p:nvPr>
-        </p:nvSpPr>
-        <p:spPr/>
-        <p:txBody>
-          <a:bodyPr/>
-          <a:lstStyle/>
-          <a:p>
-            <a:r>
-              <a:rPr lang="es-MX" dirty="0"/>
-              <a:t>Recomendaciones</a:t>
-            </a:r>
-            <a:endParaRPr lang="es-PE" dirty="0"/>
-          </a:p>
-        </p:txBody>
-      </p:sp>
-      <p:sp>
-        <p:nvSpPr>
-          <p:cNvPr id="3" name="Marcador de texto 2">
-            <a:extLst>
-              <a:ext uri="{FF2B5EF4-FFF2-40B4-BE49-F238E27FC236}">
-                <a16:creationId xmlns:a16="http://schemas.microsoft.com/office/drawing/2014/main" id="{9F7C2DDA-C7E1-0E6B-131A-98327166AAB1}"/>
-              </a:ext>
-            </a:extLst>
-          </p:cNvPr>
-          <p:cNvSpPr>
-            <a:spLocks noGrp="1"/>
-          </p:cNvSpPr>
-          <p:nvPr>
-            <p:ph type="body" idx="1"/>
-          </p:nvPr>
-        </p:nvSpPr>
-        <p:spPr/>
-        <p:txBody>
-          <a:bodyPr/>
-          <a:lstStyle/>
-          <a:p>
-            <a:endParaRPr lang="es-PE"/>
-          </a:p>
-        </p:txBody>
-      </p:sp>
-    </p:spTree>
-    <p:extLst>
-      <p:ext uri="{BB962C8B-B14F-4D97-AF65-F5344CB8AC3E}">
-        <p14:creationId xmlns:p14="http://schemas.microsoft.com/office/powerpoint/2010/main" val="1226754451"/>
-      </p:ext>
-    </p:extLst>
-  </p:cSld>
-  <p:clrMapOvr>
-    <a:masterClrMapping/>
-  </p:clrMapOvr>
-</p:sld>
-</file>
-
-<file path=ppt/slides/slide48.xml><?xml version="1.0" encoding="utf-8"?>
-<p:sld xmlns:a="http://schemas.openxmlformats.org/drawingml/2006/main" xmlns:r="http://schemas.openxmlformats.org/officeDocument/2006/relationships" xmlns:p="http://schemas.openxmlformats.org/presentationml/2006/main">
-  <p:cSld>
-    <p:spTree>
-      <p:nvGrpSpPr>
-        <p:cNvPr id="1" name=""/>
-        <p:cNvGrpSpPr/>
-        <p:nvPr/>
-      </p:nvGrpSpPr>
-      <p:grpSpPr>
-        <a:xfrm>
-          <a:off x="0" y="0"/>
-          <a:ext cx="0" cy="0"/>
-          <a:chOff x="0" y="0"/>
-          <a:chExt cx="0" cy="0"/>
-        </a:xfrm>
-      </p:grpSpPr>
-      <p:sp>
-        <p:nvSpPr>
-          <p:cNvPr id="2" name="Título 1">
-            <a:extLst>
-              <a:ext uri="{FF2B5EF4-FFF2-40B4-BE49-F238E27FC236}">
-                <a16:creationId xmlns:a16="http://schemas.microsoft.com/office/drawing/2014/main" id="{D2426F40-B7FB-DEC1-6743-EEE75D98EB36}"/>
-              </a:ext>
-            </a:extLst>
-          </p:cNvPr>
-          <p:cNvSpPr>
-            <a:spLocks noGrp="1"/>
-          </p:cNvSpPr>
-          <p:nvPr>
-            <p:ph type="title"/>
-          </p:nvPr>
-        </p:nvSpPr>
-        <p:spPr/>
-        <p:txBody>
-          <a:bodyPr/>
-          <a:lstStyle/>
-          <a:p>
-            <a:r>
-              <a:rPr lang="es-MX" dirty="0"/>
-              <a:t>Recomendaciones</a:t>
-            </a:r>
-            <a:endParaRPr lang="es-PE" dirty="0"/>
-          </a:p>
-        </p:txBody>
-      </p:sp>
-      <p:sp>
-        <p:nvSpPr>
-          <p:cNvPr id="3" name="Marcador de contenido 2">
-            <a:extLst>
-              <a:ext uri="{FF2B5EF4-FFF2-40B4-BE49-F238E27FC236}">
-                <a16:creationId xmlns:a16="http://schemas.microsoft.com/office/drawing/2014/main" id="{54B18982-994E-A5FA-25E5-D4EF841DBED6}"/>
-              </a:ext>
-            </a:extLst>
-          </p:cNvPr>
-          <p:cNvSpPr>
-            <a:spLocks noGrp="1"/>
-          </p:cNvSpPr>
-          <p:nvPr>
-            <p:ph idx="1"/>
-          </p:nvPr>
-        </p:nvSpPr>
-        <p:spPr/>
-        <p:txBody>
-          <a:bodyPr/>
-          <a:lstStyle/>
-          <a:p>
-            <a:endParaRPr lang="es-PE"/>
-          </a:p>
-        </p:txBody>
-      </p:sp>
-    </p:spTree>
-    <p:extLst>
-      <p:ext uri="{BB962C8B-B14F-4D97-AF65-F5344CB8AC3E}">
-        <p14:creationId xmlns:p14="http://schemas.microsoft.com/office/powerpoint/2010/main" val="2869833305"/>
-      </p:ext>
-    </p:extLst>
-  </p:cSld>
-  <p:clrMapOvr>
-    <a:masterClrMapping/>
-  </p:clrMapOvr>
-</p:sld>
-</file>
-
-<file path=ppt/slides/slide5.xml><?xml version="1.0" encoding="utf-8"?>
-<p:sld xmlns:a="http://schemas.openxmlformats.org/drawingml/2006/main" xmlns:r="http://schemas.openxmlformats.org/officeDocument/2006/relationships" xmlns:p="http://schemas.openxmlformats.org/presentationml/2006/main">
-  <p:cSld>
-    <p:spTree>
-      <p:nvGrpSpPr>
-        <p:cNvPr id="1" name=""/>
-        <p:cNvGrpSpPr/>
-        <p:nvPr/>
-      </p:nvGrpSpPr>
-      <p:grpSpPr>
-        <a:xfrm>
-          <a:off x="0" y="0"/>
-          <a:ext cx="0" cy="0"/>
-          <a:chOff x="0" y="0"/>
-          <a:chExt cx="0" cy="0"/>
-        </a:xfrm>
-      </p:grpSpPr>
-      <p:sp>
-        <p:nvSpPr>
-          <p:cNvPr id="2" name="Título 1">
-            <a:extLst>
-              <a:ext uri="{FF2B5EF4-FFF2-40B4-BE49-F238E27FC236}">
-                <a16:creationId xmlns:a16="http://schemas.microsoft.com/office/drawing/2014/main" id="{30BD1730-B728-1D5A-D824-39833DA8D53D}"/>
-              </a:ext>
-            </a:extLst>
-          </p:cNvPr>
-          <p:cNvSpPr>
-            <a:spLocks noGrp="1"/>
-          </p:cNvSpPr>
-          <p:nvPr>
-            <p:ph type="title"/>
-          </p:nvPr>
-        </p:nvSpPr>
-        <p:spPr/>
-        <p:txBody>
-          <a:bodyPr/>
-          <a:lstStyle/>
-          <a:p>
-            <a:r>
-              <a:rPr lang="es-MX" dirty="0"/>
-              <a:t>Problema de investigación</a:t>
-            </a:r>
-            <a:endParaRPr lang="es-PE" dirty="0"/>
-          </a:p>
-        </p:txBody>
-      </p:sp>
-      <p:sp>
-        <p:nvSpPr>
-          <p:cNvPr id="3" name="Marcador de contenido 2">
-            <a:extLst>
-              <a:ext uri="{FF2B5EF4-FFF2-40B4-BE49-F238E27FC236}">
-                <a16:creationId xmlns:a16="http://schemas.microsoft.com/office/drawing/2014/main" id="{98D2C2C6-67EC-D04E-ED34-A8C54CD02173}"/>
-              </a:ext>
-            </a:extLst>
-          </p:cNvPr>
-          <p:cNvSpPr>
-            <a:spLocks noGrp="1"/>
-          </p:cNvSpPr>
-          <p:nvPr>
-            <p:ph idx="1"/>
-          </p:nvPr>
-        </p:nvSpPr>
-        <p:spPr/>
-        <p:txBody>
-          <a:bodyPr/>
-          <a:lstStyle/>
-          <a:p>
-            <a:r>
-              <a:rPr lang="es-MX" dirty="0"/>
-              <a:t>Información sobre cómo se están incorporando las mujeres a las especialidades médicas es insuficiente.</a:t>
-            </a:r>
-          </a:p>
-          <a:p>
-            <a:r>
-              <a:rPr lang="es-PE" dirty="0"/>
-              <a:t>Detectar diferencias de género es el primer paso para determinar las causas de estas diferencias que pueden ser problemáticas.</a:t>
-            </a:r>
-          </a:p>
-          <a:p>
-            <a:r>
-              <a:rPr lang="es-PE" dirty="0"/>
-              <a:t>Diferencias de género en algunas especialidades (ej. quirúrgicas), son descritas por la literatura. Se describen discriminación por género, acoso sexual, entre otras como posibles causas de estas diferencias.</a:t>
-            </a:r>
-          </a:p>
-          <a:p>
-            <a:r>
-              <a:rPr lang="es-PE" dirty="0"/>
-              <a:t>El presente estudio busca caracterizar la incorporación del género femenino en el programa de </a:t>
-            </a:r>
-            <a:r>
-              <a:rPr lang="es-PE" dirty="0" err="1"/>
-              <a:t>residentado</a:t>
-            </a:r>
-            <a:r>
-              <a:rPr lang="es-PE" dirty="0"/>
-              <a:t> médico del Perú entre los años 2013 y 2023 para tener un panorama de la situación actual respecto a este tema.</a:t>
-            </a:r>
-          </a:p>
-        </p:txBody>
-      </p:sp>
-    </p:spTree>
-    <p:extLst>
-      <p:ext uri="{BB962C8B-B14F-4D97-AF65-F5344CB8AC3E}">
-        <p14:creationId xmlns:p14="http://schemas.microsoft.com/office/powerpoint/2010/main" val="650012995"/>
       </p:ext>
     </p:extLst>
   </p:cSld>
@@ -25381,6 +26539,594 @@
     <p:extLst>
       <p:ext uri="{BB962C8B-B14F-4D97-AF65-F5344CB8AC3E}">
         <p14:creationId xmlns:p14="http://schemas.microsoft.com/office/powerpoint/2010/main" val="2626305618"/>
+      </p:ext>
+    </p:extLst>
+  </p:cSld>
+  <p:clrMapOvr>
+    <a:masterClrMapping/>
+  </p:clrMapOvr>
+</p:sld>
+</file>
+
+<file path=ppt/slides/slide60.xml><?xml version="1.0" encoding="utf-8"?>
+<p:sld xmlns:a="http://schemas.openxmlformats.org/drawingml/2006/main" xmlns:r="http://schemas.openxmlformats.org/officeDocument/2006/relationships" xmlns:p="http://schemas.openxmlformats.org/presentationml/2006/main">
+  <p:cSld>
+    <p:spTree>
+      <p:nvGrpSpPr>
+        <p:cNvPr id="1" name=""/>
+        <p:cNvGrpSpPr/>
+        <p:nvPr/>
+      </p:nvGrpSpPr>
+      <p:grpSpPr>
+        <a:xfrm>
+          <a:off x="0" y="0"/>
+          <a:ext cx="0" cy="0"/>
+          <a:chOff x="0" y="0"/>
+          <a:chExt cx="0" cy="0"/>
+        </a:xfrm>
+      </p:grpSpPr>
+      <p:sp>
+        <p:nvSpPr>
+          <p:cNvPr id="2" name="Título 1">
+            <a:extLst>
+              <a:ext uri="{FF2B5EF4-FFF2-40B4-BE49-F238E27FC236}">
+                <a16:creationId xmlns:a16="http://schemas.microsoft.com/office/drawing/2014/main" id="{BF0F4476-32BB-29C2-168D-C2D752FD43B7}"/>
+              </a:ext>
+            </a:extLst>
+          </p:cNvPr>
+          <p:cNvSpPr>
+            <a:spLocks noGrp="1"/>
+          </p:cNvSpPr>
+          <p:nvPr>
+            <p:ph type="title"/>
+          </p:nvPr>
+        </p:nvSpPr>
+        <p:spPr/>
+        <p:txBody>
+          <a:bodyPr/>
+          <a:lstStyle/>
+          <a:p>
+            <a:r>
+              <a:rPr lang="es-MX" dirty="0"/>
+              <a:t>Limitaciones</a:t>
+            </a:r>
+            <a:endParaRPr lang="es-PE" dirty="0"/>
+          </a:p>
+        </p:txBody>
+      </p:sp>
+      <p:sp>
+        <p:nvSpPr>
+          <p:cNvPr id="3" name="Marcador de contenido 2">
+            <a:extLst>
+              <a:ext uri="{FF2B5EF4-FFF2-40B4-BE49-F238E27FC236}">
+                <a16:creationId xmlns:a16="http://schemas.microsoft.com/office/drawing/2014/main" id="{9814A80F-1BC3-CEF0-0A68-8A57A5E3F2C3}"/>
+              </a:ext>
+            </a:extLst>
+          </p:cNvPr>
+          <p:cNvSpPr>
+            <a:spLocks noGrp="1"/>
+          </p:cNvSpPr>
+          <p:nvPr>
+            <p:ph idx="1"/>
+          </p:nvPr>
+        </p:nvSpPr>
+        <p:spPr/>
+        <p:txBody>
+          <a:bodyPr/>
+          <a:lstStyle/>
+          <a:p>
+            <a:endParaRPr lang="es-PE"/>
+          </a:p>
+        </p:txBody>
+      </p:sp>
+    </p:spTree>
+    <p:extLst>
+      <p:ext uri="{BB962C8B-B14F-4D97-AF65-F5344CB8AC3E}">
+        <p14:creationId xmlns:p14="http://schemas.microsoft.com/office/powerpoint/2010/main" val="1065821840"/>
+      </p:ext>
+    </p:extLst>
+  </p:cSld>
+  <p:clrMapOvr>
+    <a:masterClrMapping/>
+  </p:clrMapOvr>
+</p:sld>
+</file>
+
+<file path=ppt/slides/slide61.xml><?xml version="1.0" encoding="utf-8"?>
+<p:sld xmlns:a="http://schemas.openxmlformats.org/drawingml/2006/main" xmlns:r="http://schemas.openxmlformats.org/officeDocument/2006/relationships" xmlns:p="http://schemas.openxmlformats.org/presentationml/2006/main">
+  <p:cSld>
+    <p:spTree>
+      <p:nvGrpSpPr>
+        <p:cNvPr id="1" name=""/>
+        <p:cNvGrpSpPr/>
+        <p:nvPr/>
+      </p:nvGrpSpPr>
+      <p:grpSpPr>
+        <a:xfrm>
+          <a:off x="0" y="0"/>
+          <a:ext cx="0" cy="0"/>
+          <a:chOff x="0" y="0"/>
+          <a:chExt cx="0" cy="0"/>
+        </a:xfrm>
+      </p:grpSpPr>
+      <p:sp>
+        <p:nvSpPr>
+          <p:cNvPr id="2" name="Título 1">
+            <a:extLst>
+              <a:ext uri="{FF2B5EF4-FFF2-40B4-BE49-F238E27FC236}">
+                <a16:creationId xmlns:a16="http://schemas.microsoft.com/office/drawing/2014/main" id="{33D59C49-650A-15EF-F2C6-F3454F2D2000}"/>
+              </a:ext>
+            </a:extLst>
+          </p:cNvPr>
+          <p:cNvSpPr>
+            <a:spLocks noGrp="1"/>
+          </p:cNvSpPr>
+          <p:nvPr>
+            <p:ph type="title"/>
+          </p:nvPr>
+        </p:nvSpPr>
+        <p:spPr/>
+        <p:txBody>
+          <a:bodyPr/>
+          <a:lstStyle/>
+          <a:p>
+            <a:r>
+              <a:rPr lang="es-MX" dirty="0"/>
+              <a:t>Implicancias y significancia del estudio</a:t>
+            </a:r>
+            <a:endParaRPr lang="es-PE" dirty="0"/>
+          </a:p>
+        </p:txBody>
+      </p:sp>
+      <p:sp>
+        <p:nvSpPr>
+          <p:cNvPr id="3" name="Marcador de contenido 2">
+            <a:extLst>
+              <a:ext uri="{FF2B5EF4-FFF2-40B4-BE49-F238E27FC236}">
+                <a16:creationId xmlns:a16="http://schemas.microsoft.com/office/drawing/2014/main" id="{E8EB1420-7868-ECB8-D57E-80B6122B8151}"/>
+              </a:ext>
+            </a:extLst>
+          </p:cNvPr>
+          <p:cNvSpPr>
+            <a:spLocks noGrp="1"/>
+          </p:cNvSpPr>
+          <p:nvPr>
+            <p:ph idx="1"/>
+          </p:nvPr>
+        </p:nvSpPr>
+        <p:spPr/>
+        <p:txBody>
+          <a:bodyPr/>
+          <a:lstStyle/>
+          <a:p>
+            <a:endParaRPr lang="es-PE"/>
+          </a:p>
+        </p:txBody>
+      </p:sp>
+    </p:spTree>
+    <p:extLst>
+      <p:ext uri="{BB962C8B-B14F-4D97-AF65-F5344CB8AC3E}">
+        <p14:creationId xmlns:p14="http://schemas.microsoft.com/office/powerpoint/2010/main" val="1065016520"/>
+      </p:ext>
+    </p:extLst>
+  </p:cSld>
+  <p:clrMapOvr>
+    <a:masterClrMapping/>
+  </p:clrMapOvr>
+</p:sld>
+</file>
+
+<file path=ppt/slides/slide62.xml><?xml version="1.0" encoding="utf-8"?>
+<p:sld xmlns:a="http://schemas.openxmlformats.org/drawingml/2006/main" xmlns:r="http://schemas.openxmlformats.org/officeDocument/2006/relationships" xmlns:p="http://schemas.openxmlformats.org/presentationml/2006/main">
+  <p:cSld>
+    <p:spTree>
+      <p:nvGrpSpPr>
+        <p:cNvPr id="1" name=""/>
+        <p:cNvGrpSpPr/>
+        <p:nvPr/>
+      </p:nvGrpSpPr>
+      <p:grpSpPr>
+        <a:xfrm>
+          <a:off x="0" y="0"/>
+          <a:ext cx="0" cy="0"/>
+          <a:chOff x="0" y="0"/>
+          <a:chExt cx="0" cy="0"/>
+        </a:xfrm>
+      </p:grpSpPr>
+      <p:sp>
+        <p:nvSpPr>
+          <p:cNvPr id="2" name="Título 1">
+            <a:extLst>
+              <a:ext uri="{FF2B5EF4-FFF2-40B4-BE49-F238E27FC236}">
+                <a16:creationId xmlns:a16="http://schemas.microsoft.com/office/drawing/2014/main" id="{CA83AE3D-B4AE-1B15-7940-4C52FD12AA85}"/>
+              </a:ext>
+            </a:extLst>
+          </p:cNvPr>
+          <p:cNvSpPr>
+            <a:spLocks noGrp="1"/>
+          </p:cNvSpPr>
+          <p:nvPr>
+            <p:ph type="title"/>
+          </p:nvPr>
+        </p:nvSpPr>
+        <p:spPr/>
+        <p:txBody>
+          <a:bodyPr/>
+          <a:lstStyle/>
+          <a:p>
+            <a:r>
+              <a:rPr lang="es-MX" dirty="0"/>
+              <a:t>Direcciones de investigación futuras</a:t>
+            </a:r>
+            <a:endParaRPr lang="es-PE" dirty="0"/>
+          </a:p>
+        </p:txBody>
+      </p:sp>
+      <p:sp>
+        <p:nvSpPr>
+          <p:cNvPr id="3" name="Marcador de contenido 2">
+            <a:extLst>
+              <a:ext uri="{FF2B5EF4-FFF2-40B4-BE49-F238E27FC236}">
+                <a16:creationId xmlns:a16="http://schemas.microsoft.com/office/drawing/2014/main" id="{D87CE05F-BC72-7D88-E536-C0377A21F856}"/>
+              </a:ext>
+            </a:extLst>
+          </p:cNvPr>
+          <p:cNvSpPr>
+            <a:spLocks noGrp="1"/>
+          </p:cNvSpPr>
+          <p:nvPr>
+            <p:ph idx="1"/>
+          </p:nvPr>
+        </p:nvSpPr>
+        <p:spPr/>
+        <p:txBody>
+          <a:bodyPr/>
+          <a:lstStyle/>
+          <a:p>
+            <a:endParaRPr lang="es-PE"/>
+          </a:p>
+        </p:txBody>
+      </p:sp>
+    </p:spTree>
+    <p:extLst>
+      <p:ext uri="{BB962C8B-B14F-4D97-AF65-F5344CB8AC3E}">
+        <p14:creationId xmlns:p14="http://schemas.microsoft.com/office/powerpoint/2010/main" val="1220307406"/>
+      </p:ext>
+    </p:extLst>
+  </p:cSld>
+  <p:clrMapOvr>
+    <a:masterClrMapping/>
+  </p:clrMapOvr>
+</p:sld>
+</file>
+
+<file path=ppt/slides/slide63.xml><?xml version="1.0" encoding="utf-8"?>
+<p:sld xmlns:a="http://schemas.openxmlformats.org/drawingml/2006/main" xmlns:r="http://schemas.openxmlformats.org/officeDocument/2006/relationships" xmlns:p="http://schemas.openxmlformats.org/presentationml/2006/main">
+  <p:cSld>
+    <p:spTree>
+      <p:nvGrpSpPr>
+        <p:cNvPr id="1" name=""/>
+        <p:cNvGrpSpPr/>
+        <p:nvPr/>
+      </p:nvGrpSpPr>
+      <p:grpSpPr>
+        <a:xfrm>
+          <a:off x="0" y="0"/>
+          <a:ext cx="0" cy="0"/>
+          <a:chOff x="0" y="0"/>
+          <a:chExt cx="0" cy="0"/>
+        </a:xfrm>
+      </p:grpSpPr>
+      <p:sp>
+        <p:nvSpPr>
+          <p:cNvPr id="2" name="Título 1">
+            <a:extLst>
+              <a:ext uri="{FF2B5EF4-FFF2-40B4-BE49-F238E27FC236}">
+                <a16:creationId xmlns:a16="http://schemas.microsoft.com/office/drawing/2014/main" id="{4683FAC4-0A42-0FD8-03FD-73E01A59C19D}"/>
+              </a:ext>
+            </a:extLst>
+          </p:cNvPr>
+          <p:cNvSpPr>
+            <a:spLocks noGrp="1"/>
+          </p:cNvSpPr>
+          <p:nvPr>
+            <p:ph type="title"/>
+          </p:nvPr>
+        </p:nvSpPr>
+        <p:spPr/>
+        <p:txBody>
+          <a:bodyPr/>
+          <a:lstStyle/>
+          <a:p>
+            <a:r>
+              <a:rPr lang="es-MX" dirty="0"/>
+              <a:t>Conclusiones</a:t>
+            </a:r>
+            <a:endParaRPr lang="es-PE" dirty="0"/>
+          </a:p>
+        </p:txBody>
+      </p:sp>
+      <p:sp>
+        <p:nvSpPr>
+          <p:cNvPr id="3" name="Marcador de texto 2">
+            <a:extLst>
+              <a:ext uri="{FF2B5EF4-FFF2-40B4-BE49-F238E27FC236}">
+                <a16:creationId xmlns:a16="http://schemas.microsoft.com/office/drawing/2014/main" id="{A5F78B56-51D5-9455-9F2C-E759D0C31C17}"/>
+              </a:ext>
+            </a:extLst>
+          </p:cNvPr>
+          <p:cNvSpPr>
+            <a:spLocks noGrp="1"/>
+          </p:cNvSpPr>
+          <p:nvPr>
+            <p:ph type="body" idx="1"/>
+          </p:nvPr>
+        </p:nvSpPr>
+        <p:spPr/>
+        <p:txBody>
+          <a:bodyPr/>
+          <a:lstStyle/>
+          <a:p>
+            <a:endParaRPr lang="es-PE"/>
+          </a:p>
+        </p:txBody>
+      </p:sp>
+    </p:spTree>
+    <p:extLst>
+      <p:ext uri="{BB962C8B-B14F-4D97-AF65-F5344CB8AC3E}">
+        <p14:creationId xmlns:p14="http://schemas.microsoft.com/office/powerpoint/2010/main" val="2465460233"/>
+      </p:ext>
+    </p:extLst>
+  </p:cSld>
+  <p:clrMapOvr>
+    <a:masterClrMapping/>
+  </p:clrMapOvr>
+</p:sld>
+</file>
+
+<file path=ppt/slides/slide64.xml><?xml version="1.0" encoding="utf-8"?>
+<p:sld xmlns:a="http://schemas.openxmlformats.org/drawingml/2006/main" xmlns:r="http://schemas.openxmlformats.org/officeDocument/2006/relationships" xmlns:p="http://schemas.openxmlformats.org/presentationml/2006/main">
+  <p:cSld>
+    <p:spTree>
+      <p:nvGrpSpPr>
+        <p:cNvPr id="1" name=""/>
+        <p:cNvGrpSpPr/>
+        <p:nvPr/>
+      </p:nvGrpSpPr>
+      <p:grpSpPr>
+        <a:xfrm>
+          <a:off x="0" y="0"/>
+          <a:ext cx="0" cy="0"/>
+          <a:chOff x="0" y="0"/>
+          <a:chExt cx="0" cy="0"/>
+        </a:xfrm>
+      </p:grpSpPr>
+      <p:sp>
+        <p:nvSpPr>
+          <p:cNvPr id="2" name="Título 1">
+            <a:extLst>
+              <a:ext uri="{FF2B5EF4-FFF2-40B4-BE49-F238E27FC236}">
+                <a16:creationId xmlns:a16="http://schemas.microsoft.com/office/drawing/2014/main" id="{EC0E22F8-7BE2-55CD-80B4-FF7C65F21588}"/>
+              </a:ext>
+            </a:extLst>
+          </p:cNvPr>
+          <p:cNvSpPr>
+            <a:spLocks noGrp="1"/>
+          </p:cNvSpPr>
+          <p:nvPr>
+            <p:ph type="title"/>
+          </p:nvPr>
+        </p:nvSpPr>
+        <p:spPr/>
+        <p:txBody>
+          <a:bodyPr/>
+          <a:lstStyle/>
+          <a:p>
+            <a:r>
+              <a:rPr lang="es-MX" dirty="0"/>
+              <a:t>Conclusiones</a:t>
+            </a:r>
+            <a:endParaRPr lang="es-PE" dirty="0"/>
+          </a:p>
+        </p:txBody>
+      </p:sp>
+      <p:sp>
+        <p:nvSpPr>
+          <p:cNvPr id="3" name="Marcador de contenido 2">
+            <a:extLst>
+              <a:ext uri="{FF2B5EF4-FFF2-40B4-BE49-F238E27FC236}">
+                <a16:creationId xmlns:a16="http://schemas.microsoft.com/office/drawing/2014/main" id="{F555039C-2FB1-9C0A-C941-0BBA39CB99D0}"/>
+              </a:ext>
+            </a:extLst>
+          </p:cNvPr>
+          <p:cNvSpPr>
+            <a:spLocks noGrp="1"/>
+          </p:cNvSpPr>
+          <p:nvPr>
+            <p:ph idx="1"/>
+          </p:nvPr>
+        </p:nvSpPr>
+        <p:spPr/>
+        <p:txBody>
+          <a:bodyPr/>
+          <a:lstStyle/>
+          <a:p>
+            <a:endParaRPr lang="es-PE"/>
+          </a:p>
+        </p:txBody>
+      </p:sp>
+    </p:spTree>
+    <p:extLst>
+      <p:ext uri="{BB962C8B-B14F-4D97-AF65-F5344CB8AC3E}">
+        <p14:creationId xmlns:p14="http://schemas.microsoft.com/office/powerpoint/2010/main" val="3201697237"/>
+      </p:ext>
+    </p:extLst>
+  </p:cSld>
+  <p:clrMapOvr>
+    <a:masterClrMapping/>
+  </p:clrMapOvr>
+</p:sld>
+</file>
+
+<file path=ppt/slides/slide65.xml><?xml version="1.0" encoding="utf-8"?>
+<p:sld xmlns:a="http://schemas.openxmlformats.org/drawingml/2006/main" xmlns:r="http://schemas.openxmlformats.org/officeDocument/2006/relationships" xmlns:p="http://schemas.openxmlformats.org/presentationml/2006/main">
+  <p:cSld>
+    <p:spTree>
+      <p:nvGrpSpPr>
+        <p:cNvPr id="1" name=""/>
+        <p:cNvGrpSpPr/>
+        <p:nvPr/>
+      </p:nvGrpSpPr>
+      <p:grpSpPr>
+        <a:xfrm>
+          <a:off x="0" y="0"/>
+          <a:ext cx="0" cy="0"/>
+          <a:chOff x="0" y="0"/>
+          <a:chExt cx="0" cy="0"/>
+        </a:xfrm>
+      </p:grpSpPr>
+      <p:sp>
+        <p:nvSpPr>
+          <p:cNvPr id="2" name="Título 1">
+            <a:extLst>
+              <a:ext uri="{FF2B5EF4-FFF2-40B4-BE49-F238E27FC236}">
+                <a16:creationId xmlns:a16="http://schemas.microsoft.com/office/drawing/2014/main" id="{6C6A166D-28F4-C01B-7CB6-E6373C45DADD}"/>
+              </a:ext>
+            </a:extLst>
+          </p:cNvPr>
+          <p:cNvSpPr>
+            <a:spLocks noGrp="1"/>
+          </p:cNvSpPr>
+          <p:nvPr>
+            <p:ph type="title"/>
+          </p:nvPr>
+        </p:nvSpPr>
+        <p:spPr/>
+        <p:txBody>
+          <a:bodyPr/>
+          <a:lstStyle/>
+          <a:p>
+            <a:r>
+              <a:rPr lang="es-MX" dirty="0"/>
+              <a:t>Recomendaciones</a:t>
+            </a:r>
+            <a:endParaRPr lang="es-PE" dirty="0"/>
+          </a:p>
+        </p:txBody>
+      </p:sp>
+      <p:sp>
+        <p:nvSpPr>
+          <p:cNvPr id="3" name="Marcador de texto 2">
+            <a:extLst>
+              <a:ext uri="{FF2B5EF4-FFF2-40B4-BE49-F238E27FC236}">
+                <a16:creationId xmlns:a16="http://schemas.microsoft.com/office/drawing/2014/main" id="{9F7C2DDA-C7E1-0E6B-131A-98327166AAB1}"/>
+              </a:ext>
+            </a:extLst>
+          </p:cNvPr>
+          <p:cNvSpPr>
+            <a:spLocks noGrp="1"/>
+          </p:cNvSpPr>
+          <p:nvPr>
+            <p:ph type="body" idx="1"/>
+          </p:nvPr>
+        </p:nvSpPr>
+        <p:spPr/>
+        <p:txBody>
+          <a:bodyPr/>
+          <a:lstStyle/>
+          <a:p>
+            <a:endParaRPr lang="es-PE"/>
+          </a:p>
+        </p:txBody>
+      </p:sp>
+    </p:spTree>
+    <p:extLst>
+      <p:ext uri="{BB962C8B-B14F-4D97-AF65-F5344CB8AC3E}">
+        <p14:creationId xmlns:p14="http://schemas.microsoft.com/office/powerpoint/2010/main" val="1226754451"/>
+      </p:ext>
+    </p:extLst>
+  </p:cSld>
+  <p:clrMapOvr>
+    <a:masterClrMapping/>
+  </p:clrMapOvr>
+</p:sld>
+</file>
+
+<file path=ppt/slides/slide66.xml><?xml version="1.0" encoding="utf-8"?>
+<p:sld xmlns:a="http://schemas.openxmlformats.org/drawingml/2006/main" xmlns:r="http://schemas.openxmlformats.org/officeDocument/2006/relationships" xmlns:p="http://schemas.openxmlformats.org/presentationml/2006/main">
+  <p:cSld>
+    <p:spTree>
+      <p:nvGrpSpPr>
+        <p:cNvPr id="1" name=""/>
+        <p:cNvGrpSpPr/>
+        <p:nvPr/>
+      </p:nvGrpSpPr>
+      <p:grpSpPr>
+        <a:xfrm>
+          <a:off x="0" y="0"/>
+          <a:ext cx="0" cy="0"/>
+          <a:chOff x="0" y="0"/>
+          <a:chExt cx="0" cy="0"/>
+        </a:xfrm>
+      </p:grpSpPr>
+      <p:sp>
+        <p:nvSpPr>
+          <p:cNvPr id="2" name="Título 1">
+            <a:extLst>
+              <a:ext uri="{FF2B5EF4-FFF2-40B4-BE49-F238E27FC236}">
+                <a16:creationId xmlns:a16="http://schemas.microsoft.com/office/drawing/2014/main" id="{D2426F40-B7FB-DEC1-6743-EEE75D98EB36}"/>
+              </a:ext>
+            </a:extLst>
+          </p:cNvPr>
+          <p:cNvSpPr>
+            <a:spLocks noGrp="1"/>
+          </p:cNvSpPr>
+          <p:nvPr>
+            <p:ph type="title"/>
+          </p:nvPr>
+        </p:nvSpPr>
+        <p:spPr/>
+        <p:txBody>
+          <a:bodyPr/>
+          <a:lstStyle/>
+          <a:p>
+            <a:r>
+              <a:rPr lang="es-MX" dirty="0"/>
+              <a:t>Recomendaciones</a:t>
+            </a:r>
+            <a:endParaRPr lang="es-PE" dirty="0"/>
+          </a:p>
+        </p:txBody>
+      </p:sp>
+      <p:sp>
+        <p:nvSpPr>
+          <p:cNvPr id="3" name="Marcador de contenido 2">
+            <a:extLst>
+              <a:ext uri="{FF2B5EF4-FFF2-40B4-BE49-F238E27FC236}">
+                <a16:creationId xmlns:a16="http://schemas.microsoft.com/office/drawing/2014/main" id="{54B18982-994E-A5FA-25E5-D4EF841DBED6}"/>
+              </a:ext>
+            </a:extLst>
+          </p:cNvPr>
+          <p:cNvSpPr>
+            <a:spLocks noGrp="1"/>
+          </p:cNvSpPr>
+          <p:nvPr>
+            <p:ph idx="1"/>
+          </p:nvPr>
+        </p:nvSpPr>
+        <p:spPr/>
+        <p:txBody>
+          <a:bodyPr/>
+          <a:lstStyle/>
+          <a:p>
+            <a:endParaRPr lang="es-PE"/>
+          </a:p>
+        </p:txBody>
+      </p:sp>
+    </p:spTree>
+    <p:extLst>
+      <p:ext uri="{BB962C8B-B14F-4D97-AF65-F5344CB8AC3E}">
+        <p14:creationId xmlns:p14="http://schemas.microsoft.com/office/powerpoint/2010/main" val="2869833305"/>
       </p:ext>
     </p:extLst>
   </p:cSld>

</xml_diff>

<commit_message>
Add some information to my slides
</commit_message>
<xml_diff>
--- a/doc/diapositivas_sustentacion_tesis.pptx
+++ b/doc/diapositivas_sustentacion_tesis.pptx
@@ -362,7 +362,7 @@
           <a:p>
             <a:fld id="{234B5AB6-08EC-47B1-B66D-262C33DD7BFF}" type="datetimeFigureOut">
               <a:rPr lang="es-PE" smtClean="0"/>
-              <a:t>2/03/2024</a:t>
+              <a:t>6/03/2024</a:t>
             </a:fld>
             <a:endParaRPr lang="es-PE"/>
           </a:p>
@@ -1685,7 +1685,7 @@
                 <a:ea typeface="Calibri" panose="020F0502020204030204" pitchFamily="34" charset="0"/>
                 <a:cs typeface="Times New Roman" panose="02020603050405020304" pitchFamily="18" charset="0"/>
               </a:rPr>
-              <a:t>Se observó el mismo patrón durante la mayoría de años, habiendo una mayor proporción de no ingresantes que de ingresantes. Sin embargo, el año 2020 se observa que existe una mayor proporción de ingresantes que los demás años, y el año 2021 esto se hace incluso más notorio, alcanzando el número de ingresantes casi el número de no ingresantes.</a:t>
+              <a:t>Se observó el mismo patrón durante la mayoría de años, habiendo una mayor proporción de no ingresantes que de ingresantes. Sin embargo, el año 2020 se observa que existe una mayor proporción de ingresantes que los demás años, y el año 2021 esto se hace incluso más notorio, alcanzando el número de ingresantes casi el número de no ingresantes. Atribuible a la pandemia por COVID-19</a:t>
             </a:r>
           </a:p>
         </p:txBody>
@@ -1828,7 +1828,7 @@
                 <a:ea typeface="Calibri" panose="020F0502020204030204" pitchFamily="34" charset="0"/>
                 <a:cs typeface="Times New Roman" panose="02020603050405020304" pitchFamily="18" charset="0"/>
               </a:rPr>
-              <a:t>Se observa que en el año 2020 hubo un menor número de ingresantes. No se aprecian diferencias notables en el gráfico en cuanto a la distribución de género.</a:t>
+              <a:t>Se observa que en el año 2020 hubo un menor número de ingresantes. No se aprecian diferencias notables en el gráfico en cuanto a la distribución de género. Atribuible a la pandemia por COVID-19.</a:t>
             </a:r>
           </a:p>
         </p:txBody>
@@ -2386,7 +2386,7 @@
             </a:r>
             <a:r>
               <a:rPr lang="es-MX" dirty="0"/>
-              <a:t> médico del Perú. Se puede notar una disminución de los postulantes en los años 2020 y 2021.</a:t>
+              <a:t> médico del Perú. Se puede notar una disminución de los postulantes en los años 2020 y 2021, atribuible a la pandemia por COVID-19</a:t>
             </a:r>
             <a:endParaRPr lang="es-PE" dirty="0"/>
           </a:p>
@@ -4451,7 +4451,7 @@
           <a:p>
             <a:fld id="{7B14AA15-6390-4B76-91AD-6461C139DACF}" type="datetimeFigureOut">
               <a:rPr lang="es-PE" smtClean="0"/>
-              <a:t>2/03/2024</a:t>
+              <a:t>6/03/2024</a:t>
             </a:fld>
             <a:endParaRPr lang="es-PE"/>
           </a:p>
@@ -4659,7 +4659,7 @@
           <a:p>
             <a:fld id="{7B14AA15-6390-4B76-91AD-6461C139DACF}" type="datetimeFigureOut">
               <a:rPr lang="es-PE" smtClean="0"/>
-              <a:t>2/03/2024</a:t>
+              <a:t>6/03/2024</a:t>
             </a:fld>
             <a:endParaRPr lang="es-PE"/>
           </a:p>
@@ -4915,7 +4915,7 @@
           <a:p>
             <a:fld id="{7B14AA15-6390-4B76-91AD-6461C139DACF}" type="datetimeFigureOut">
               <a:rPr lang="es-PE" smtClean="0"/>
-              <a:t>2/03/2024</a:t>
+              <a:t>6/03/2024</a:t>
             </a:fld>
             <a:endParaRPr lang="es-PE"/>
           </a:p>
@@ -5085,7 +5085,7 @@
           <a:p>
             <a:fld id="{7B14AA15-6390-4B76-91AD-6461C139DACF}" type="datetimeFigureOut">
               <a:rPr lang="es-PE" smtClean="0"/>
-              <a:t>2/03/2024</a:t>
+              <a:t>6/03/2024</a:t>
             </a:fld>
             <a:endParaRPr lang="es-PE"/>
           </a:p>
@@ -5428,7 +5428,7 @@
           <a:p>
             <a:fld id="{7B14AA15-6390-4B76-91AD-6461C139DACF}" type="datetimeFigureOut">
               <a:rPr lang="es-PE" smtClean="0"/>
-              <a:t>2/03/2024</a:t>
+              <a:t>6/03/2024</a:t>
             </a:fld>
             <a:endParaRPr lang="es-PE"/>
           </a:p>
@@ -5703,7 +5703,7 @@
           <a:p>
             <a:fld id="{7B14AA15-6390-4B76-91AD-6461C139DACF}" type="datetimeFigureOut">
               <a:rPr lang="es-PE" smtClean="0"/>
-              <a:t>2/03/2024</a:t>
+              <a:t>6/03/2024</a:t>
             </a:fld>
             <a:endParaRPr lang="es-PE"/>
           </a:p>
@@ -6082,7 +6082,7 @@
           <a:p>
             <a:fld id="{7B14AA15-6390-4B76-91AD-6461C139DACF}" type="datetimeFigureOut">
               <a:rPr lang="es-PE" smtClean="0"/>
-              <a:t>2/03/2024</a:t>
+              <a:t>6/03/2024</a:t>
             </a:fld>
             <a:endParaRPr lang="es-PE"/>
           </a:p>
@@ -6200,7 +6200,7 @@
           <a:p>
             <a:fld id="{7B14AA15-6390-4B76-91AD-6461C139DACF}" type="datetimeFigureOut">
               <a:rPr lang="es-PE" smtClean="0"/>
-              <a:t>2/03/2024</a:t>
+              <a:t>6/03/2024</a:t>
             </a:fld>
             <a:endParaRPr lang="es-PE"/>
           </a:p>
@@ -6371,7 +6371,7 @@
           <a:p>
             <a:fld id="{7B14AA15-6390-4B76-91AD-6461C139DACF}" type="datetimeFigureOut">
               <a:rPr lang="es-PE" smtClean="0"/>
-              <a:t>2/03/2024</a:t>
+              <a:t>6/03/2024</a:t>
             </a:fld>
             <a:endParaRPr lang="es-PE"/>
           </a:p>
@@ -6725,7 +6725,7 @@
           <a:p>
             <a:fld id="{7B14AA15-6390-4B76-91AD-6461C139DACF}" type="datetimeFigureOut">
               <a:rPr lang="es-PE" smtClean="0"/>
-              <a:t>2/03/2024</a:t>
+              <a:t>6/03/2024</a:t>
             </a:fld>
             <a:endParaRPr lang="es-PE"/>
           </a:p>
@@ -7102,7 +7102,7 @@
           <a:p>
             <a:fld id="{7B14AA15-6390-4B76-91AD-6461C139DACF}" type="datetimeFigureOut">
               <a:rPr lang="es-PE" smtClean="0"/>
-              <a:t>2/03/2024</a:t>
+              <a:t>6/03/2024</a:t>
             </a:fld>
             <a:endParaRPr lang="es-PE"/>
           </a:p>
@@ -7389,7 +7389,7 @@
           <a:p>
             <a:fld id="{7B14AA15-6390-4B76-91AD-6461C139DACF}" type="datetimeFigureOut">
               <a:rPr lang="es-PE" smtClean="0"/>
-              <a:t>2/03/2024</a:t>
+              <a:t>6/03/2024</a:t>
             </a:fld>
             <a:endParaRPr lang="es-PE"/>
           </a:p>

</xml_diff>

<commit_message>
Change things due to "sex" instead of "gender"
</commit_message>
<xml_diff>
--- a/doc/diapositivas_sustentacion_tesis.pptx
+++ b/doc/diapositivas_sustentacion_tesis.pptx
@@ -676,7 +676,7 @@
           <a:p>
             <a:r>
               <a:rPr lang="es-MX" dirty="0"/>
-              <a:t>En la tabla se puede observar el número y la distribución de género de los postulantes al programa de </a:t>
+              <a:t>En la tabla se puede observar el número y la distribución de sexo de los postulantes al programa de </a:t>
             </a:r>
             <a:r>
               <a:rPr lang="es-MX" dirty="0" err="1"/>
@@ -690,19 +690,19 @@
           <a:p>
             <a:r>
               <a:rPr lang="es-MX" dirty="0"/>
-              <a:t>En los distintos años se encontró un elevado porcentaje de postulantes con género asignado con un rango de 88.6% a 95.5%. Se observa una disminución del porcentaje de personas con género asignado en los últimos años.</a:t>
+              <a:t>En los distintos años se encontró un elevado porcentaje de postulantes con sexo asignado con un rango de 88.6% a 95.5%. Se observa una disminución del porcentaje de personas con sexo asignado en los últimos años.</a:t>
             </a:r>
           </a:p>
           <a:p>
             <a:r>
               <a:rPr lang="es-MX" dirty="0"/>
-              <a:t>En cuanto a la distribución de género, se observa un incremento progresivo en el número relativo de mujeres. El porcentaje más alto de mujeres se alcanzó el año 2020 (50.1%).</a:t>
+              <a:t>En cuanto a la distribución de sexo, se observa un incremento progresivo en el número relativo de mujeres. El porcentaje más alto de mujeres se alcanzó el año 2020 (50.1%).</a:t>
             </a:r>
           </a:p>
           <a:p>
             <a:r>
               <a:rPr lang="es-MX" dirty="0"/>
-              <a:t>Para analizar la tendencia global de forma estadística se realizó un modelo de regresión logística en el cual la variable dependiente fue el género, mientras que la variable independiente fue el tiempo (años).</a:t>
+              <a:t>Para analizar la tendencia global de forma estadística se realizó un modelo de regresión logística en el cual la variable dependiente fue el sexo, mientras que la variable independiente fue el tiempo (años).</a:t>
             </a:r>
           </a:p>
           <a:p>
@@ -716,7 +716,7 @@
             </a:r>
             <a:r>
               <a:rPr lang="es-MX" dirty="0"/>
-              <a:t> ratio de 1.029 y un intervalo de confianza de 1.024 a 1.034. Por lo tanto, se encuentra significancia estadística en el cambio de la distribución de género con el pasar de los años y con una dirección hacia un mayor número de mujeres.</a:t>
+              <a:t> ratio de 1.029 y un intervalo de confianza de 1.024 a 1.034. Por lo tanto, se encuentra significancia estadística en el cambio de la distribución de sexo con el pasar de los años y con una dirección hacia un mayor número de mujeres.</a:t>
             </a:r>
           </a:p>
           <a:p>
@@ -851,7 +851,7 @@
                 <a:ea typeface="Calibri" panose="020F0502020204030204" pitchFamily="34" charset="0"/>
                 <a:cs typeface="Times New Roman" panose="02020603050405020304" pitchFamily="18" charset="0"/>
               </a:rPr>
-              <a:t>En la figura se observa la proporción de mujeres entre los postulantes a las especialidades que tuvieron una modificación de efecto sobre el año de postulación estadísticamente significativa, luego de incluir la interacción de la especialidad y el año de postulación en el modelo estadístico (regresión lineal) que tiene como variable dependiente (resultado) el género y como variables independientes (predictoras) el año de postulación y las especialidades.</a:t>
+              <a:t>En la figura se observa la proporción de mujeres entre los postulantes a las especialidades que tuvieron una modificación de efecto sobre el año de postulación estadísticamente significativa, luego de incluir la interacción de la especialidad y el año de postulación en el modelo estadístico (regresión lineal) que tiene como variable dependiente (resultado) el sexo y como variables independientes (predictoras) el año de postulación y las especialidades.</a:t>
             </a:r>
           </a:p>
           <a:p>
@@ -1006,7 +1006,7 @@
                 <a:ea typeface="Calibri" panose="020F0502020204030204" pitchFamily="34" charset="0"/>
                 <a:cs typeface="Times New Roman" panose="02020603050405020304" pitchFamily="18" charset="0"/>
               </a:rPr>
-              <a:t>también podemos notar que hay una diferencia entre las especialidades clínicas y quirúrgicas respecto al género de los postulantes. Para esto podemos agrupar las especialidades y comparar a las especialidades clínicas y las quirúrgicas.</a:t>
+              <a:t>también podemos notar que hay una diferencia entre las especialidades clínicas y quirúrgicas respecto al sexo de los postulantes. Para esto podemos agrupar las especialidades y comparar a las especialidades clínicas y las quirúrgicas.</a:t>
             </a:r>
           </a:p>
           <a:p>
@@ -1367,7 +1367,7 @@
                 <a:ea typeface="Calibri" panose="020F0502020204030204" pitchFamily="34" charset="0"/>
                 <a:cs typeface="Times New Roman" panose="02020603050405020304" pitchFamily="18" charset="0"/>
               </a:rPr>
-              <a:t>En la figura se observa el número de postulantes de género femenino al programa de </a:t>
+              <a:t>En la figura se observa el número de postulantes de sexo femenino al programa de </a:t>
             </a:r>
             <a:r>
               <a:rPr lang="es-PE" sz="1800" dirty="0" err="1">
@@ -1536,7 +1536,7 @@
                 <a:ea typeface="Calibri" panose="020F0502020204030204" pitchFamily="34" charset="0"/>
                 <a:cs typeface="Times New Roman" panose="02020603050405020304" pitchFamily="18" charset="0"/>
               </a:rPr>
-              <a:t>En la figura se representa lo mismo que en la figura anterior, pero para el género masculino. Se observa también una disminución de postulantes en los años 2020 y 2021. Se encontró que en el género masculino las especialidades quirúrgicas ocupan una mayor parte de las postulaciones, en comparación con el género femenino.</a:t>
+              <a:t>En la figura se representa lo mismo que en la figura anterior, pero para el sexo masculino. Se observa también una disminución de postulantes en los años 2020 y 2021. Se encontró que en el sexo masculino las especialidades quirúrgicas ocupan una mayor parte de las postulaciones, en comparación con el sexo femenino.</a:t>
             </a:r>
           </a:p>
         </p:txBody>
@@ -1788,7 +1788,7 @@
                 <a:ea typeface="Calibri" panose="020F0502020204030204" pitchFamily="34" charset="0"/>
                 <a:cs typeface="Times New Roman" panose="02020603050405020304" pitchFamily="18" charset="0"/>
               </a:rPr>
-              <a:t>En la figura se observa la distribución de género de ingresantes al programa de </a:t>
+              <a:t>En la figura se observa la distribución de sexo de ingresantes al programa de </a:t>
             </a:r>
             <a:r>
               <a:rPr lang="es-PE" sz="1800" dirty="0" err="1">
@@ -1828,7 +1828,7 @@
                 <a:ea typeface="Calibri" panose="020F0502020204030204" pitchFamily="34" charset="0"/>
                 <a:cs typeface="Times New Roman" panose="02020603050405020304" pitchFamily="18" charset="0"/>
               </a:rPr>
-              <a:t>Se observa que en el año 2020 hubo un menor número de ingresantes. No se aprecian diferencias notables en el gráfico en cuanto a la distribución de género. Atribuible a la pandemia por COVID-19.</a:t>
+              <a:t>Se observa que en el año 2020 hubo un menor número de ingresantes. No se aprecian diferencias notables en el gráfico en cuanto a la distribución de sexo. Atribuible a la pandemia por COVID-19.</a:t>
             </a:r>
           </a:p>
         </p:txBody>
@@ -2114,7 +2114,7 @@
                 <a:ea typeface="Calibri" panose="020F0502020204030204" pitchFamily="34" charset="0"/>
                 <a:cs typeface="Times New Roman" panose="02020603050405020304" pitchFamily="18" charset="0"/>
               </a:rPr>
-              <a:t>Entre los postulantes de género femenino se encontró que el porcentaje más alto de ingresantes fue en el año 2021, llegando a 51.5%, mientras que el porcentaje más bajo fue el último año, 2023, llegando a 33.2%.</a:t>
+              <a:t>Entre los postulantes de sexo femenino se encontró que el porcentaje más alto de ingresantes fue en el año 2021, llegando a 51.5%, mientras que el porcentaje más bajo fue el último año, 2023, llegando a 33.2%.</a:t>
             </a:r>
           </a:p>
           <a:p>
@@ -2136,7 +2136,7 @@
                 <a:ea typeface="Calibri" panose="020F0502020204030204" pitchFamily="34" charset="0"/>
                 <a:cs typeface="Times New Roman" panose="02020603050405020304" pitchFamily="18" charset="0"/>
               </a:rPr>
-              <a:t>Entre los postulantes de género masculino, se tuvo hallazgos similares. El porcentaje más alto fue en el año 2021, llegando a 49.6%, mientras que el porcentaje más bajo fue el último año, 2023, con 39.4%.</a:t>
+              <a:t>Entre los postulantes de sexo masculino, se tuvo hallazgos similares. El porcentaje más alto fue en el año 2021, llegando a 49.6%, mientras que el porcentaje más bajo fue el último año, 2023, con 39.4%.</a:t>
             </a:r>
           </a:p>
           <a:p>
@@ -2158,7 +2158,7 @@
                 <a:ea typeface="Calibri" panose="020F0502020204030204" pitchFamily="34" charset="0"/>
                 <a:cs typeface="Times New Roman" panose="02020603050405020304" pitchFamily="18" charset="0"/>
               </a:rPr>
-              <a:t>En la comparación global (incluyendo todos los años) entre ambos géneros se encontró que los postulantes de género masculino lograron ingresar en un 39.4%, mientras que en el género femenino lograron ingresar en un 38.7%.</a:t>
+              <a:t>En la comparación global (incluyendo todos los años) entre ambos sexos se encontró que los postulantes de sexo masculino lograron ingresar en un 39.4%, mientras que en el sexo femenino lograron ingresar en un 38.7%.</a:t>
             </a:r>
           </a:p>
         </p:txBody>
@@ -2378,7 +2378,7 @@
           <a:p>
             <a:r>
               <a:rPr lang="es-MX" dirty="0"/>
-              <a:t>En la figura se observa la distribución de género en los distintos años entre 2013 y 2023 de los postulantes al programa de </a:t>
+              <a:t>En la figura se observa la distribución de sexo en los distintos años entre 2013 y 2023 de los postulantes al programa de </a:t>
             </a:r>
             <a:r>
               <a:rPr lang="es-MX" dirty="0" err="1"/>
@@ -2490,7 +2490,7 @@
                 <a:ea typeface="Calibri" panose="020F0502020204030204" pitchFamily="34" charset="0"/>
                 <a:cs typeface="Times New Roman" panose="02020603050405020304" pitchFamily="18" charset="0"/>
               </a:rPr>
-              <a:t>En la figura se representa la distribución de género de acuerdo a región de postulación entre los postulantes al programa de </a:t>
+              <a:t>En la figura se representa la distribución de sexo de acuerdo a región de postulación entre los postulantes al programa de </a:t>
             </a:r>
             <a:r>
               <a:rPr lang="es-PE" sz="1800" dirty="0" err="1">
@@ -2530,7 +2530,7 @@
                 <a:ea typeface="Calibri" panose="020F0502020204030204" pitchFamily="34" charset="0"/>
                 <a:cs typeface="Times New Roman" panose="02020603050405020304" pitchFamily="18" charset="0"/>
               </a:rPr>
-              <a:t>Se observa que Lima es la región que abarca la mayoría de postulaciones, seguido del norte, el sur, el centro y finalmente el oriente. En cuanto a la distribución de género se encontró que en las distintas regiones predominó el género masculino entre los postulantes.</a:t>
+              <a:t>Se observa que Lima es la región que abarca la mayoría de postulaciones, seguido del norte, el sur, el centro y finalmente el oriente. En cuanto a la distribución de sexo se encontró que en las distintas regiones predominó el sexo masculino entre los postulantes.</a:t>
             </a:r>
           </a:p>
         </p:txBody>
@@ -2899,7 +2899,7 @@
                 <a:ea typeface="Calibri" panose="020F0502020204030204" pitchFamily="34" charset="0"/>
                 <a:cs typeface="Times New Roman" panose="02020603050405020304" pitchFamily="18" charset="0"/>
               </a:rPr>
-              <a:t>En la tabla se muestran los resultados de los coeficientes de la variable región de postulación en los modelos de regresión logística creados usando al género como variable dependiente y a la región de postulación y al tiempo (año de postulación) como variables independientes (predictoras). Se creó un modelo de regresión logística por cada región, comparando a esta región con el resto de regiones.</a:t>
+              <a:t>En la tabla se muestran los resultados de los coeficientes de la variable región de postulación en los modelos de regresión logística creados usando al sexo como variable dependiente y a la región de postulación y al tiempo (año de postulación) como variables independientes (predictoras). Se creó un modelo de regresión logística por cada región, comparando a esta región con el resto de regiones.</a:t>
             </a:r>
           </a:p>
           <a:p>
@@ -2933,13 +2933,13 @@
               <a:t>odds</a:t>
             </a:r>
             <a:r>
-              <a:rPr lang="es-PE" sz="1800">
+              <a:rPr lang="es-PE" sz="1800" dirty="0">
                 <a:effectLst/>
                 <a:latin typeface="Calibri" panose="020F0502020204030204" pitchFamily="34" charset="0"/>
                 <a:ea typeface="Calibri" panose="020F0502020204030204" pitchFamily="34" charset="0"/>
                 <a:cs typeface="Times New Roman" panose="02020603050405020304" pitchFamily="18" charset="0"/>
               </a:rPr>
-              <a:t> ratio del efecto de la región en el género, se observó un tamaño de efecto mayor en la región oriente (OR: 0.75).</a:t>
+              <a:t> ratio del efecto de la región en el sexo, se observó un tamaño de efecto mayor en la región oriente (OR: 0.75).</a:t>
             </a:r>
           </a:p>
         </p:txBody>
@@ -3035,7 +3035,7 @@
           <a:p>
             <a:r>
               <a:rPr lang="es-MX" dirty="0"/>
-              <a:t>En la tabla se representan el número y la distribución de género entre las 14 especialidades médicas con mayor porcentaje de género femenino de postulantes al </a:t>
+              <a:t>En la tabla se representan el número y la distribución de sexo entre las 14 especialidades médicas con mayor porcentaje de sexo femenino de postulantes al </a:t>
             </a:r>
             <a:r>
               <a:rPr lang="es-MX" dirty="0" err="1"/>
@@ -3049,7 +3049,7 @@
           <a:p>
             <a:r>
               <a:rPr lang="es-MX" dirty="0"/>
-              <a:t>Se observa que, entre estas especialidades médicas, solo se encontró una especialidad quirúrgica: cirugía pediátrica, con un 62.7% de postulantes de género femenino. Las demás especialidades fueron especialidades clínicas.</a:t>
+              <a:t>Se observa que, entre estas especialidades médicas, solo se encontró una especialidad quirúrgica: cirugía pediátrica, con un 62.7% de postulantes de sexo femenino. Las demás especialidades fueron especialidades clínicas.</a:t>
             </a:r>
           </a:p>
         </p:txBody>
@@ -3152,7 +3152,7 @@
                 <a:ea typeface="Calibri" panose="020F0502020204030204" pitchFamily="34" charset="0"/>
                 <a:cs typeface="Times New Roman" panose="02020603050405020304" pitchFamily="18" charset="0"/>
               </a:rPr>
-              <a:t>En la tabla se representan el número y la distribución de género entre las 14 especialidades médicas con mayor porcentaje de género masculino de postulantes al </a:t>
+              <a:t>En la tabla se representan el número y la distribución de sexo entre las 14 especialidades médicas con mayor porcentaje de sexo masculino de postulantes al </a:t>
             </a:r>
             <a:r>
               <a:rPr lang="es-PE" sz="1800" dirty="0" err="1">
@@ -3192,7 +3192,7 @@
                 <a:ea typeface="Calibri" panose="020F0502020204030204" pitchFamily="34" charset="0"/>
                 <a:cs typeface="Times New Roman" panose="02020603050405020304" pitchFamily="18" charset="0"/>
               </a:rPr>
-              <a:t>Se observa que, entre estas especialidades médicas, predominaron las especialidades quirúrgicas, habiendo 8 especialidades quirúrgicas entre las 14 y siendo las 5 primeras especialidades todas quirúrgicas, algo que contrasta con lo encontrado en las especialidades con mayor cantidad de postulantes de género femenino.</a:t>
+              <a:t>Se observa que, entre estas especialidades médicas, predominaron las especialidades quirúrgicas, habiendo 8 especialidades quirúrgicas entre las 14 y siendo las 5 primeras especialidades todas quirúrgicas, algo que contrasta con lo encontrado en las especialidades con mayor cantidad de postulantes de sexo femenino.</a:t>
             </a:r>
           </a:p>
           <a:p>
@@ -3214,7 +3214,7 @@
                 <a:ea typeface="Calibri" panose="020F0502020204030204" pitchFamily="34" charset="0"/>
                 <a:cs typeface="Times New Roman" panose="02020603050405020304" pitchFamily="18" charset="0"/>
               </a:rPr>
-              <a:t>La especialidad con mayor porcentaje de postulantes representada en la tabla fue ortopedia y traumatología, llegando a 88.7% de postulantes de género masculino.</a:t>
+              <a:t>La especialidad con mayor porcentaje de postulantes representada en la tabla fue ortopedia y traumatología, llegando a 88.7% de postulantes de sexo masculino.</a:t>
             </a:r>
           </a:p>
         </p:txBody>
@@ -3437,7 +3437,7 @@
                 <a:ea typeface="Calibri" panose="020F0502020204030204" pitchFamily="34" charset="0"/>
                 <a:cs typeface="Times New Roman" panose="02020603050405020304" pitchFamily="18" charset="0"/>
               </a:rPr>
-              <a:t> ratios entre aquellas con significancia estadística como predictoras del género entre los postulantes. Los </a:t>
+              <a:t> ratios entre aquellas con significancia estadística como predictoras del sexo entre los postulantes. Los </a:t>
             </a:r>
             <a:r>
               <a:rPr lang="es-PE" sz="1800" dirty="0" err="1">
@@ -3553,7 +3553,7 @@
                 <a:ea typeface="Calibri" panose="020F0502020204030204" pitchFamily="34" charset="0"/>
                 <a:cs typeface="Times New Roman" panose="02020603050405020304" pitchFamily="18" charset="0"/>
               </a:rPr>
-              <a:t> ratio superiores a uno (mayor número de postulantes de género femenino) fueron: pediatría, dermatología, medicina física y de rehabilitación, anestesiología, psiquiatría, endocrinología, patología clínica, geriatría, hematología, cirugía pediátrica, neonatología, oftalmología, medicina familiar y comunitaria, otorrinolaringología, endocrinología pediátrica, reumatología, administración y gestión en salud, medicina oncológica, medicina ocupacional, medicina legal, psiquiatría del niño y del adolescente, dermatología pediátrica, inmunología y alergia.</a:t>
+              <a:t> ratio superiores a uno (mayor número de postulantes de sexo femenino) fueron: pediatría, dermatología, medicina física y de rehabilitación, anestesiología, psiquiatría, endocrinología, patología clínica, geriatría, hematología, cirugía pediátrica, neonatología, oftalmología, medicina familiar y comunitaria, otorrinolaringología, endocrinología pediátrica, reumatología, administración y gestión en salud, medicina oncológica, medicina ocupacional, medicina legal, psiquiatría del niño y del adolescente, dermatología pediátrica, inmunología y alergia.</a:t>
             </a:r>
           </a:p>
         </p:txBody>
@@ -3680,7 +3680,7 @@
                 <a:ea typeface="Calibri" panose="020F0502020204030204" pitchFamily="34" charset="0"/>
                 <a:cs typeface="Times New Roman" panose="02020603050405020304" pitchFamily="18" charset="0"/>
               </a:rPr>
-              <a:t> ratios entre aquellas con significancia estadística como predictoras del género entre los postulantes. Los </a:t>
+              <a:t> ratios entre aquellas con significancia estadística como predictoras del sexo entre los postulantes. Los </a:t>
             </a:r>
             <a:r>
               <a:rPr lang="es-PE" sz="1800" dirty="0" err="1">
@@ -3796,7 +3796,7 @@
                 <a:ea typeface="Calibri" panose="020F0502020204030204" pitchFamily="34" charset="0"/>
                 <a:cs typeface="Times New Roman" panose="02020603050405020304" pitchFamily="18" charset="0"/>
               </a:rPr>
-              <a:t> ratio inferiores a uno (mayor número de postulantes de género masculino) fueron: ortopedia y traumatología, cirugía general, urología, neurocirugía, cardiología, cirugía de tórax y cardiovascular, cirugía plástica, cirugía oncológica, medicina intensiva, ginecología oncológica, cirugía </a:t>
+              <a:t> ratio inferiores a uno (mayor número de postulantes de sexo masculino) fueron: ortopedia y traumatología, cirugía general, urología, neurocirugía, cardiología, cirugía de tórax y cardiovascular, cirugía plástica, cirugía oncológica, medicina intensiva, ginecología oncológica, cirugía </a:t>
             </a:r>
             <a:r>
               <a:rPr lang="es-PE" sz="1800" dirty="0" err="1">
@@ -3993,7 +3993,7 @@
                 <a:ea typeface="Calibri" panose="020F0502020204030204" pitchFamily="34" charset="0"/>
                 <a:cs typeface="Times New Roman" panose="02020603050405020304" pitchFamily="18" charset="0"/>
               </a:rPr>
-              <a:t>Se puede observar que estas especialidades se caracterizan por tener una mayor proporción de postulantes de género femenino en comparación con la proporción global, también se observa que, en líneas generales, tienen más mujeres que hombres (líneas sobre la línea roja discontinua que indica igual número de postulantes de género femenino y masculino).</a:t>
+              <a:t>Se puede observar que estas especialidades se caracterizan por tener una mayor proporción de postulantes de sexo femenino en comparación con la proporción global, también se observa que, en líneas generales, tienen más mujeres que hombres (líneas sobre la línea roja discontinua que indica igual número de postulantes de sexo femenino y masculino).</a:t>
             </a:r>
           </a:p>
         </p:txBody>
@@ -4178,7 +4178,7 @@
                 <a:ea typeface="Calibri" panose="020F0502020204030204" pitchFamily="34" charset="0"/>
                 <a:cs typeface="Times New Roman" panose="02020603050405020304" pitchFamily="18" charset="0"/>
               </a:rPr>
-              <a:t>Se puede observar que estas especialidades se caracterizan por tener una menor proporción de postulantes de género femenino en comparación con la proporción global, también se observa que, en líneas generales, tienen menos mujeres que hombres (líneas por debajo de la línea roja discontinua que indica igual número de postulantes de género femenino y masculino).</a:t>
+              <a:t>Se puede observar que estas especialidades se caracterizan por tener una menor proporción de postulantes de sexo femenino en comparación con la proporción global, también se observa que, en líneas generales, tienen menos mujeres que hombres (líneas por debajo de la línea roja discontinua que indica igual número de postulantes de sexo femenino y masculino).</a:t>
             </a:r>
           </a:p>
         </p:txBody>
@@ -7938,7 +7938,7 @@
           <a:p>
             <a:r>
               <a:rPr lang="es-MX" sz="5400" dirty="0"/>
-              <a:t>Tendencias de género en postulantes e ingresantes al programa de </a:t>
+              <a:t>Tendencias de sexo en postulantes e ingresantes al programa de </a:t>
             </a:r>
             <a:r>
               <a:rPr lang="es-MX" sz="5400" dirty="0" err="1"/>
@@ -8040,7 +8040,7 @@
           <a:p>
             <a:r>
               <a:rPr lang="es-MX" dirty="0"/>
-              <a:t>Asignación de género</a:t>
+              <a:t>Asignación de sexo</a:t>
             </a:r>
             <a:endParaRPr lang="es-PE" dirty="0"/>
           </a:p>
@@ -8069,20 +8069,20 @@
           <a:p>
             <a:r>
               <a:rPr lang="es-MX" dirty="0"/>
-              <a:t>Al no contar con información directa sobre el género en estas bases de datos se optó por obtener el género a partir del primer nombre como equivalente.</a:t>
+              <a:t>Al no contar con información directa sobre el sexo en estas bases de datos se optó por obtener el sexo a partir del primer nombre como equivalente.</a:t>
             </a:r>
             <a:endParaRPr lang="es-PE" dirty="0"/>
           </a:p>
           <a:p>
             <a:r>
               <a:rPr lang="es-PE" dirty="0"/>
-              <a:t>Se usó una base de datos con el género de acuerdo al primer nombre, se complementó manualmente con otros primeros nombres con género conocido populares. Ante ambigüedad se optó por excluir esos nombres (no se asignó género).</a:t>
+              <a:t>Se usó una base de datos con el sexo de acuerdo al primer nombre, se complementó manualmente con otros primeros nombres con sexo conocido populares. Ante ambigüedad se optó por excluir esos nombres (no se asignó sexo).</a:t>
             </a:r>
           </a:p>
           <a:p>
             <a:r>
               <a:rPr lang="es-PE" dirty="0"/>
-              <a:t>Se armó un diccionario con la que se realizó la asignación de géneros a los nombres de la base de datos.</a:t>
+              <a:t>Se armó un diccionario con la que se realizó la asignación de sexos a los nombres de la base de datos.</a:t>
             </a:r>
             <a:endParaRPr lang="es-MX" dirty="0"/>
           </a:p>
@@ -8204,7 +8204,7 @@
             <a:pPr lvl="1"/>
             <a:r>
               <a:rPr lang="es-MX" dirty="0"/>
-              <a:t>Género</a:t>
+              <a:t>Sexo</a:t>
             </a:r>
           </a:p>
           <a:p>
@@ -8304,13 +8304,13 @@
           <a:p>
             <a:r>
               <a:rPr lang="es-MX" dirty="0"/>
-              <a:t>Se determinó el número de postulantes con género asignado mediante el método previamente descrito.</a:t>
+              <a:t>Se determinó el número de postulantes con sexo asignado mediante el método previamente descrito.</a:t>
             </a:r>
           </a:p>
           <a:p>
             <a:r>
               <a:rPr lang="es-MX" dirty="0"/>
-              <a:t>Se obtuvieron datos de la distribución de género: números absolutos y proporciones.</a:t>
+              <a:t>Se obtuvieron datos de la distribución de sexo: números absolutos y proporciones.</a:t>
             </a:r>
           </a:p>
           <a:p>
@@ -8322,7 +8322,7 @@
           <a:p>
             <a:r>
               <a:rPr lang="es-MX" dirty="0"/>
-              <a:t>Para el análisis de las tendencias de género se incluyó la interacción de la especialidad médica con el año de postulación en el modelo estadístico de regresión logística.</a:t>
+              <a:t>Para el análisis de las tendencias de sexo se incluyó la interacción de la especialidad médica con el año de postulación en el modelo estadístico de regresión logística.</a:t>
             </a:r>
           </a:p>
           <a:p>
@@ -8508,13 +8508,13 @@
           <a:p>
             <a:r>
               <a:rPr lang="es-MX" dirty="0"/>
-              <a:t>Se asignó el género al 62093 (92.7%)</a:t>
+              <a:t>Se asignó el sexo al 62093 (92.7%)</a:t>
             </a:r>
           </a:p>
           <a:p>
             <a:r>
               <a:rPr lang="es-MX" dirty="0"/>
-              <a:t>28778 postulantes de género femenino (46.35%), 33315 de género masculino (53.65%).</a:t>
+              <a:t>28778 postulantes de sexo femenino (46.35%), 33315 de sexo masculino (53.65%).</a:t>
             </a:r>
             <a:endParaRPr lang="es-PE" dirty="0"/>
           </a:p>
@@ -8575,7 +8575,7 @@
           <a:p>
             <a:r>
               <a:rPr lang="es-MX" dirty="0"/>
-              <a:t>Número y distribución de género de los postulantes en los diferentes años</a:t>
+              <a:t>Número y distribución de sexo de los postulantes en los diferentes años</a:t>
             </a:r>
             <a:endParaRPr lang="es-PE" dirty="0"/>
           </a:p>
@@ -8724,12 +8724,12 @@
                         </a:spcAft>
                       </a:pPr>
                       <a:r>
-                        <a:rPr lang="es-PE" sz="1400">
-                          <a:effectLst/>
-                        </a:rPr>
-                        <a:t>Postulantes con género asignado</a:t>
-                      </a:r>
-                      <a:endParaRPr lang="es-PE" sz="1400">
+                        <a:rPr lang="es-PE" sz="1400" dirty="0">
+                          <a:effectLst/>
+                        </a:rPr>
+                        <a:t>Postulantes con sexo asignado</a:t>
+                      </a:r>
+                      <a:endParaRPr lang="es-PE" sz="1400" dirty="0">
                         <a:effectLst/>
                         <a:latin typeface="Calibri" panose="020F0502020204030204" pitchFamily="34" charset="0"/>
                         <a:ea typeface="Calibri" panose="020F0502020204030204" pitchFamily="34" charset="0"/>
@@ -8756,12 +8756,12 @@
                         </a:spcAft>
                       </a:pPr>
                       <a:r>
-                        <a:rPr lang="es-PE" sz="1400">
-                          <a:effectLst/>
-                        </a:rPr>
-                        <a:t>Postulantes de género femenino</a:t>
-                      </a:r>
-                      <a:endParaRPr lang="es-PE" sz="1400">
+                        <a:rPr lang="es-PE" sz="1400" dirty="0">
+                          <a:effectLst/>
+                        </a:rPr>
+                        <a:t>Postulantes de sexo femenino</a:t>
+                      </a:r>
+                      <a:endParaRPr lang="es-PE" sz="1400" dirty="0">
                         <a:effectLst/>
                         <a:latin typeface="Calibri" panose="020F0502020204030204" pitchFamily="34" charset="0"/>
                         <a:ea typeface="Calibri" panose="020F0502020204030204" pitchFamily="34" charset="0"/>
@@ -10319,7 +10319,7 @@
           <a:p>
             <a:r>
               <a:rPr lang="es-MX" dirty="0"/>
-              <a:t>Distribución de género en los distintos años de los postulantes </a:t>
+              <a:t>Distribución de sexo en los distintos años de los postulantes </a:t>
             </a:r>
             <a:endParaRPr lang="es-PE" dirty="0"/>
           </a:p>
@@ -10327,10 +10327,10 @@
       </p:sp>
       <p:pic>
         <p:nvPicPr>
-          <p:cNvPr id="4" name="Marcador de contenido 3">
+          <p:cNvPr id="7" name="Marcador de contenido 6">
             <a:extLst>
               <a:ext uri="{FF2B5EF4-FFF2-40B4-BE49-F238E27FC236}">
-                <a16:creationId xmlns:a16="http://schemas.microsoft.com/office/drawing/2014/main" id="{C19E3F18-D327-B6A0-2614-8933482E6900}"/>
+                <a16:creationId xmlns:a16="http://schemas.microsoft.com/office/drawing/2014/main" id="{20258A6A-DC4C-AF81-C812-AF94A3948209}"/>
               </a:ext>
             </a:extLst>
           </p:cNvPr>
@@ -10342,7 +10342,7 @@
           </p:nvPr>
         </p:nvPicPr>
         <p:blipFill>
-          <a:blip r:embed="rId3" cstate="print">
+          <a:blip r:embed="rId3">
             <a:extLst>
               <a:ext uri="{28A0092B-C50C-407E-A947-70E740481C1C}">
                 <a14:useLocalDpi xmlns:a14="http://schemas.microsoft.com/office/drawing/2010/main" val="0"/>
@@ -10356,8 +10356,8 @@
         </p:blipFill>
         <p:spPr bwMode="auto">
           <a:xfrm>
-            <a:off x="2816121" y="2001705"/>
-            <a:ext cx="6620718" cy="4089567"/>
+            <a:off x="2610723" y="1955991"/>
+            <a:ext cx="6970554" cy="4302811"/>
           </a:xfrm>
           <a:prstGeom prst="rect">
             <a:avLst/>
@@ -10513,7 +10513,7 @@
           <a:p>
             <a:r>
               <a:rPr lang="es-MX" sz="3400" dirty="0"/>
-              <a:t>Número y distribución de género entre especialidades con mayor porcentaje de género femenino entre postulantes</a:t>
+              <a:t>Número y distribución de sexo entre especialidades con mayor porcentaje de sexo femenino entre postulantes</a:t>
             </a:r>
             <a:endParaRPr lang="es-PE" sz="3400" dirty="0"/>
           </a:p>
@@ -10676,12 +10676,12 @@
                         </a:spcAft>
                       </a:pPr>
                       <a:r>
-                        <a:rPr lang="es-PE" sz="1200">
-                          <a:effectLst/>
-                        </a:rPr>
-                        <a:t>Postulantes con género asignado</a:t>
-                      </a:r>
-                      <a:endParaRPr lang="es-PE" sz="2000">
+                        <a:rPr lang="es-PE" sz="1200" dirty="0">
+                          <a:effectLst/>
+                        </a:rPr>
+                        <a:t>Postulantes con sexo asignado</a:t>
+                      </a:r>
+                      <a:endParaRPr lang="es-PE" sz="2000" dirty="0">
                         <a:effectLst/>
                         <a:latin typeface="Calibri" panose="020F0502020204030204" pitchFamily="34" charset="0"/>
                         <a:ea typeface="Calibri" panose="020F0502020204030204" pitchFamily="34" charset="0"/>
@@ -10721,7 +10721,7 @@
                         <a:rPr lang="es-PE" sz="1200" dirty="0">
                           <a:effectLst/>
                         </a:rPr>
-                        <a:t>Postulantes de género femenino</a:t>
+                        <a:t>Postulantes de sexo femenino</a:t>
                       </a:r>
                       <a:endParaRPr lang="es-PE" sz="2000" dirty="0">
                         <a:effectLst/>
@@ -13056,7 +13056,7 @@
           <a:p>
             <a:r>
               <a:rPr lang="es-MX" sz="3400" dirty="0"/>
-              <a:t>Número y distribución de género entre especialidades con mayor porcentaje de género masculino entre postulantes</a:t>
+              <a:t>Número y distribución de sexo entre especialidades con mayor porcentaje de sexo masculino entre postulantes</a:t>
             </a:r>
             <a:endParaRPr lang="es-PE" sz="3400" dirty="0"/>
           </a:p>
@@ -13219,12 +13219,12 @@
                         </a:spcAft>
                       </a:pPr>
                       <a:r>
-                        <a:rPr lang="es-PE" sz="1200">
-                          <a:effectLst/>
-                        </a:rPr>
-                        <a:t>Postulantes con género asignado</a:t>
-                      </a:r>
-                      <a:endParaRPr lang="es-PE" sz="1200">
+                        <a:rPr lang="es-PE" sz="1200" dirty="0">
+                          <a:effectLst/>
+                        </a:rPr>
+                        <a:t>Postulantes con sexo asignado</a:t>
+                      </a:r>
+                      <a:endParaRPr lang="es-PE" sz="1200" dirty="0">
                         <a:effectLst/>
                         <a:latin typeface="Calibri" panose="020F0502020204030204" pitchFamily="34" charset="0"/>
                         <a:ea typeface="Calibri" panose="020F0502020204030204" pitchFamily="34" charset="0"/>
@@ -13261,12 +13261,12 @@
                         </a:spcAft>
                       </a:pPr>
                       <a:r>
-                        <a:rPr lang="es-PE" sz="1200">
-                          <a:effectLst/>
-                        </a:rPr>
-                        <a:t>Postulantes de género femenino</a:t>
-                      </a:r>
-                      <a:endParaRPr lang="es-PE" sz="1200">
+                        <a:rPr lang="es-PE" sz="1200" dirty="0">
+                          <a:effectLst/>
+                        </a:rPr>
+                        <a:t>Postulantes de sexo femenino</a:t>
+                      </a:r>
+                      <a:endParaRPr lang="es-PE" sz="1200" dirty="0">
                         <a:effectLst/>
                         <a:latin typeface="Calibri" panose="020F0502020204030204" pitchFamily="34" charset="0"/>
                         <a:ea typeface="Calibri" panose="020F0502020204030204" pitchFamily="34" charset="0"/>
@@ -15759,7 +15759,7 @@
           <a:p>
             <a:r>
               <a:rPr lang="es-MX" dirty="0"/>
-              <a:t>Llama la atención que entre las especialidades con mayor porcentaje de postulantes de género femenino solo hay una especialidad quirúrgica: cirugía pediátrica.</a:t>
+              <a:t>Llama la atención que entre las especialidades con mayor porcentaje de postulantes de sexo femenino solo hay una especialidad quirúrgica: cirugía pediátrica.</a:t>
             </a:r>
           </a:p>
         </p:txBody>
@@ -16027,7 +16027,7 @@
           <a:p>
             <a:r>
               <a:rPr lang="es-MX" dirty="0"/>
-              <a:t>Por el contrario, entre las especialidades con mayor porcentaje de postulantes de género masculino predominaron las quirúrgicas: ortopedia y traumatología (88.7% de postulantes de género masculino), seguida de urología (81.5%), neurocirugía (78.3%), cirugía de tórax y cardiovascular (76.7%), cirugía general (73.2%), cirugía oncológica (72.9%). Cardiología fue la especialidad clínica con mayor porcentaje de postulantes de género masculino (excluyendo subespecialidades), con un 69.8%.</a:t>
+              <a:t>Por el contrario, entre las especialidades con mayor porcentaje de postulantes de sexo masculino predominaron las quirúrgicas: ortopedia y traumatología (88.7% de postulantes de sexo masculino), seguida de urología (81.5%), neurocirugía (78.3%), cirugía de tórax y cardiovascular (76.7%), cirugía general (73.2%), cirugía oncológica (72.9%). Cardiología fue la especialidad clínica con mayor porcentaje de postulantes de sexo masculino (excluyendo subespecialidades), con un 69.8%.</a:t>
             </a:r>
             <a:endParaRPr lang="es-PE" dirty="0"/>
           </a:p>
@@ -16736,7 +16736,7 @@
           <a:p>
             <a:r>
               <a:rPr lang="es-MX" sz="1400" dirty="0"/>
-              <a:t>Resultado: género</a:t>
+              <a:t>Resultado: sexo</a:t>
             </a:r>
           </a:p>
           <a:p>
@@ -17014,7 +17014,7 @@
             </a:pPr>
             <a:r>
               <a:rPr lang="es-MX" dirty="0"/>
-              <a:t>Predominancia relativa de género femenino</a:t>
+              <a:t>Predominancia relativa de sexo femenino</a:t>
             </a:r>
             <a:br>
               <a:rPr lang="es-MX" dirty="0"/>
@@ -17293,7 +17293,7 @@
             </a:pPr>
             <a:r>
               <a:rPr lang="es-MX" dirty="0"/>
-              <a:t>Predominancia relativa de género masculino</a:t>
+              <a:t>Predominancia relativa de sexo masculino</a:t>
             </a:r>
             <a:br>
               <a:rPr lang="es-MX" dirty="0"/>
@@ -21868,7 +21868,7 @@
           <a:p>
             <a:r>
               <a:rPr lang="es-MX" dirty="0"/>
-              <a:t>Entre estas especialidades encontradas se encuentra un patrón similar al encontrado anteriormente analizando solamente las proporciones de género.</a:t>
+              <a:t>Entre estas especialidades encontradas se encuentra un patrón similar al encontrado anteriormente analizando solamente las proporciones de sexo.</a:t>
             </a:r>
             <a:endParaRPr lang="es-PE" dirty="0"/>
           </a:p>
@@ -22481,7 +22481,7 @@
           <a:p>
             <a:r>
               <a:rPr lang="es-MX" dirty="0"/>
-              <a:t>Resultados: tendencias de género</a:t>
+              <a:t>Resultados: tendencias de sexo</a:t>
             </a:r>
             <a:endParaRPr lang="es-PE" dirty="0"/>
           </a:p>
@@ -22632,7 +22632,7 @@
           <a:p>
             <a:r>
               <a:rPr lang="es-MX" dirty="0"/>
-              <a:t>Para esto se realizó un modelo estadístico (regresión logística) en el que se tenía al género como variable dependiente (de resultado) y al año de postulación y especialidad como variables independientes (predictoras), se encontró que el coeficiente del año de postulación era estadísticamente significativo y con un </a:t>
+              <a:t>Para esto se realizó un modelo estadístico (regresión logística) en el que se tenía al sexo como variable dependiente (de resultado) y al año de postulación y especialidad como variables independientes (predictoras), se encontró que el coeficiente del año de postulación era estadísticamente significativo y con un </a:t>
             </a:r>
             <a:r>
               <a:rPr lang="es-MX" dirty="0" err="1"/>
@@ -22715,7 +22715,7 @@
           <a:p>
             <a:r>
               <a:rPr lang="es-MX" sz="2800" dirty="0"/>
-              <a:t>Proporción de postulantes de género femenino de especialidades con más postulantes entre aquellas que presentaban significancia estadística y un </a:t>
+              <a:t>Proporción de postulantes de sexo femenino de especialidades con más postulantes entre aquellas que presentaban significancia estadística y un </a:t>
             </a:r>
             <a:r>
               <a:rPr lang="es-MX" sz="2800" dirty="0" err="1"/>
@@ -22833,7 +22833,7 @@
           <a:p>
             <a:r>
               <a:rPr lang="es-MX" sz="2800" dirty="0"/>
-              <a:t>Proporción de postulantes de género femenino de especialidades médicas con más postulantes entre aquellas que presentaban significancia estadística y un </a:t>
+              <a:t>Proporción de postulantes de sexo femenino de especialidades médicas con más postulantes entre aquellas que presentaban significancia estadística y un </a:t>
             </a:r>
             <a:r>
               <a:rPr lang="es-MX" sz="2800" dirty="0" err="1"/>
@@ -22950,7 +22950,7 @@
           <a:p>
             <a:r>
               <a:rPr lang="es-MX" dirty="0"/>
-              <a:t>Ahora, para determinar si esta tendencia es la misma en todas las especialidades o es una tendencia heterogénea se optó por realizar también una regresión logística en la cual se agregaba a la posible modificación del efecto del tiempo sobre el género por las distintas especialidades.</a:t>
+              <a:t>Ahora, para determinar si esta tendencia es la misma en todas las especialidades o es una tendencia heterogénea se optó por realizar también una regresión logística en la cual se agregaba a la posible modificación del efecto del tiempo sobre el sexo por las distintas especialidades.</a:t>
             </a:r>
           </a:p>
           <a:p>
@@ -23133,7 +23133,7 @@
           <a:p>
             <a:r>
               <a:rPr lang="es-MX" sz="3200" dirty="0"/>
-              <a:t>Proporción de postulantes de género femenino de las especialidades que tuvieron una modificación de efecto sobre el año de postulación estadísticamente significativa</a:t>
+              <a:t>Proporción de postulantes de sexo femenino de las especialidades que tuvieron una modificación de efecto sobre el año de postulación estadísticamente significativa</a:t>
             </a:r>
             <a:endParaRPr lang="es-PE" sz="3200" dirty="0"/>
           </a:p>
@@ -23352,7 +23352,7 @@
           <a:p>
             <a:r>
               <a:rPr lang="es-PE" sz="4000" dirty="0"/>
-              <a:t>Proporción de postulantes de género femenino separada por especialidades clínicas y quirúrgicas</a:t>
+              <a:t>Proporción de postulantes de sexo femenino separada por especialidades clínicas y quirúrgicas</a:t>
             </a:r>
           </a:p>
         </p:txBody>
@@ -23458,7 +23458,7 @@
           <a:p>
             <a:r>
               <a:rPr lang="es-MX" dirty="0"/>
-              <a:t>Se realizó un modelo de regresión logística en el que se tenía al género como variable dependiente (de resultado) y al tipo de especialidad (clínica vs. quirúrgica) y al año de postulación como variables independientes (predictoras).</a:t>
+              <a:t>Se realizó un modelo de regresión logística en el que se tenía al sexo como variable dependiente (de resultado) y al tipo de especialidad (clínica vs. quirúrgica) y al año de postulación como variables independientes (predictoras).</a:t>
             </a:r>
           </a:p>
           <a:p>
@@ -23478,7 +23478,7 @@
           <a:p>
             <a:r>
               <a:rPr lang="es-MX" dirty="0"/>
-              <a:t>También se realizó un modelo en el que se incorporaba la posible modificación de efecto del tipo de especialidad sobre el efecto del año de postulación en el género. Sin embargo, no se obtuvo una significancia estadística (valor de p de la interacción: 0.054). Esto indica que, a pesar de las grandes diferencias en la distribución de género, la tendencia de las especialidades clínicas y las especialidades quirúrgicas es similar. Esto también puede observarse en la figura 6, donde se observa que las líneas hasta parecen paralelas entre sí.</a:t>
+              <a:t>También se realizó un modelo en el que se incorporaba la posible modificación de efecto del tipo de especialidad sobre el efecto del año de postulación en el sexo. Sin embargo, no se obtuvo una significancia estadística (valor de p de la interacción: 0.054). Esto indica que, a pesar de las grandes diferencias en la distribución de sexo, la tendencia de las especialidades clínicas y las especialidades quirúrgicas es similar. Esto también puede observarse en la figura 6, donde se observa que las líneas hasta parecen paralelas entre sí.</a:t>
             </a:r>
             <a:endParaRPr lang="es-PE" dirty="0"/>
           </a:p>
@@ -23545,7 +23545,7 @@
           <a:p>
             <a:r>
               <a:rPr lang="es-PE" dirty="0"/>
-              <a:t>Número de postulantes de género femenino a especialidades clínicas y quirúrgicas</a:t>
+              <a:t>Número de postulantes de sexo femenino a especialidades clínicas y quirúrgicas</a:t>
             </a:r>
           </a:p>
         </p:txBody>
@@ -23654,7 +23654,7 @@
           <a:p>
             <a:r>
               <a:rPr lang="es-PE" dirty="0"/>
-              <a:t>Número de postulantes de género masculino a especialidades clínicas y quirúrgicas</a:t>
+              <a:t>Número de postulantes de sexo masculino a especialidades clínicas y quirúrgicas</a:t>
             </a:r>
           </a:p>
         </p:txBody>
@@ -23760,19 +23760,19 @@
           <a:p>
             <a:r>
               <a:rPr lang="es-MX" dirty="0"/>
-              <a:t>Ahora, si comparamos la predilección por la postulación a especialidades clínicas o quirúrgicas entre los postulantes de género femenino y masculino, encontramos que consistentemente los postulantes de género femenino tienen porcentajes más bajos de postulación a especialidades quirúrgicas.</a:t>
+              <a:t>Ahora, si comparamos la predilección por la postulación a especialidades clínicas o quirúrgicas entre los postulantes de sexo femenino y masculino, encontramos que consistentemente los postulantes de sexo femenino tienen porcentajes más bajos de postulación a especialidades quirúrgicas.</a:t>
             </a:r>
           </a:p>
           <a:p>
             <a:r>
               <a:rPr lang="es-MX" dirty="0"/>
-              <a:t>El porcentaje más alto de postulación a especialidades quirúrgicas entre los postulantes de género femenino fue alcanzado el año 2023, con 35.7%, mientras que el de los postulantes de género masculino fue el año 2022, con 56.8%. Incluso, el año con menor porcentaje de postulación a especialidades quirúrgicas de los postulantes de género masculino fue el año 2013, con 45.8%, porcentaje superior al mayor porcentaje en el género femenino.</a:t>
+              <a:t>El porcentaje más alto de postulación a especialidades quirúrgicas entre los postulantes de sexo femenino fue alcanzado el año 2023, con 35.7%, mientras que el de los postulantes de sexo masculino fue el año 2022, con 56.8%. Incluso, el año con menor porcentaje de postulación a especialidades quirúrgicas de los postulantes de sexo masculino fue el año 2013, con 45.8%, porcentaje superior al mayor porcentaje en el sexo femenino.</a:t>
             </a:r>
           </a:p>
           <a:p>
             <a:r>
               <a:rPr lang="es-MX" dirty="0"/>
-              <a:t>Esto indica la amplia diferencia en cuanto a la predilección por las especialidades quirúrgicas del género masculino.</a:t>
+              <a:t>Esto indica la amplia diferencia en cuanto a la predilección por las especialidades quirúrgicas del sexo masculino.</a:t>
             </a:r>
             <a:endParaRPr lang="es-PE" dirty="0"/>
           </a:p>
@@ -24153,7 +24153,7 @@
           <a:p>
             <a:r>
               <a:rPr lang="es-PE" dirty="0"/>
-              <a:t>No existe a la fecha un estudio sobre el género de los postulantes a los programas de </a:t>
+              <a:t>No existe a la fecha un estudio sobre el sexo de los postulantes a los programas de </a:t>
             </a:r>
             <a:r>
               <a:rPr lang="es-PE" dirty="0" err="1"/>
@@ -24221,7 +24221,7 @@
           <a:p>
             <a:r>
               <a:rPr lang="es-MX" dirty="0"/>
-              <a:t>Distribución de género de ingresantes en los distintos años</a:t>
+              <a:t>Distribución de sexo de ingresantes en los distintos años</a:t>
             </a:r>
             <a:endParaRPr lang="es-PE" dirty="0"/>
           </a:p>
@@ -24229,10 +24229,10 @@
       </p:sp>
       <p:pic>
         <p:nvPicPr>
-          <p:cNvPr id="4" name="Marcador de contenido 3">
+          <p:cNvPr id="6" name="Marcador de contenido 5">
             <a:extLst>
               <a:ext uri="{FF2B5EF4-FFF2-40B4-BE49-F238E27FC236}">
-                <a16:creationId xmlns:a16="http://schemas.microsoft.com/office/drawing/2014/main" id="{2F7E5C8E-AEAA-0696-2F5A-25C51BF795FE}"/>
+                <a16:creationId xmlns:a16="http://schemas.microsoft.com/office/drawing/2014/main" id="{AD6621BC-6F4A-4F25-69BB-F5D980827700}"/>
               </a:ext>
             </a:extLst>
           </p:cNvPr>
@@ -24244,7 +24244,7 @@
           </p:nvPr>
         </p:nvPicPr>
         <p:blipFill>
-          <a:blip r:embed="rId3" cstate="print">
+          <a:blip r:embed="rId3">
             <a:extLst>
               <a:ext uri="{28A0092B-C50C-407E-A947-70E740481C1C}">
                 <a14:useLocalDpi xmlns:a14="http://schemas.microsoft.com/office/drawing/2010/main" val="0"/>
@@ -24258,8 +24258,8 @@
         </p:blipFill>
         <p:spPr bwMode="auto">
           <a:xfrm>
-            <a:off x="2840340" y="2079116"/>
-            <a:ext cx="6511319" cy="4021991"/>
+            <a:off x="2884725" y="2050756"/>
+            <a:ext cx="6422549" cy="3964536"/>
           </a:xfrm>
           <a:prstGeom prst="rect">
             <a:avLst/>
@@ -24644,12 +24644,12 @@
                         </a:spcAft>
                       </a:pPr>
                       <a:r>
-                        <a:rPr lang="es-PE" sz="1400">
-                          <a:effectLst/>
-                        </a:rPr>
-                        <a:t>Postulantes de género femenino</a:t>
-                      </a:r>
-                      <a:endParaRPr lang="es-PE" sz="1400">
+                        <a:rPr lang="es-PE" sz="1400" dirty="0">
+                          <a:effectLst/>
+                        </a:rPr>
+                        <a:t>Postulantes de sexo femenino</a:t>
+                      </a:r>
+                      <a:endParaRPr lang="es-PE" sz="1400" dirty="0">
                         <a:effectLst/>
                         <a:latin typeface="Calibri" panose="020F0502020204030204" pitchFamily="34" charset="0"/>
                         <a:ea typeface="Calibri" panose="020F0502020204030204" pitchFamily="34" charset="0"/>
@@ -24706,12 +24706,12 @@
                         </a:spcAft>
                       </a:pPr>
                       <a:r>
-                        <a:rPr lang="es-PE" sz="1400">
-                          <a:effectLst/>
-                        </a:rPr>
-                        <a:t>Postulantes de género masculino</a:t>
-                      </a:r>
-                      <a:endParaRPr lang="es-PE" sz="1400">
+                        <a:rPr lang="es-PE" sz="1400" dirty="0">
+                          <a:effectLst/>
+                        </a:rPr>
+                        <a:t>Postulantes de sexo masculino</a:t>
+                      </a:r>
+                      <a:endParaRPr lang="es-PE" sz="1400" dirty="0">
                         <a:effectLst/>
                         <a:latin typeface="Calibri" panose="020F0502020204030204" pitchFamily="34" charset="0"/>
                         <a:ea typeface="Calibri" panose="020F0502020204030204" pitchFamily="34" charset="0"/>
@@ -28246,7 +28246,7 @@
           <a:p>
             <a:r>
               <a:rPr lang="es-MX" dirty="0"/>
-              <a:t>En relación al porcentaje de ingresantes de género femenino o masculino se encontró que hubo más porcentaje de ingresantes de género masculino en todos los años, con excepción del año 2020, año en el que se encontró que hubo la misma cantidad de ingresantes de género femenino y masculino. Se aprecia que desde el año 2019 la diferencia se reduce en comparación a años anteriores. </a:t>
+              <a:t>En relación al porcentaje de ingresantes de sexo femenino o masculino se encontró que hubo más porcentaje de ingresantes de sexo masculino en todos los años, con excepción del año 2020, año en el que se encontró que hubo la misma cantidad de ingresantes de sexo femenino y masculino. Se aprecia que desde el año 2019 la diferencia se reduce en comparación a años anteriores. </a:t>
             </a:r>
             <a:endParaRPr lang="es-PE" dirty="0"/>
           </a:p>
@@ -28310,7 +28310,7 @@
           <a:p>
             <a:r>
               <a:rPr lang="es-MX" dirty="0"/>
-              <a:t>Para determinar si para los ingresantes el año de postulación es también estadísticamente significativo como predictor del género de los ingresantes se realizó un modelo de regresión logística con el género como variable dependiente (resultado) y el año de postulación y la especialidad como variables independientes (predictoras). Se obtuvo también significancia estadística (valor de p del coeficiente del año de postulación: 2.146297-08, con un </a:t>
+              <a:t>Para determinar si para los ingresantes el año de postulación es también estadísticamente significativo como predictor del sexo de los ingresantes se realizó un modelo de regresión logística con el sexo como variable dependiente (resultado) y el año de postulación y la especialidad como variables independientes (predictoras). Se obtuvo también significancia estadística (valor de p del coeficiente del año de postulación: 2.146297-08, con un </a:t>
             </a:r>
             <a:r>
               <a:rPr lang="es-MX" dirty="0" err="1"/>
@@ -28392,25 +28392,25 @@
           <a:p>
             <a:r>
               <a:rPr lang="es-MX" dirty="0"/>
-              <a:t>Ahora, queda una duda sobre la relación entre los postulantes y los ingresantes. La duda es si existe alguna diferencia en el resultado de postulación entre el género femenino y masculino. Es decir, ¿hay alguna diferencia en el éxito de la postulación entre postulantes de género femenino y masculino?</a:t>
+              <a:t>Ahora, queda una duda sobre la relación entre los postulantes y los ingresantes. La duda es si existe alguna diferencia en el resultado de postulación entre el sexo femenino y masculino. Es decir, ¿hay alguna diferencia en el éxito de la postulación entre postulantes de sexo femenino y masculino?</a:t>
             </a:r>
           </a:p>
           <a:p>
             <a:r>
               <a:rPr lang="es-MX" dirty="0"/>
-              <a:t>Para esto se analizaron las diferencias en el porcentaje de ingresantes (entre los postulantes) en el género femenino y masculino y se compararon estos resultados.</a:t>
+              <a:t>Para esto se analizaron las diferencias en el porcentaje de ingresantes (entre los postulantes) en el sexo femenino y masculino y se compararon estos resultados.</a:t>
             </a:r>
           </a:p>
           <a:p>
             <a:r>
               <a:rPr lang="es-MX" dirty="0"/>
-              <a:t>Se pueden observar resultados similares entre los géneros en los diferentes años y también en el porcentaje total de ingreso. Para determinar si las diferencias fueron estadísticamente significativas se realizó una prueba estadística (regresión logística) en la que se tuvo al resultado de la postulación (ingreso vs. no ingreso) como variable dependiente (de resultado), y se tuvo al género y al año de postulación como variables independientes (predictoras).</a:t>
+              <a:t>Se pueden observar resultados similares entre los sexos en los diferentes años y también en el porcentaje total de ingreso. Para determinar si las diferencias fueron estadísticamente significativas se realizó una prueba estadística (regresión logística) en la que se tuvo al resultado de la postulación (ingreso vs. no ingreso) como variable dependiente (de resultado), y se tuvo al sexo y al año de postulación como variables independientes (predictoras).</a:t>
             </a:r>
           </a:p>
           <a:p>
             <a:r>
               <a:rPr lang="es-MX" dirty="0"/>
-              <a:t>Se obtuvo que el coeficiente del género (ajustado al año de postulación) no fue estadísticamente significativo como predictor del resultado de la postulación (su valor de p fue 0.155083). Tampoco fue estadísticamente significativo al agregar al modelo el año de postulación como otra variable independiente (valor de p ajustado: 0.1416485). Esto no es sugerente de que existan diferencias importantes en el resultado de la postulación de acuerdo al género.</a:t>
+              <a:t>Se obtuvo que el coeficiente del sexo (ajustado al año de postulación) no fue estadísticamente significativo como predictor del resultado de la postulación (su valor de p fue 0.155083). Tampoco fue estadísticamente significativo al agregar al modelo el año de postulación como otra variable independiente (valor de p ajustado: 0.1416485). Esto no es sugerente de que existan diferencias importantes en el resultado de la postulación de acuerdo al sexo.</a:t>
             </a:r>
             <a:endParaRPr lang="es-PE" dirty="0"/>
           </a:p>
@@ -28474,19 +28474,19 @@
           <a:p>
             <a:r>
               <a:rPr lang="es-MX" dirty="0"/>
-              <a:t>Para los ingresantes, podemos analizar también cuáles son las especialidades con mayor porcentaje de ingresantes de género femenino o masculino.</a:t>
+              <a:t>Para los ingresantes, podemos analizar también cuáles son las especialidades con mayor porcentaje de ingresantes de sexo femenino o masculino.</a:t>
             </a:r>
           </a:p>
           <a:p>
             <a:r>
               <a:rPr lang="es-MX" dirty="0"/>
-              <a:t>Entre las especialidades médicas más relevantes con mayor porcentaje de ingresantes de género femenino que tienen un mayor porcentaje de ingresantes de género femenino destaca también la especialidad de cirugía pediátrica, que es la única especialidad quirúrgica que llega a estar entre las que más proporción de ingresantes de género femenino tiene, con 62.4% (esto coincide con los hallazgos para los postulantes).</a:t>
+              <a:t>Entre las especialidades médicas más relevantes con mayor porcentaje de ingresantes de sexo femenino que tienen un mayor porcentaje de ingresantes de sexo femenino destaca también la especialidad de cirugía pediátrica, que es la única especialidad quirúrgica que llega a estar entre las que más proporción de ingresantes de sexo femenino tiene, con 62.4% (esto coincide con los hallazgos para los postulantes).</a:t>
             </a:r>
           </a:p>
           <a:p>
             <a:r>
               <a:rPr lang="es-MX" dirty="0"/>
-              <a:t>En cuanto a las especialidades con predominancia de género masculino se encuentran también las mismas especialidades quirúrgicas que para los postulantes: ortopedia y traumatología (90.2% de postulantes de género masculino), seguida de urología (82.3%), neurocirugía (81.5%), cirugía de tórax y cardiovascular (80.2%). Cardiología fue también la especialidad clínica con mayor predominancia masculina (73.9%).</a:t>
+              <a:t>En cuanto a las especialidades con predominancia de sexo masculino se encuentran también las mismas especialidades quirúrgicas que para los postulantes: ortopedia y traumatología (90.2% de postulantes de sexo masculino), seguida de urología (82.3%), neurocirugía (81.5%), cirugía de tórax y cardiovascular (80.2%). Cardiología fue también la especialidad clínica con mayor predominancia masculina (73.9%).</a:t>
             </a:r>
             <a:endParaRPr lang="es-PE" dirty="0"/>
           </a:p>
@@ -28547,7 +28547,7 @@
           <a:p>
             <a:r>
               <a:rPr lang="es-MX" sz="3600" dirty="0"/>
-              <a:t>Proporción de ingresantes de género femenino separada por especialidades clínicas y quirúrgicas en los distintos años</a:t>
+              <a:t>Proporción de ingresantes de sexo femenino separada por especialidades clínicas y quirúrgicas en los distintos años</a:t>
             </a:r>
             <a:endParaRPr lang="es-PE" sz="3600" dirty="0"/>
           </a:p>
@@ -28656,13 +28656,13 @@
           <a:p>
             <a:r>
               <a:rPr lang="es-MX" dirty="0"/>
-              <a:t>Para los ingresantes también se agruparon las especialidades en clínicas y quirúrgicas para realizar la comparación. Al igual que en los postulantes se obtuvo una diferencia notable en la distribución de género, teniendo las especialidades quirúrgicas mayor número relativo de ingresantes de género masculino.</a:t>
+              <a:t>Para los ingresantes también se agruparon las especialidades en clínicas y quirúrgicas para realizar la comparación. Al igual que en los postulantes se obtuvo una diferencia notable en la distribución de sexo, teniendo las especialidades quirúrgicas mayor número relativo de ingresantes de sexo masculino.</a:t>
             </a:r>
           </a:p>
           <a:p>
             <a:r>
               <a:rPr lang="es-MX" dirty="0"/>
-              <a:t>Del mismo modo se realizó un modelo estadístico para determinar si esta diferencia observada es estadísticamente significativa. Este modelo tuvo al género como variable dependiente (resultado), mientras que el tipo de especialidad (clínica vs. quirúrgica) y el año de postulación fueron usadas como variables independientes (predictoras). Se encontró la diferencia sí fue estadísticamente significativa (valor de p del coeficiente para el tipo de especialidad: 3.459630-156, con un </a:t>
+              <a:t>Del mismo modo se realizó un modelo estadístico para determinar si esta diferencia observada es estadísticamente significativa. Este modelo tuvo al sexo como variable dependiente (resultado), mientras que el tipo de especialidad (clínica vs. quirúrgica) y el año de postulación fueron usadas como variables independientes (predictoras). Se encontró la diferencia sí fue estadísticamente significativa (valor de p del coeficiente para el tipo de especialidad: 3.459630-156, con un </a:t>
             </a:r>
             <a:r>
               <a:rPr lang="es-MX" dirty="0" err="1"/>
@@ -28676,7 +28676,7 @@
           <a:p>
             <a:r>
               <a:rPr lang="es-MX" dirty="0"/>
-              <a:t>Además, se agregó también al modelo la posible modificación de efecto del tipo de especialidad (clínica vs. quirúrgica) sobre el efecto del año de postulación en el género.</a:t>
+              <a:t>Además, se agregó también al modelo la posible modificación de efecto del tipo de especialidad (clínica vs. quirúrgica) sobre el efecto del año de postulación en el sexo.</a:t>
             </a:r>
           </a:p>
           <a:p>
@@ -28776,19 +28776,19 @@
           <a:p>
             <a:r>
               <a:rPr lang="es-PE" dirty="0"/>
-              <a:t>Detectar diferencias de género es el primer paso para determinar las causas de estas diferencias que pueden ser problemáticas.</a:t>
+              <a:t>Detectar diferencias de sexo es el primer paso para determinar las causas de estas diferencias que pueden ser problemáticas.</a:t>
             </a:r>
           </a:p>
           <a:p>
             <a:r>
               <a:rPr lang="es-PE" dirty="0"/>
-              <a:t>Diferencias de género en algunas especialidades (ej. quirúrgicas), son descritas por la literatura. Se describen discriminación por género, acoso sexual, entre otras como posibles causas de estas diferencias.</a:t>
+              <a:t>Diferencias de sexo en algunas especialidades (ej. quirúrgicas), son descritas por la literatura. Se describen discriminación por sexo, acoso sexual, entre otras como posibles causas de estas diferencias.</a:t>
             </a:r>
           </a:p>
           <a:p>
             <a:r>
               <a:rPr lang="es-PE" dirty="0"/>
-              <a:t>El presente estudio busca caracterizar la incorporación del género femenino en el programa de </a:t>
+              <a:t>El presente estudio busca caracterizar la incorporación del sexo femenino en el programa de </a:t>
             </a:r>
             <a:r>
               <a:rPr lang="es-PE" dirty="0" err="1"/>
@@ -28946,7 +28946,7 @@
           <a:p>
             <a:r>
               <a:rPr lang="es-MX" dirty="0"/>
-              <a:t>Distribución de género de acuerdo a región de postulación</a:t>
+              <a:t>Distribución de sexo de acuerdo a región de postulación</a:t>
             </a:r>
             <a:endParaRPr lang="es-PE" dirty="0"/>
           </a:p>
@@ -28954,10 +28954,10 @@
       </p:sp>
       <p:pic>
         <p:nvPicPr>
-          <p:cNvPr id="4" name="Marcador de contenido 3">
+          <p:cNvPr id="7" name="Marcador de contenido 6">
             <a:extLst>
               <a:ext uri="{FF2B5EF4-FFF2-40B4-BE49-F238E27FC236}">
-                <a16:creationId xmlns:a16="http://schemas.microsoft.com/office/drawing/2014/main" id="{18193164-D4B8-923B-C36D-635F130ABC61}"/>
+                <a16:creationId xmlns:a16="http://schemas.microsoft.com/office/drawing/2014/main" id="{0F110D49-10EA-D8FF-EB9E-D02E7CB316DC}"/>
               </a:ext>
             </a:extLst>
           </p:cNvPr>
@@ -28969,7 +28969,7 @@
           </p:nvPr>
         </p:nvPicPr>
         <p:blipFill>
-          <a:blip r:embed="rId3" cstate="print">
+          <a:blip r:embed="rId3">
             <a:extLst>
               <a:ext uri="{28A0092B-C50C-407E-A947-70E740481C1C}">
                 <a14:useLocalDpi xmlns:a14="http://schemas.microsoft.com/office/drawing/2010/main" val="0"/>
@@ -28983,8 +28983,8 @@
         </p:blipFill>
         <p:spPr bwMode="auto">
           <a:xfrm>
-            <a:off x="2676506" y="1993530"/>
-            <a:ext cx="6838988" cy="4224390"/>
+            <a:off x="2779007" y="2029969"/>
+            <a:ext cx="6633985" cy="4095052"/>
           </a:xfrm>
           <a:prstGeom prst="rect">
             <a:avLst/>
@@ -29153,7 +29153,7 @@
           <a:p>
             <a:r>
               <a:rPr lang="es-MX" dirty="0"/>
-              <a:t>Proporción de postulantes de género femenino de acuerdo a la región</a:t>
+              <a:t>Proporción de postulantes de sexo femenino de acuerdo a la región</a:t>
             </a:r>
             <a:endParaRPr lang="es-PE" dirty="0"/>
           </a:p>
@@ -29260,7 +29260,7 @@
           <a:p>
             <a:r>
               <a:rPr lang="es-MX" dirty="0"/>
-              <a:t>En cuanto a la distribución de género llama especial atención la distribución de género y la tendencia de la región Oriente. Esta región tiene un número muy inferior de postulantes de género femenino en comparación a otras regiones. Para el estudio comparativo de las distribuciones de género en las diferentes regiones y las tendencias de las mismas se realizaron modelos de regresión logística comparando cada región con las demás. </a:t>
+              <a:t>En cuanto a la distribución de sexo llama especial atención la distribución de sexo y la tendencia de la región Oriente. Esta región tiene un número muy inferior de postulantes de sexo femenino en comparación a otras regiones. Para el estudio comparativo de las distribuciones de sexo en las diferentes regiones y las tendencias de las mismas se realizaron modelos de regresión logística comparando cada región con las demás. </a:t>
             </a:r>
             <a:endParaRPr lang="es-PE" dirty="0"/>
           </a:p>
@@ -29324,13 +29324,13 @@
           <a:p>
             <a:r>
               <a:rPr lang="es-MX" dirty="0"/>
-              <a:t>Para el estudio comparativo de las distribuciones de género en las diferentes regiones y las tendencias de las mismas se realizaron modelos de regresión logística comparando cada región con las demás.</a:t>
+              <a:t>Para el estudio comparativo de las distribuciones de sexo en las diferentes regiones y las tendencias de las mismas se realizaron modelos de regresión logística comparando cada región con las demás.</a:t>
             </a:r>
           </a:p>
           <a:p>
             <a:r>
               <a:rPr lang="es-MX" dirty="0"/>
-              <a:t>Se obtuvo como resultado que las regiones tenían diferencias estadísticamente significativas en comparación con el resto como variables predictoras del género (ajustadas al año de postulación).</a:t>
+              <a:t>Se obtuvo como resultado que las regiones tenían diferencias estadísticamente significativas en comparación con el resto como variables predictoras del sexo (ajustadas al año de postulación).</a:t>
             </a:r>
           </a:p>
           <a:p>
@@ -29352,7 +29352,7 @@
             </a:r>
             <a:r>
               <a:rPr lang="es-MX" dirty="0"/>
-              <a:t> ratio de la región oriente: 0.75 [IC 95%: 0.69-0.81], el cual es notablemente inferior a los demás. También se agregó a los modelos de regresión logística la modificación del efecto del año de postulación en el género ocasionada por las regiones. Sin embargo, no se obtuvo significancia estadística de esta interacción en ninguna de las regiones, lo cual indica que no hay diferencias estadísticamente significativas en las tendencias de género entre las distintas regiones.</a:t>
+              <a:t> ratio de la región oriente: 0.75 [IC 95%: 0.69-0.81], el cual es notablemente inferior a los demás. También se agregó a los modelos de regresión logística la modificación del efecto del año de postulación en el sexo ocasionada por las regiones. Sin embargo, no se obtuvo significancia estadística de esta interacción en ninguna de las regiones, lo cual indica que no hay diferencias estadísticamente significativas en las tendencias de sexo entre las distintas regiones.</a:t>
             </a:r>
             <a:endParaRPr lang="es-PE" dirty="0"/>
           </a:p>
@@ -29413,7 +29413,7 @@
           <a:p>
             <a:r>
               <a:rPr lang="es-MX" sz="3600" dirty="0"/>
-              <a:t>Resultados del modelo de regresión logística del género como variable dependiente y a la región de postulación y tiempo como variables independientes</a:t>
+              <a:t>Resultados del modelo de regresión logística del sexo como variable dependiente y a la región de postulación y tiempo como variables independientes</a:t>
             </a:r>
             <a:endParaRPr lang="es-PE" sz="3600" dirty="0"/>
           </a:p>
@@ -30725,7 +30725,7 @@
           <a:p>
             <a:r>
               <a:rPr lang="es-MX" dirty="0"/>
-              <a:t>Para concluir y comprobar que la significancia estadística del año de postulación como predictor del género se preserva luego de ajustar este coeficiente a la especialidad y a la región se realizó un modelo de regresión logística incluyendo todas estas variables. Se realizó entonces un modelo de regresión logística con la variable género como variable dependiente (de resultado), y las variables tiempo (año de postulación), región y especialidad como variables independientes (predictoras). Se obtuvo que para el coeficiente de tiempo hubo también significancia estadística (valor de p: 2.296120-60) y tuvo un </a:t>
+              <a:t>Para concluir y comprobar que la significancia estadística del año de postulación como predictor del sexo se preserva luego de ajustar este coeficiente a la especialidad y a la región se realizó un modelo de regresión logística incluyendo todas estas variables. Se realizó entonces un modelo de regresión logística con la variable sexo como variable dependiente (de resultado), y las variables tiempo (año de postulación), región y especialidad como variables independientes (predictoras). Se obtuvo que para el coeficiente de tiempo hubo también significancia estadística (valor de p: 2.296120-60) y tuvo un </a:t>
             </a:r>
             <a:r>
               <a:rPr lang="es-MX" dirty="0" err="1"/>
@@ -30907,19 +30907,19 @@
           <a:p>
             <a:r>
               <a:rPr lang="es-MX" dirty="0"/>
-              <a:t>Predominancia del género masculino en especialidades quirúrgicas, compatible con estudios previos.</a:t>
+              <a:t>Predominancia del sexo masculino en especialidades quirúrgicas, compatible con estudios previos.</a:t>
             </a:r>
           </a:p>
           <a:p>
             <a:r>
               <a:rPr lang="es-MX" dirty="0"/>
-              <a:t>Urología, traumatología y ortopedia, neurocirugía son especialidades típicamente asociadas a menor participación del género femenino según estudios previos.</a:t>
+              <a:t>Urología, traumatología y ortopedia, neurocirugía son especialidades típicamente asociadas a menor participación del sexo femenino según estudios previos.</a:t>
             </a:r>
           </a:p>
           <a:p>
             <a:r>
               <a:rPr lang="es-MX" dirty="0"/>
-              <a:t>Entre estas especialidades mencionadas, no se encontró evidencia en el presente estudio de que la tendencia de género fuera diferente a la tendencia global, lo cual indica que estas especialidades tienen una tendencia a un aumento en el número de mujeres que haga que probablemente en el futuro, las diferencias observadas se acorten cada vez más en nuestro contexto nacional.</a:t>
+              <a:t>Entre estas especialidades mencionadas, no se encontró evidencia en el presente estudio de que la tendencia de sexo fuera diferente a la tendencia global, lo cual indica que estas especialidades tienen una tendencia a un aumento en el número de mujeres que haga que probablemente en el futuro, las diferencias observadas se acorten cada vez más en nuestro contexto nacional.</a:t>
             </a:r>
             <a:endParaRPr lang="es-PE" dirty="0"/>
           </a:p>
@@ -31093,13 +31093,13 @@
           <a:p>
             <a:r>
               <a:rPr lang="es-MX" dirty="0"/>
-              <a:t>Sobre la especialidad de ginecología y obstetricia, estudios indican que esta especialidad es tradicionalmente preferida por el género femenino. También, otros estudios indican que pacientes prefieren ginecólogas-obstetras mujeres. En el presente estudio, sin embargo, se encontró que inicialmente (hasta el año 2018) la proporción de mujeres postulantes esta especialidad era incluso inferior a la proporción global de postulantes. Sin embargo, desde el año 2018, el aumento en el número de postulantes e ingresantes de género femenino a la especialidad siguió una tendencia superior a la tendencia global. A partir del 2019 se encontró que el número de postulantes de género femenino ya era superior a los postulantes de género masculino y esto se mantuvo en los años siguientes.</a:t>
+              <a:t>Sobre la especialidad de ginecología y obstetricia, estudios indican que esta especialidad es tradicionalmente preferida por el sexo femenino. También, otros estudios indican que pacientes prefieren ginecólogas-obstetras mujeres. En el presente estudio, sin embargo, se encontró que inicialmente (hasta el año 2018) la proporción de mujeres postulantes esta especialidad era incluso inferior a la proporción global de postulantes. Sin embargo, desde el año 2018, el aumento en el número de postulantes e ingresantes de sexo femenino a la especialidad siguió una tendencia superior a la tendencia global. A partir del 2019 se encontró que el número de postulantes de sexo femenino ya era superior a los postulantes de sexo masculino y esto se mantuvo en los años siguientes.</a:t>
             </a:r>
           </a:p>
           <a:p>
             <a:r>
               <a:rPr lang="es-MX" dirty="0"/>
-              <a:t>Sobre la especialidad de cirugía general, se encontró que la especialidad tradicionalmente ha tenido predominancia del género masculino. Estudios indican que residentes de género femenino en esta especialidad reportan comúnmente experiencias de discriminación por el género y acoso sexual, entre otras barreras. Esto podría explicar el menor interés de las mujeres por las especialidades quirúrgicas, así como el mayor valor que le dan las mujeres al estilo de vida que brinda la especialidad, el cual no suele ser muy favorable en algunas especialidades quirúrgicas. En el presente estudio se encontró también que existen diferencias importantes en la distribución de género de los postulantes e ingresantes a la especialidad, teniendo predominancia de género masculino. Sin embargo, se encontró que la tendencia de la especialidad a tener una mayor proporción de postulantes de género femenino fue superior a la tendencia global, habiendo cada año una mayor cantidad de postulantes e ingresantes de género femenino. Aún así, la proporción de postulantes de género femenino para el año 2023 es aún inferior a la proporción global, conformando menos del 40% de los postulantes, aunque es un gran salto desde el año 2013, en el que solo conformaban alrededor del 20% de los postulantes.</a:t>
+              <a:t>Sobre la especialidad de cirugía general, se encontró que la especialidad tradicionalmente ha tenido predominancia del sexo masculino. Estudios indican que residentes de sexo femenino en esta especialidad reportan comúnmente experiencias de discriminación por el sexo y acoso sexual, entre otras barreras. Esto podría explicar el menor interés de las mujeres por las especialidades quirúrgicas, así como el mayor valor que le dan las mujeres al estilo de vida que brinda la especialidad, el cual no suele ser muy favorable en algunas especialidades quirúrgicas. En el presente estudio se encontró también que existen diferencias importantes en la distribución de sexo de los postulantes e ingresantes a la especialidad, teniendo predominancia de sexo masculino. Sin embargo, se encontró que la tendencia de la especialidad a tener una mayor proporción de postulantes de sexo femenino fue superior a la tendencia global, habiendo cada año una mayor cantidad de postulantes e ingresantes de sexo femenino. Aún así, la proporción de postulantes de sexo femenino para el año 2023 es aún inferior a la proporción global, conformando menos del 40% de los postulantes, aunque es un gran salto desde el año 2013, en el que solo conformaban alrededor del 20% de los postulantes.</a:t>
             </a:r>
           </a:p>
           <a:p>
@@ -31194,7 +31194,7 @@
           <a:p>
             <a:r>
               <a:rPr lang="es-MX" dirty="0"/>
-              <a:t>Sobre la especialidad de cirugía plástica, estudios encontraron que mujeres tienen más probabilidades que los hombres de experimentar sexismo. También se menciona que mujeres tienen menos probabilidades de casarse, tener hijos, de estar satisfechas con el equilibrio entre su trabajo y su vida cotidiana, o de tener reconocimiento por sus ideas, autoría, promociones o incrementos en el salario, así como tener menos ingresos económicos al ejercer la especialidad que los cirujanos varones. También se describen amplias diferencias de género en el área académica, teniendo las mujeres una menor participación. Algunos estudios describen un incremento en la representación de mujeres en el área académica de la cirugía plástica y también en los programas de </a:t>
+              <a:t>Sobre la especialidad de cirugía plástica, estudios encontraron que mujeres tienen más probabilidades que los hombres de experimentar sexismo. También se menciona que mujeres tienen menos probabilidades de casarse, tener hijos, de estar satisfechas con el equilibrio entre su trabajo y su vida cotidiana, o de tener reconocimiento por sus ideas, autoría, promociones o incrementos en el salario, así como tener menos ingresos económicos al ejercer la especialidad que los cirujanos varones. También se describen amplias diferencias de sexo en el área académica, teniendo las mujeres una menor participación. Algunos estudios describen un incremento en la representación de mujeres en el área académica de la cirugía plástica y también en los programas de </a:t>
             </a:r>
             <a:r>
               <a:rPr lang="es-MX" dirty="0" err="1"/>
@@ -31202,7 +31202,7 @@
             </a:r>
             <a:r>
               <a:rPr lang="es-MX" dirty="0"/>
-              <a:t> médico de esta especialidad, incluso llegando a alcanzar el mismo número de residentes que de los de género masculino (esto en Estados Unidos) (66). Sin embargo, esto contrasta con lo encontrado en el presente estudio, donde se observa una tendencia hacia una menor participación en los postulantes al programa de </a:t>
+              <a:t> médico de esta especialidad, incluso llegando a alcanzar el mismo número de residentes que de los de sexo masculino (esto en Estados Unidos) (66). Sin embargo, esto contrasta con lo encontrado en el presente estudio, donde se observa una tendencia hacia una menor participación en los postulantes al programa de </a:t>
             </a:r>
             <a:r>
               <a:rPr lang="es-MX" dirty="0" err="1"/>
@@ -31216,7 +31216,7 @@
           <a:p>
             <a:r>
               <a:rPr lang="es-MX" dirty="0"/>
-              <a:t>Otro hallazgo llamativo de la presente investigación es que cirugía pediátrica escapaba de la tendencia de las demás especialidades quirúrgicas. Estudios indican que esta especialidad ha presentado un aumento en la representación del género femenino los estos últimos años. No se encontró información sobre una predominancia femenino, sino que se mencionaba que, al igual que las demás especialidades quirúrgicas, había predominancia masculina. No se encontró estudios previos que indiquen lo encontrado en la presente investigación, que la especialidad de cirugía pediátrica tiene una predominancia femenina (siendo más postulantes de género femenino que masculino desde el año 2014) que se ha mantenido durante todos los años desde el 2014 hasta el 2023 e incluso con un aumento en el número de mujeres a un ritmo similar al de la tendencia global.</a:t>
+              <a:t>Otro hallazgo llamativo de la presente investigación es que cirugía pediátrica escapaba de la tendencia de las demás especialidades quirúrgicas. Estudios indican que esta especialidad ha presentado un aumento en la representación del sexo femenino los estos últimos años. No se encontró información sobre una predominancia femenino, sino que se mencionaba que, al igual que las demás especialidades quirúrgicas, había predominancia masculina. No se encontró estudios previos que indiquen lo encontrado en la presente investigación, que la especialidad de cirugía pediátrica tiene una predominancia femenina (siendo más postulantes de sexo femenino que masculino desde el año 2014) que se ha mantenido durante todos los años desde el 2014 hasta el 2023 e incluso con un aumento en el número de mujeres a un ritmo similar al de la tendencia global.</a:t>
             </a:r>
           </a:p>
         </p:txBody>
@@ -31303,7 +31303,7 @@
           <a:p>
             <a:r>
               <a:rPr lang="es-MX" dirty="0"/>
-              <a:t>Entre las limitaciones del estudio se encuentra la forma de determinar el género de los participantes, ya que esta no fue determinada mediante algún método directo, sino que fue obtenida a partir del primer nombre de los postulantes. Este es un método usado por otros estudios; sin embargo, esta forma de asignar el género es una aproximación al género real de los participantes y no está exento de error. No hay estudios específicos que estudien la precisión de asignación de género de este método en la población estudiada.</a:t>
+              <a:t>Entre las limitaciones del estudio se encuentra la forma de determinar el sexo de los participantes, ya que esta no fue determinada mediante algún método directo, sino que fue obtenida a partir del primer nombre de los postulantes. Este es un método usado por otros estudios; sin embargo, esta forma de asignar el sexo es una aproximación al sexo real de los participantes y no está exento de error. No hay estudios específicos que estudien la precisión de asignación de sexo de este método en la población estudiada.</a:t>
             </a:r>
             <a:endParaRPr lang="es-PE" dirty="0"/>
           </a:p>
@@ -31393,7 +31393,7 @@
           <a:p>
             <a:r>
               <a:rPr lang="es-MX" dirty="0"/>
-              <a:t>No existen estudios previos sobre la distribución de género y las tendencias de género en esta población de postulantes e ingresantes al programa de </a:t>
+              <a:t>No existen estudios previos sobre la distribución de sexo y las tendencias de sexo en esta población de postulantes e ingresantes al programa de </a:t>
             </a:r>
             <a:r>
               <a:rPr lang="es-MX" dirty="0" err="1"/>
@@ -31401,7 +31401,7 @@
             </a:r>
             <a:r>
               <a:rPr lang="es-MX" dirty="0"/>
-              <a:t> médico del Perú. Esta investigación permitió conocer la situación actual del Perú en cuanto a las diferencias en el género en sus postulantes a las distintas especialidades médicas. Se pudo además explorar los detalles de estas diferencias y las tendencias de género en los últimos 11 años (del 2013 al 2023), brindando información sobre el contexto actual de las diferencias de género entre los postulantes e ingresantes al programa de </a:t>
+              <a:t> médico del Perú. Esta investigación permitió conocer la situación actual del Perú en cuanto a las diferencias en el sexo en sus postulantes a las distintas especialidades médicas. Se pudo además explorar los detalles de estas diferencias y las tendencias de sexo en los últimos 11 años (del 2013 al 2023), brindando información sobre el contexto actual de las diferencias de sexo entre los postulantes e ingresantes al programa de </a:t>
             </a:r>
             <a:r>
               <a:rPr lang="es-MX" dirty="0" err="1"/>
@@ -31415,7 +31415,7 @@
           <a:p>
             <a:r>
               <a:rPr lang="es-MX" dirty="0"/>
-              <a:t>En el presente estudio se pudo determinar que en el contexto del Perú existen diferencias en la distribución de género y las tendencias en las distintas especialidades y distintas regiones. Es debatible si las diferencias de género son en sí mismas un problema, pero estudios indican que contar con diversidad de género en las distintas especialidades médicas se podría considerar como algo positivo, ya que aumentar la diversidad de un grupo permite que personas con distintas experiencias, perspectivas y herramientas interactúen para encontrar mejores soluciones, los efectos de esto pueden reflejarse en algunos estudios que indican que hay más probabilidades que equipos de investigación conformados por mujeres inventen tecnologías relacionadas a la salud femenina, precisamente buscando solucionar a problemas de salud en este género, lo mismo podría ocurrir también en el ambiente laboral de la residencia médica y posteriormente en el trabajo asistencial de los médicos como especialistas.</a:t>
+              <a:t>En el presente estudio se pudo determinar que en el contexto del Perú existen diferencias en la distribución de sexo y las tendencias en las distintas especialidades y distintas regiones. Es debatible si las diferencias de sexo son en sí mismas un problema, pero estudios indican que contar con diversidad de sexo en las distintas especialidades médicas se podría considerar como algo positivo, ya que aumentar la diversidad de un grupo permite que personas con distintas experiencias, perspectivas y herramientas interactúen para encontrar mejores soluciones, los efectos de esto pueden reflejarse en algunos estudios que indican que hay más probabilidades que equipos de investigación conformados por mujeres inventen tecnologías relacionadas a la salud femenina, precisamente buscando solucionar a problemas de salud en este sexo, lo mismo podría ocurrir también en el ambiente laboral de la residencia médica y posteriormente en el trabajo asistencial de los médicos como especialistas.</a:t>
             </a:r>
           </a:p>
           <a:p>
@@ -31507,13 +31507,13 @@
           <a:p>
             <a:r>
               <a:rPr lang="es-MX" dirty="0"/>
-              <a:t>Además, es importante explorar las causas de estas diferencias encontradas, las cuales pueden ser problemáticas, y justamente este estudio podría brindar la información necesaria para poder ampliar la investigación al respecto, ya que identificar las disparidades constituye el primer paso para la exploración de las causas de las mismas. Entre las causas descritas por la literatura se describe a una cultura de exclusión y prejuicios de género que se originan desde la facultad de medicina, impactando negativamente a las mujeres que optan por continuar su formación en alguna especialidad quirúrgica. Otros estudios indican que existe una mayor prevalencia de maltrato, acoso y abuso hacia mujeres en su preparación para ser cirujanas. En nuestro contexto no se cuentan con estudios de este tipo y tampoco se explican algunos hallazgos encontrados, como la tendencia opuesta de cirugía plástica o por qué la especialidad de cirugía pediátrica es diferente a las demás especialidades quirúrgicas, teniendo más postulantes e ingresantes de género femenino.</a:t>
+              <a:t>Además, es importante explorar las causas de estas diferencias encontradas, las cuales pueden ser problemáticas, y justamente este estudio podría brindar la información necesaria para poder ampliar la investigación al respecto, ya que identificar las disparidades constituye el primer paso para la exploración de las causas de las mismas. Entre las causas descritas por la literatura se describe a una cultura de exclusión y prejuicios de sexo que se originan desde la facultad de medicina, impactando negativamente a las mujeres que optan por continuar su formación en alguna especialidad quirúrgica. Otros estudios indican que existe una mayor prevalencia de maltrato, acoso y abuso hacia mujeres en su preparación para ser cirujanas. En nuestro contexto no se cuentan con estudios de este tipo y tampoco se explican algunos hallazgos encontrados, como la tendencia opuesta de cirugía plástica o por qué la especialidad de cirugía pediátrica es diferente a las demás especialidades quirúrgicas, teniendo más postulantes e ingresantes de sexo femenino.</a:t>
             </a:r>
           </a:p>
           <a:p>
             <a:r>
               <a:rPr lang="es-MX" dirty="0"/>
-              <a:t>Es claro que la elección de una especialidad es una decisión compleja, factores relacionados al género pueden jugar un papel importante en esta elección, ya sean motivos personales, o sociales, como el tema familiar. La forma de ingreso, mediante el concurso nacional de </a:t>
+              <a:t>Es claro que la elección de una especialidad es una decisión compleja, factores relacionados al sexo pueden jugar un papel importante en esta elección, ya sean motivos personales, o sociales, como el tema familiar. La forma de ingreso, mediante el concurso nacional de </a:t>
             </a:r>
             <a:r>
               <a:rPr lang="es-MX" dirty="0" err="1"/>
@@ -31521,7 +31521,7 @@
             </a:r>
             <a:r>
               <a:rPr lang="es-MX" dirty="0"/>
-              <a:t> médico es en gran medida objetiva, pero es probable que no esté libre de factores posiblemente problemáticos que afecten la elección de la especialidad, factores más allá de la capacidad individual de la persona y sus aspiraciones futuras. Estudios en otros lugares indican que mujeres estudiantes de medicina perciben tener menos oportunidades que los varones en avanzar profesionalmente debido al género, y que mujeres sienten que han perdido oportunidades laborales y que su subespecialidad de elección ha sido influida por el género. Es posible que estos factores tengan un papel también en la elección de las especialidades en el Perú y la investigación en este tema podría en el futuro revelar posibles problemas en la incorporación de la mujer a la fuerza laboral en el área de la medicina humana.</a:t>
+              <a:t> médico es en gran medida objetiva, pero es probable que no esté libre de factores posiblemente problemáticos que afecten la elección de la especialidad, factores más allá de la capacidad individual de la persona y sus aspiraciones futuras. Estudios en otros lugares indican que mujeres estudiantes de medicina perciben tener menos oportunidades que los varones en avanzar profesionalmente debido al sexo, y que mujeres sienten que han perdido oportunidades laborales y que su subespecialidad de elección ha sido influida por el sexo. Es posible que estos factores tengan un papel también en la elección de las especialidades en el Perú y la investigación en este tema podría en el futuro revelar posibles problemas en la incorporación de la mujer a la fuerza laboral en el área de la medicina humana.</a:t>
             </a:r>
           </a:p>
         </p:txBody>
@@ -31617,7 +31617,7 @@
             <a:pPr lvl="1"/>
             <a:r>
               <a:rPr lang="es-MX" dirty="0"/>
-              <a:t>Por qué la distribución de género es tan diferente en la región oriente.</a:t>
+              <a:t>Por qué la distribución de sexo es tan diferente en la región oriente.</a:t>
             </a:r>
           </a:p>
           <a:p>
@@ -31631,7 +31631,7 @@
             <a:pPr lvl="1"/>
             <a:r>
               <a:rPr lang="es-MX" dirty="0"/>
-              <a:t>Por qué cirugía pediátrica es diferente a las otras especialidades quirúrgicas (habiendo más postulantes e ingresantes de género femenino).</a:t>
+              <a:t>Por qué cirugía pediátrica es diferente a las otras especialidades quirúrgicas (habiendo más postulantes e ingresantes de sexo femenino).</a:t>
             </a:r>
           </a:p>
           <a:p>
@@ -31644,7 +31644,7 @@
           <a:p>
             <a:r>
               <a:rPr lang="es-MX" dirty="0"/>
-              <a:t>Además de esto, se podría complementar la investigación estudiando a los médicos en programas de residencia médica no solo al momento de la postulación y el ingreso, sino a lo largo de su residencia médica, pudiendo estudiar cuántos finalmente terminan y si hay alguna diferencia en la distribución de género entre los que terminan y los que inician la especialidad médica, pudiendo estudiar si es que existen diferencias en el abandono de la especialidad y, de ser así, los motivos de esto. También se podría realizar un seguimiento a aquellos ingresantes de género femenino a especialidades con predominancia masculina (y también lo opuesto: ingresantes de género masculino a especialidades con predominancia femenina), para monitorizar si es que pasan por situaciones de acoso o si presentan barreras o dificultades ocasionadas por las diferencias de género.</a:t>
+              <a:t>Además de esto, se podría complementar la investigación estudiando a los médicos en programas de residencia médica no solo al momento de la postulación y el ingreso, sino a lo largo de su residencia médica, pudiendo estudiar cuántos finalmente terminan y si hay alguna diferencia en la distribución de sexo entre los que terminan y los que inician la especialidad médica, pudiendo estudiar si es que existen diferencias en el abandono de la especialidad y, de ser así, los motivos de esto. También se podría realizar un seguimiento a aquellos ingresantes de sexo femenino a especialidades con predominancia masculina (y también lo opuesto: ingresantes de sexo masculino a especialidades con predominancia femenina), para monitorizar si es que pasan por situaciones de acoso o si presentan barreras o dificultades ocasionadas por las diferencias de sexo.</a:t>
             </a:r>
           </a:p>
           <a:p>
@@ -31824,7 +31824,7 @@
             </a:pPr>
             <a:r>
               <a:rPr lang="es-MX" dirty="0"/>
-              <a:t>Hubo más postulantes de género masculino que de género femenino durante el periodo 2013-2023 en el programa de </a:t>
+              <a:t>Hubo más postulantes de sexo masculino que de sexo femenino durante el periodo 2013-2023 en el programa de </a:t>
             </a:r>
             <a:r>
               <a:rPr lang="es-MX" dirty="0" err="1"/>
@@ -31832,7 +31832,7 @@
             </a:r>
             <a:r>
               <a:rPr lang="es-MX" dirty="0"/>
-              <a:t> médico del Perú y se encontró una tendencia hacia una mayor proporción de postulantes de género femenino.</a:t>
+              <a:t> médico del Perú y se encontró una tendencia hacia una mayor proporción de postulantes de sexo femenino.</a:t>
             </a:r>
           </a:p>
           <a:p>
@@ -31842,7 +31842,7 @@
             </a:pPr>
             <a:r>
               <a:rPr lang="es-MX" dirty="0"/>
-              <a:t>Se encontró una distribución de género heterogénea en los postulantes a las distintas especialidades médicas en el periodo 2013-2023 en el programa de </a:t>
+              <a:t>Se encontró una distribución de sexo heterogénea en los postulantes a las distintas especialidades médicas en el periodo 2013-2023 en el programa de </a:t>
             </a:r>
             <a:r>
               <a:rPr lang="es-MX" dirty="0" err="1"/>
@@ -31860,7 +31860,7 @@
             </a:pPr>
             <a:r>
               <a:rPr lang="es-MX" dirty="0"/>
-              <a:t>Hubo más ingresantes de género masculino que de género femenino durante el periodo 2016-2023 en el programa de </a:t>
+              <a:t>Hubo más ingresantes de sexo masculino que de sexo femenino durante el periodo 2016-2023 en el programa de </a:t>
             </a:r>
             <a:r>
               <a:rPr lang="es-MX" dirty="0" err="1"/>
@@ -31868,7 +31868,7 @@
             </a:r>
             <a:r>
               <a:rPr lang="es-MX" dirty="0"/>
-              <a:t> médico del Perú y se encontró también una tendencia hacia una mayor proporción de ingresantes de género femenino.</a:t>
+              <a:t> médico del Perú y se encontró también una tendencia hacia una mayor proporción de ingresantes de sexo femenino.</a:t>
             </a:r>
           </a:p>
           <a:p>
@@ -31878,7 +31878,7 @@
             </a:pPr>
             <a:r>
               <a:rPr lang="es-MX" dirty="0"/>
-              <a:t>Se encontró una distribución de género heterogénea en los ingresantes a las distintas especialidades médicas en el periodo 2016-2023 en el programa de </a:t>
+              <a:t>Se encontró una distribución de sexo heterogénea en los ingresantes a las distintas especialidades médicas en el periodo 2016-2023 en el programa de </a:t>
             </a:r>
             <a:r>
               <a:rPr lang="es-MX" dirty="0" err="1"/>
@@ -31896,7 +31896,7 @@
             </a:pPr>
             <a:r>
               <a:rPr lang="es-MX" dirty="0"/>
-              <a:t>En las especialidades quirúrgicas hubo un mayor número de postulantes e ingresantes de género masculino, en comparación a aquellos de género femenino en el periodo de tiempo 2013-2023 en el programa de </a:t>
+              <a:t>En las especialidades quirúrgicas hubo un mayor número de postulantes e ingresantes de sexo masculino, en comparación a aquellos de sexo femenino en el periodo de tiempo 2013-2023 en el programa de </a:t>
             </a:r>
             <a:r>
               <a:rPr lang="es-MX" dirty="0" err="1"/>
@@ -31914,7 +31914,7 @@
             </a:pPr>
             <a:r>
               <a:rPr lang="es-MX" dirty="0"/>
-              <a:t>En las distintas regiones hubo una distribución de género heterogénea en los postulantes al programa de </a:t>
+              <a:t>En las distintas regiones hubo una distribución de sexo heterogénea en los postulantes al programa de </a:t>
             </a:r>
             <a:r>
               <a:rPr lang="es-MX" dirty="0" err="1"/>
@@ -32102,7 +32102,7 @@
             </a:pPr>
             <a:r>
               <a:rPr lang="es-MX" dirty="0"/>
-              <a:t>Explorar por qué la distribución de género es tan diferente en la región oriente.</a:t>
+              <a:t>Explorar por qué la distribución de sexo es tan diferente en la región oriente.</a:t>
             </a:r>
           </a:p>
           <a:p>
@@ -32122,7 +32122,7 @@
             </a:pPr>
             <a:r>
               <a:rPr lang="es-MX" dirty="0"/>
-              <a:t>Explorar por qué cirugía pediátrica es diferente a las otras especialidades quirúrgicas (habiendo más postulantes e ingresantes de género femenino). </a:t>
+              <a:t>Explorar por qué cirugía pediátrica es diferente a las otras especialidades quirúrgicas (habiendo más postulantes e ingresantes de sexo femenino). </a:t>
             </a:r>
           </a:p>
           <a:p>
@@ -32142,7 +32142,7 @@
             </a:pPr>
             <a:r>
               <a:rPr lang="es-MX" dirty="0"/>
-              <a:t>Estudiar la distribución de género y las tendencias de género al final de los programas de residencia médica. </a:t>
+              <a:t>Estudiar la distribución de sexo y las tendencias de sexo al final de los programas de residencia médica. </a:t>
             </a:r>
           </a:p>
           <a:p>
@@ -32152,7 +32152,7 @@
             </a:pPr>
             <a:r>
               <a:rPr lang="es-MX" dirty="0"/>
-              <a:t>Realizar seguimiento a los ingresantes a las especialidades con predominancia del género opuesto para estudiar posibles barreras o dificultades producto del género. </a:t>
+              <a:t>Realizar seguimiento a los ingresantes a las especialidades con predominancia del sexo opuesto para estudiar posibles barreras o dificultades producto del sexo. </a:t>
             </a:r>
           </a:p>
           <a:p>
@@ -32162,7 +32162,7 @@
             </a:pPr>
             <a:r>
               <a:rPr lang="es-MX" dirty="0"/>
-              <a:t>Registrar información sobre el género de los participantes en procesos de evaluación y formación de la carrera de medicina humana.</a:t>
+              <a:t>Registrar información sobre el sexo de los participantes en procesos de evaluación y formación de la carrera de medicina humana.</a:t>
             </a:r>
           </a:p>
           <a:p>
@@ -32254,7 +32254,7 @@
           <a:p>
             <a:r>
               <a:rPr lang="es-MX" dirty="0"/>
-              <a:t>Objetivo general: determinar las tendencias de género de los postulantes e ingresantes a las distintas especialidades médicas en el Perú durante el periodo 2013-2023.</a:t>
+              <a:t>Objetivo general: determinar las tendencias de sexo de los postulantes e ingresantes a las distintas especialidades médicas en el Perú durante el periodo 2013-2023.</a:t>
             </a:r>
           </a:p>
           <a:p>
@@ -32267,28 +32267,28 @@
             <a:pPr lvl="1"/>
             <a:r>
               <a:rPr lang="es-MX" dirty="0"/>
-              <a:t>Describir las tendencias de género de los postulantes a las especialidades médicas</a:t>
+              <a:t>Describir las tendencias de sexo de los postulantes a las especialidades médicas</a:t>
             </a:r>
           </a:p>
           <a:p>
             <a:pPr lvl="1"/>
             <a:r>
               <a:rPr lang="es-MX" dirty="0"/>
-              <a:t>Describir las tendencias de género de los ingresantes a las especialidades médicas</a:t>
+              <a:t>Describir las tendencias de sexo de los ingresantes a las especialidades médicas</a:t>
             </a:r>
           </a:p>
           <a:p>
             <a:pPr lvl="1"/>
             <a:r>
               <a:rPr lang="es-MX" dirty="0"/>
-              <a:t>Comparar los cambios en la distribución de género entre los postulantes a las especialidades quirúrgicas y clínicas</a:t>
+              <a:t>Comparar los cambios en la distribución de sexo entre los postulantes a las especialidades quirúrgicas y clínicas</a:t>
             </a:r>
           </a:p>
           <a:p>
             <a:pPr lvl="1"/>
             <a:r>
               <a:rPr lang="es-MX" dirty="0"/>
-              <a:t>Describir las tendencias de género de los postulantes de acuerdo con la región de postulación</a:t>
+              <a:t>Describir las tendencias de sexo de los postulantes de acuerdo con la región de postulación</a:t>
             </a:r>
           </a:p>
           <a:p>

</xml_diff>

<commit_message>
Follow suggestions of judges of my thesis
</commit_message>
<xml_diff>
--- a/doc/diapositivas_sustentacion_tesis.pptx
+++ b/doc/diapositivas_sustentacion_tesis.pptx
@@ -5,7 +5,7 @@
     <p:sldMasterId id="2147483672" r:id="rId1"/>
   </p:sldMasterIdLst>
   <p:notesMasterIdLst>
-    <p:notesMasterId r:id="rId71"/>
+    <p:notesMasterId r:id="rId72"/>
   </p:notesMasterIdLst>
   <p:sldIdLst>
     <p:sldId id="256" r:id="rId2"/>
@@ -71,12 +71,13 @@
     <p:sldId id="328" r:id="rId62"/>
     <p:sldId id="286" r:id="rId63"/>
     <p:sldId id="287" r:id="rId64"/>
-    <p:sldId id="329" r:id="rId65"/>
-    <p:sldId id="288" r:id="rId66"/>
-    <p:sldId id="263" r:id="rId67"/>
-    <p:sldId id="289" r:id="rId68"/>
-    <p:sldId id="264" r:id="rId69"/>
-    <p:sldId id="290" r:id="rId70"/>
+    <p:sldId id="331" r:id="rId65"/>
+    <p:sldId id="329" r:id="rId66"/>
+    <p:sldId id="288" r:id="rId67"/>
+    <p:sldId id="263" r:id="rId68"/>
+    <p:sldId id="289" r:id="rId69"/>
+    <p:sldId id="264" r:id="rId70"/>
+    <p:sldId id="290" r:id="rId71"/>
   </p:sldIdLst>
   <p:sldSz cx="12192000" cy="6858000"/>
   <p:notesSz cx="6858000" cy="9144000"/>
@@ -259,6 +260,7 @@
             <p14:sldId id="328"/>
             <p14:sldId id="286"/>
             <p14:sldId id="287"/>
+            <p14:sldId id="331"/>
             <p14:sldId id="329"/>
             <p14:sldId id="288"/>
           </p14:sldIdLst>
@@ -31441,6 +31443,104 @@
   <p:cSld>
     <p:spTree>
       <p:nvGrpSpPr>
+        <p:cNvPr id="1" name="">
+          <a:extLst>
+            <a:ext uri="{FF2B5EF4-FFF2-40B4-BE49-F238E27FC236}">
+              <a16:creationId xmlns:a16="http://schemas.microsoft.com/office/drawing/2014/main" id="{3F8B6B7E-256F-342B-DA0C-81E06F2EB545}"/>
+            </a:ext>
+          </a:extLst>
+        </p:cNvPr>
+        <p:cNvGrpSpPr/>
+        <p:nvPr/>
+      </p:nvGrpSpPr>
+      <p:grpSpPr>
+        <a:xfrm>
+          <a:off x="0" y="0"/>
+          <a:ext cx="0" cy="0"/>
+          <a:chOff x="0" y="0"/>
+          <a:chExt cx="0" cy="0"/>
+        </a:xfrm>
+      </p:grpSpPr>
+      <p:sp>
+        <p:nvSpPr>
+          <p:cNvPr id="2" name="Título 1">
+            <a:extLst>
+              <a:ext uri="{FF2B5EF4-FFF2-40B4-BE49-F238E27FC236}">
+                <a16:creationId xmlns:a16="http://schemas.microsoft.com/office/drawing/2014/main" id="{B7DFF908-5A78-C87B-6F93-2112006DA422}"/>
+              </a:ext>
+            </a:extLst>
+          </p:cNvPr>
+          <p:cNvSpPr>
+            <a:spLocks noGrp="1"/>
+          </p:cNvSpPr>
+          <p:nvPr>
+            <p:ph type="title"/>
+          </p:nvPr>
+        </p:nvSpPr>
+        <p:spPr/>
+        <p:txBody>
+          <a:bodyPr/>
+          <a:lstStyle/>
+          <a:p>
+            <a:r>
+              <a:rPr lang="es-MX" dirty="0"/>
+              <a:t>Implicancias y significancia del estudio</a:t>
+            </a:r>
+            <a:endParaRPr lang="es-PE" dirty="0"/>
+          </a:p>
+        </p:txBody>
+      </p:sp>
+      <p:sp>
+        <p:nvSpPr>
+          <p:cNvPr id="3" name="Marcador de contenido 2">
+            <a:extLst>
+              <a:ext uri="{FF2B5EF4-FFF2-40B4-BE49-F238E27FC236}">
+                <a16:creationId xmlns:a16="http://schemas.microsoft.com/office/drawing/2014/main" id="{5959CC68-9A22-EDE8-0508-D4B17BF3E681}"/>
+              </a:ext>
+            </a:extLst>
+          </p:cNvPr>
+          <p:cNvSpPr>
+            <a:spLocks noGrp="1"/>
+          </p:cNvSpPr>
+          <p:nvPr>
+            <p:ph idx="1"/>
+          </p:nvPr>
+        </p:nvSpPr>
+        <p:spPr/>
+        <p:txBody>
+          <a:bodyPr>
+            <a:normAutofit/>
+          </a:bodyPr>
+          <a:lstStyle/>
+          <a:p>
+            <a:r>
+              <a:rPr lang="es-MX" dirty="0"/>
+              <a:t>Esta información puede usarse para implementar medidas: vestidores de ambos sexos, reforzar políticas para lactancia y embarazo.</a:t>
+            </a:r>
+          </a:p>
+          <a:p>
+            <a:endParaRPr lang="es-PE" dirty="0"/>
+          </a:p>
+        </p:txBody>
+      </p:sp>
+    </p:spTree>
+    <p:extLst>
+      <p:ext uri="{BB962C8B-B14F-4D97-AF65-F5344CB8AC3E}">
+        <p14:creationId xmlns:p14="http://schemas.microsoft.com/office/powerpoint/2010/main" val="297132873"/>
+      </p:ext>
+    </p:extLst>
+  </p:cSld>
+  <p:clrMapOvr>
+    <a:masterClrMapping/>
+  </p:clrMapOvr>
+</p:sld>
+</file>
+
+<file path=ppt/slides/slide65.xml><?xml version="1.0" encoding="utf-8"?>
+<p:sld xmlns:a="http://schemas.openxmlformats.org/drawingml/2006/main" xmlns:r="http://schemas.openxmlformats.org/officeDocument/2006/relationships" xmlns:p="http://schemas.openxmlformats.org/presentationml/2006/main">
+  <p:cSld>
+    <p:spTree>
+      <p:nvGrpSpPr>
         <p:cNvPr id="1" name=""/>
         <p:cNvGrpSpPr/>
         <p:nvPr/>
@@ -31539,7 +31639,7 @@
 </p:sld>
 </file>
 
-<file path=ppt/slides/slide65.xml><?xml version="1.0" encoding="utf-8"?>
+<file path=ppt/slides/slide66.xml><?xml version="1.0" encoding="utf-8"?>
 <p:sld xmlns:a="http://schemas.openxmlformats.org/drawingml/2006/main" xmlns:r="http://schemas.openxmlformats.org/officeDocument/2006/relationships" xmlns:p="http://schemas.openxmlformats.org/presentationml/2006/main">
   <p:cSld>
     <p:spTree>
@@ -31665,7 +31765,7 @@
 </p:sld>
 </file>
 
-<file path=ppt/slides/slide66.xml><?xml version="1.0" encoding="utf-8"?>
+<file path=ppt/slides/slide67.xml><?xml version="1.0" encoding="utf-8"?>
 <p:sld xmlns:a="http://schemas.openxmlformats.org/drawingml/2006/main" xmlns:r="http://schemas.openxmlformats.org/officeDocument/2006/relationships" xmlns:p="http://schemas.openxmlformats.org/presentationml/2006/main">
   <p:cSld>
     <p:spTree>
@@ -31749,7 +31849,7 @@
 </p:sld>
 </file>
 
-<file path=ppt/slides/slide67.xml><?xml version="1.0" encoding="utf-8"?>
+<file path=ppt/slides/slide68.xml><?xml version="1.0" encoding="utf-8"?>
 <p:sld xmlns:a="http://schemas.openxmlformats.org/drawingml/2006/main" xmlns:r="http://schemas.openxmlformats.org/officeDocument/2006/relationships" xmlns:p="http://schemas.openxmlformats.org/presentationml/2006/main">
   <p:cSld>
     <p:spTree>
@@ -31943,7 +32043,7 @@
 </p:sld>
 </file>
 
-<file path=ppt/slides/slide68.xml><?xml version="1.0" encoding="utf-8"?>
+<file path=ppt/slides/slide69.xml><?xml version="1.0" encoding="utf-8"?>
 <p:sld xmlns:a="http://schemas.openxmlformats.org/drawingml/2006/main" xmlns:r="http://schemas.openxmlformats.org/officeDocument/2006/relationships" xmlns:p="http://schemas.openxmlformats.org/presentationml/2006/main">
   <p:cSld>
     <p:spTree>
@@ -32018,162 +32118,6 @@
     <p:extLst>
       <p:ext uri="{BB962C8B-B14F-4D97-AF65-F5344CB8AC3E}">
         <p14:creationId xmlns:p14="http://schemas.microsoft.com/office/powerpoint/2010/main" val="1226754451"/>
-      </p:ext>
-    </p:extLst>
-  </p:cSld>
-  <p:clrMapOvr>
-    <a:masterClrMapping/>
-  </p:clrMapOvr>
-</p:sld>
-</file>
-
-<file path=ppt/slides/slide69.xml><?xml version="1.0" encoding="utf-8"?>
-<p:sld xmlns:a="http://schemas.openxmlformats.org/drawingml/2006/main" xmlns:r="http://schemas.openxmlformats.org/officeDocument/2006/relationships" xmlns:p="http://schemas.openxmlformats.org/presentationml/2006/main">
-  <p:cSld>
-    <p:spTree>
-      <p:nvGrpSpPr>
-        <p:cNvPr id="1" name=""/>
-        <p:cNvGrpSpPr/>
-        <p:nvPr/>
-      </p:nvGrpSpPr>
-      <p:grpSpPr>
-        <a:xfrm>
-          <a:off x="0" y="0"/>
-          <a:ext cx="0" cy="0"/>
-          <a:chOff x="0" y="0"/>
-          <a:chExt cx="0" cy="0"/>
-        </a:xfrm>
-      </p:grpSpPr>
-      <p:sp>
-        <p:nvSpPr>
-          <p:cNvPr id="2" name="Título 1">
-            <a:extLst>
-              <a:ext uri="{FF2B5EF4-FFF2-40B4-BE49-F238E27FC236}">
-                <a16:creationId xmlns:a16="http://schemas.microsoft.com/office/drawing/2014/main" id="{D2426F40-B7FB-DEC1-6743-EEE75D98EB36}"/>
-              </a:ext>
-            </a:extLst>
-          </p:cNvPr>
-          <p:cNvSpPr>
-            <a:spLocks noGrp="1"/>
-          </p:cNvSpPr>
-          <p:nvPr>
-            <p:ph type="title"/>
-          </p:nvPr>
-        </p:nvSpPr>
-        <p:spPr/>
-        <p:txBody>
-          <a:bodyPr/>
-          <a:lstStyle/>
-          <a:p>
-            <a:r>
-              <a:rPr lang="es-MX" dirty="0"/>
-              <a:t>Recomendaciones</a:t>
-            </a:r>
-            <a:endParaRPr lang="es-PE" dirty="0"/>
-          </a:p>
-        </p:txBody>
-      </p:sp>
-      <p:sp>
-        <p:nvSpPr>
-          <p:cNvPr id="3" name="Marcador de contenido 2">
-            <a:extLst>
-              <a:ext uri="{FF2B5EF4-FFF2-40B4-BE49-F238E27FC236}">
-                <a16:creationId xmlns:a16="http://schemas.microsoft.com/office/drawing/2014/main" id="{54B18982-994E-A5FA-25E5-D4EF841DBED6}"/>
-              </a:ext>
-            </a:extLst>
-          </p:cNvPr>
-          <p:cNvSpPr>
-            <a:spLocks noGrp="1"/>
-          </p:cNvSpPr>
-          <p:nvPr>
-            <p:ph idx="1"/>
-          </p:nvPr>
-        </p:nvSpPr>
-        <p:spPr/>
-        <p:txBody>
-          <a:bodyPr>
-            <a:normAutofit fontScale="92500" lnSpcReduction="20000"/>
-          </a:bodyPr>
-          <a:lstStyle/>
-          <a:p>
-            <a:pPr marL="457200" indent="-457200">
-              <a:buFont typeface="+mj-lt"/>
-              <a:buAutoNum type="arabicPeriod"/>
-            </a:pPr>
-            <a:r>
-              <a:rPr lang="es-MX" dirty="0"/>
-              <a:t>Explorar por qué la distribución de sexo es tan diferente en la región oriente.</a:t>
-            </a:r>
-          </a:p>
-          <a:p>
-            <a:pPr marL="457200" indent="-457200">
-              <a:buFont typeface="+mj-lt"/>
-              <a:buAutoNum type="arabicPeriod"/>
-            </a:pPr>
-            <a:r>
-              <a:rPr lang="es-MX" dirty="0"/>
-              <a:t>Estudiar cuáles son los motivos que explican las diferencias entre especialidades quirúrgicas y las demás en el Perú. </a:t>
-            </a:r>
-          </a:p>
-          <a:p>
-            <a:pPr marL="457200" indent="-457200">
-              <a:buFont typeface="+mj-lt"/>
-              <a:buAutoNum type="arabicPeriod"/>
-            </a:pPr>
-            <a:r>
-              <a:rPr lang="es-MX" dirty="0"/>
-              <a:t>Explorar por qué cirugía pediátrica es diferente a las otras especialidades quirúrgicas (habiendo más postulantes e ingresantes de sexo femenino). </a:t>
-            </a:r>
-          </a:p>
-          <a:p>
-            <a:pPr marL="457200" indent="-457200">
-              <a:buFont typeface="+mj-lt"/>
-              <a:buAutoNum type="arabicPeriod"/>
-            </a:pPr>
-            <a:r>
-              <a:rPr lang="es-MX" dirty="0"/>
-              <a:t>Explorar por qué cirugía plástica no sigue la tendencia de las demás especialidades (cada vez tiene menos mujeres). </a:t>
-            </a:r>
-          </a:p>
-          <a:p>
-            <a:pPr marL="457200" indent="-457200">
-              <a:buFont typeface="+mj-lt"/>
-              <a:buAutoNum type="arabicPeriod"/>
-            </a:pPr>
-            <a:r>
-              <a:rPr lang="es-MX" dirty="0"/>
-              <a:t>Estudiar la distribución de sexo y las tendencias de sexo al final de los programas de residencia médica. </a:t>
-            </a:r>
-          </a:p>
-          <a:p>
-            <a:pPr marL="457200" indent="-457200">
-              <a:buFont typeface="+mj-lt"/>
-              <a:buAutoNum type="arabicPeriod"/>
-            </a:pPr>
-            <a:r>
-              <a:rPr lang="es-MX" dirty="0"/>
-              <a:t>Realizar seguimiento a los ingresantes a las especialidades con predominancia del sexo opuesto para estudiar posibles barreras o dificultades producto del sexo. </a:t>
-            </a:r>
-          </a:p>
-          <a:p>
-            <a:pPr marL="457200" indent="-457200">
-              <a:buFont typeface="+mj-lt"/>
-              <a:buAutoNum type="arabicPeriod"/>
-            </a:pPr>
-            <a:r>
-              <a:rPr lang="es-MX" dirty="0"/>
-              <a:t>Registrar información sobre el sexo de los participantes en procesos de evaluación y formación de la carrera de medicina humana.</a:t>
-            </a:r>
-          </a:p>
-          <a:p>
-            <a:endParaRPr lang="es-PE" dirty="0"/>
-          </a:p>
-        </p:txBody>
-      </p:sp>
-    </p:spTree>
-    <p:extLst>
-      <p:ext uri="{BB962C8B-B14F-4D97-AF65-F5344CB8AC3E}">
-        <p14:creationId xmlns:p14="http://schemas.microsoft.com/office/powerpoint/2010/main" val="2869833305"/>
       </p:ext>
     </p:extLst>
   </p:cSld>
@@ -32300,6 +32244,162 @@
     <p:extLst>
       <p:ext uri="{BB962C8B-B14F-4D97-AF65-F5344CB8AC3E}">
         <p14:creationId xmlns:p14="http://schemas.microsoft.com/office/powerpoint/2010/main" val="255294937"/>
+      </p:ext>
+    </p:extLst>
+  </p:cSld>
+  <p:clrMapOvr>
+    <a:masterClrMapping/>
+  </p:clrMapOvr>
+</p:sld>
+</file>
+
+<file path=ppt/slides/slide70.xml><?xml version="1.0" encoding="utf-8"?>
+<p:sld xmlns:a="http://schemas.openxmlformats.org/drawingml/2006/main" xmlns:r="http://schemas.openxmlformats.org/officeDocument/2006/relationships" xmlns:p="http://schemas.openxmlformats.org/presentationml/2006/main">
+  <p:cSld>
+    <p:spTree>
+      <p:nvGrpSpPr>
+        <p:cNvPr id="1" name=""/>
+        <p:cNvGrpSpPr/>
+        <p:nvPr/>
+      </p:nvGrpSpPr>
+      <p:grpSpPr>
+        <a:xfrm>
+          <a:off x="0" y="0"/>
+          <a:ext cx="0" cy="0"/>
+          <a:chOff x="0" y="0"/>
+          <a:chExt cx="0" cy="0"/>
+        </a:xfrm>
+      </p:grpSpPr>
+      <p:sp>
+        <p:nvSpPr>
+          <p:cNvPr id="2" name="Título 1">
+            <a:extLst>
+              <a:ext uri="{FF2B5EF4-FFF2-40B4-BE49-F238E27FC236}">
+                <a16:creationId xmlns:a16="http://schemas.microsoft.com/office/drawing/2014/main" id="{D2426F40-B7FB-DEC1-6743-EEE75D98EB36}"/>
+              </a:ext>
+            </a:extLst>
+          </p:cNvPr>
+          <p:cNvSpPr>
+            <a:spLocks noGrp="1"/>
+          </p:cNvSpPr>
+          <p:nvPr>
+            <p:ph type="title"/>
+          </p:nvPr>
+        </p:nvSpPr>
+        <p:spPr/>
+        <p:txBody>
+          <a:bodyPr/>
+          <a:lstStyle/>
+          <a:p>
+            <a:r>
+              <a:rPr lang="es-MX" dirty="0"/>
+              <a:t>Recomendaciones</a:t>
+            </a:r>
+            <a:endParaRPr lang="es-PE" dirty="0"/>
+          </a:p>
+        </p:txBody>
+      </p:sp>
+      <p:sp>
+        <p:nvSpPr>
+          <p:cNvPr id="3" name="Marcador de contenido 2">
+            <a:extLst>
+              <a:ext uri="{FF2B5EF4-FFF2-40B4-BE49-F238E27FC236}">
+                <a16:creationId xmlns:a16="http://schemas.microsoft.com/office/drawing/2014/main" id="{54B18982-994E-A5FA-25E5-D4EF841DBED6}"/>
+              </a:ext>
+            </a:extLst>
+          </p:cNvPr>
+          <p:cNvSpPr>
+            <a:spLocks noGrp="1"/>
+          </p:cNvSpPr>
+          <p:nvPr>
+            <p:ph idx="1"/>
+          </p:nvPr>
+        </p:nvSpPr>
+        <p:spPr/>
+        <p:txBody>
+          <a:bodyPr>
+            <a:normAutofit fontScale="92500" lnSpcReduction="20000"/>
+          </a:bodyPr>
+          <a:lstStyle/>
+          <a:p>
+            <a:pPr marL="457200" indent="-457200">
+              <a:buFont typeface="+mj-lt"/>
+              <a:buAutoNum type="arabicPeriod"/>
+            </a:pPr>
+            <a:r>
+              <a:rPr lang="es-MX" dirty="0"/>
+              <a:t>Explorar por qué la distribución de sexo es tan diferente en la región oriente.</a:t>
+            </a:r>
+          </a:p>
+          <a:p>
+            <a:pPr marL="457200" indent="-457200">
+              <a:buFont typeface="+mj-lt"/>
+              <a:buAutoNum type="arabicPeriod"/>
+            </a:pPr>
+            <a:r>
+              <a:rPr lang="es-MX" dirty="0"/>
+              <a:t>Estudiar cuáles son los motivos que explican las diferencias entre especialidades quirúrgicas y las demás en el Perú. </a:t>
+            </a:r>
+          </a:p>
+          <a:p>
+            <a:pPr marL="457200" indent="-457200">
+              <a:buFont typeface="+mj-lt"/>
+              <a:buAutoNum type="arabicPeriod"/>
+            </a:pPr>
+            <a:r>
+              <a:rPr lang="es-MX" dirty="0"/>
+              <a:t>Explorar por qué cirugía pediátrica es diferente a las otras especialidades quirúrgicas (habiendo más postulantes e ingresantes de sexo femenino). </a:t>
+            </a:r>
+          </a:p>
+          <a:p>
+            <a:pPr marL="457200" indent="-457200">
+              <a:buFont typeface="+mj-lt"/>
+              <a:buAutoNum type="arabicPeriod"/>
+            </a:pPr>
+            <a:r>
+              <a:rPr lang="es-MX" dirty="0"/>
+              <a:t>Explorar por qué cirugía plástica no sigue la tendencia de las demás especialidades (cada vez tiene menos mujeres). </a:t>
+            </a:r>
+          </a:p>
+          <a:p>
+            <a:pPr marL="457200" indent="-457200">
+              <a:buFont typeface="+mj-lt"/>
+              <a:buAutoNum type="arabicPeriod"/>
+            </a:pPr>
+            <a:r>
+              <a:rPr lang="es-MX" dirty="0"/>
+              <a:t>Estudiar la distribución de sexo y las tendencias de sexo al final de los programas de residencia médica. </a:t>
+            </a:r>
+          </a:p>
+          <a:p>
+            <a:pPr marL="457200" indent="-457200">
+              <a:buFont typeface="+mj-lt"/>
+              <a:buAutoNum type="arabicPeriod"/>
+            </a:pPr>
+            <a:r>
+              <a:rPr lang="es-MX" dirty="0"/>
+              <a:t>Realizar seguimiento a los ingresantes a las especialidades con predominancia del sexo opuesto para estudiar posibles barreras o dificultades producto del sexo. </a:t>
+            </a:r>
+          </a:p>
+          <a:p>
+            <a:pPr marL="457200" indent="-457200">
+              <a:buFont typeface="+mj-lt"/>
+              <a:buAutoNum type="arabicPeriod"/>
+            </a:pPr>
+            <a:r>
+              <a:rPr lang="es-MX" dirty="0"/>
+              <a:t>Registrar información sobre el sexo de los participantes en procesos de evaluación y formación de la carrera de medicina humana.</a:t>
+            </a:r>
+          </a:p>
+          <a:p>
+            <a:endParaRPr lang="es-PE" dirty="0"/>
+          </a:p>
+        </p:txBody>
+      </p:sp>
+    </p:spTree>
+    <p:extLst>
+      <p:ext uri="{BB962C8B-B14F-4D97-AF65-F5344CB8AC3E}">
+        <p14:creationId xmlns:p14="http://schemas.microsoft.com/office/powerpoint/2010/main" val="2869833305"/>
       </p:ext>
     </p:extLst>
   </p:cSld>

</xml_diff>

<commit_message>
Some minor changes to my document and my slides
</commit_message>
<xml_diff>
--- a/doc/diapositivas_sustentacion_tesis.pptx
+++ b/doc/diapositivas_sustentacion_tesis.pptx
@@ -5,79 +5,81 @@
     <p:sldMasterId id="2147483672" r:id="rId1"/>
   </p:sldMasterIdLst>
   <p:notesMasterIdLst>
-    <p:notesMasterId r:id="rId72"/>
+    <p:notesMasterId r:id="rId74"/>
   </p:notesMasterIdLst>
   <p:sldIdLst>
     <p:sldId id="256" r:id="rId2"/>
     <p:sldId id="258" r:id="rId3"/>
     <p:sldId id="257" r:id="rId4"/>
     <p:sldId id="265" r:id="rId5"/>
-    <p:sldId id="267" r:id="rId6"/>
-    <p:sldId id="259" r:id="rId7"/>
-    <p:sldId id="269" r:id="rId8"/>
-    <p:sldId id="260" r:id="rId9"/>
-    <p:sldId id="270" r:id="rId10"/>
-    <p:sldId id="272" r:id="rId11"/>
-    <p:sldId id="291" r:id="rId12"/>
-    <p:sldId id="273" r:id="rId13"/>
-    <p:sldId id="261" r:id="rId14"/>
-    <p:sldId id="309" r:id="rId15"/>
-    <p:sldId id="279" r:id="rId16"/>
-    <p:sldId id="292" r:id="rId17"/>
-    <p:sldId id="275" r:id="rId18"/>
-    <p:sldId id="280" r:id="rId19"/>
-    <p:sldId id="293" r:id="rId20"/>
-    <p:sldId id="310" r:id="rId21"/>
-    <p:sldId id="311" r:id="rId22"/>
-    <p:sldId id="330" r:id="rId23"/>
-    <p:sldId id="294" r:id="rId24"/>
-    <p:sldId id="312" r:id="rId25"/>
-    <p:sldId id="276" r:id="rId26"/>
-    <p:sldId id="313" r:id="rId27"/>
-    <p:sldId id="295" r:id="rId28"/>
-    <p:sldId id="296" r:id="rId29"/>
-    <p:sldId id="314" r:id="rId30"/>
-    <p:sldId id="297" r:id="rId31"/>
-    <p:sldId id="298" r:id="rId32"/>
-    <p:sldId id="299" r:id="rId33"/>
-    <p:sldId id="315" r:id="rId34"/>
-    <p:sldId id="300" r:id="rId35"/>
-    <p:sldId id="301" r:id="rId36"/>
-    <p:sldId id="316" r:id="rId37"/>
-    <p:sldId id="277" r:id="rId38"/>
-    <p:sldId id="317" r:id="rId39"/>
-    <p:sldId id="282" r:id="rId40"/>
-    <p:sldId id="302" r:id="rId41"/>
-    <p:sldId id="303" r:id="rId42"/>
-    <p:sldId id="318" r:id="rId43"/>
-    <p:sldId id="305" r:id="rId44"/>
-    <p:sldId id="319" r:id="rId45"/>
-    <p:sldId id="320" r:id="rId46"/>
-    <p:sldId id="323" r:id="rId47"/>
-    <p:sldId id="321" r:id="rId48"/>
-    <p:sldId id="304" r:id="rId49"/>
-    <p:sldId id="322" r:id="rId50"/>
-    <p:sldId id="278" r:id="rId51"/>
-    <p:sldId id="283" r:id="rId52"/>
-    <p:sldId id="306" r:id="rId53"/>
-    <p:sldId id="307" r:id="rId54"/>
-    <p:sldId id="324" r:id="rId55"/>
-    <p:sldId id="325" r:id="rId56"/>
-    <p:sldId id="308" r:id="rId57"/>
-    <p:sldId id="326" r:id="rId58"/>
-    <p:sldId id="262" r:id="rId59"/>
-    <p:sldId id="285" r:id="rId60"/>
-    <p:sldId id="327" r:id="rId61"/>
-    <p:sldId id="328" r:id="rId62"/>
-    <p:sldId id="286" r:id="rId63"/>
-    <p:sldId id="287" r:id="rId64"/>
-    <p:sldId id="331" r:id="rId65"/>
-    <p:sldId id="329" r:id="rId66"/>
-    <p:sldId id="288" r:id="rId67"/>
-    <p:sldId id="263" r:id="rId68"/>
-    <p:sldId id="289" r:id="rId69"/>
-    <p:sldId id="264" r:id="rId70"/>
-    <p:sldId id="290" r:id="rId71"/>
+    <p:sldId id="333" r:id="rId6"/>
+    <p:sldId id="267" r:id="rId7"/>
+    <p:sldId id="259" r:id="rId8"/>
+    <p:sldId id="269" r:id="rId9"/>
+    <p:sldId id="260" r:id="rId10"/>
+    <p:sldId id="270" r:id="rId11"/>
+    <p:sldId id="272" r:id="rId12"/>
+    <p:sldId id="291" r:id="rId13"/>
+    <p:sldId id="273" r:id="rId14"/>
+    <p:sldId id="261" r:id="rId15"/>
+    <p:sldId id="309" r:id="rId16"/>
+    <p:sldId id="279" r:id="rId17"/>
+    <p:sldId id="292" r:id="rId18"/>
+    <p:sldId id="275" r:id="rId19"/>
+    <p:sldId id="280" r:id="rId20"/>
+    <p:sldId id="293" r:id="rId21"/>
+    <p:sldId id="310" r:id="rId22"/>
+    <p:sldId id="311" r:id="rId23"/>
+    <p:sldId id="330" r:id="rId24"/>
+    <p:sldId id="294" r:id="rId25"/>
+    <p:sldId id="312" r:id="rId26"/>
+    <p:sldId id="276" r:id="rId27"/>
+    <p:sldId id="313" r:id="rId28"/>
+    <p:sldId id="295" r:id="rId29"/>
+    <p:sldId id="296" r:id="rId30"/>
+    <p:sldId id="314" r:id="rId31"/>
+    <p:sldId id="297" r:id="rId32"/>
+    <p:sldId id="298" r:id="rId33"/>
+    <p:sldId id="299" r:id="rId34"/>
+    <p:sldId id="315" r:id="rId35"/>
+    <p:sldId id="300" r:id="rId36"/>
+    <p:sldId id="301" r:id="rId37"/>
+    <p:sldId id="316" r:id="rId38"/>
+    <p:sldId id="277" r:id="rId39"/>
+    <p:sldId id="317" r:id="rId40"/>
+    <p:sldId id="282" r:id="rId41"/>
+    <p:sldId id="302" r:id="rId42"/>
+    <p:sldId id="303" r:id="rId43"/>
+    <p:sldId id="318" r:id="rId44"/>
+    <p:sldId id="305" r:id="rId45"/>
+    <p:sldId id="319" r:id="rId46"/>
+    <p:sldId id="320" r:id="rId47"/>
+    <p:sldId id="323" r:id="rId48"/>
+    <p:sldId id="321" r:id="rId49"/>
+    <p:sldId id="304" r:id="rId50"/>
+    <p:sldId id="322" r:id="rId51"/>
+    <p:sldId id="278" r:id="rId52"/>
+    <p:sldId id="283" r:id="rId53"/>
+    <p:sldId id="306" r:id="rId54"/>
+    <p:sldId id="307" r:id="rId55"/>
+    <p:sldId id="324" r:id="rId56"/>
+    <p:sldId id="325" r:id="rId57"/>
+    <p:sldId id="308" r:id="rId58"/>
+    <p:sldId id="326" r:id="rId59"/>
+    <p:sldId id="262" r:id="rId60"/>
+    <p:sldId id="285" r:id="rId61"/>
+    <p:sldId id="327" r:id="rId62"/>
+    <p:sldId id="328" r:id="rId63"/>
+    <p:sldId id="286" r:id="rId64"/>
+    <p:sldId id="332" r:id="rId65"/>
+    <p:sldId id="287" r:id="rId66"/>
+    <p:sldId id="331" r:id="rId67"/>
+    <p:sldId id="329" r:id="rId68"/>
+    <p:sldId id="288" r:id="rId69"/>
+    <p:sldId id="263" r:id="rId70"/>
+    <p:sldId id="289" r:id="rId71"/>
+    <p:sldId id="264" r:id="rId72"/>
+    <p:sldId id="290" r:id="rId73"/>
   </p:sldIdLst>
   <p:sldSz cx="12192000" cy="6858000"/>
   <p:notesSz cx="6858000" cy="9144000"/>
@@ -189,6 +191,7 @@
           <p14:sldIdLst>
             <p14:sldId id="257"/>
             <p14:sldId id="265"/>
+            <p14:sldId id="333"/>
             <p14:sldId id="267"/>
             <p14:sldId id="259"/>
             <p14:sldId id="269"/>
@@ -259,6 +262,7 @@
             <p14:sldId id="327"/>
             <p14:sldId id="328"/>
             <p14:sldId id="286"/>
+            <p14:sldId id="332"/>
             <p14:sldId id="287"/>
             <p14:sldId id="331"/>
             <p14:sldId id="329"/>
@@ -364,7 +368,7 @@
           <a:p>
             <a:fld id="{234B5AB6-08EC-47B1-B66D-262C33DD7BFF}" type="datetimeFigureOut">
               <a:rPr lang="es-PE" smtClean="0"/>
-              <a:t>6/03/2024</a:t>
+              <a:t>10/03/2024</a:t>
             </a:fld>
             <a:endParaRPr lang="es-PE"/>
           </a:p>
@@ -754,7 +758,7 @@
           <a:p>
             <a:fld id="{C8C7E893-61C0-4E51-AB68-6EE02BB86A4E}" type="slidenum">
               <a:rPr lang="es-PE" smtClean="0"/>
-              <a:t>15</a:t>
+              <a:t>16</a:t>
             </a:fld>
             <a:endParaRPr lang="es-PE"/>
           </a:p>
@@ -903,7 +907,7 @@
           <a:p>
             <a:fld id="{C8C7E893-61C0-4E51-AB68-6EE02BB86A4E}" type="slidenum">
               <a:rPr lang="es-PE" smtClean="0"/>
-              <a:t>30</a:t>
+              <a:t>31</a:t>
             </a:fld>
             <a:endParaRPr lang="es-PE"/>
           </a:p>
@@ -1107,7 +1111,7 @@
           <a:p>
             <a:fld id="{C8C7E893-61C0-4E51-AB68-6EE02BB86A4E}" type="slidenum">
               <a:rPr lang="es-PE" smtClean="0"/>
-              <a:t>31</a:t>
+              <a:t>32</a:t>
             </a:fld>
             <a:endParaRPr lang="es-PE"/>
           </a:p>
@@ -1264,7 +1268,7 @@
           <a:p>
             <a:fld id="{C8C7E893-61C0-4E51-AB68-6EE02BB86A4E}" type="slidenum">
               <a:rPr lang="es-PE" smtClean="0"/>
-              <a:t>32</a:t>
+              <a:t>33</a:t>
             </a:fld>
             <a:endParaRPr lang="es-PE"/>
           </a:p>
@@ -1433,7 +1437,7 @@
           <a:p>
             <a:fld id="{C8C7E893-61C0-4E51-AB68-6EE02BB86A4E}" type="slidenum">
               <a:rPr lang="es-PE" smtClean="0"/>
-              <a:t>34</a:t>
+              <a:t>35</a:t>
             </a:fld>
             <a:endParaRPr lang="es-PE"/>
           </a:p>
@@ -1566,7 +1570,7 @@
           <a:p>
             <a:fld id="{C8C7E893-61C0-4E51-AB68-6EE02BB86A4E}" type="slidenum">
               <a:rPr lang="es-PE" smtClean="0"/>
-              <a:t>35</a:t>
+              <a:t>36</a:t>
             </a:fld>
             <a:endParaRPr lang="es-PE"/>
           </a:p>
@@ -1709,7 +1713,7 @@
           <a:p>
             <a:fld id="{C8C7E893-61C0-4E51-AB68-6EE02BB86A4E}" type="slidenum">
               <a:rPr lang="es-PE" smtClean="0"/>
-              <a:t>39</a:t>
+              <a:t>40</a:t>
             </a:fld>
             <a:endParaRPr lang="es-PE"/>
           </a:p>
@@ -1852,7 +1856,7 @@
           <a:p>
             <a:fld id="{C8C7E893-61C0-4E51-AB68-6EE02BB86A4E}" type="slidenum">
               <a:rPr lang="es-PE" smtClean="0"/>
-              <a:t>40</a:t>
+              <a:t>41</a:t>
             </a:fld>
             <a:endParaRPr lang="es-PE"/>
           </a:p>
@@ -1995,7 +1999,7 @@
           <a:p>
             <a:fld id="{C8C7E893-61C0-4E51-AB68-6EE02BB86A4E}" type="slidenum">
               <a:rPr lang="es-PE" smtClean="0"/>
-              <a:t>41</a:t>
+              <a:t>42</a:t>
             </a:fld>
             <a:endParaRPr lang="es-PE"/>
           </a:p>
@@ -2182,7 +2186,7 @@
           <a:p>
             <a:fld id="{C8C7E893-61C0-4E51-AB68-6EE02BB86A4E}" type="slidenum">
               <a:rPr lang="es-PE" smtClean="0"/>
-              <a:t>43</a:t>
+              <a:t>44</a:t>
             </a:fld>
             <a:endParaRPr lang="es-PE"/>
           </a:p>
@@ -2315,7 +2319,7 @@
           <a:p>
             <a:fld id="{C8C7E893-61C0-4E51-AB68-6EE02BB86A4E}" type="slidenum">
               <a:rPr lang="es-PE" smtClean="0"/>
-              <a:t>48</a:t>
+              <a:t>49</a:t>
             </a:fld>
             <a:endParaRPr lang="es-PE"/>
           </a:p>
@@ -2411,7 +2415,7 @@
           <a:p>
             <a:fld id="{C8C7E893-61C0-4E51-AB68-6EE02BB86A4E}" type="slidenum">
               <a:rPr lang="es-PE" smtClean="0"/>
-              <a:t>16</a:t>
+              <a:t>17</a:t>
             </a:fld>
             <a:endParaRPr lang="es-PE"/>
           </a:p>
@@ -2554,7 +2558,7 @@
           <a:p>
             <a:fld id="{C8C7E893-61C0-4E51-AB68-6EE02BB86A4E}" type="slidenum">
               <a:rPr lang="es-PE" smtClean="0"/>
-              <a:t>51</a:t>
+              <a:t>52</a:t>
             </a:fld>
             <a:endParaRPr lang="es-PE"/>
           </a:p>
@@ -2709,7 +2713,7 @@
           <a:p>
             <a:fld id="{C8C7E893-61C0-4E51-AB68-6EE02BB86A4E}" type="slidenum">
               <a:rPr lang="es-PE" smtClean="0"/>
-              <a:t>52</a:t>
+              <a:t>53</a:t>
             </a:fld>
             <a:endParaRPr lang="es-PE"/>
           </a:p>
@@ -2820,7 +2824,7 @@
           <a:p>
             <a:fld id="{C8C7E893-61C0-4E51-AB68-6EE02BB86A4E}" type="slidenum">
               <a:rPr lang="es-PE" smtClean="0"/>
-              <a:t>53</a:t>
+              <a:t>54</a:t>
             </a:fld>
             <a:endParaRPr lang="es-PE"/>
           </a:p>
@@ -2963,7 +2967,7 @@
           <a:p>
             <a:fld id="{C8C7E893-61C0-4E51-AB68-6EE02BB86A4E}" type="slidenum">
               <a:rPr lang="es-PE" smtClean="0"/>
-              <a:t>56</a:t>
+              <a:t>57</a:t>
             </a:fld>
             <a:endParaRPr lang="es-PE"/>
           </a:p>
@@ -3073,7 +3077,7 @@
           <a:p>
             <a:fld id="{C8C7E893-61C0-4E51-AB68-6EE02BB86A4E}" type="slidenum">
               <a:rPr lang="es-PE" smtClean="0"/>
-              <a:t>18</a:t>
+              <a:t>19</a:t>
             </a:fld>
             <a:endParaRPr lang="es-PE"/>
           </a:p>
@@ -3238,7 +3242,7 @@
           <a:p>
             <a:fld id="{C8C7E893-61C0-4E51-AB68-6EE02BB86A4E}" type="slidenum">
               <a:rPr lang="es-PE" smtClean="0"/>
-              <a:t>19</a:t>
+              <a:t>20</a:t>
             </a:fld>
             <a:endParaRPr lang="es-PE"/>
           </a:p>
@@ -3322,7 +3326,7 @@
           <a:p>
             <a:fld id="{C8C7E893-61C0-4E51-AB68-6EE02BB86A4E}" type="slidenum">
               <a:rPr lang="es-PE" smtClean="0"/>
-              <a:t>20</a:t>
+              <a:t>21</a:t>
             </a:fld>
             <a:endParaRPr lang="es-PE"/>
           </a:p>
@@ -3583,7 +3587,7 @@
           <a:p>
             <a:fld id="{C8C7E893-61C0-4E51-AB68-6EE02BB86A4E}" type="slidenum">
               <a:rPr lang="es-PE" smtClean="0"/>
-              <a:t>22</a:t>
+              <a:t>23</a:t>
             </a:fld>
             <a:endParaRPr lang="es-PE"/>
           </a:p>
@@ -3838,7 +3842,7 @@
           <a:p>
             <a:fld id="{C8C7E893-61C0-4E51-AB68-6EE02BB86A4E}" type="slidenum">
               <a:rPr lang="es-PE" smtClean="0"/>
-              <a:t>23</a:t>
+              <a:t>24</a:t>
             </a:fld>
             <a:endParaRPr lang="es-PE"/>
           </a:p>
@@ -4023,7 +4027,7 @@
           <a:p>
             <a:fld id="{C8C7E893-61C0-4E51-AB68-6EE02BB86A4E}" type="slidenum">
               <a:rPr lang="es-PE" smtClean="0"/>
-              <a:t>27</a:t>
+              <a:t>28</a:t>
             </a:fld>
             <a:endParaRPr lang="es-PE"/>
           </a:p>
@@ -4208,7 +4212,7 @@
           <a:p>
             <a:fld id="{C8C7E893-61C0-4E51-AB68-6EE02BB86A4E}" type="slidenum">
               <a:rPr lang="es-PE" smtClean="0"/>
-              <a:t>28</a:t>
+              <a:t>29</a:t>
             </a:fld>
             <a:endParaRPr lang="es-PE"/>
           </a:p>
@@ -4453,7 +4457,7 @@
           <a:p>
             <a:fld id="{7B14AA15-6390-4B76-91AD-6461C139DACF}" type="datetimeFigureOut">
               <a:rPr lang="es-PE" smtClean="0"/>
-              <a:t>6/03/2024</a:t>
+              <a:t>10/03/2024</a:t>
             </a:fld>
             <a:endParaRPr lang="es-PE"/>
           </a:p>
@@ -4661,7 +4665,7 @@
           <a:p>
             <a:fld id="{7B14AA15-6390-4B76-91AD-6461C139DACF}" type="datetimeFigureOut">
               <a:rPr lang="es-PE" smtClean="0"/>
-              <a:t>6/03/2024</a:t>
+              <a:t>10/03/2024</a:t>
             </a:fld>
             <a:endParaRPr lang="es-PE"/>
           </a:p>
@@ -4917,7 +4921,7 @@
           <a:p>
             <a:fld id="{7B14AA15-6390-4B76-91AD-6461C139DACF}" type="datetimeFigureOut">
               <a:rPr lang="es-PE" smtClean="0"/>
-              <a:t>6/03/2024</a:t>
+              <a:t>10/03/2024</a:t>
             </a:fld>
             <a:endParaRPr lang="es-PE"/>
           </a:p>
@@ -5087,7 +5091,7 @@
           <a:p>
             <a:fld id="{7B14AA15-6390-4B76-91AD-6461C139DACF}" type="datetimeFigureOut">
               <a:rPr lang="es-PE" smtClean="0"/>
-              <a:t>6/03/2024</a:t>
+              <a:t>10/03/2024</a:t>
             </a:fld>
             <a:endParaRPr lang="es-PE"/>
           </a:p>
@@ -5430,7 +5434,7 @@
           <a:p>
             <a:fld id="{7B14AA15-6390-4B76-91AD-6461C139DACF}" type="datetimeFigureOut">
               <a:rPr lang="es-PE" smtClean="0"/>
-              <a:t>6/03/2024</a:t>
+              <a:t>10/03/2024</a:t>
             </a:fld>
             <a:endParaRPr lang="es-PE"/>
           </a:p>
@@ -5705,7 +5709,7 @@
           <a:p>
             <a:fld id="{7B14AA15-6390-4B76-91AD-6461C139DACF}" type="datetimeFigureOut">
               <a:rPr lang="es-PE" smtClean="0"/>
-              <a:t>6/03/2024</a:t>
+              <a:t>10/03/2024</a:t>
             </a:fld>
             <a:endParaRPr lang="es-PE"/>
           </a:p>
@@ -6084,7 +6088,7 @@
           <a:p>
             <a:fld id="{7B14AA15-6390-4B76-91AD-6461C139DACF}" type="datetimeFigureOut">
               <a:rPr lang="es-PE" smtClean="0"/>
-              <a:t>6/03/2024</a:t>
+              <a:t>10/03/2024</a:t>
             </a:fld>
             <a:endParaRPr lang="es-PE"/>
           </a:p>
@@ -6202,7 +6206,7 @@
           <a:p>
             <a:fld id="{7B14AA15-6390-4B76-91AD-6461C139DACF}" type="datetimeFigureOut">
               <a:rPr lang="es-PE" smtClean="0"/>
-              <a:t>6/03/2024</a:t>
+              <a:t>10/03/2024</a:t>
             </a:fld>
             <a:endParaRPr lang="es-PE"/>
           </a:p>
@@ -6373,7 +6377,7 @@
           <a:p>
             <a:fld id="{7B14AA15-6390-4B76-91AD-6461C139DACF}" type="datetimeFigureOut">
               <a:rPr lang="es-PE" smtClean="0"/>
-              <a:t>6/03/2024</a:t>
+              <a:t>10/03/2024</a:t>
             </a:fld>
             <a:endParaRPr lang="es-PE"/>
           </a:p>
@@ -6727,7 +6731,7 @@
           <a:p>
             <a:fld id="{7B14AA15-6390-4B76-91AD-6461C139DACF}" type="datetimeFigureOut">
               <a:rPr lang="es-PE" smtClean="0"/>
-              <a:t>6/03/2024</a:t>
+              <a:t>10/03/2024</a:t>
             </a:fld>
             <a:endParaRPr lang="es-PE"/>
           </a:p>
@@ -7104,7 +7108,7 @@
           <a:p>
             <a:fld id="{7B14AA15-6390-4B76-91AD-6461C139DACF}" type="datetimeFigureOut">
               <a:rPr lang="es-PE" smtClean="0"/>
-              <a:t>6/03/2024</a:t>
+              <a:t>10/03/2024</a:t>
             </a:fld>
             <a:endParaRPr lang="es-PE"/>
           </a:p>
@@ -7391,7 +7395,7 @@
           <a:p>
             <a:fld id="{7B14AA15-6390-4B76-91AD-6461C139DACF}" type="datetimeFigureOut">
               <a:rPr lang="es-PE" smtClean="0"/>
-              <a:t>6/03/2024</a:t>
+              <a:t>10/03/2024</a:t>
             </a:fld>
             <a:endParaRPr lang="es-PE"/>
           </a:p>
@@ -8024,6 +8028,143 @@
           <p:cNvPr id="2" name="Título 1">
             <a:extLst>
               <a:ext uri="{FF2B5EF4-FFF2-40B4-BE49-F238E27FC236}">
+                <a16:creationId xmlns:a16="http://schemas.microsoft.com/office/drawing/2014/main" id="{08F598B0-53C8-C7E5-C707-9AEF6D1CAA9E}"/>
+              </a:ext>
+            </a:extLst>
+          </p:cNvPr>
+          <p:cNvSpPr>
+            <a:spLocks noGrp="1"/>
+          </p:cNvSpPr>
+          <p:nvPr>
+            <p:ph type="title"/>
+          </p:nvPr>
+        </p:nvSpPr>
+        <p:spPr/>
+        <p:txBody>
+          <a:bodyPr/>
+          <a:lstStyle/>
+          <a:p>
+            <a:r>
+              <a:rPr lang="es-MX" dirty="0"/>
+              <a:t>Obtención y manejo de datos</a:t>
+            </a:r>
+            <a:endParaRPr lang="es-PE" dirty="0"/>
+          </a:p>
+        </p:txBody>
+      </p:sp>
+      <p:sp>
+        <p:nvSpPr>
+          <p:cNvPr id="3" name="Marcador de contenido 2">
+            <a:extLst>
+              <a:ext uri="{FF2B5EF4-FFF2-40B4-BE49-F238E27FC236}">
+                <a16:creationId xmlns:a16="http://schemas.microsoft.com/office/drawing/2014/main" id="{4816063D-634E-B1FE-0D3C-4155ECDE73A8}"/>
+              </a:ext>
+            </a:extLst>
+          </p:cNvPr>
+          <p:cNvSpPr>
+            <a:spLocks noGrp="1"/>
+          </p:cNvSpPr>
+          <p:nvPr>
+            <p:ph idx="1"/>
+          </p:nvPr>
+        </p:nvSpPr>
+        <p:spPr/>
+        <p:txBody>
+          <a:bodyPr/>
+          <a:lstStyle/>
+          <a:p>
+            <a:r>
+              <a:rPr lang="es-MX" dirty="0"/>
+              <a:t>Información obtenida de los resultados públicos del Concurso Nacional del </a:t>
+            </a:r>
+            <a:r>
+              <a:rPr lang="es-MX" dirty="0" err="1"/>
+              <a:t>Residentado</a:t>
+            </a:r>
+            <a:r>
+              <a:rPr lang="es-MX" dirty="0"/>
+              <a:t> Médico (CONAREME) entre los años 2013 y 2023</a:t>
+            </a:r>
+            <a:r>
+              <a:rPr lang="es-PE" dirty="0"/>
+              <a:t>.</a:t>
+            </a:r>
+          </a:p>
+          <a:p>
+            <a:r>
+              <a:rPr lang="es-MX" dirty="0"/>
+              <a:t>Estos años contenían la información relevante para el presente estudio.</a:t>
+            </a:r>
+          </a:p>
+          <a:p>
+            <a:pPr lvl="1"/>
+            <a:r>
+              <a:rPr lang="es-MX" dirty="0"/>
+              <a:t>2013 – 2023: información completa de postulantes solamente</a:t>
+            </a:r>
+          </a:p>
+          <a:p>
+            <a:pPr lvl="1"/>
+            <a:r>
+              <a:rPr lang="es-MX" dirty="0"/>
+              <a:t>2016 – 2023: información completa de postulantes e ingresantes</a:t>
+            </a:r>
+          </a:p>
+          <a:p>
+            <a:r>
+              <a:rPr lang="es-MX" dirty="0"/>
+              <a:t>Formato en PDF fue transformado a CSV usando programa “Tabula”.</a:t>
+            </a:r>
+          </a:p>
+          <a:p>
+            <a:r>
+              <a:rPr lang="es-MX" dirty="0"/>
+              <a:t>Bases de datos fueron unificadas en una sola usando software “R”.</a:t>
+            </a:r>
+          </a:p>
+          <a:p>
+            <a:r>
+              <a:rPr lang="es-MX" dirty="0"/>
+              <a:t>Repositorio disponible en GitHub.</a:t>
+            </a:r>
+          </a:p>
+        </p:txBody>
+      </p:sp>
+    </p:spTree>
+    <p:extLst>
+      <p:ext uri="{BB962C8B-B14F-4D97-AF65-F5344CB8AC3E}">
+        <p14:creationId xmlns:p14="http://schemas.microsoft.com/office/powerpoint/2010/main" val="831922085"/>
+      </p:ext>
+    </p:extLst>
+  </p:cSld>
+  <p:clrMapOvr>
+    <a:masterClrMapping/>
+  </p:clrMapOvr>
+</p:sld>
+</file>
+
+<file path=ppt/slides/slide11.xml><?xml version="1.0" encoding="utf-8"?>
+<p:sld xmlns:a="http://schemas.openxmlformats.org/drawingml/2006/main" xmlns:r="http://schemas.openxmlformats.org/officeDocument/2006/relationships" xmlns:p="http://schemas.openxmlformats.org/presentationml/2006/main">
+  <p:cSld>
+    <p:spTree>
+      <p:nvGrpSpPr>
+        <p:cNvPr id="1" name=""/>
+        <p:cNvGrpSpPr/>
+        <p:nvPr/>
+      </p:nvGrpSpPr>
+      <p:grpSpPr>
+        <a:xfrm>
+          <a:off x="0" y="0"/>
+          <a:ext cx="0" cy="0"/>
+          <a:chOff x="0" y="0"/>
+          <a:chExt cx="0" cy="0"/>
+        </a:xfrm>
+      </p:grpSpPr>
+      <p:sp>
+        <p:nvSpPr>
+          <p:cNvPr id="2" name="Título 1">
+            <a:extLst>
+              <a:ext uri="{FF2B5EF4-FFF2-40B4-BE49-F238E27FC236}">
                 <a16:creationId xmlns:a16="http://schemas.microsoft.com/office/drawing/2014/main" id="{F87693B0-4BF4-DF37-DB15-ABF5AC92515D}"/>
               </a:ext>
             </a:extLst>
@@ -8103,7 +8244,7 @@
 </p:sld>
 </file>
 
-<file path=ppt/slides/slide11.xml><?xml version="1.0" encoding="utf-8"?>
+<file path=ppt/slides/slide12.xml><?xml version="1.0" encoding="utf-8"?>
 <p:sld xmlns:a="http://schemas.openxmlformats.org/drawingml/2006/main" xmlns:r="http://schemas.openxmlformats.org/officeDocument/2006/relationships" xmlns:p="http://schemas.openxmlformats.org/presentationml/2006/main">
   <p:cSld>
     <p:spTree>
@@ -8231,7 +8372,7 @@
 </p:sld>
 </file>
 
-<file path=ppt/slides/slide12.xml><?xml version="1.0" encoding="utf-8"?>
+<file path=ppt/slides/slide13.xml><?xml version="1.0" encoding="utf-8"?>
 <p:sld xmlns:a="http://schemas.openxmlformats.org/drawingml/2006/main" xmlns:r="http://schemas.openxmlformats.org/officeDocument/2006/relationships" xmlns:p="http://schemas.openxmlformats.org/presentationml/2006/main">
   <p:cSld>
     <p:spTree>
@@ -8351,7 +8492,7 @@
 </p:sld>
 </file>
 
-<file path=ppt/slides/slide13.xml><?xml version="1.0" encoding="utf-8"?>
+<file path=ppt/slides/slide14.xml><?xml version="1.0" encoding="utf-8"?>
 <p:sld xmlns:a="http://schemas.openxmlformats.org/drawingml/2006/main" xmlns:r="http://schemas.openxmlformats.org/officeDocument/2006/relationships" xmlns:p="http://schemas.openxmlformats.org/presentationml/2006/main">
   <p:cSld>
     <p:spTree>
@@ -8435,7 +8576,7 @@
 </p:sld>
 </file>
 
-<file path=ppt/slides/slide14.xml><?xml version="1.0" encoding="utf-8"?>
+<file path=ppt/slides/slide15.xml><?xml version="1.0" encoding="utf-8"?>
 <p:sld xmlns:a="http://schemas.openxmlformats.org/drawingml/2006/main" xmlns:r="http://schemas.openxmlformats.org/officeDocument/2006/relationships" xmlns:p="http://schemas.openxmlformats.org/presentationml/2006/main">
   <p:cSld>
     <p:spTree>
@@ -8535,7 +8676,7 @@
 </p:sld>
 </file>
 
-<file path=ppt/slides/slide15.xml><?xml version="1.0" encoding="utf-8"?>
+<file path=ppt/slides/slide16.xml><?xml version="1.0" encoding="utf-8"?>
 <p:sld xmlns:a="http://schemas.openxmlformats.org/drawingml/2006/main" xmlns:r="http://schemas.openxmlformats.org/officeDocument/2006/relationships" xmlns:p="http://schemas.openxmlformats.org/presentationml/2006/main">
   <p:cSld>
     <p:spTree>
@@ -10281,7 +10422,7 @@
 </p:sld>
 </file>
 
-<file path=ppt/slides/slide16.xml><?xml version="1.0" encoding="utf-8"?>
+<file path=ppt/slides/slide17.xml><?xml version="1.0" encoding="utf-8"?>
 <p:sld xmlns:a="http://schemas.openxmlformats.org/drawingml/2006/main" xmlns:r="http://schemas.openxmlformats.org/officeDocument/2006/relationships" xmlns:p="http://schemas.openxmlformats.org/presentationml/2006/main">
   <p:cSld>
     <p:spTree>
@@ -10383,7 +10524,7 @@
 </p:sld>
 </file>
 
-<file path=ppt/slides/slide17.xml><?xml version="1.0" encoding="utf-8"?>
+<file path=ppt/slides/slide18.xml><?xml version="1.0" encoding="utf-8"?>
 <p:sld xmlns:a="http://schemas.openxmlformats.org/drawingml/2006/main" xmlns:r="http://schemas.openxmlformats.org/officeDocument/2006/relationships" xmlns:p="http://schemas.openxmlformats.org/presentationml/2006/main">
   <p:cSld>
     <p:spTree>
@@ -10467,7 +10608,7 @@
 </p:sld>
 </file>
 
-<file path=ppt/slides/slide18.xml><?xml version="1.0" encoding="utf-8"?>
+<file path=ppt/slides/slide19.xml><?xml version="1.0" encoding="utf-8"?>
 <p:sld xmlns:a="http://schemas.openxmlformats.org/drawingml/2006/main" xmlns:r="http://schemas.openxmlformats.org/officeDocument/2006/relationships" xmlns:p="http://schemas.openxmlformats.org/presentationml/2006/main">
   <p:cSld>
     <p:spTree>
@@ -13016,7 +13157,148 @@
 </p:sld>
 </file>
 
-<file path=ppt/slides/slide19.xml><?xml version="1.0" encoding="utf-8"?>
+<file path=ppt/slides/slide2.xml><?xml version="1.0" encoding="utf-8"?>
+<p:sld xmlns:a="http://schemas.openxmlformats.org/drawingml/2006/main" xmlns:r="http://schemas.openxmlformats.org/officeDocument/2006/relationships" xmlns:p="http://schemas.openxmlformats.org/presentationml/2006/main">
+  <p:cSld>
+    <p:spTree>
+      <p:nvGrpSpPr>
+        <p:cNvPr id="1" name=""/>
+        <p:cNvGrpSpPr/>
+        <p:nvPr/>
+      </p:nvGrpSpPr>
+      <p:grpSpPr>
+        <a:xfrm>
+          <a:off x="0" y="0"/>
+          <a:ext cx="0" cy="0"/>
+          <a:chOff x="0" y="0"/>
+          <a:chExt cx="0" cy="0"/>
+        </a:xfrm>
+      </p:grpSpPr>
+      <p:sp>
+        <p:nvSpPr>
+          <p:cNvPr id="2" name="Título 1">
+            <a:extLst>
+              <a:ext uri="{FF2B5EF4-FFF2-40B4-BE49-F238E27FC236}">
+                <a16:creationId xmlns:a16="http://schemas.microsoft.com/office/drawing/2014/main" id="{064C1A2E-4D77-2744-E49C-B60F6C2C57C7}"/>
+              </a:ext>
+            </a:extLst>
+          </p:cNvPr>
+          <p:cNvSpPr>
+            <a:spLocks noGrp="1"/>
+          </p:cNvSpPr>
+          <p:nvPr>
+            <p:ph type="title"/>
+          </p:nvPr>
+        </p:nvSpPr>
+        <p:spPr/>
+        <p:txBody>
+          <a:bodyPr/>
+          <a:lstStyle/>
+          <a:p>
+            <a:r>
+              <a:rPr lang="es-MX" dirty="0"/>
+              <a:t>Puntos a tratar</a:t>
+            </a:r>
+            <a:endParaRPr lang="es-PE" dirty="0"/>
+          </a:p>
+        </p:txBody>
+      </p:sp>
+      <p:sp>
+        <p:nvSpPr>
+          <p:cNvPr id="3" name="Marcador de contenido 2">
+            <a:extLst>
+              <a:ext uri="{FF2B5EF4-FFF2-40B4-BE49-F238E27FC236}">
+                <a16:creationId xmlns:a16="http://schemas.microsoft.com/office/drawing/2014/main" id="{19A94768-A3AF-214B-9C00-EDEA644CE768}"/>
+              </a:ext>
+            </a:extLst>
+          </p:cNvPr>
+          <p:cNvSpPr>
+            <a:spLocks noGrp="1"/>
+          </p:cNvSpPr>
+          <p:nvPr>
+            <p:ph idx="1"/>
+          </p:nvPr>
+        </p:nvSpPr>
+        <p:spPr/>
+        <p:txBody>
+          <a:bodyPr/>
+          <a:lstStyle/>
+          <a:p>
+            <a:pPr>
+              <a:buFont typeface="Wingdings" panose="05000000000000000000" pitchFamily="2" charset="2"/>
+              <a:buChar char="Ø"/>
+            </a:pPr>
+            <a:r>
+              <a:rPr lang="es-MX" dirty="0"/>
+              <a:t>Introducción y marco teórico</a:t>
+            </a:r>
+          </a:p>
+          <a:p>
+            <a:pPr>
+              <a:buFont typeface="Wingdings" panose="05000000000000000000" pitchFamily="2" charset="2"/>
+              <a:buChar char="Ø"/>
+            </a:pPr>
+            <a:r>
+              <a:rPr lang="es-MX" dirty="0"/>
+              <a:t>Objetivos</a:t>
+            </a:r>
+          </a:p>
+          <a:p>
+            <a:pPr>
+              <a:buFont typeface="Wingdings" panose="05000000000000000000" pitchFamily="2" charset="2"/>
+              <a:buChar char="Ø"/>
+            </a:pPr>
+            <a:r>
+              <a:rPr lang="es-MX" dirty="0"/>
+              <a:t>Materiales y métodos</a:t>
+            </a:r>
+          </a:p>
+          <a:p>
+            <a:pPr>
+              <a:buFont typeface="Wingdings" panose="05000000000000000000" pitchFamily="2" charset="2"/>
+              <a:buChar char="Ø"/>
+            </a:pPr>
+            <a:r>
+              <a:rPr lang="es-MX" dirty="0"/>
+              <a:t>Resultados</a:t>
+            </a:r>
+          </a:p>
+          <a:p>
+            <a:pPr>
+              <a:buFont typeface="Wingdings" panose="05000000000000000000" pitchFamily="2" charset="2"/>
+              <a:buChar char="Ø"/>
+            </a:pPr>
+            <a:r>
+              <a:rPr lang="es-MX" dirty="0"/>
+              <a:t>Discusión</a:t>
+            </a:r>
+          </a:p>
+          <a:p>
+            <a:pPr>
+              <a:buFont typeface="Wingdings" panose="05000000000000000000" pitchFamily="2" charset="2"/>
+              <a:buChar char="Ø"/>
+            </a:pPr>
+            <a:r>
+              <a:rPr lang="es-MX" dirty="0"/>
+              <a:t>Conclusiones y recomendaciones</a:t>
+            </a:r>
+          </a:p>
+        </p:txBody>
+      </p:sp>
+    </p:spTree>
+    <p:extLst>
+      <p:ext uri="{BB962C8B-B14F-4D97-AF65-F5344CB8AC3E}">
+        <p14:creationId xmlns:p14="http://schemas.microsoft.com/office/powerpoint/2010/main" val="3282833789"/>
+      </p:ext>
+    </p:extLst>
+  </p:cSld>
+  <p:clrMapOvr>
+    <a:masterClrMapping/>
+  </p:clrMapOvr>
+</p:sld>
+</file>
+
+<file path=ppt/slides/slide20.xml><?xml version="1.0" encoding="utf-8"?>
 <p:sld xmlns:a="http://schemas.openxmlformats.org/drawingml/2006/main" xmlns:r="http://schemas.openxmlformats.org/officeDocument/2006/relationships" xmlns:p="http://schemas.openxmlformats.org/presentationml/2006/main">
   <p:cSld>
     <p:spTree>
@@ -15559,148 +15841,7 @@
 </p:sld>
 </file>
 
-<file path=ppt/slides/slide2.xml><?xml version="1.0" encoding="utf-8"?>
-<p:sld xmlns:a="http://schemas.openxmlformats.org/drawingml/2006/main" xmlns:r="http://schemas.openxmlformats.org/officeDocument/2006/relationships" xmlns:p="http://schemas.openxmlformats.org/presentationml/2006/main">
-  <p:cSld>
-    <p:spTree>
-      <p:nvGrpSpPr>
-        <p:cNvPr id="1" name=""/>
-        <p:cNvGrpSpPr/>
-        <p:nvPr/>
-      </p:nvGrpSpPr>
-      <p:grpSpPr>
-        <a:xfrm>
-          <a:off x="0" y="0"/>
-          <a:ext cx="0" cy="0"/>
-          <a:chOff x="0" y="0"/>
-          <a:chExt cx="0" cy="0"/>
-        </a:xfrm>
-      </p:grpSpPr>
-      <p:sp>
-        <p:nvSpPr>
-          <p:cNvPr id="2" name="Título 1">
-            <a:extLst>
-              <a:ext uri="{FF2B5EF4-FFF2-40B4-BE49-F238E27FC236}">
-                <a16:creationId xmlns:a16="http://schemas.microsoft.com/office/drawing/2014/main" id="{064C1A2E-4D77-2744-E49C-B60F6C2C57C7}"/>
-              </a:ext>
-            </a:extLst>
-          </p:cNvPr>
-          <p:cNvSpPr>
-            <a:spLocks noGrp="1"/>
-          </p:cNvSpPr>
-          <p:nvPr>
-            <p:ph type="title"/>
-          </p:nvPr>
-        </p:nvSpPr>
-        <p:spPr/>
-        <p:txBody>
-          <a:bodyPr/>
-          <a:lstStyle/>
-          <a:p>
-            <a:r>
-              <a:rPr lang="es-MX" dirty="0"/>
-              <a:t>Puntos a tratar</a:t>
-            </a:r>
-            <a:endParaRPr lang="es-PE" dirty="0"/>
-          </a:p>
-        </p:txBody>
-      </p:sp>
-      <p:sp>
-        <p:nvSpPr>
-          <p:cNvPr id="3" name="Marcador de contenido 2">
-            <a:extLst>
-              <a:ext uri="{FF2B5EF4-FFF2-40B4-BE49-F238E27FC236}">
-                <a16:creationId xmlns:a16="http://schemas.microsoft.com/office/drawing/2014/main" id="{19A94768-A3AF-214B-9C00-EDEA644CE768}"/>
-              </a:ext>
-            </a:extLst>
-          </p:cNvPr>
-          <p:cNvSpPr>
-            <a:spLocks noGrp="1"/>
-          </p:cNvSpPr>
-          <p:nvPr>
-            <p:ph idx="1"/>
-          </p:nvPr>
-        </p:nvSpPr>
-        <p:spPr/>
-        <p:txBody>
-          <a:bodyPr/>
-          <a:lstStyle/>
-          <a:p>
-            <a:pPr>
-              <a:buFont typeface="Wingdings" panose="05000000000000000000" pitchFamily="2" charset="2"/>
-              <a:buChar char="Ø"/>
-            </a:pPr>
-            <a:r>
-              <a:rPr lang="es-MX" dirty="0"/>
-              <a:t>Introducción y marco teórico</a:t>
-            </a:r>
-          </a:p>
-          <a:p>
-            <a:pPr>
-              <a:buFont typeface="Wingdings" panose="05000000000000000000" pitchFamily="2" charset="2"/>
-              <a:buChar char="Ø"/>
-            </a:pPr>
-            <a:r>
-              <a:rPr lang="es-MX" dirty="0"/>
-              <a:t>Objetivos</a:t>
-            </a:r>
-          </a:p>
-          <a:p>
-            <a:pPr>
-              <a:buFont typeface="Wingdings" panose="05000000000000000000" pitchFamily="2" charset="2"/>
-              <a:buChar char="Ø"/>
-            </a:pPr>
-            <a:r>
-              <a:rPr lang="es-MX" dirty="0"/>
-              <a:t>Materiales y métodos</a:t>
-            </a:r>
-          </a:p>
-          <a:p>
-            <a:pPr>
-              <a:buFont typeface="Wingdings" panose="05000000000000000000" pitchFamily="2" charset="2"/>
-              <a:buChar char="Ø"/>
-            </a:pPr>
-            <a:r>
-              <a:rPr lang="es-MX" dirty="0"/>
-              <a:t>Resultados</a:t>
-            </a:r>
-          </a:p>
-          <a:p>
-            <a:pPr>
-              <a:buFont typeface="Wingdings" panose="05000000000000000000" pitchFamily="2" charset="2"/>
-              <a:buChar char="Ø"/>
-            </a:pPr>
-            <a:r>
-              <a:rPr lang="es-MX" dirty="0"/>
-              <a:t>Discusión</a:t>
-            </a:r>
-          </a:p>
-          <a:p>
-            <a:pPr>
-              <a:buFont typeface="Wingdings" panose="05000000000000000000" pitchFamily="2" charset="2"/>
-              <a:buChar char="Ø"/>
-            </a:pPr>
-            <a:r>
-              <a:rPr lang="es-MX" dirty="0"/>
-              <a:t>Conclusiones y recomendaciones</a:t>
-            </a:r>
-          </a:p>
-        </p:txBody>
-      </p:sp>
-    </p:spTree>
-    <p:extLst>
-      <p:ext uri="{BB962C8B-B14F-4D97-AF65-F5344CB8AC3E}">
-        <p14:creationId xmlns:p14="http://schemas.microsoft.com/office/powerpoint/2010/main" val="3282833789"/>
-      </p:ext>
-    </p:extLst>
-  </p:cSld>
-  <p:clrMapOvr>
-    <a:masterClrMapping/>
-  </p:clrMapOvr>
-</p:sld>
-</file>
-
-<file path=ppt/slides/slide20.xml><?xml version="1.0" encoding="utf-8"?>
+<file path=ppt/slides/slide21.xml><?xml version="1.0" encoding="utf-8"?>
 <p:sld xmlns:a="http://schemas.openxmlformats.org/drawingml/2006/main" xmlns:r="http://schemas.openxmlformats.org/officeDocument/2006/relationships" xmlns:p="http://schemas.openxmlformats.org/presentationml/2006/main">
   <p:cSld>
     <p:spTree>
@@ -16048,7 +16189,7 @@
 </p:sld>
 </file>
 
-<file path=ppt/slides/slide21.xml><?xml version="1.0" encoding="utf-8"?>
+<file path=ppt/slides/slide22.xml><?xml version="1.0" encoding="utf-8"?>
 <p:sld xmlns:a="http://schemas.openxmlformats.org/drawingml/2006/main" xmlns:r="http://schemas.openxmlformats.org/officeDocument/2006/relationships" xmlns:p="http://schemas.openxmlformats.org/presentationml/2006/main">
   <p:cSld>
     <p:spTree>
@@ -17460,7 +17601,7 @@
 </p:sld>
 </file>
 
-<file path=ppt/slides/slide22.xml><?xml version="1.0" encoding="utf-8"?>
+<file path=ppt/slides/slide23.xml><?xml version="1.0" encoding="utf-8"?>
 <p:sld xmlns:a="http://schemas.openxmlformats.org/drawingml/2006/main" xmlns:r="http://schemas.openxmlformats.org/officeDocument/2006/relationships" xmlns:p="http://schemas.openxmlformats.org/presentationml/2006/main">
   <p:cSld>
     <p:spTree>
@@ -19649,7 +19790,7 @@
 </p:sld>
 </file>
 
-<file path=ppt/slides/slide23.xml><?xml version="1.0" encoding="utf-8"?>
+<file path=ppt/slides/slide24.xml><?xml version="1.0" encoding="utf-8"?>
 <p:sld xmlns:a="http://schemas.openxmlformats.org/drawingml/2006/main" xmlns:r="http://schemas.openxmlformats.org/officeDocument/2006/relationships" xmlns:p="http://schemas.openxmlformats.org/presentationml/2006/main">
   <p:cSld>
     <p:spTree>
@@ -21811,7 +21952,7 @@
 </p:sld>
 </file>
 
-<file path=ppt/slides/slide24.xml><?xml version="1.0" encoding="utf-8"?>
+<file path=ppt/slides/slide25.xml><?xml version="1.0" encoding="utf-8"?>
 <p:sld xmlns:a="http://schemas.openxmlformats.org/drawingml/2006/main" xmlns:r="http://schemas.openxmlformats.org/officeDocument/2006/relationships" xmlns:p="http://schemas.openxmlformats.org/presentationml/2006/main">
   <p:cSld>
     <p:spTree>
@@ -22443,7 +22584,7 @@
 </p:sld>
 </file>
 
-<file path=ppt/slides/slide25.xml><?xml version="1.0" encoding="utf-8"?>
+<file path=ppt/slides/slide26.xml><?xml version="1.0" encoding="utf-8"?>
 <p:sld xmlns:a="http://schemas.openxmlformats.org/drawingml/2006/main" xmlns:r="http://schemas.openxmlformats.org/officeDocument/2006/relationships" xmlns:p="http://schemas.openxmlformats.org/presentationml/2006/main">
   <p:cSld>
     <p:spTree>
@@ -22527,7 +22668,7 @@
 </p:sld>
 </file>
 
-<file path=ppt/slides/slide26.xml><?xml version="1.0" encoding="utf-8"?>
+<file path=ppt/slides/slide27.xml><?xml version="1.0" encoding="utf-8"?>
 <p:sld xmlns:a="http://schemas.openxmlformats.org/drawingml/2006/main" xmlns:r="http://schemas.openxmlformats.org/officeDocument/2006/relationships" xmlns:p="http://schemas.openxmlformats.org/presentationml/2006/main">
   <p:cSld>
     <p:spTree>
@@ -22669,7 +22810,7 @@
 </p:sld>
 </file>
 
-<file path=ppt/slides/slide27.xml><?xml version="1.0" encoding="utf-8"?>
+<file path=ppt/slides/slide28.xml><?xml version="1.0" encoding="utf-8"?>
 <p:sld xmlns:a="http://schemas.openxmlformats.org/drawingml/2006/main" xmlns:r="http://schemas.openxmlformats.org/officeDocument/2006/relationships" xmlns:p="http://schemas.openxmlformats.org/presentationml/2006/main">
   <p:cSld>
     <p:spTree>
@@ -22787,7 +22928,7 @@
 </p:sld>
 </file>
 
-<file path=ppt/slides/slide28.xml><?xml version="1.0" encoding="utf-8"?>
+<file path=ppt/slides/slide29.xml><?xml version="1.0" encoding="utf-8"?>
 <p:sld xmlns:a="http://schemas.openxmlformats.org/drawingml/2006/main" xmlns:r="http://schemas.openxmlformats.org/officeDocument/2006/relationships" xmlns:p="http://schemas.openxmlformats.org/presentationml/2006/main">
   <p:cSld>
     <p:spTree>
@@ -22905,7 +23046,91 @@
 </p:sld>
 </file>
 
-<file path=ppt/slides/slide29.xml><?xml version="1.0" encoding="utf-8"?>
+<file path=ppt/slides/slide3.xml><?xml version="1.0" encoding="utf-8"?>
+<p:sld xmlns:a="http://schemas.openxmlformats.org/drawingml/2006/main" xmlns:r="http://schemas.openxmlformats.org/officeDocument/2006/relationships" xmlns:p="http://schemas.openxmlformats.org/presentationml/2006/main">
+  <p:cSld>
+    <p:spTree>
+      <p:nvGrpSpPr>
+        <p:cNvPr id="1" name=""/>
+        <p:cNvGrpSpPr/>
+        <p:nvPr/>
+      </p:nvGrpSpPr>
+      <p:grpSpPr>
+        <a:xfrm>
+          <a:off x="0" y="0"/>
+          <a:ext cx="0" cy="0"/>
+          <a:chOff x="0" y="0"/>
+          <a:chExt cx="0" cy="0"/>
+        </a:xfrm>
+      </p:grpSpPr>
+      <p:sp>
+        <p:nvSpPr>
+          <p:cNvPr id="4" name="Título 3">
+            <a:extLst>
+              <a:ext uri="{FF2B5EF4-FFF2-40B4-BE49-F238E27FC236}">
+                <a16:creationId xmlns:a16="http://schemas.microsoft.com/office/drawing/2014/main" id="{F9F995DB-5B73-D0D8-4616-5EF9B2B84A0A}"/>
+              </a:ext>
+            </a:extLst>
+          </p:cNvPr>
+          <p:cNvSpPr>
+            <a:spLocks noGrp="1"/>
+          </p:cNvSpPr>
+          <p:nvPr>
+            <p:ph type="title"/>
+          </p:nvPr>
+        </p:nvSpPr>
+        <p:spPr/>
+        <p:txBody>
+          <a:bodyPr/>
+          <a:lstStyle/>
+          <a:p>
+            <a:r>
+              <a:rPr lang="es-MX" dirty="0"/>
+              <a:t>Introducción y marco teórico</a:t>
+            </a:r>
+            <a:endParaRPr lang="es-PE" dirty="0"/>
+          </a:p>
+        </p:txBody>
+      </p:sp>
+      <p:sp>
+        <p:nvSpPr>
+          <p:cNvPr id="5" name="Marcador de texto 4">
+            <a:extLst>
+              <a:ext uri="{FF2B5EF4-FFF2-40B4-BE49-F238E27FC236}">
+                <a16:creationId xmlns:a16="http://schemas.microsoft.com/office/drawing/2014/main" id="{EEE1B087-4536-92A2-9D16-540E34F96D3E}"/>
+              </a:ext>
+            </a:extLst>
+          </p:cNvPr>
+          <p:cNvSpPr>
+            <a:spLocks noGrp="1"/>
+          </p:cNvSpPr>
+          <p:nvPr>
+            <p:ph type="body" idx="1"/>
+          </p:nvPr>
+        </p:nvSpPr>
+        <p:spPr/>
+        <p:txBody>
+          <a:bodyPr/>
+          <a:lstStyle/>
+          <a:p>
+            <a:endParaRPr lang="es-PE"/>
+          </a:p>
+        </p:txBody>
+      </p:sp>
+    </p:spTree>
+    <p:extLst>
+      <p:ext uri="{BB962C8B-B14F-4D97-AF65-F5344CB8AC3E}">
+        <p14:creationId xmlns:p14="http://schemas.microsoft.com/office/powerpoint/2010/main" val="3605842633"/>
+      </p:ext>
+    </p:extLst>
+  </p:cSld>
+  <p:clrMapOvr>
+    <a:masterClrMapping/>
+  </p:clrMapOvr>
+</p:sld>
+</file>
+
+<file path=ppt/slides/slide30.xml><?xml version="1.0" encoding="utf-8"?>
 <p:sld xmlns:a="http://schemas.openxmlformats.org/drawingml/2006/main" xmlns:r="http://schemas.openxmlformats.org/officeDocument/2006/relationships" xmlns:p="http://schemas.openxmlformats.org/presentationml/2006/main">
   <p:cSld>
     <p:spTree>
@@ -23003,91 +23228,7 @@
 </p:sld>
 </file>
 
-<file path=ppt/slides/slide3.xml><?xml version="1.0" encoding="utf-8"?>
-<p:sld xmlns:a="http://schemas.openxmlformats.org/drawingml/2006/main" xmlns:r="http://schemas.openxmlformats.org/officeDocument/2006/relationships" xmlns:p="http://schemas.openxmlformats.org/presentationml/2006/main">
-  <p:cSld>
-    <p:spTree>
-      <p:nvGrpSpPr>
-        <p:cNvPr id="1" name=""/>
-        <p:cNvGrpSpPr/>
-        <p:nvPr/>
-      </p:nvGrpSpPr>
-      <p:grpSpPr>
-        <a:xfrm>
-          <a:off x="0" y="0"/>
-          <a:ext cx="0" cy="0"/>
-          <a:chOff x="0" y="0"/>
-          <a:chExt cx="0" cy="0"/>
-        </a:xfrm>
-      </p:grpSpPr>
-      <p:sp>
-        <p:nvSpPr>
-          <p:cNvPr id="4" name="Título 3">
-            <a:extLst>
-              <a:ext uri="{FF2B5EF4-FFF2-40B4-BE49-F238E27FC236}">
-                <a16:creationId xmlns:a16="http://schemas.microsoft.com/office/drawing/2014/main" id="{F9F995DB-5B73-D0D8-4616-5EF9B2B84A0A}"/>
-              </a:ext>
-            </a:extLst>
-          </p:cNvPr>
-          <p:cNvSpPr>
-            <a:spLocks noGrp="1"/>
-          </p:cNvSpPr>
-          <p:nvPr>
-            <p:ph type="title"/>
-          </p:nvPr>
-        </p:nvSpPr>
-        <p:spPr/>
-        <p:txBody>
-          <a:bodyPr/>
-          <a:lstStyle/>
-          <a:p>
-            <a:r>
-              <a:rPr lang="es-MX" dirty="0"/>
-              <a:t>Introducción y marco teórico</a:t>
-            </a:r>
-            <a:endParaRPr lang="es-PE" dirty="0"/>
-          </a:p>
-        </p:txBody>
-      </p:sp>
-      <p:sp>
-        <p:nvSpPr>
-          <p:cNvPr id="5" name="Marcador de texto 4">
-            <a:extLst>
-              <a:ext uri="{FF2B5EF4-FFF2-40B4-BE49-F238E27FC236}">
-                <a16:creationId xmlns:a16="http://schemas.microsoft.com/office/drawing/2014/main" id="{EEE1B087-4536-92A2-9D16-540E34F96D3E}"/>
-              </a:ext>
-            </a:extLst>
-          </p:cNvPr>
-          <p:cNvSpPr>
-            <a:spLocks noGrp="1"/>
-          </p:cNvSpPr>
-          <p:nvPr>
-            <p:ph type="body" idx="1"/>
-          </p:nvPr>
-        </p:nvSpPr>
-        <p:spPr/>
-        <p:txBody>
-          <a:bodyPr/>
-          <a:lstStyle/>
-          <a:p>
-            <a:endParaRPr lang="es-PE"/>
-          </a:p>
-        </p:txBody>
-      </p:sp>
-    </p:spTree>
-    <p:extLst>
-      <p:ext uri="{BB962C8B-B14F-4D97-AF65-F5344CB8AC3E}">
-        <p14:creationId xmlns:p14="http://schemas.microsoft.com/office/powerpoint/2010/main" val="3605842633"/>
-      </p:ext>
-    </p:extLst>
-  </p:cSld>
-  <p:clrMapOvr>
-    <a:masterClrMapping/>
-  </p:clrMapOvr>
-</p:sld>
-</file>
-
-<file path=ppt/slides/slide30.xml><?xml version="1.0" encoding="utf-8"?>
+<file path=ppt/slides/slide31.xml><?xml version="1.0" encoding="utf-8"?>
 <p:sld xmlns:a="http://schemas.openxmlformats.org/drawingml/2006/main" xmlns:r="http://schemas.openxmlformats.org/officeDocument/2006/relationships" xmlns:p="http://schemas.openxmlformats.org/presentationml/2006/main">
   <p:cSld>
     <p:spTree>
@@ -23197,7 +23338,7 @@
 </p:sld>
 </file>
 
-<file path=ppt/slides/slide31.xml><?xml version="1.0" encoding="utf-8"?>
+<file path=ppt/slides/slide32.xml><?xml version="1.0" encoding="utf-8"?>
 <p:sld xmlns:a="http://schemas.openxmlformats.org/drawingml/2006/main" xmlns:r="http://schemas.openxmlformats.org/officeDocument/2006/relationships" xmlns:p="http://schemas.openxmlformats.org/presentationml/2006/main">
   <p:cSld>
     <p:spTree>
@@ -23306,7 +23447,7 @@
 </p:sld>
 </file>
 
-<file path=ppt/slides/slide32.xml><?xml version="1.0" encoding="utf-8"?>
+<file path=ppt/slides/slide33.xml><?xml version="1.0" encoding="utf-8"?>
 <p:sld xmlns:a="http://schemas.openxmlformats.org/drawingml/2006/main" xmlns:r="http://schemas.openxmlformats.org/officeDocument/2006/relationships" xmlns:p="http://schemas.openxmlformats.org/presentationml/2006/main">
   <p:cSld>
     <p:spTree>
@@ -23415,7 +23556,7 @@
 </p:sld>
 </file>
 
-<file path=ppt/slides/slide33.xml><?xml version="1.0" encoding="utf-8"?>
+<file path=ppt/slides/slide34.xml><?xml version="1.0" encoding="utf-8"?>
 <p:sld xmlns:a="http://schemas.openxmlformats.org/drawingml/2006/main" xmlns:r="http://schemas.openxmlformats.org/officeDocument/2006/relationships" xmlns:p="http://schemas.openxmlformats.org/presentationml/2006/main">
   <p:cSld>
     <p:spTree>
@@ -23499,7 +23640,7 @@
 </p:sld>
 </file>
 
-<file path=ppt/slides/slide34.xml><?xml version="1.0" encoding="utf-8"?>
+<file path=ppt/slides/slide35.xml><?xml version="1.0" encoding="utf-8"?>
 <p:sld xmlns:a="http://schemas.openxmlformats.org/drawingml/2006/main" xmlns:r="http://schemas.openxmlformats.org/officeDocument/2006/relationships" xmlns:p="http://schemas.openxmlformats.org/presentationml/2006/main">
   <p:cSld>
     <p:spTree>
@@ -23608,7 +23749,7 @@
 </p:sld>
 </file>
 
-<file path=ppt/slides/slide35.xml><?xml version="1.0" encoding="utf-8"?>
+<file path=ppt/slides/slide36.xml><?xml version="1.0" encoding="utf-8"?>
 <p:sld xmlns:a="http://schemas.openxmlformats.org/drawingml/2006/main" xmlns:r="http://schemas.openxmlformats.org/officeDocument/2006/relationships" xmlns:p="http://schemas.openxmlformats.org/presentationml/2006/main">
   <p:cSld>
     <p:spTree>
@@ -23717,7 +23858,7 @@
 </p:sld>
 </file>
 
-<file path=ppt/slides/slide36.xml><?xml version="1.0" encoding="utf-8"?>
+<file path=ppt/slides/slide37.xml><?xml version="1.0" encoding="utf-8"?>
 <p:sld xmlns:a="http://schemas.openxmlformats.org/drawingml/2006/main" xmlns:r="http://schemas.openxmlformats.org/officeDocument/2006/relationships" xmlns:p="http://schemas.openxmlformats.org/presentationml/2006/main">
   <p:cSld>
     <p:spTree>
@@ -23793,7 +23934,7 @@
 </p:sld>
 </file>
 
-<file path=ppt/slides/slide37.xml><?xml version="1.0" encoding="utf-8"?>
+<file path=ppt/slides/slide38.xml><?xml version="1.0" encoding="utf-8"?>
 <p:sld xmlns:a="http://schemas.openxmlformats.org/drawingml/2006/main" xmlns:r="http://schemas.openxmlformats.org/officeDocument/2006/relationships" xmlns:p="http://schemas.openxmlformats.org/presentationml/2006/main">
   <p:cSld>
     <p:spTree>
@@ -23877,7 +24018,7 @@
 </p:sld>
 </file>
 
-<file path=ppt/slides/slide38.xml><?xml version="1.0" encoding="utf-8"?>
+<file path=ppt/slides/slide39.xml><?xml version="1.0" encoding="utf-8"?>
 <p:sld xmlns:a="http://schemas.openxmlformats.org/drawingml/2006/main" xmlns:r="http://schemas.openxmlformats.org/officeDocument/2006/relationships" xmlns:p="http://schemas.openxmlformats.org/presentationml/2006/main">
   <p:cSld>
     <p:spTree>
@@ -23941,7 +24082,137 @@
 </p:sld>
 </file>
 
-<file path=ppt/slides/slide39.xml><?xml version="1.0" encoding="utf-8"?>
+<file path=ppt/slides/slide4.xml><?xml version="1.0" encoding="utf-8"?>
+<p:sld xmlns:a="http://schemas.openxmlformats.org/drawingml/2006/main" xmlns:r="http://schemas.openxmlformats.org/officeDocument/2006/relationships" xmlns:p="http://schemas.openxmlformats.org/presentationml/2006/main">
+  <p:cSld>
+    <p:spTree>
+      <p:nvGrpSpPr>
+        <p:cNvPr id="1" name=""/>
+        <p:cNvGrpSpPr/>
+        <p:nvPr/>
+      </p:nvGrpSpPr>
+      <p:grpSpPr>
+        <a:xfrm>
+          <a:off x="0" y="0"/>
+          <a:ext cx="0" cy="0"/>
+          <a:chOff x="0" y="0"/>
+          <a:chExt cx="0" cy="0"/>
+        </a:xfrm>
+      </p:grpSpPr>
+      <p:sp>
+        <p:nvSpPr>
+          <p:cNvPr id="4" name="Título 3">
+            <a:extLst>
+              <a:ext uri="{FF2B5EF4-FFF2-40B4-BE49-F238E27FC236}">
+                <a16:creationId xmlns:a16="http://schemas.microsoft.com/office/drawing/2014/main" id="{A12A0201-3825-1432-5849-1ABE3D3C3EF4}"/>
+              </a:ext>
+            </a:extLst>
+          </p:cNvPr>
+          <p:cNvSpPr>
+            <a:spLocks noGrp="1"/>
+          </p:cNvSpPr>
+          <p:nvPr>
+            <p:ph type="title"/>
+          </p:nvPr>
+        </p:nvSpPr>
+        <p:spPr/>
+        <p:txBody>
+          <a:bodyPr/>
+          <a:lstStyle/>
+          <a:p>
+            <a:r>
+              <a:rPr lang="es-MX" dirty="0"/>
+              <a:t>Introducción y datos generales</a:t>
+            </a:r>
+            <a:endParaRPr lang="es-PE" dirty="0"/>
+          </a:p>
+        </p:txBody>
+      </p:sp>
+      <p:sp>
+        <p:nvSpPr>
+          <p:cNvPr id="5" name="Marcador de contenido 4">
+            <a:extLst>
+              <a:ext uri="{FF2B5EF4-FFF2-40B4-BE49-F238E27FC236}">
+                <a16:creationId xmlns:a16="http://schemas.microsoft.com/office/drawing/2014/main" id="{9573FAE0-C63F-4B12-904B-17395943868A}"/>
+              </a:ext>
+            </a:extLst>
+          </p:cNvPr>
+          <p:cNvSpPr>
+            <a:spLocks noGrp="1"/>
+          </p:cNvSpPr>
+          <p:nvPr>
+            <p:ph idx="1"/>
+          </p:nvPr>
+        </p:nvSpPr>
+        <p:spPr/>
+        <p:txBody>
+          <a:bodyPr>
+            <a:normAutofit/>
+          </a:bodyPr>
+          <a:lstStyle/>
+          <a:p>
+            <a:r>
+              <a:rPr lang="es-MX" dirty="0"/>
+              <a:t>En la actualidad, la especialidad médica representa un hito significativo en la formación de muchos médicos.</a:t>
+            </a:r>
+            <a:endParaRPr lang="es-PE" dirty="0"/>
+          </a:p>
+          <a:p>
+            <a:r>
+              <a:rPr lang="es-PE" dirty="0"/>
+              <a:t>Tener una especialidad repercute en el desarrollo profesional y en la situación económica individual de un médico.</a:t>
+            </a:r>
+            <a:endParaRPr lang="es-MX" dirty="0"/>
+          </a:p>
+          <a:p>
+            <a:r>
+              <a:rPr lang="es-PE" dirty="0"/>
+              <a:t>Antiguamente existía una predominancia masculina en los profesionales médicos.</a:t>
+            </a:r>
+          </a:p>
+          <a:p>
+            <a:r>
+              <a:rPr lang="es-MX" dirty="0"/>
+              <a:t>En 1971 solo el 11.5% de los médicos registrados en el Colegio Médico del Perú eran mujeres, en el año 2011 esta cifra aumentó al 48.9%.</a:t>
+            </a:r>
+            <a:endParaRPr lang="es-PE" dirty="0"/>
+          </a:p>
+          <a:p>
+            <a:r>
+              <a:rPr lang="es-PE" dirty="0"/>
+              <a:t>Cada vez hay más mujeres que son profesionales médicos y, consecuentemente, cada vez hay más mujeres realizando especialidades médicas.</a:t>
+            </a:r>
+          </a:p>
+          <a:p>
+            <a:r>
+              <a:rPr lang="es-PE" dirty="0"/>
+              <a:t>No existe a la fecha un estudio sobre el sexo de los postulantes a los programas de </a:t>
+            </a:r>
+            <a:r>
+              <a:rPr lang="es-PE" dirty="0" err="1"/>
+              <a:t>residentado</a:t>
+            </a:r>
+            <a:r>
+              <a:rPr lang="es-PE" dirty="0"/>
+              <a:t> médico en el Perú.</a:t>
+            </a:r>
+          </a:p>
+        </p:txBody>
+      </p:sp>
+    </p:spTree>
+    <p:extLst>
+      <p:ext uri="{BB962C8B-B14F-4D97-AF65-F5344CB8AC3E}">
+        <p14:creationId xmlns:p14="http://schemas.microsoft.com/office/powerpoint/2010/main" val="3185660407"/>
+      </p:ext>
+    </p:extLst>
+  </p:cSld>
+  <p:clrMapOvr>
+    <a:masterClrMapping/>
+  </p:clrMapOvr>
+</p:sld>
+</file>
+
+<file path=ppt/slides/slide40.xml><?xml version="1.0" encoding="utf-8"?>
 <p:sld xmlns:a="http://schemas.openxmlformats.org/drawingml/2006/main" xmlns:r="http://schemas.openxmlformats.org/officeDocument/2006/relationships" xmlns:p="http://schemas.openxmlformats.org/presentationml/2006/main">
   <p:cSld>
     <p:spTree>
@@ -24051,137 +24322,7 @@
 </p:sld>
 </file>
 
-<file path=ppt/slides/slide4.xml><?xml version="1.0" encoding="utf-8"?>
-<p:sld xmlns:a="http://schemas.openxmlformats.org/drawingml/2006/main" xmlns:r="http://schemas.openxmlformats.org/officeDocument/2006/relationships" xmlns:p="http://schemas.openxmlformats.org/presentationml/2006/main">
-  <p:cSld>
-    <p:spTree>
-      <p:nvGrpSpPr>
-        <p:cNvPr id="1" name=""/>
-        <p:cNvGrpSpPr/>
-        <p:nvPr/>
-      </p:nvGrpSpPr>
-      <p:grpSpPr>
-        <a:xfrm>
-          <a:off x="0" y="0"/>
-          <a:ext cx="0" cy="0"/>
-          <a:chOff x="0" y="0"/>
-          <a:chExt cx="0" cy="0"/>
-        </a:xfrm>
-      </p:grpSpPr>
-      <p:sp>
-        <p:nvSpPr>
-          <p:cNvPr id="4" name="Título 3">
-            <a:extLst>
-              <a:ext uri="{FF2B5EF4-FFF2-40B4-BE49-F238E27FC236}">
-                <a16:creationId xmlns:a16="http://schemas.microsoft.com/office/drawing/2014/main" id="{A12A0201-3825-1432-5849-1ABE3D3C3EF4}"/>
-              </a:ext>
-            </a:extLst>
-          </p:cNvPr>
-          <p:cNvSpPr>
-            <a:spLocks noGrp="1"/>
-          </p:cNvSpPr>
-          <p:nvPr>
-            <p:ph type="title"/>
-          </p:nvPr>
-        </p:nvSpPr>
-        <p:spPr/>
-        <p:txBody>
-          <a:bodyPr/>
-          <a:lstStyle/>
-          <a:p>
-            <a:r>
-              <a:rPr lang="es-MX" dirty="0"/>
-              <a:t>Introducción y datos generales</a:t>
-            </a:r>
-            <a:endParaRPr lang="es-PE" dirty="0"/>
-          </a:p>
-        </p:txBody>
-      </p:sp>
-      <p:sp>
-        <p:nvSpPr>
-          <p:cNvPr id="5" name="Marcador de contenido 4">
-            <a:extLst>
-              <a:ext uri="{FF2B5EF4-FFF2-40B4-BE49-F238E27FC236}">
-                <a16:creationId xmlns:a16="http://schemas.microsoft.com/office/drawing/2014/main" id="{9573FAE0-C63F-4B12-904B-17395943868A}"/>
-              </a:ext>
-            </a:extLst>
-          </p:cNvPr>
-          <p:cNvSpPr>
-            <a:spLocks noGrp="1"/>
-          </p:cNvSpPr>
-          <p:nvPr>
-            <p:ph idx="1"/>
-          </p:nvPr>
-        </p:nvSpPr>
-        <p:spPr/>
-        <p:txBody>
-          <a:bodyPr>
-            <a:normAutofit/>
-          </a:bodyPr>
-          <a:lstStyle/>
-          <a:p>
-            <a:r>
-              <a:rPr lang="es-MX" dirty="0"/>
-              <a:t>En la actualidad, la especialidad médica representa un hito significativo en la formación de muchos médicos.</a:t>
-            </a:r>
-            <a:endParaRPr lang="es-PE" dirty="0"/>
-          </a:p>
-          <a:p>
-            <a:r>
-              <a:rPr lang="es-PE" dirty="0"/>
-              <a:t>Tener una especialidad repercute en el desarrollo profesional y en la situación económica individual de un médico.</a:t>
-            </a:r>
-            <a:endParaRPr lang="es-MX" dirty="0"/>
-          </a:p>
-          <a:p>
-            <a:r>
-              <a:rPr lang="es-PE" dirty="0"/>
-              <a:t>Antiguamente existía una predominancia masculina en los profesionales médicos.</a:t>
-            </a:r>
-          </a:p>
-          <a:p>
-            <a:r>
-              <a:rPr lang="es-MX" dirty="0"/>
-              <a:t>En 1971 solo el 11.5% de los médicos registrados en el Colegio Médico del Perú eran mujeres, en el año 2011 esta cifra aumentó al 48.9%.</a:t>
-            </a:r>
-            <a:endParaRPr lang="es-PE" dirty="0"/>
-          </a:p>
-          <a:p>
-            <a:r>
-              <a:rPr lang="es-PE" dirty="0"/>
-              <a:t>Cada vez hay más mujeres que son profesionales médicos y, consecuentemente, cada vez hay más mujeres realizando especialidades médicas.</a:t>
-            </a:r>
-          </a:p>
-          <a:p>
-            <a:r>
-              <a:rPr lang="es-PE" dirty="0"/>
-              <a:t>No existe a la fecha un estudio sobre el sexo de los postulantes a los programas de </a:t>
-            </a:r>
-            <a:r>
-              <a:rPr lang="es-PE" dirty="0" err="1"/>
-              <a:t>residentado</a:t>
-            </a:r>
-            <a:r>
-              <a:rPr lang="es-PE" dirty="0"/>
-              <a:t> médico en el Perú.</a:t>
-            </a:r>
-          </a:p>
-        </p:txBody>
-      </p:sp>
-    </p:spTree>
-    <p:extLst>
-      <p:ext uri="{BB962C8B-B14F-4D97-AF65-F5344CB8AC3E}">
-        <p14:creationId xmlns:p14="http://schemas.microsoft.com/office/powerpoint/2010/main" val="3185660407"/>
-      </p:ext>
-    </p:extLst>
-  </p:cSld>
-  <p:clrMapOvr>
-    <a:masterClrMapping/>
-  </p:clrMapOvr>
-</p:sld>
-</file>
-
-<file path=ppt/slides/slide40.xml><?xml version="1.0" encoding="utf-8"?>
+<file path=ppt/slides/slide41.xml><?xml version="1.0" encoding="utf-8"?>
 <p:sld xmlns:a="http://schemas.openxmlformats.org/drawingml/2006/main" xmlns:r="http://schemas.openxmlformats.org/officeDocument/2006/relationships" xmlns:p="http://schemas.openxmlformats.org/presentationml/2006/main">
   <p:cSld>
     <p:spTree>
@@ -24285,7 +24426,7 @@
 </p:sld>
 </file>
 
-<file path=ppt/slides/slide41.xml><?xml version="1.0" encoding="utf-8"?>
+<file path=ppt/slides/slide42.xml><?xml version="1.0" encoding="utf-8"?>
 <p:sld xmlns:a="http://schemas.openxmlformats.org/drawingml/2006/main" xmlns:r="http://schemas.openxmlformats.org/officeDocument/2006/relationships" xmlns:p="http://schemas.openxmlformats.org/presentationml/2006/main">
   <p:cSld>
     <p:spTree>
@@ -24388,7 +24529,7 @@
 </p:sld>
 </file>
 
-<file path=ppt/slides/slide42.xml><?xml version="1.0" encoding="utf-8"?>
+<file path=ppt/slides/slide43.xml><?xml version="1.0" encoding="utf-8"?>
 <p:sld xmlns:a="http://schemas.openxmlformats.org/drawingml/2006/main" xmlns:r="http://schemas.openxmlformats.org/officeDocument/2006/relationships" xmlns:p="http://schemas.openxmlformats.org/presentationml/2006/main">
   <p:cSld>
     <p:spTree>
@@ -24452,7 +24593,7 @@
 </p:sld>
 </file>
 
-<file path=ppt/slides/slide43.xml><?xml version="1.0" encoding="utf-8"?>
+<file path=ppt/slides/slide44.xml><?xml version="1.0" encoding="utf-8"?>
 <p:sld xmlns:a="http://schemas.openxmlformats.org/drawingml/2006/main" xmlns:r="http://schemas.openxmlformats.org/officeDocument/2006/relationships" xmlns:p="http://schemas.openxmlformats.org/presentationml/2006/main">
   <p:cSld>
     <p:spTree>
@@ -28203,7 +28344,7 @@
 </p:sld>
 </file>
 
-<file path=ppt/slides/slide44.xml><?xml version="1.0" encoding="utf-8"?>
+<file path=ppt/slides/slide45.xml><?xml version="1.0" encoding="utf-8"?>
 <p:sld xmlns:a="http://schemas.openxmlformats.org/drawingml/2006/main" xmlns:r="http://schemas.openxmlformats.org/officeDocument/2006/relationships" xmlns:p="http://schemas.openxmlformats.org/presentationml/2006/main">
   <p:cSld>
     <p:spTree>
@@ -28267,7 +28408,7 @@
 </p:sld>
 </file>
 
-<file path=ppt/slides/slide45.xml><?xml version="1.0" encoding="utf-8"?>
+<file path=ppt/slides/slide46.xml><?xml version="1.0" encoding="utf-8"?>
 <p:sld xmlns:a="http://schemas.openxmlformats.org/drawingml/2006/main" xmlns:r="http://schemas.openxmlformats.org/officeDocument/2006/relationships" xmlns:p="http://schemas.openxmlformats.org/presentationml/2006/main">
   <p:cSld>
     <p:spTree>
@@ -28347,7 +28488,7 @@
 </p:sld>
 </file>
 
-<file path=ppt/slides/slide46.xml><?xml version="1.0" encoding="utf-8"?>
+<file path=ppt/slides/slide47.xml><?xml version="1.0" encoding="utf-8"?>
 <p:sld xmlns:a="http://schemas.openxmlformats.org/drawingml/2006/main" xmlns:r="http://schemas.openxmlformats.org/officeDocument/2006/relationships" xmlns:p="http://schemas.openxmlformats.org/presentationml/2006/main">
   <p:cSld>
     <p:spTree>
@@ -28431,7 +28572,7 @@
 </p:sld>
 </file>
 
-<file path=ppt/slides/slide47.xml><?xml version="1.0" encoding="utf-8"?>
+<file path=ppt/slides/slide48.xml><?xml version="1.0" encoding="utf-8"?>
 <p:sld xmlns:a="http://schemas.openxmlformats.org/drawingml/2006/main" xmlns:r="http://schemas.openxmlformats.org/officeDocument/2006/relationships" xmlns:p="http://schemas.openxmlformats.org/presentationml/2006/main">
   <p:cSld>
     <p:spTree>
@@ -28507,7 +28648,7 @@
 </p:sld>
 </file>
 
-<file path=ppt/slides/slide48.xml><?xml version="1.0" encoding="utf-8"?>
+<file path=ppt/slides/slide49.xml><?xml version="1.0" encoding="utf-8"?>
 <p:sld xmlns:a="http://schemas.openxmlformats.org/drawingml/2006/main" xmlns:r="http://schemas.openxmlformats.org/officeDocument/2006/relationships" xmlns:p="http://schemas.openxmlformats.org/presentationml/2006/main">
   <p:cSld>
     <p:spTree>
@@ -28611,7 +28752,91 @@
 </p:sld>
 </file>
 
-<file path=ppt/slides/slide49.xml><?xml version="1.0" encoding="utf-8"?>
+<file path=ppt/slides/slide5.xml><?xml version="1.0" encoding="utf-8"?>
+<p:sld xmlns:a="http://schemas.openxmlformats.org/drawingml/2006/main" xmlns:r="http://schemas.openxmlformats.org/officeDocument/2006/relationships" xmlns:p="http://schemas.openxmlformats.org/presentationml/2006/main">
+  <p:cSld>
+    <p:spTree>
+      <p:nvGrpSpPr>
+        <p:cNvPr id="1" name=""/>
+        <p:cNvGrpSpPr/>
+        <p:nvPr/>
+      </p:nvGrpSpPr>
+      <p:grpSpPr>
+        <a:xfrm>
+          <a:off x="0" y="0"/>
+          <a:ext cx="0" cy="0"/>
+          <a:chOff x="0" y="0"/>
+          <a:chExt cx="0" cy="0"/>
+        </a:xfrm>
+      </p:grpSpPr>
+      <p:sp>
+        <p:nvSpPr>
+          <p:cNvPr id="2" name="Título 1">
+            <a:extLst>
+              <a:ext uri="{FF2B5EF4-FFF2-40B4-BE49-F238E27FC236}">
+                <a16:creationId xmlns:a16="http://schemas.microsoft.com/office/drawing/2014/main" id="{332CA70A-313C-6CEC-5CAD-8B3A2C7492AC}"/>
+              </a:ext>
+            </a:extLst>
+          </p:cNvPr>
+          <p:cNvSpPr>
+            <a:spLocks noGrp="1"/>
+          </p:cNvSpPr>
+          <p:nvPr>
+            <p:ph type="title"/>
+          </p:nvPr>
+        </p:nvSpPr>
+        <p:spPr/>
+        <p:txBody>
+          <a:bodyPr/>
+          <a:lstStyle/>
+          <a:p>
+            <a:r>
+              <a:rPr lang="es-MX" dirty="0"/>
+              <a:t>Sexo vs. género</a:t>
+            </a:r>
+            <a:endParaRPr lang="es-PE" dirty="0"/>
+          </a:p>
+        </p:txBody>
+      </p:sp>
+      <p:sp>
+        <p:nvSpPr>
+          <p:cNvPr id="3" name="Marcador de contenido 2">
+            <a:extLst>
+              <a:ext uri="{FF2B5EF4-FFF2-40B4-BE49-F238E27FC236}">
+                <a16:creationId xmlns:a16="http://schemas.microsoft.com/office/drawing/2014/main" id="{368208D6-AAC0-FFF3-5250-A412EA91E76C}"/>
+              </a:ext>
+            </a:extLst>
+          </p:cNvPr>
+          <p:cNvSpPr>
+            <a:spLocks noGrp="1"/>
+          </p:cNvSpPr>
+          <p:nvPr>
+            <p:ph idx="1"/>
+          </p:nvPr>
+        </p:nvSpPr>
+        <p:spPr/>
+        <p:txBody>
+          <a:bodyPr/>
+          <a:lstStyle/>
+          <a:p>
+            <a:endParaRPr lang="es-PE" dirty="0"/>
+          </a:p>
+        </p:txBody>
+      </p:sp>
+    </p:spTree>
+    <p:extLst>
+      <p:ext uri="{BB962C8B-B14F-4D97-AF65-F5344CB8AC3E}">
+        <p14:creationId xmlns:p14="http://schemas.microsoft.com/office/powerpoint/2010/main" val="3473816972"/>
+      </p:ext>
+    </p:extLst>
+  </p:cSld>
+  <p:clrMapOvr>
+    <a:masterClrMapping/>
+  </p:clrMapOvr>
+</p:sld>
+</file>
+
+<file path=ppt/slides/slide50.xml><?xml version="1.0" encoding="utf-8"?>
 <p:sld xmlns:a="http://schemas.openxmlformats.org/drawingml/2006/main" xmlns:r="http://schemas.openxmlformats.org/officeDocument/2006/relationships" xmlns:p="http://schemas.openxmlformats.org/presentationml/2006/main">
   <p:cSld>
     <p:spTree>
@@ -28703,120 +28928,7 @@
 </p:sld>
 </file>
 
-<file path=ppt/slides/slide5.xml><?xml version="1.0" encoding="utf-8"?>
-<p:sld xmlns:a="http://schemas.openxmlformats.org/drawingml/2006/main" xmlns:r="http://schemas.openxmlformats.org/officeDocument/2006/relationships" xmlns:p="http://schemas.openxmlformats.org/presentationml/2006/main">
-  <p:cSld>
-    <p:spTree>
-      <p:nvGrpSpPr>
-        <p:cNvPr id="1" name=""/>
-        <p:cNvGrpSpPr/>
-        <p:nvPr/>
-      </p:nvGrpSpPr>
-      <p:grpSpPr>
-        <a:xfrm>
-          <a:off x="0" y="0"/>
-          <a:ext cx="0" cy="0"/>
-          <a:chOff x="0" y="0"/>
-          <a:chExt cx="0" cy="0"/>
-        </a:xfrm>
-      </p:grpSpPr>
-      <p:sp>
-        <p:nvSpPr>
-          <p:cNvPr id="2" name="Título 1">
-            <a:extLst>
-              <a:ext uri="{FF2B5EF4-FFF2-40B4-BE49-F238E27FC236}">
-                <a16:creationId xmlns:a16="http://schemas.microsoft.com/office/drawing/2014/main" id="{30BD1730-B728-1D5A-D824-39833DA8D53D}"/>
-              </a:ext>
-            </a:extLst>
-          </p:cNvPr>
-          <p:cNvSpPr>
-            <a:spLocks noGrp="1"/>
-          </p:cNvSpPr>
-          <p:nvPr>
-            <p:ph type="title"/>
-          </p:nvPr>
-        </p:nvSpPr>
-        <p:spPr/>
-        <p:txBody>
-          <a:bodyPr/>
-          <a:lstStyle/>
-          <a:p>
-            <a:r>
-              <a:rPr lang="es-MX" dirty="0"/>
-              <a:t>Problema de investigación</a:t>
-            </a:r>
-            <a:endParaRPr lang="es-PE" dirty="0"/>
-          </a:p>
-        </p:txBody>
-      </p:sp>
-      <p:sp>
-        <p:nvSpPr>
-          <p:cNvPr id="3" name="Marcador de contenido 2">
-            <a:extLst>
-              <a:ext uri="{FF2B5EF4-FFF2-40B4-BE49-F238E27FC236}">
-                <a16:creationId xmlns:a16="http://schemas.microsoft.com/office/drawing/2014/main" id="{98D2C2C6-67EC-D04E-ED34-A8C54CD02173}"/>
-              </a:ext>
-            </a:extLst>
-          </p:cNvPr>
-          <p:cNvSpPr>
-            <a:spLocks noGrp="1"/>
-          </p:cNvSpPr>
-          <p:nvPr>
-            <p:ph idx="1"/>
-          </p:nvPr>
-        </p:nvSpPr>
-        <p:spPr/>
-        <p:txBody>
-          <a:bodyPr/>
-          <a:lstStyle/>
-          <a:p>
-            <a:r>
-              <a:rPr lang="es-MX" dirty="0"/>
-              <a:t>Información sobre cómo se están incorporando las mujeres a las especialidades médicas es insuficiente.</a:t>
-            </a:r>
-          </a:p>
-          <a:p>
-            <a:r>
-              <a:rPr lang="es-PE" dirty="0"/>
-              <a:t>Detectar diferencias de sexo es el primer paso para determinar las causas de estas diferencias que pueden ser problemáticas.</a:t>
-            </a:r>
-          </a:p>
-          <a:p>
-            <a:r>
-              <a:rPr lang="es-PE" dirty="0"/>
-              <a:t>Diferencias de sexo en algunas especialidades (ej. quirúrgicas), son descritas por la literatura. Se describen discriminación por sexo, acoso sexual, entre otras como posibles causas de estas diferencias.</a:t>
-            </a:r>
-          </a:p>
-          <a:p>
-            <a:r>
-              <a:rPr lang="es-PE" dirty="0"/>
-              <a:t>El presente estudio busca caracterizar la incorporación del sexo femenino en el programa de </a:t>
-            </a:r>
-            <a:r>
-              <a:rPr lang="es-PE" dirty="0" err="1"/>
-              <a:t>residentado</a:t>
-            </a:r>
-            <a:r>
-              <a:rPr lang="es-PE" dirty="0"/>
-              <a:t> médico del Perú entre los años 2013 y 2023 para tener un panorama de la situación actual respecto a este tema.</a:t>
-            </a:r>
-          </a:p>
-        </p:txBody>
-      </p:sp>
-    </p:spTree>
-    <p:extLst>
-      <p:ext uri="{BB962C8B-B14F-4D97-AF65-F5344CB8AC3E}">
-        <p14:creationId xmlns:p14="http://schemas.microsoft.com/office/powerpoint/2010/main" val="650012995"/>
-      </p:ext>
-    </p:extLst>
-  </p:cSld>
-  <p:clrMapOvr>
-    <a:masterClrMapping/>
-  </p:clrMapOvr>
-</p:sld>
-</file>
-
-<file path=ppt/slides/slide50.xml><?xml version="1.0" encoding="utf-8"?>
+<file path=ppt/slides/slide51.xml><?xml version="1.0" encoding="utf-8"?>
 <p:sld xmlns:a="http://schemas.openxmlformats.org/drawingml/2006/main" xmlns:r="http://schemas.openxmlformats.org/officeDocument/2006/relationships" xmlns:p="http://schemas.openxmlformats.org/presentationml/2006/main">
   <p:cSld>
     <p:spTree>
@@ -28900,7 +29012,7 @@
 </p:sld>
 </file>
 
-<file path=ppt/slides/slide51.xml><?xml version="1.0" encoding="utf-8"?>
+<file path=ppt/slides/slide52.xml><?xml version="1.0" encoding="utf-8"?>
 <p:sld xmlns:a="http://schemas.openxmlformats.org/drawingml/2006/main" xmlns:r="http://schemas.openxmlformats.org/officeDocument/2006/relationships" xmlns:p="http://schemas.openxmlformats.org/presentationml/2006/main">
   <p:cSld>
     <p:spTree>
@@ -29010,7 +29122,7 @@
 </p:sld>
 </file>
 
-<file path=ppt/slides/slide52.xml><?xml version="1.0" encoding="utf-8"?>
+<file path=ppt/slides/slide53.xml><?xml version="1.0" encoding="utf-8"?>
 <p:sld xmlns:a="http://schemas.openxmlformats.org/drawingml/2006/main" xmlns:r="http://schemas.openxmlformats.org/officeDocument/2006/relationships" xmlns:p="http://schemas.openxmlformats.org/presentationml/2006/main">
   <p:cSld>
     <p:spTree>
@@ -29113,7 +29225,7 @@
 </p:sld>
 </file>
 
-<file path=ppt/slides/slide53.xml><?xml version="1.0" encoding="utf-8"?>
+<file path=ppt/slides/slide54.xml><?xml version="1.0" encoding="utf-8"?>
 <p:sld xmlns:a="http://schemas.openxmlformats.org/drawingml/2006/main" xmlns:r="http://schemas.openxmlformats.org/officeDocument/2006/relationships" xmlns:p="http://schemas.openxmlformats.org/presentationml/2006/main">
   <p:cSld>
     <p:spTree>
@@ -29217,7 +29329,7 @@
 </p:sld>
 </file>
 
-<file path=ppt/slides/slide54.xml><?xml version="1.0" encoding="utf-8"?>
+<file path=ppt/slides/slide55.xml><?xml version="1.0" encoding="utf-8"?>
 <p:sld xmlns:a="http://schemas.openxmlformats.org/drawingml/2006/main" xmlns:r="http://schemas.openxmlformats.org/officeDocument/2006/relationships" xmlns:p="http://schemas.openxmlformats.org/presentationml/2006/main">
   <p:cSld>
     <p:spTree>
@@ -29281,7 +29393,7 @@
 </p:sld>
 </file>
 
-<file path=ppt/slides/slide55.xml><?xml version="1.0" encoding="utf-8"?>
+<file path=ppt/slides/slide56.xml><?xml version="1.0" encoding="utf-8"?>
 <p:sld xmlns:a="http://schemas.openxmlformats.org/drawingml/2006/main" xmlns:r="http://schemas.openxmlformats.org/officeDocument/2006/relationships" xmlns:p="http://schemas.openxmlformats.org/presentationml/2006/main">
   <p:cSld>
     <p:spTree>
@@ -29373,7 +29485,7 @@
 </p:sld>
 </file>
 
-<file path=ppt/slides/slide56.xml><?xml version="1.0" encoding="utf-8"?>
+<file path=ppt/slides/slide57.xml><?xml version="1.0" encoding="utf-8"?>
 <p:sld xmlns:a="http://schemas.openxmlformats.org/drawingml/2006/main" xmlns:r="http://schemas.openxmlformats.org/officeDocument/2006/relationships" xmlns:p="http://schemas.openxmlformats.org/presentationml/2006/main">
   <p:cSld>
     <p:spTree>
@@ -30682,7 +30794,7 @@
 </p:sld>
 </file>
 
-<file path=ppt/slides/slide57.xml><?xml version="1.0" encoding="utf-8"?>
+<file path=ppt/slides/slide58.xml><?xml version="1.0" encoding="utf-8"?>
 <p:sld xmlns:a="http://schemas.openxmlformats.org/drawingml/2006/main" xmlns:r="http://schemas.openxmlformats.org/officeDocument/2006/relationships" xmlns:p="http://schemas.openxmlformats.org/presentationml/2006/main">
   <p:cSld>
     <p:spTree>
@@ -30754,7 +30866,7 @@
 </p:sld>
 </file>
 
-<file path=ppt/slides/slide58.xml><?xml version="1.0" encoding="utf-8"?>
+<file path=ppt/slides/slide59.xml><?xml version="1.0" encoding="utf-8"?>
 <p:sld xmlns:a="http://schemas.openxmlformats.org/drawingml/2006/main" xmlns:r="http://schemas.openxmlformats.org/officeDocument/2006/relationships" xmlns:p="http://schemas.openxmlformats.org/presentationml/2006/main">
   <p:cSld>
     <p:spTree>
@@ -30838,7 +30950,120 @@
 </p:sld>
 </file>
 
-<file path=ppt/slides/slide59.xml><?xml version="1.0" encoding="utf-8"?>
+<file path=ppt/slides/slide6.xml><?xml version="1.0" encoding="utf-8"?>
+<p:sld xmlns:a="http://schemas.openxmlformats.org/drawingml/2006/main" xmlns:r="http://schemas.openxmlformats.org/officeDocument/2006/relationships" xmlns:p="http://schemas.openxmlformats.org/presentationml/2006/main">
+  <p:cSld>
+    <p:spTree>
+      <p:nvGrpSpPr>
+        <p:cNvPr id="1" name=""/>
+        <p:cNvGrpSpPr/>
+        <p:nvPr/>
+      </p:nvGrpSpPr>
+      <p:grpSpPr>
+        <a:xfrm>
+          <a:off x="0" y="0"/>
+          <a:ext cx="0" cy="0"/>
+          <a:chOff x="0" y="0"/>
+          <a:chExt cx="0" cy="0"/>
+        </a:xfrm>
+      </p:grpSpPr>
+      <p:sp>
+        <p:nvSpPr>
+          <p:cNvPr id="2" name="Título 1">
+            <a:extLst>
+              <a:ext uri="{FF2B5EF4-FFF2-40B4-BE49-F238E27FC236}">
+                <a16:creationId xmlns:a16="http://schemas.microsoft.com/office/drawing/2014/main" id="{30BD1730-B728-1D5A-D824-39833DA8D53D}"/>
+              </a:ext>
+            </a:extLst>
+          </p:cNvPr>
+          <p:cNvSpPr>
+            <a:spLocks noGrp="1"/>
+          </p:cNvSpPr>
+          <p:nvPr>
+            <p:ph type="title"/>
+          </p:nvPr>
+        </p:nvSpPr>
+        <p:spPr/>
+        <p:txBody>
+          <a:bodyPr/>
+          <a:lstStyle/>
+          <a:p>
+            <a:r>
+              <a:rPr lang="es-MX" dirty="0"/>
+              <a:t>Problema de investigación</a:t>
+            </a:r>
+            <a:endParaRPr lang="es-PE" dirty="0"/>
+          </a:p>
+        </p:txBody>
+      </p:sp>
+      <p:sp>
+        <p:nvSpPr>
+          <p:cNvPr id="3" name="Marcador de contenido 2">
+            <a:extLst>
+              <a:ext uri="{FF2B5EF4-FFF2-40B4-BE49-F238E27FC236}">
+                <a16:creationId xmlns:a16="http://schemas.microsoft.com/office/drawing/2014/main" id="{98D2C2C6-67EC-D04E-ED34-A8C54CD02173}"/>
+              </a:ext>
+            </a:extLst>
+          </p:cNvPr>
+          <p:cNvSpPr>
+            <a:spLocks noGrp="1"/>
+          </p:cNvSpPr>
+          <p:nvPr>
+            <p:ph idx="1"/>
+          </p:nvPr>
+        </p:nvSpPr>
+        <p:spPr/>
+        <p:txBody>
+          <a:bodyPr/>
+          <a:lstStyle/>
+          <a:p>
+            <a:r>
+              <a:rPr lang="es-MX" dirty="0"/>
+              <a:t>Información sobre cómo se están incorporando las mujeres a las especialidades médicas es insuficiente.</a:t>
+            </a:r>
+          </a:p>
+          <a:p>
+            <a:r>
+              <a:rPr lang="es-PE" dirty="0"/>
+              <a:t>Detectar diferencias de sexo es el primer paso para determinar las causas de estas diferencias que pueden ser problemáticas.</a:t>
+            </a:r>
+          </a:p>
+          <a:p>
+            <a:r>
+              <a:rPr lang="es-PE" dirty="0"/>
+              <a:t>Diferencias de sexo en algunas especialidades (ej. quirúrgicas), son descritas por la literatura. Se describen discriminación por sexo, acoso sexual, entre otras como posibles causas de estas diferencias.</a:t>
+            </a:r>
+          </a:p>
+          <a:p>
+            <a:r>
+              <a:rPr lang="es-PE" dirty="0"/>
+              <a:t>El presente estudio busca caracterizar la incorporación del sexo femenino en el programa de </a:t>
+            </a:r>
+            <a:r>
+              <a:rPr lang="es-PE" dirty="0" err="1"/>
+              <a:t>residentado</a:t>
+            </a:r>
+            <a:r>
+              <a:rPr lang="es-PE" dirty="0"/>
+              <a:t> médico del Perú entre los años 2013 y 2023 para tener un panorama de la situación actual respecto a este tema.</a:t>
+            </a:r>
+          </a:p>
+        </p:txBody>
+      </p:sp>
+    </p:spTree>
+    <p:extLst>
+      <p:ext uri="{BB962C8B-B14F-4D97-AF65-F5344CB8AC3E}">
+        <p14:creationId xmlns:p14="http://schemas.microsoft.com/office/powerpoint/2010/main" val="650012995"/>
+      </p:ext>
+    </p:extLst>
+  </p:cSld>
+  <p:clrMapOvr>
+    <a:masterClrMapping/>
+  </p:clrMapOvr>
+</p:sld>
+</file>
+
+<file path=ppt/slides/slide60.xml><?xml version="1.0" encoding="utf-8"?>
 <p:sld xmlns:a="http://schemas.openxmlformats.org/drawingml/2006/main" xmlns:r="http://schemas.openxmlformats.org/officeDocument/2006/relationships" xmlns:p="http://schemas.openxmlformats.org/presentationml/2006/main">
   <p:cSld>
     <p:spTree>
@@ -30940,91 +31165,7 @@
 </p:sld>
 </file>
 
-<file path=ppt/slides/slide6.xml><?xml version="1.0" encoding="utf-8"?>
-<p:sld xmlns:a="http://schemas.openxmlformats.org/drawingml/2006/main" xmlns:r="http://schemas.openxmlformats.org/officeDocument/2006/relationships" xmlns:p="http://schemas.openxmlformats.org/presentationml/2006/main">
-  <p:cSld>
-    <p:spTree>
-      <p:nvGrpSpPr>
-        <p:cNvPr id="1" name=""/>
-        <p:cNvGrpSpPr/>
-        <p:nvPr/>
-      </p:nvGrpSpPr>
-      <p:grpSpPr>
-        <a:xfrm>
-          <a:off x="0" y="0"/>
-          <a:ext cx="0" cy="0"/>
-          <a:chOff x="0" y="0"/>
-          <a:chExt cx="0" cy="0"/>
-        </a:xfrm>
-      </p:grpSpPr>
-      <p:sp>
-        <p:nvSpPr>
-          <p:cNvPr id="2" name="Título 1">
-            <a:extLst>
-              <a:ext uri="{FF2B5EF4-FFF2-40B4-BE49-F238E27FC236}">
-                <a16:creationId xmlns:a16="http://schemas.microsoft.com/office/drawing/2014/main" id="{B93D6C2D-E5CF-02BF-2D34-E0C5D1A9B49A}"/>
-              </a:ext>
-            </a:extLst>
-          </p:cNvPr>
-          <p:cNvSpPr>
-            <a:spLocks noGrp="1"/>
-          </p:cNvSpPr>
-          <p:nvPr>
-            <p:ph type="title"/>
-          </p:nvPr>
-        </p:nvSpPr>
-        <p:spPr/>
-        <p:txBody>
-          <a:bodyPr/>
-          <a:lstStyle/>
-          <a:p>
-            <a:r>
-              <a:rPr lang="es-MX" dirty="0"/>
-              <a:t>Objetivos</a:t>
-            </a:r>
-            <a:endParaRPr lang="es-PE" dirty="0"/>
-          </a:p>
-        </p:txBody>
-      </p:sp>
-      <p:sp>
-        <p:nvSpPr>
-          <p:cNvPr id="3" name="Marcador de texto 2">
-            <a:extLst>
-              <a:ext uri="{FF2B5EF4-FFF2-40B4-BE49-F238E27FC236}">
-                <a16:creationId xmlns:a16="http://schemas.microsoft.com/office/drawing/2014/main" id="{1D359D38-60D7-59E7-C80D-DB406FCBBD50}"/>
-              </a:ext>
-            </a:extLst>
-          </p:cNvPr>
-          <p:cNvSpPr>
-            <a:spLocks noGrp="1"/>
-          </p:cNvSpPr>
-          <p:nvPr>
-            <p:ph type="body" idx="1"/>
-          </p:nvPr>
-        </p:nvSpPr>
-        <p:spPr/>
-        <p:txBody>
-          <a:bodyPr/>
-          <a:lstStyle/>
-          <a:p>
-            <a:endParaRPr lang="es-PE"/>
-          </a:p>
-        </p:txBody>
-      </p:sp>
-    </p:spTree>
-    <p:extLst>
-      <p:ext uri="{BB962C8B-B14F-4D97-AF65-F5344CB8AC3E}">
-        <p14:creationId xmlns:p14="http://schemas.microsoft.com/office/powerpoint/2010/main" val="2626305618"/>
-      </p:ext>
-    </p:extLst>
-  </p:cSld>
-  <p:clrMapOvr>
-    <a:masterClrMapping/>
-  </p:clrMapOvr>
-</p:sld>
-</file>
-
-<file path=ppt/slides/slide60.xml><?xml version="1.0" encoding="utf-8"?>
+<file path=ppt/slides/slide61.xml><?xml version="1.0" encoding="utf-8"?>
 <p:sld xmlns:a="http://schemas.openxmlformats.org/drawingml/2006/main" xmlns:r="http://schemas.openxmlformats.org/officeDocument/2006/relationships" xmlns:p="http://schemas.openxmlformats.org/presentationml/2006/main">
   <p:cSld>
     <p:spTree>
@@ -31125,7 +31266,7 @@
 </p:sld>
 </file>
 
-<file path=ppt/slides/slide61.xml><?xml version="1.0" encoding="utf-8"?>
+<file path=ppt/slides/slide62.xml><?xml version="1.0" encoding="utf-8"?>
 <p:sld xmlns:a="http://schemas.openxmlformats.org/drawingml/2006/main" xmlns:r="http://schemas.openxmlformats.org/officeDocument/2006/relationships" xmlns:p="http://schemas.openxmlformats.org/presentationml/2006/main">
   <p:cSld>
     <p:spTree>
@@ -31236,7 +31377,7 @@
 </p:sld>
 </file>
 
-<file path=ppt/slides/slide62.xml><?xml version="1.0" encoding="utf-8"?>
+<file path=ppt/slides/slide63.xml><?xml version="1.0" encoding="utf-8"?>
 <p:sld xmlns:a="http://schemas.openxmlformats.org/drawingml/2006/main" xmlns:r="http://schemas.openxmlformats.org/officeDocument/2006/relationships" xmlns:p="http://schemas.openxmlformats.org/presentationml/2006/main">
   <p:cSld>
     <p:spTree>
@@ -31324,7 +31465,106 @@
 </p:sld>
 </file>
 
-<file path=ppt/slides/slide63.xml><?xml version="1.0" encoding="utf-8"?>
+<file path=ppt/slides/slide64.xml><?xml version="1.0" encoding="utf-8"?>
+<p:sld xmlns:a="http://schemas.openxmlformats.org/drawingml/2006/main" xmlns:r="http://schemas.openxmlformats.org/officeDocument/2006/relationships" xmlns:p="http://schemas.openxmlformats.org/presentationml/2006/main">
+  <p:cSld>
+    <p:spTree>
+      <p:nvGrpSpPr>
+        <p:cNvPr id="1" name=""/>
+        <p:cNvGrpSpPr/>
+        <p:nvPr/>
+      </p:nvGrpSpPr>
+      <p:grpSpPr>
+        <a:xfrm>
+          <a:off x="0" y="0"/>
+          <a:ext cx="0" cy="0"/>
+          <a:chOff x="0" y="0"/>
+          <a:chExt cx="0" cy="0"/>
+        </a:xfrm>
+      </p:grpSpPr>
+      <p:sp>
+        <p:nvSpPr>
+          <p:cNvPr id="2" name="Título 1">
+            <a:extLst>
+              <a:ext uri="{FF2B5EF4-FFF2-40B4-BE49-F238E27FC236}">
+                <a16:creationId xmlns:a16="http://schemas.microsoft.com/office/drawing/2014/main" id="{ABF4C973-3B88-39AF-D0D2-4F990CE91C97}"/>
+              </a:ext>
+            </a:extLst>
+          </p:cNvPr>
+          <p:cNvSpPr>
+            <a:spLocks noGrp="1"/>
+          </p:cNvSpPr>
+          <p:nvPr>
+            <p:ph type="title"/>
+          </p:nvPr>
+        </p:nvSpPr>
+        <p:spPr/>
+        <p:txBody>
+          <a:bodyPr/>
+          <a:lstStyle/>
+          <a:p>
+            <a:r>
+              <a:rPr lang="es-MX" dirty="0"/>
+              <a:t>Limitaciones</a:t>
+            </a:r>
+            <a:endParaRPr lang="es-PE" dirty="0"/>
+          </a:p>
+        </p:txBody>
+      </p:sp>
+      <p:sp>
+        <p:nvSpPr>
+          <p:cNvPr id="3" name="Marcador de contenido 2">
+            <a:extLst>
+              <a:ext uri="{FF2B5EF4-FFF2-40B4-BE49-F238E27FC236}">
+                <a16:creationId xmlns:a16="http://schemas.microsoft.com/office/drawing/2014/main" id="{615A7A1F-5782-8B07-F0C4-861BE928D2F5}"/>
+              </a:ext>
+            </a:extLst>
+          </p:cNvPr>
+          <p:cNvSpPr>
+            <a:spLocks noGrp="1"/>
+          </p:cNvSpPr>
+          <p:nvPr>
+            <p:ph idx="1"/>
+          </p:nvPr>
+        </p:nvSpPr>
+        <p:spPr/>
+        <p:txBody>
+          <a:bodyPr/>
+          <a:lstStyle/>
+          <a:p>
+            <a:r>
+              <a:rPr lang="es-MX" dirty="0"/>
+              <a:t>Cabe mencionar que la forma de asignación de sexo utilizada y su interpretación como un sustituto aproximado del género es imperfecta. En el presente estudio se consideró el sexo femenino y el sexo masculino. Investigaciones usando esta metodología abordan el género como binario (31–33). El estudio de Sinclair y Clark reconoce a este aspecto como una limitación y acepta que con la metodología utilizada no se puede estudiar el espectro de género en aquellos que se identifican con un género no binario (31). Es necesario realizar otros estudios diseñados para abordar a esta población para determinar las características y tendencias en estos grupos.</a:t>
+            </a:r>
+          </a:p>
+          <a:p>
+            <a:r>
+              <a:rPr lang="es-MX" dirty="0"/>
+              <a:t>Se considera también oportuno incluir esta información en los procesos de admisión en distintas etapas de la formación académica en la carrera de medicina humana, así como en la información brindada por los mecanismos de registro de información de recursos humanos a nivel nacional para facilitar la investigación en este tema.</a:t>
+            </a:r>
+          </a:p>
+          <a:p>
+            <a:pPr marL="0" indent="0">
+              <a:buNone/>
+            </a:pPr>
+            <a:endParaRPr lang="es-PE" dirty="0"/>
+          </a:p>
+        </p:txBody>
+      </p:sp>
+    </p:spTree>
+    <p:extLst>
+      <p:ext uri="{BB962C8B-B14F-4D97-AF65-F5344CB8AC3E}">
+        <p14:creationId xmlns:p14="http://schemas.microsoft.com/office/powerpoint/2010/main" val="1957995745"/>
+      </p:ext>
+    </p:extLst>
+  </p:cSld>
+  <p:clrMapOvr>
+    <a:masterClrMapping/>
+  </p:clrMapOvr>
+</p:sld>
+</file>
+
+<file path=ppt/slides/slide65.xml><?xml version="1.0" encoding="utf-8"?>
 <p:sld xmlns:a="http://schemas.openxmlformats.org/drawingml/2006/main" xmlns:r="http://schemas.openxmlformats.org/officeDocument/2006/relationships" xmlns:p="http://schemas.openxmlformats.org/presentationml/2006/main">
   <p:cSld>
     <p:spTree>
@@ -31438,7 +31678,7 @@
 </p:sld>
 </file>
 
-<file path=ppt/slides/slide64.xml><?xml version="1.0" encoding="utf-8"?>
+<file path=ppt/slides/slide66.xml><?xml version="1.0" encoding="utf-8"?>
 <p:sld xmlns:a="http://schemas.openxmlformats.org/drawingml/2006/main" xmlns:r="http://schemas.openxmlformats.org/officeDocument/2006/relationships" xmlns:p="http://schemas.openxmlformats.org/presentationml/2006/main">
   <p:cSld>
     <p:spTree>
@@ -31536,7 +31776,7 @@
 </p:sld>
 </file>
 
-<file path=ppt/slides/slide65.xml><?xml version="1.0" encoding="utf-8"?>
+<file path=ppt/slides/slide67.xml><?xml version="1.0" encoding="utf-8"?>
 <p:sld xmlns:a="http://schemas.openxmlformats.org/drawingml/2006/main" xmlns:r="http://schemas.openxmlformats.org/officeDocument/2006/relationships" xmlns:p="http://schemas.openxmlformats.org/presentationml/2006/main">
   <p:cSld>
     <p:spTree>
@@ -31639,7 +31879,7 @@
 </p:sld>
 </file>
 
-<file path=ppt/slides/slide66.xml><?xml version="1.0" encoding="utf-8"?>
+<file path=ppt/slides/slide68.xml><?xml version="1.0" encoding="utf-8"?>
 <p:sld xmlns:a="http://schemas.openxmlformats.org/drawingml/2006/main" xmlns:r="http://schemas.openxmlformats.org/officeDocument/2006/relationships" xmlns:p="http://schemas.openxmlformats.org/presentationml/2006/main">
   <p:cSld>
     <p:spTree>
@@ -31765,7 +32005,7 @@
 </p:sld>
 </file>
 
-<file path=ppt/slides/slide67.xml><?xml version="1.0" encoding="utf-8"?>
+<file path=ppt/slides/slide69.xml><?xml version="1.0" encoding="utf-8"?>
 <p:sld xmlns:a="http://schemas.openxmlformats.org/drawingml/2006/main" xmlns:r="http://schemas.openxmlformats.org/officeDocument/2006/relationships" xmlns:p="http://schemas.openxmlformats.org/presentationml/2006/main">
   <p:cSld>
     <p:spTree>
@@ -31849,7 +32089,91 @@
 </p:sld>
 </file>
 
-<file path=ppt/slides/slide68.xml><?xml version="1.0" encoding="utf-8"?>
+<file path=ppt/slides/slide7.xml><?xml version="1.0" encoding="utf-8"?>
+<p:sld xmlns:a="http://schemas.openxmlformats.org/drawingml/2006/main" xmlns:r="http://schemas.openxmlformats.org/officeDocument/2006/relationships" xmlns:p="http://schemas.openxmlformats.org/presentationml/2006/main">
+  <p:cSld>
+    <p:spTree>
+      <p:nvGrpSpPr>
+        <p:cNvPr id="1" name=""/>
+        <p:cNvGrpSpPr/>
+        <p:nvPr/>
+      </p:nvGrpSpPr>
+      <p:grpSpPr>
+        <a:xfrm>
+          <a:off x="0" y="0"/>
+          <a:ext cx="0" cy="0"/>
+          <a:chOff x="0" y="0"/>
+          <a:chExt cx="0" cy="0"/>
+        </a:xfrm>
+      </p:grpSpPr>
+      <p:sp>
+        <p:nvSpPr>
+          <p:cNvPr id="2" name="Título 1">
+            <a:extLst>
+              <a:ext uri="{FF2B5EF4-FFF2-40B4-BE49-F238E27FC236}">
+                <a16:creationId xmlns:a16="http://schemas.microsoft.com/office/drawing/2014/main" id="{B93D6C2D-E5CF-02BF-2D34-E0C5D1A9B49A}"/>
+              </a:ext>
+            </a:extLst>
+          </p:cNvPr>
+          <p:cNvSpPr>
+            <a:spLocks noGrp="1"/>
+          </p:cNvSpPr>
+          <p:nvPr>
+            <p:ph type="title"/>
+          </p:nvPr>
+        </p:nvSpPr>
+        <p:spPr/>
+        <p:txBody>
+          <a:bodyPr/>
+          <a:lstStyle/>
+          <a:p>
+            <a:r>
+              <a:rPr lang="es-MX" dirty="0"/>
+              <a:t>Objetivos</a:t>
+            </a:r>
+            <a:endParaRPr lang="es-PE" dirty="0"/>
+          </a:p>
+        </p:txBody>
+      </p:sp>
+      <p:sp>
+        <p:nvSpPr>
+          <p:cNvPr id="3" name="Marcador de texto 2">
+            <a:extLst>
+              <a:ext uri="{FF2B5EF4-FFF2-40B4-BE49-F238E27FC236}">
+                <a16:creationId xmlns:a16="http://schemas.microsoft.com/office/drawing/2014/main" id="{1D359D38-60D7-59E7-C80D-DB406FCBBD50}"/>
+              </a:ext>
+            </a:extLst>
+          </p:cNvPr>
+          <p:cNvSpPr>
+            <a:spLocks noGrp="1"/>
+          </p:cNvSpPr>
+          <p:nvPr>
+            <p:ph type="body" idx="1"/>
+          </p:nvPr>
+        </p:nvSpPr>
+        <p:spPr/>
+        <p:txBody>
+          <a:bodyPr/>
+          <a:lstStyle/>
+          <a:p>
+            <a:endParaRPr lang="es-PE"/>
+          </a:p>
+        </p:txBody>
+      </p:sp>
+    </p:spTree>
+    <p:extLst>
+      <p:ext uri="{BB962C8B-B14F-4D97-AF65-F5344CB8AC3E}">
+        <p14:creationId xmlns:p14="http://schemas.microsoft.com/office/powerpoint/2010/main" val="2626305618"/>
+      </p:ext>
+    </p:extLst>
+  </p:cSld>
+  <p:clrMapOvr>
+    <a:masterClrMapping/>
+  </p:clrMapOvr>
+</p:sld>
+</file>
+
+<file path=ppt/slides/slide70.xml><?xml version="1.0" encoding="utf-8"?>
 <p:sld xmlns:a="http://schemas.openxmlformats.org/drawingml/2006/main" xmlns:r="http://schemas.openxmlformats.org/officeDocument/2006/relationships" xmlns:p="http://schemas.openxmlformats.org/presentationml/2006/main">
   <p:cSld>
     <p:spTree>
@@ -32043,7 +32367,7 @@
 </p:sld>
 </file>
 
-<file path=ppt/slides/slide69.xml><?xml version="1.0" encoding="utf-8"?>
+<file path=ppt/slides/slide71.xml><?xml version="1.0" encoding="utf-8"?>
 <p:sld xmlns:a="http://schemas.openxmlformats.org/drawingml/2006/main" xmlns:r="http://schemas.openxmlformats.org/officeDocument/2006/relationships" xmlns:p="http://schemas.openxmlformats.org/presentationml/2006/main">
   <p:cSld>
     <p:spTree>
@@ -32127,133 +32451,7 @@
 </p:sld>
 </file>
 
-<file path=ppt/slides/slide7.xml><?xml version="1.0" encoding="utf-8"?>
-<p:sld xmlns:a="http://schemas.openxmlformats.org/drawingml/2006/main" xmlns:r="http://schemas.openxmlformats.org/officeDocument/2006/relationships" xmlns:p="http://schemas.openxmlformats.org/presentationml/2006/main">
-  <p:cSld>
-    <p:spTree>
-      <p:nvGrpSpPr>
-        <p:cNvPr id="1" name=""/>
-        <p:cNvGrpSpPr/>
-        <p:nvPr/>
-      </p:nvGrpSpPr>
-      <p:grpSpPr>
-        <a:xfrm>
-          <a:off x="0" y="0"/>
-          <a:ext cx="0" cy="0"/>
-          <a:chOff x="0" y="0"/>
-          <a:chExt cx="0" cy="0"/>
-        </a:xfrm>
-      </p:grpSpPr>
-      <p:sp>
-        <p:nvSpPr>
-          <p:cNvPr id="2" name="Título 1">
-            <a:extLst>
-              <a:ext uri="{FF2B5EF4-FFF2-40B4-BE49-F238E27FC236}">
-                <a16:creationId xmlns:a16="http://schemas.microsoft.com/office/drawing/2014/main" id="{A531F47C-DA26-35CE-0873-17A082AE2BFA}"/>
-              </a:ext>
-            </a:extLst>
-          </p:cNvPr>
-          <p:cNvSpPr>
-            <a:spLocks noGrp="1"/>
-          </p:cNvSpPr>
-          <p:nvPr>
-            <p:ph type="title"/>
-          </p:nvPr>
-        </p:nvSpPr>
-        <p:spPr/>
-        <p:txBody>
-          <a:bodyPr/>
-          <a:lstStyle/>
-          <a:p>
-            <a:r>
-              <a:rPr lang="es-MX" dirty="0"/>
-              <a:t>Objetivos de la investigación</a:t>
-            </a:r>
-            <a:endParaRPr lang="es-PE" dirty="0"/>
-          </a:p>
-        </p:txBody>
-      </p:sp>
-      <p:sp>
-        <p:nvSpPr>
-          <p:cNvPr id="3" name="Marcador de contenido 2">
-            <a:extLst>
-              <a:ext uri="{FF2B5EF4-FFF2-40B4-BE49-F238E27FC236}">
-                <a16:creationId xmlns:a16="http://schemas.microsoft.com/office/drawing/2014/main" id="{01E5D52F-4BAA-8852-F0F7-5FEBA26AB447}"/>
-              </a:ext>
-            </a:extLst>
-          </p:cNvPr>
-          <p:cNvSpPr>
-            <a:spLocks noGrp="1"/>
-          </p:cNvSpPr>
-          <p:nvPr>
-            <p:ph idx="1"/>
-          </p:nvPr>
-        </p:nvSpPr>
-        <p:spPr/>
-        <p:txBody>
-          <a:bodyPr>
-            <a:normAutofit/>
-          </a:bodyPr>
-          <a:lstStyle/>
-          <a:p>
-            <a:r>
-              <a:rPr lang="es-MX" dirty="0"/>
-              <a:t>Objetivo general: determinar las tendencias de sexo de los postulantes e ingresantes a las distintas especialidades médicas en el Perú durante el periodo 2013-2023.</a:t>
-            </a:r>
-          </a:p>
-          <a:p>
-            <a:r>
-              <a:rPr lang="es-MX" dirty="0"/>
-              <a:t>Objetivos específicos:</a:t>
-            </a:r>
-          </a:p>
-          <a:p>
-            <a:pPr lvl="1"/>
-            <a:r>
-              <a:rPr lang="es-MX" dirty="0"/>
-              <a:t>Describir las tendencias de sexo de los postulantes a las especialidades médicas</a:t>
-            </a:r>
-          </a:p>
-          <a:p>
-            <a:pPr lvl="1"/>
-            <a:r>
-              <a:rPr lang="es-MX" dirty="0"/>
-              <a:t>Describir las tendencias de sexo de los ingresantes a las especialidades médicas</a:t>
-            </a:r>
-          </a:p>
-          <a:p>
-            <a:pPr lvl="1"/>
-            <a:r>
-              <a:rPr lang="es-MX" dirty="0"/>
-              <a:t>Comparar los cambios en la distribución de sexo entre los postulantes a las especialidades quirúrgicas y clínicas</a:t>
-            </a:r>
-          </a:p>
-          <a:p>
-            <a:pPr lvl="1"/>
-            <a:r>
-              <a:rPr lang="es-MX" dirty="0"/>
-              <a:t>Describir las tendencias de sexo de los postulantes de acuerdo con la región de postulación</a:t>
-            </a:r>
-          </a:p>
-          <a:p>
-            <a:endParaRPr lang="es-PE" dirty="0"/>
-          </a:p>
-        </p:txBody>
-      </p:sp>
-    </p:spTree>
-    <p:extLst>
-      <p:ext uri="{BB962C8B-B14F-4D97-AF65-F5344CB8AC3E}">
-        <p14:creationId xmlns:p14="http://schemas.microsoft.com/office/powerpoint/2010/main" val="255294937"/>
-      </p:ext>
-    </p:extLst>
-  </p:cSld>
-  <p:clrMapOvr>
-    <a:masterClrMapping/>
-  </p:clrMapOvr>
-</p:sld>
-</file>
-
-<file path=ppt/slides/slide70.xml><?xml version="1.0" encoding="utf-8"?>
+<file path=ppt/slides/slide72.xml><?xml version="1.0" encoding="utf-8"?>
 <p:sld xmlns:a="http://schemas.openxmlformats.org/drawingml/2006/main" xmlns:r="http://schemas.openxmlformats.org/officeDocument/2006/relationships" xmlns:p="http://schemas.openxmlformats.org/presentationml/2006/main">
   <p:cSld>
     <p:spTree>
@@ -32431,7 +32629,7 @@
           <p:cNvPr id="2" name="Título 1">
             <a:extLst>
               <a:ext uri="{FF2B5EF4-FFF2-40B4-BE49-F238E27FC236}">
-                <a16:creationId xmlns:a16="http://schemas.microsoft.com/office/drawing/2014/main" id="{DC470A37-A537-AA7E-F229-14FF57CF860B}"/>
+                <a16:creationId xmlns:a16="http://schemas.microsoft.com/office/drawing/2014/main" id="{A531F47C-DA26-35CE-0873-17A082AE2BFA}"/>
               </a:ext>
             </a:extLst>
           </p:cNvPr>
@@ -32449,7 +32647,7 @@
           <a:p>
             <a:r>
               <a:rPr lang="es-MX" dirty="0"/>
-              <a:t>Materiales y métodos</a:t>
+              <a:t>Objetivos de la investigación</a:t>
             </a:r>
             <a:endParaRPr lang="es-PE" dirty="0"/>
           </a:p>
@@ -32457,10 +32655,10 @@
       </p:sp>
       <p:sp>
         <p:nvSpPr>
-          <p:cNvPr id="3" name="Marcador de texto 2">
+          <p:cNvPr id="3" name="Marcador de contenido 2">
             <a:extLst>
               <a:ext uri="{FF2B5EF4-FFF2-40B4-BE49-F238E27FC236}">
-                <a16:creationId xmlns:a16="http://schemas.microsoft.com/office/drawing/2014/main" id="{C76F0A8B-DCA2-47AB-A092-824004EC7CCE}"/>
+                <a16:creationId xmlns:a16="http://schemas.microsoft.com/office/drawing/2014/main" id="{01E5D52F-4BAA-8852-F0F7-5FEBA26AB447}"/>
               </a:ext>
             </a:extLst>
           </p:cNvPr>
@@ -32468,22 +32666,64 @@
             <a:spLocks noGrp="1"/>
           </p:cNvSpPr>
           <p:nvPr>
-            <p:ph type="body" idx="1"/>
+            <p:ph idx="1"/>
           </p:nvPr>
         </p:nvSpPr>
         <p:spPr/>
         <p:txBody>
-          <a:bodyPr/>
+          <a:bodyPr>
+            <a:normAutofit/>
+          </a:bodyPr>
           <a:lstStyle/>
           <a:p>
-            <a:endParaRPr lang="es-PE"/>
+            <a:r>
+              <a:rPr lang="es-MX" dirty="0"/>
+              <a:t>Objetivo general: determinar las tendencias de sexo de los postulantes e ingresantes a las distintas especialidades médicas en el Perú durante el periodo 2013-2023.</a:t>
+            </a:r>
+          </a:p>
+          <a:p>
+            <a:r>
+              <a:rPr lang="es-MX" dirty="0"/>
+              <a:t>Objetivos específicos:</a:t>
+            </a:r>
+          </a:p>
+          <a:p>
+            <a:pPr lvl="1"/>
+            <a:r>
+              <a:rPr lang="es-MX" dirty="0"/>
+              <a:t>Describir las tendencias de sexo de los postulantes a las especialidades médicas</a:t>
+            </a:r>
+          </a:p>
+          <a:p>
+            <a:pPr lvl="1"/>
+            <a:r>
+              <a:rPr lang="es-MX" dirty="0"/>
+              <a:t>Describir las tendencias de sexo de los ingresantes a las especialidades médicas</a:t>
+            </a:r>
+          </a:p>
+          <a:p>
+            <a:pPr lvl="1"/>
+            <a:r>
+              <a:rPr lang="es-MX" dirty="0"/>
+              <a:t>Comparar los cambios en la distribución de sexo entre los postulantes a las especialidades quirúrgicas y clínicas</a:t>
+            </a:r>
+          </a:p>
+          <a:p>
+            <a:pPr lvl="1"/>
+            <a:r>
+              <a:rPr lang="es-MX" dirty="0"/>
+              <a:t>Describir las tendencias de sexo de los postulantes de acuerdo con la región de postulación</a:t>
+            </a:r>
+          </a:p>
+          <a:p>
+            <a:endParaRPr lang="es-PE" dirty="0"/>
           </a:p>
         </p:txBody>
       </p:sp>
     </p:spTree>
     <p:extLst>
       <p:ext uri="{BB962C8B-B14F-4D97-AF65-F5344CB8AC3E}">
-        <p14:creationId xmlns:p14="http://schemas.microsoft.com/office/powerpoint/2010/main" val="1247254136"/>
+        <p14:creationId xmlns:p14="http://schemas.microsoft.com/office/powerpoint/2010/main" val="255294937"/>
       </p:ext>
     </p:extLst>
   </p:cSld>
@@ -32515,7 +32755,7 @@
           <p:cNvPr id="2" name="Título 1">
             <a:extLst>
               <a:ext uri="{FF2B5EF4-FFF2-40B4-BE49-F238E27FC236}">
-                <a16:creationId xmlns:a16="http://schemas.microsoft.com/office/drawing/2014/main" id="{08F598B0-53C8-C7E5-C707-9AEF6D1CAA9E}"/>
+                <a16:creationId xmlns:a16="http://schemas.microsoft.com/office/drawing/2014/main" id="{DC470A37-A537-AA7E-F229-14FF57CF860B}"/>
               </a:ext>
             </a:extLst>
           </p:cNvPr>
@@ -32533,7 +32773,7 @@
           <a:p>
             <a:r>
               <a:rPr lang="es-MX" dirty="0"/>
-              <a:t>Obtención y manejo de datos</a:t>
+              <a:t>Materiales y métodos</a:t>
             </a:r>
             <a:endParaRPr lang="es-PE" dirty="0"/>
           </a:p>
@@ -32541,10 +32781,10 @@
       </p:sp>
       <p:sp>
         <p:nvSpPr>
-          <p:cNvPr id="3" name="Marcador de contenido 2">
+          <p:cNvPr id="3" name="Marcador de texto 2">
             <a:extLst>
               <a:ext uri="{FF2B5EF4-FFF2-40B4-BE49-F238E27FC236}">
-                <a16:creationId xmlns:a16="http://schemas.microsoft.com/office/drawing/2014/main" id="{4816063D-634E-B1FE-0D3C-4155ECDE73A8}"/>
+                <a16:creationId xmlns:a16="http://schemas.microsoft.com/office/drawing/2014/main" id="{C76F0A8B-DCA2-47AB-A092-824004EC7CCE}"/>
               </a:ext>
             </a:extLst>
           </p:cNvPr>
@@ -32552,7 +32792,7 @@
             <a:spLocks noGrp="1"/>
           </p:cNvSpPr>
           <p:nvPr>
-            <p:ph idx="1"/>
+            <p:ph type="body" idx="1"/>
           </p:nvPr>
         </p:nvSpPr>
         <p:spPr/>
@@ -32560,67 +32800,14 @@
           <a:bodyPr/>
           <a:lstStyle/>
           <a:p>
-            <a:r>
-              <a:rPr lang="es-MX" dirty="0"/>
-              <a:t>Información obtenida de los resultados públicos del Concurso Nacional del </a:t>
-            </a:r>
-            <a:r>
-              <a:rPr lang="es-MX" dirty="0" err="1"/>
-              <a:t>Residentado</a:t>
-            </a:r>
-            <a:r>
-              <a:rPr lang="es-MX" dirty="0"/>
-              <a:t> Médico (CONAREME) entre los años 2013 y 2023</a:t>
-            </a:r>
-            <a:r>
-              <a:rPr lang="es-PE" dirty="0"/>
-              <a:t>.</a:t>
-            </a:r>
-          </a:p>
-          <a:p>
-            <a:r>
-              <a:rPr lang="es-MX" dirty="0"/>
-              <a:t>Estos años contenían la información relevante para el presente estudio.</a:t>
-            </a:r>
-          </a:p>
-          <a:p>
-            <a:pPr lvl="1"/>
-            <a:r>
-              <a:rPr lang="es-MX" dirty="0"/>
-              <a:t>2013 – 2023: información completa de postulantes solamente</a:t>
-            </a:r>
-          </a:p>
-          <a:p>
-            <a:pPr lvl="1"/>
-            <a:r>
-              <a:rPr lang="es-MX" dirty="0"/>
-              <a:t>2016 – 2023: información completa de postulantes e ingresantes</a:t>
-            </a:r>
-          </a:p>
-          <a:p>
-            <a:r>
-              <a:rPr lang="es-MX" dirty="0"/>
-              <a:t>Formato en PDF fue transformado a CSV usando programa “Tabula”.</a:t>
-            </a:r>
-          </a:p>
-          <a:p>
-            <a:r>
-              <a:rPr lang="es-MX" dirty="0"/>
-              <a:t>Bases de datos fueron unificadas en una sola usando software “R”.</a:t>
-            </a:r>
-          </a:p>
-          <a:p>
-            <a:r>
-              <a:rPr lang="es-MX" dirty="0"/>
-              <a:t>Repositorio disponible en GitHub.</a:t>
-            </a:r>
+            <a:endParaRPr lang="es-PE"/>
           </a:p>
         </p:txBody>
       </p:sp>
     </p:spTree>
     <p:extLst>
       <p:ext uri="{BB962C8B-B14F-4D97-AF65-F5344CB8AC3E}">
-        <p14:creationId xmlns:p14="http://schemas.microsoft.com/office/powerpoint/2010/main" val="831922085"/>
+        <p14:creationId xmlns:p14="http://schemas.microsoft.com/office/powerpoint/2010/main" val="1247254136"/>
       </p:ext>
     </p:extLst>
   </p:cSld>

</xml_diff>

<commit_message>
Minor changes to the slides for the presentation
</commit_message>
<xml_diff>
--- a/doc/diapositivas_sustentacion_tesis.pptx
+++ b/doc/diapositivas_sustentacion_tesis.pptx
@@ -366,7 +366,7 @@
           <a:p>
             <a:fld id="{234B5AB6-08EC-47B1-B66D-262C33DD7BFF}" type="datetimeFigureOut">
               <a:rPr lang="es-PE" smtClean="0"/>
-              <a:t>13/03/2024</a:t>
+              <a:t>14/03/2024</a:t>
             </a:fld>
             <a:endParaRPr lang="es-PE"/>
           </a:p>
@@ -6684,7 +6684,7 @@
           <a:p>
             <a:fld id="{DBA08613-9D34-4C64-ADF6-F6A78A49E861}" type="datetime1">
               <a:rPr lang="es-PE" smtClean="0"/>
-              <a:t>13/03/2024</a:t>
+              <a:t>14/03/2024</a:t>
             </a:fld>
             <a:endParaRPr lang="es-PE"/>
           </a:p>
@@ -6944,7 +6944,7 @@
           <a:p>
             <a:fld id="{B75BB41B-2F1F-4EED-B9AD-28A4491210E7}" type="datetime1">
               <a:rPr lang="es-PE" smtClean="0"/>
-              <a:t>13/03/2024</a:t>
+              <a:t>14/03/2024</a:t>
             </a:fld>
             <a:endParaRPr lang="es-PE"/>
           </a:p>
@@ -7124,7 +7124,7 @@
           <a:p>
             <a:fld id="{71D8067A-C68A-4979-A401-8C5E7407C067}" type="datetime1">
               <a:rPr lang="es-PE" smtClean="0"/>
-              <a:t>13/03/2024</a:t>
+              <a:t>14/03/2024</a:t>
             </a:fld>
             <a:endParaRPr lang="es-PE"/>
           </a:p>
@@ -7294,7 +7294,7 @@
           <a:p>
             <a:fld id="{D1774A54-FE2F-4FC6-8AFA-80C224BC656A}" type="datetime1">
               <a:rPr lang="es-PE" smtClean="0"/>
-              <a:t>13/03/2024</a:t>
+              <a:t>14/03/2024</a:t>
             </a:fld>
             <a:endParaRPr lang="es-PE"/>
           </a:p>
@@ -7389,7 +7389,7 @@
           <a:p>
             <a:fld id="{E054427A-AE26-4525-B400-F58E74A9FC76}" type="datetime1">
               <a:rPr lang="es-PE" smtClean="0"/>
-              <a:t>13/03/2024</a:t>
+              <a:t>14/03/2024</a:t>
             </a:fld>
             <a:endParaRPr lang="es-PE"/>
           </a:p>
@@ -7640,7 +7640,7 @@
           <a:p>
             <a:fld id="{1D6BE7BA-8246-4880-802B-5A6218087811}" type="datetime1">
               <a:rPr lang="es-PE" smtClean="0"/>
-              <a:t>13/03/2024</a:t>
+              <a:t>14/03/2024</a:t>
             </a:fld>
             <a:endParaRPr lang="es-PE"/>
           </a:p>
@@ -7877,7 +7877,7 @@
           <a:p>
             <a:fld id="{CAFA8352-98D0-4A7E-9854-DE4ECABCBA21}" type="datetime1">
               <a:rPr lang="es-PE" smtClean="0"/>
-              <a:t>13/03/2024</a:t>
+              <a:t>14/03/2024</a:t>
             </a:fld>
             <a:endParaRPr lang="es-PE"/>
           </a:p>
@@ -8249,7 +8249,7 @@
           <a:p>
             <a:fld id="{B043D876-3743-4EFD-BCD5-F739EF54D74F}" type="datetime1">
               <a:rPr lang="es-PE" smtClean="0"/>
-              <a:t>13/03/2024</a:t>
+              <a:t>14/03/2024</a:t>
             </a:fld>
             <a:endParaRPr lang="es-PE"/>
           </a:p>
@@ -8367,7 +8367,7 @@
           <a:p>
             <a:fld id="{B45967A8-DDED-4B1B-B6CA-99B42AB63C5E}" type="datetime1">
               <a:rPr lang="es-PE" smtClean="0"/>
-              <a:t>13/03/2024</a:t>
+              <a:t>14/03/2024</a:t>
             </a:fld>
             <a:endParaRPr lang="es-PE"/>
           </a:p>
@@ -8462,7 +8462,7 @@
           <a:p>
             <a:fld id="{F79EBBD7-A3BE-4C68-B9B4-7EA7ECCEA8A9}" type="datetime1">
               <a:rPr lang="es-PE" smtClean="0"/>
-              <a:t>13/03/2024</a:t>
+              <a:t>14/03/2024</a:t>
             </a:fld>
             <a:endParaRPr lang="es-PE"/>
           </a:p>
@@ -8739,7 +8739,7 @@
           <a:p>
             <a:fld id="{01D42D07-AD1D-473C-9AFB-078C74387C23}" type="datetime1">
               <a:rPr lang="es-PE" smtClean="0"/>
-              <a:t>13/03/2024</a:t>
+              <a:t>14/03/2024</a:t>
             </a:fld>
             <a:endParaRPr lang="es-PE"/>
           </a:p>
@@ -8996,7 +8996,7 @@
           <a:p>
             <a:fld id="{C5CA423F-7FF1-4C67-804C-F4CFC7576EBA}" type="datetime1">
               <a:rPr lang="es-PE" smtClean="0"/>
-              <a:t>13/03/2024</a:t>
+              <a:t>14/03/2024</a:t>
             </a:fld>
             <a:endParaRPr lang="es-PE"/>
           </a:p>
@@ -9218,7 +9218,7 @@
           <a:p>
             <a:fld id="{A5B619CE-DC29-48B1-9B48-532ED1DECCF0}" type="datetime1">
               <a:rPr lang="es-PE" smtClean="0"/>
-              <a:t>13/03/2024</a:t>
+              <a:t>14/03/2024</a:t>
             </a:fld>
             <a:endParaRPr lang="es-PE"/>
           </a:p>
@@ -9939,8 +9939,8 @@
         </p:nvSpPr>
         <p:spPr>
           <a:xfrm>
-            <a:off x="838200" y="1690688"/>
-            <a:ext cx="8437880" cy="4486275"/>
+            <a:off x="838199" y="1690688"/>
+            <a:ext cx="8824415" cy="4486275"/>
           </a:xfrm>
         </p:spPr>
         <p:txBody>
@@ -9964,25 +9964,19 @@
           <a:p>
             <a:r>
               <a:rPr lang="es-MX" dirty="0"/>
-              <a:t>Especialidad</a:t>
+              <a:t>Especialidad → tipo de especialidad (quirúrgica o clínica)</a:t>
             </a:r>
           </a:p>
           <a:p>
             <a:r>
               <a:rPr lang="es-MX" dirty="0"/>
-              <a:t>Ingreso</a:t>
+              <a:t>Resultado de postulación</a:t>
             </a:r>
           </a:p>
           <a:p>
             <a:r>
               <a:rPr lang="es-MX" dirty="0"/>
               <a:t>Sexo</a:t>
-            </a:r>
-          </a:p>
-          <a:p>
-            <a:r>
-              <a:rPr lang="es-MX" dirty="0"/>
-              <a:t>Tipo de especialidad (quirúrgica o clínica)</a:t>
             </a:r>
           </a:p>
         </p:txBody>
@@ -15800,7 +15794,7 @@
 </file>
 
 <file path=ppt/slides/slide2.xml><?xml version="1.0" encoding="utf-8"?>
-<p:sld xmlns:a="http://schemas.openxmlformats.org/drawingml/2006/main" xmlns:r="http://schemas.openxmlformats.org/officeDocument/2006/relationships" xmlns:p="http://schemas.openxmlformats.org/presentationml/2006/main">
+<p:sld xmlns:a="http://schemas.openxmlformats.org/drawingml/2006/main" xmlns:r="http://schemas.openxmlformats.org/officeDocument/2006/relationships" xmlns:p="http://schemas.openxmlformats.org/presentationml/2006/main" show="0">
   <p:cSld>
     <p:spTree>
       <p:nvGrpSpPr>
@@ -40177,7 +40171,7 @@
           <a:p>
             <a:r>
               <a:rPr lang="es-PE" dirty="0"/>
-              <a:t>Diferencias de sexo en algunas especialidades (ej. quirúrgicas), son descritas por la literatura. Se describen discriminación por sexo, acoso sexual como posibles causas.</a:t>
+              <a:t>Posibles causas descritas son problemáticas, tales como discriminación por sexo y acoso sexual, entre otras.</a:t>
             </a:r>
           </a:p>
         </p:txBody>
@@ -40605,12 +40599,6 @@
             <a:r>
               <a:rPr lang="es-MX" dirty="0"/>
               <a:t>Forma de determinar el sexo no fue directa, sino obtenida a partir del primer nombre. </a:t>
-            </a:r>
-          </a:p>
-          <a:p>
-            <a:r>
-              <a:rPr lang="es-MX" dirty="0"/>
-              <a:t>Se usó concepto de sexo en lugar de género.</a:t>
             </a:r>
           </a:p>
           <a:p>

</xml_diff>